<commit_message>
added last plots to ppt
</commit_message>
<xml_diff>
--- a/webscraping_proj.pptx
+++ b/webscraping_proj.pptx
@@ -1143,6 +1143,90 @@
     <p:extLst>
       <p:ext uri="{BB962C8B-B14F-4D97-AF65-F5344CB8AC3E}">
         <p14:creationId xmlns:p14="http://schemas.microsoft.com/office/powerpoint/2010/main" val="4263128842"/>
+      </p:ext>
+    </p:extLst>
+  </p:cSld>
+  <p:clrMapOvr>
+    <a:masterClrMapping/>
+  </p:clrMapOvr>
+</p:notes>
+</file>
+
+<file path=ppt/notesSlides/notesSlide6.xml><?xml version="1.0" encoding="utf-8"?>
+<p:notes xmlns:a="http://schemas.openxmlformats.org/drawingml/2006/main" xmlns:r="http://schemas.openxmlformats.org/officeDocument/2006/relationships" xmlns:p="http://schemas.openxmlformats.org/presentationml/2006/main">
+  <p:cSld>
+    <p:spTree>
+      <p:nvGrpSpPr>
+        <p:cNvPr id="1" name=""/>
+        <p:cNvGrpSpPr/>
+        <p:nvPr/>
+      </p:nvGrpSpPr>
+      <p:grpSpPr>
+        <a:xfrm>
+          <a:off x="0" y="0"/>
+          <a:ext cx="0" cy="0"/>
+          <a:chOff x="0" y="0"/>
+          <a:chExt cx="0" cy="0"/>
+        </a:xfrm>
+      </p:grpSpPr>
+      <p:sp>
+        <p:nvSpPr>
+          <p:cNvPr id="2" name="Slide Image Placeholder 1"/>
+          <p:cNvSpPr>
+            <a:spLocks noGrp="1" noRot="1" noChangeAspect="1"/>
+          </p:cNvSpPr>
+          <p:nvPr>
+            <p:ph type="sldImg"/>
+          </p:nvPr>
+        </p:nvSpPr>
+        <p:spPr/>
+      </p:sp>
+      <p:sp>
+        <p:nvSpPr>
+          <p:cNvPr id="3" name="Notes Placeholder 2"/>
+          <p:cNvSpPr>
+            <a:spLocks noGrp="1"/>
+          </p:cNvSpPr>
+          <p:nvPr>
+            <p:ph type="body" idx="1"/>
+          </p:nvPr>
+        </p:nvSpPr>
+        <p:spPr/>
+        <p:txBody>
+          <a:bodyPr/>
+          <a:lstStyle/>
+          <a:p>
+            <a:endParaRPr lang="en-US"/>
+          </a:p>
+        </p:txBody>
+      </p:sp>
+      <p:sp>
+        <p:nvSpPr>
+          <p:cNvPr id="4" name="Slide Number Placeholder 3"/>
+          <p:cNvSpPr>
+            <a:spLocks noGrp="1"/>
+          </p:cNvSpPr>
+          <p:nvPr>
+            <p:ph type="sldNum" sz="quarter" idx="10"/>
+          </p:nvPr>
+        </p:nvSpPr>
+        <p:spPr/>
+        <p:txBody>
+          <a:bodyPr/>
+          <a:lstStyle/>
+          <a:p>
+            <a:fld id="{04EEA3A2-2FA8-44A5-BDE6-24519C8DF7EF}" type="slidenum">
+              <a:rPr lang="en-US" smtClean="0"/>
+              <a:t>9</a:t>
+            </a:fld>
+            <a:endParaRPr lang="en-US"/>
+          </a:p>
+        </p:txBody>
+      </p:sp>
+    </p:spTree>
+    <p:extLst>
+      <p:ext uri="{BB962C8B-B14F-4D97-AF65-F5344CB8AC3E}">
+        <p14:creationId xmlns:p14="http://schemas.microsoft.com/office/powerpoint/2010/main" val="1969563218"/>
       </p:ext>
     </p:extLst>
   </p:cSld>
@@ -5012,8 +5096,8 @@
           </a:p>
         </p:txBody>
       </p:sp>
-      <mc:AlternateContent xmlns:mc="http://schemas.openxmlformats.org/markup-compatibility/2006">
-        <mc:Choice xmlns:we="http://schemas.microsoft.com/office/webextensions/webextension/2010/11" xmlns:pca="http://schemas.microsoft.com/office/powerpoint/2013/contentapp" Requires="we pca">
+      <mc:AlternateContent xmlns:mc="http://schemas.openxmlformats.org/markup-compatibility/2006" xmlns:we="http://schemas.microsoft.com/office/webextensions/webextension/2010/11" xmlns:pca="http://schemas.microsoft.com/office/powerpoint/2013/contentapp">
+        <mc:Choice Requires="we pca">
           <p:graphicFrame>
             <p:nvGraphicFramePr>
               <p:cNvPr id="5" name="Add-in 4" title="Plotly D3.js Charts for Powerpoint and Excel">
@@ -5045,7 +5129,7 @@
             </a:graphic>
           </p:graphicFrame>
         </mc:Choice>
-        <mc:Fallback>
+        <mc:Fallback xmlns="">
           <p:pic>
             <p:nvPicPr>
               <p:cNvPr id="5" name="Add-in 4" title="Plotly D3.js Charts for Powerpoint and Excel">
@@ -5078,8 +5162,8 @@
           </p:pic>
         </mc:Fallback>
       </mc:AlternateContent>
-      <mc:AlternateContent xmlns:mc="http://schemas.openxmlformats.org/markup-compatibility/2006">
-        <mc:Choice xmlns:we="http://schemas.microsoft.com/office/webextensions/webextension/2010/11" xmlns:pca="http://schemas.microsoft.com/office/powerpoint/2013/contentapp" Requires="we pca">
+      <mc:AlternateContent xmlns:mc="http://schemas.openxmlformats.org/markup-compatibility/2006" xmlns:we="http://schemas.microsoft.com/office/webextensions/webextension/2010/11" xmlns:pca="http://schemas.microsoft.com/office/powerpoint/2013/contentapp">
+        <mc:Choice Requires="we pca">
           <p:graphicFrame>
             <p:nvGraphicFramePr>
               <p:cNvPr id="7" name="Add-in 6" title="Plotly D3.js Charts for Powerpoint and Excel">
@@ -5111,7 +5195,7 @@
             </a:graphic>
           </p:graphicFrame>
         </mc:Choice>
-        <mc:Fallback>
+        <mc:Fallback xmlns="">
           <p:pic>
             <p:nvPicPr>
               <p:cNvPr id="7" name="Add-in 6" title="Plotly D3.js Charts for Powerpoint and Excel">
@@ -5499,8 +5583,8 @@
           <a:chExt cx="0" cy="0"/>
         </a:xfrm>
       </p:grpSpPr>
-      <mc:AlternateContent xmlns:mc="http://schemas.openxmlformats.org/markup-compatibility/2006" xmlns:we="http://schemas.microsoft.com/office/webextensions/webextension/2010/11" xmlns:pca="http://schemas.microsoft.com/office/powerpoint/2013/contentapp">
-        <mc:Choice Requires="we pca">
+      <mc:AlternateContent xmlns:mc="http://schemas.openxmlformats.org/markup-compatibility/2006">
+        <mc:Choice xmlns:we="http://schemas.microsoft.com/office/webextensions/webextension/2010/11" xmlns:pca="http://schemas.microsoft.com/office/powerpoint/2013/contentapp" Requires="we pca">
           <p:graphicFrame>
             <p:nvGraphicFramePr>
               <p:cNvPr id="5" name="Content Placeholder 4" title="Plotly D3.js Charts for Powerpoint and Excel">
@@ -5533,7 +5617,7 @@
             </a:graphic>
           </p:graphicFrame>
         </mc:Choice>
-        <mc:Fallback xmlns="">
+        <mc:Fallback>
           <p:pic>
             <p:nvPicPr>
               <p:cNvPr id="5" name="Content Placeholder 4" title="Plotly D3.js Charts for Powerpoint and Excel">
@@ -5629,8 +5713,8 @@
           <a:chExt cx="0" cy="0"/>
         </a:xfrm>
       </p:grpSpPr>
-      <mc:AlternateContent xmlns:mc="http://schemas.openxmlformats.org/markup-compatibility/2006" xmlns:we="http://schemas.microsoft.com/office/webextensions/webextension/2010/11" xmlns:pca="http://schemas.microsoft.com/office/powerpoint/2013/contentapp">
-        <mc:Choice Requires="we pca">
+      <mc:AlternateContent xmlns:mc="http://schemas.openxmlformats.org/markup-compatibility/2006">
+        <mc:Choice xmlns:we="http://schemas.microsoft.com/office/webextensions/webextension/2010/11" xmlns:pca="http://schemas.microsoft.com/office/powerpoint/2013/contentapp" Requires="we pca">
           <p:graphicFrame>
             <p:nvGraphicFramePr>
               <p:cNvPr id="2" name="Add-in 1" title="Plotly D3.js Charts for Powerpoint and Excel">
@@ -5657,12 +5741,12 @@
             </p:xfrm>
             <a:graphic>
               <a:graphicData uri="http://schemas.microsoft.com/office/webextensions/webextension/2010/11">
-                <we:webextensionref xmlns:we="http://schemas.microsoft.com/office/webextensions/webextension/2010/11" xmlns:r="http://schemas.openxmlformats.org/officeDocument/2006/relationships" r:id="rId2"/>
+                <we:webextensionref xmlns:we="http://schemas.microsoft.com/office/webextensions/webextension/2010/11" xmlns:r="http://schemas.openxmlformats.org/officeDocument/2006/relationships" r:id="rId3"/>
               </a:graphicData>
             </a:graphic>
           </p:graphicFrame>
         </mc:Choice>
-        <mc:Fallback xmlns="">
+        <mc:Fallback>
           <p:pic>
             <p:nvPicPr>
               <p:cNvPr id="2" name="Add-in 1" title="Plotly D3.js Charts for Powerpoint and Excel">
@@ -5678,7 +5762,7 @@
               <p:nvPr/>
             </p:nvPicPr>
             <p:blipFill>
-              <a:blip r:embed="rId3"/>
+              <a:blip r:embed="rId4"/>
               <a:stretch>
                 <a:fillRect/>
               </a:stretch>
@@ -5695,8 +5779,8 @@
           </p:pic>
         </mc:Fallback>
       </mc:AlternateContent>
-      <mc:AlternateContent xmlns:mc="http://schemas.openxmlformats.org/markup-compatibility/2006" xmlns:we="http://schemas.microsoft.com/office/webextensions/webextension/2010/11" xmlns:pca="http://schemas.microsoft.com/office/powerpoint/2013/contentapp">
-        <mc:Choice Requires="we pca">
+      <mc:AlternateContent xmlns:mc="http://schemas.openxmlformats.org/markup-compatibility/2006">
+        <mc:Choice xmlns:we="http://schemas.microsoft.com/office/webextensions/webextension/2010/11" xmlns:pca="http://schemas.microsoft.com/office/powerpoint/2013/contentapp" Requires="we pca">
           <p:graphicFrame>
             <p:nvGraphicFramePr>
               <p:cNvPr id="3" name="Add-in 2" title="Plotly D3.js Charts for Powerpoint and Excel">
@@ -5723,12 +5807,12 @@
             </p:xfrm>
             <a:graphic>
               <a:graphicData uri="http://schemas.microsoft.com/office/webextensions/webextension/2010/11">
-                <we:webextensionref xmlns:we="http://schemas.microsoft.com/office/webextensions/webextension/2010/11" xmlns:r="http://schemas.openxmlformats.org/officeDocument/2006/relationships" r:id="rId4"/>
+                <we:webextensionref xmlns:we="http://schemas.microsoft.com/office/webextensions/webextension/2010/11" xmlns:r="http://schemas.openxmlformats.org/officeDocument/2006/relationships" r:id="rId5"/>
               </a:graphicData>
             </a:graphic>
           </p:graphicFrame>
         </mc:Choice>
-        <mc:Fallback xmlns="">
+        <mc:Fallback>
           <p:pic>
             <p:nvPicPr>
               <p:cNvPr id="3" name="Add-in 2" title="Plotly D3.js Charts for Powerpoint and Excel">
@@ -5744,7 +5828,7 @@
               <p:nvPr/>
             </p:nvPicPr>
             <p:blipFill>
-              <a:blip r:embed="rId5"/>
+              <a:blip r:embed="rId6"/>
               <a:stretch>
                 <a:fillRect/>
               </a:stretch>
@@ -5753,6 +5837,138 @@
               <a:xfrm>
                 <a:off x="6352308" y="170584"/>
                 <a:ext cx="5572991" cy="3168361"/>
+              </a:xfrm>
+              <a:prstGeom prst="rect">
+                <a:avLst/>
+              </a:prstGeom>
+            </p:spPr>
+          </p:pic>
+        </mc:Fallback>
+      </mc:AlternateContent>
+      <mc:AlternateContent xmlns:mc="http://schemas.openxmlformats.org/markup-compatibility/2006">
+        <mc:Choice xmlns:we="http://schemas.microsoft.com/office/webextensions/webextension/2010/11" xmlns:pca="http://schemas.microsoft.com/office/powerpoint/2013/contentapp" Requires="we pca">
+          <p:graphicFrame>
+            <p:nvGraphicFramePr>
+              <p:cNvPr id="4" name="Add-in 3" title="Plotly D3.js Charts for Powerpoint and Excel">
+                <a:extLst>
+                  <a:ext uri="{FF2B5EF4-FFF2-40B4-BE49-F238E27FC236}">
+                    <a16:creationId xmlns:a16="http://schemas.microsoft.com/office/drawing/2014/main" id="{06CC0C0B-8DD3-4610-9856-287328A222BF}"/>
+                  </a:ext>
+                </a:extLst>
+              </p:cNvPr>
+              <p:cNvGraphicFramePr>
+                <a:graphicFrameLocks noGrp="1"/>
+              </p:cNvGraphicFramePr>
+              <p:nvPr>
+                <p:extLst>
+                  <p:ext uri="{D42A27DB-BD31-4B8C-83A1-F6EECF244321}">
+                    <p14:modId xmlns:p14="http://schemas.microsoft.com/office/powerpoint/2010/main" val="3278978723"/>
+                  </p:ext>
+                </p:extLst>
+              </p:nvPr>
+            </p:nvGraphicFramePr>
+            <p:xfrm>
+              <a:off x="287480" y="3643744"/>
+              <a:ext cx="5718463" cy="3043669"/>
+            </p:xfrm>
+            <a:graphic>
+              <a:graphicData uri="http://schemas.microsoft.com/office/webextensions/webextension/2010/11">
+                <we:webextensionref xmlns:we="http://schemas.microsoft.com/office/webextensions/webextension/2010/11" xmlns:r="http://schemas.openxmlformats.org/officeDocument/2006/relationships" r:id="rId7"/>
+              </a:graphicData>
+            </a:graphic>
+          </p:graphicFrame>
+        </mc:Choice>
+        <mc:Fallback>
+          <p:pic>
+            <p:nvPicPr>
+              <p:cNvPr id="4" name="Add-in 3" title="Plotly D3.js Charts for Powerpoint and Excel">
+                <a:extLst>
+                  <a:ext uri="{FF2B5EF4-FFF2-40B4-BE49-F238E27FC236}">
+                    <a16:creationId xmlns:a16="http://schemas.microsoft.com/office/drawing/2014/main" id="{06CC0C0B-8DD3-4610-9856-287328A222BF}"/>
+                  </a:ext>
+                </a:extLst>
+              </p:cNvPr>
+              <p:cNvPicPr>
+                <a:picLocks noGrp="1" noRot="1" noChangeAspect="1" noMove="1" noResize="1" noEditPoints="1" noAdjustHandles="1" noChangeArrowheads="1" noChangeShapeType="1"/>
+              </p:cNvPicPr>
+              <p:nvPr/>
+            </p:nvPicPr>
+            <p:blipFill>
+              <a:blip r:embed="rId8"/>
+              <a:stretch>
+                <a:fillRect/>
+              </a:stretch>
+            </p:blipFill>
+            <p:spPr>
+              <a:xfrm>
+                <a:off x="287480" y="3643744"/>
+                <a:ext cx="5718463" cy="3043669"/>
+              </a:xfrm>
+              <a:prstGeom prst="rect">
+                <a:avLst/>
+              </a:prstGeom>
+            </p:spPr>
+          </p:pic>
+        </mc:Fallback>
+      </mc:AlternateContent>
+      <mc:AlternateContent xmlns:mc="http://schemas.openxmlformats.org/markup-compatibility/2006">
+        <mc:Choice xmlns:we="http://schemas.microsoft.com/office/webextensions/webextension/2010/11" xmlns:pca="http://schemas.microsoft.com/office/powerpoint/2013/contentapp" Requires="we pca">
+          <p:graphicFrame>
+            <p:nvGraphicFramePr>
+              <p:cNvPr id="5" name="Add-in 4" title="Plotly D3.js Charts for Powerpoint and Excel">
+                <a:extLst>
+                  <a:ext uri="{FF2B5EF4-FFF2-40B4-BE49-F238E27FC236}">
+                    <a16:creationId xmlns:a16="http://schemas.microsoft.com/office/drawing/2014/main" id="{D275F186-A679-44E5-8601-6E8A8CEC522D}"/>
+                  </a:ext>
+                </a:extLst>
+              </p:cNvPr>
+              <p:cNvGraphicFramePr>
+                <a:graphicFrameLocks noGrp="1"/>
+              </p:cNvGraphicFramePr>
+              <p:nvPr>
+                <p:extLst>
+                  <p:ext uri="{D42A27DB-BD31-4B8C-83A1-F6EECF244321}">
+                    <p14:modId xmlns:p14="http://schemas.microsoft.com/office/powerpoint/2010/main" val="580306519"/>
+                  </p:ext>
+                </p:extLst>
+              </p:nvPr>
+            </p:nvGraphicFramePr>
+            <p:xfrm>
+              <a:off x="6352307" y="3643743"/>
+              <a:ext cx="5572991" cy="3043669"/>
+            </p:xfrm>
+            <a:graphic>
+              <a:graphicData uri="http://schemas.microsoft.com/office/webextensions/webextension/2010/11">
+                <we:webextensionref xmlns:we="http://schemas.microsoft.com/office/webextensions/webextension/2010/11" xmlns:r="http://schemas.openxmlformats.org/officeDocument/2006/relationships" r:id="rId9"/>
+              </a:graphicData>
+            </a:graphic>
+          </p:graphicFrame>
+        </mc:Choice>
+        <mc:Fallback>
+          <p:pic>
+            <p:nvPicPr>
+              <p:cNvPr id="5" name="Add-in 4" title="Plotly D3.js Charts for Powerpoint and Excel">
+                <a:extLst>
+                  <a:ext uri="{FF2B5EF4-FFF2-40B4-BE49-F238E27FC236}">
+                    <a16:creationId xmlns:a16="http://schemas.microsoft.com/office/drawing/2014/main" id="{D275F186-A679-44E5-8601-6E8A8CEC522D}"/>
+                  </a:ext>
+                </a:extLst>
+              </p:cNvPr>
+              <p:cNvPicPr>
+                <a:picLocks noGrp="1" noRot="1" noChangeAspect="1" noMove="1" noResize="1" noEditPoints="1" noAdjustHandles="1" noChangeArrowheads="1" noChangeShapeType="1"/>
+              </p:cNvPicPr>
+              <p:nvPr/>
+            </p:nvPicPr>
+            <p:blipFill>
+              <a:blip r:embed="rId10"/>
+              <a:stretch>
+                <a:fillRect/>
+              </a:stretch>
+            </p:blipFill>
+            <p:spPr>
+              <a:xfrm>
+                <a:off x="6352307" y="3643743"/>
+                <a:ext cx="5572991" cy="3043669"/>
               </a:xfrm>
               <a:prstGeom prst="rect">
                 <a:avLst/>
@@ -6350,7 +6566,35 @@
     <we:reference id="wa104379485" version="1.0.0.2" store="wa104379485" storeType="OMEX"/>
   </we:alternateReferences>
   <we:properties>
-    <we:property name="savedState" value="{&quot;plotlyChartUrl&quot;:&quot;https://plot.ly/~gwenkf/32&quot;,&quot;plotlyChartJSON&quot;:null,&quot;appVersion&quot;:&quot;1.0&quot;,&quot;savedDate&quot;:&quot;Tue, 24 Oct 2017 03:36:39 GMT&quot;}"/>
+    <we:property name="savedState" value="{&quot;plotlyChartUrl&quot;:&quot;https://plot.ly/~gwenkf/32&quot;,&quot;plotlyChartJSON&quot;:null,&quot;appVersion&quot;:&quot;1.0&quot;,&quot;savedDate&quot;:&quot;Tue, 24 Oct 2017 17:14:01 GMT&quot;}"/>
+  </we:properties>
+  <we:bindings/>
+  <we:snapshot xmlns:r="http://schemas.openxmlformats.org/officeDocument/2006/relationships" r:embed="rId1"/>
+</we:webextension>
+</file>
+
+<file path=ppt/webextensions/webextension11.xml><?xml version="1.0" encoding="utf-8"?>
+<we:webextension xmlns:we="http://schemas.microsoft.com/office/webextensions/webextension/2010/11" id="{87F0A45E-ABAA-4B77-8FBB-417645DEE35A}">
+  <we:reference id="wa104379485" version="1.0.0.2" store="en-US" storeType="OMEX"/>
+  <we:alternateReferences>
+    <we:reference id="wa104379485" version="1.0.0.2" store="wa104379485" storeType="OMEX"/>
+  </we:alternateReferences>
+  <we:properties>
+    <we:property name="savedState" value="{&quot;plotlyChartUrl&quot;:&quot;https://plot.ly/~gwenkf/36&quot;,&quot;plotlyChartJSON&quot;:null,&quot;appVersion&quot;:&quot;1.0&quot;,&quot;savedDate&quot;:&quot;Tue, 24 Oct 2017 17:14:46 GMT&quot;}"/>
+  </we:properties>
+  <we:bindings/>
+  <we:snapshot xmlns:r="http://schemas.openxmlformats.org/officeDocument/2006/relationships" r:embed="rId1"/>
+</we:webextension>
+</file>
+
+<file path=ppt/webextensions/webextension12.xml><?xml version="1.0" encoding="utf-8"?>
+<we:webextension xmlns:we="http://schemas.microsoft.com/office/webextensions/webextension/2010/11" id="{91EA24C6-94BD-4BB9-9D68-835ED107CFB1}">
+  <we:reference id="wa104379485" version="1.0.0.2" store="en-US" storeType="OMEX"/>
+  <we:alternateReferences>
+    <we:reference id="wa104379485" version="1.0.0.2" store="wa104379485" storeType="OMEX"/>
+  </we:alternateReferences>
+  <we:properties>
+    <we:property name="savedState" value="{&quot;plotlyChartUrl&quot;:&quot;https://plot.ly/~gwenkf/38&quot;,&quot;plotlyChartJSON&quot;:null,&quot;appVersion&quot;:&quot;1.0&quot;,&quot;savedDate&quot;:&quot;Tue, 24 Oct 2017 17:16:12 GMT&quot;}"/>
   </we:properties>
   <we:bindings/>
   <we:snapshot xmlns:r="http://schemas.openxmlformats.org/officeDocument/2006/relationships" r:embed="rId1"/>
@@ -6448,7 +6692,7 @@
     <we:reference id="wa104379485" version="1.0.0.2" store="wa104379485" storeType="OMEX"/>
   </we:alternateReferences>
   <we:properties>
-    <we:property name="savedState" value="{&quot;plotlyChartUrl&quot;:&quot;https://plot.ly/~gwenkf/42&quot;,&quot;plotlyChartJSON&quot;:null,&quot;appVersion&quot;:&quot;1.0&quot;,&quot;savedDate&quot;:&quot;Tue, 24 Oct 2017 03:36:15 GMT&quot;}"/>
+    <we:property name="savedState" value="{&quot;plotlyChartUrl&quot;:&quot;https://plot.ly/~gwenkf/42&quot;,&quot;plotlyChartJSON&quot;:null,&quot;appVersion&quot;:&quot;1.0&quot;,&quot;savedDate&quot;:&quot;Tue, 24 Oct 2017 17:14:02 GMT&quot;}"/>
   </we:properties>
   <we:bindings/>
   <we:snapshot xmlns:r="http://schemas.openxmlformats.org/officeDocument/2006/relationships" r:embed="rId1"/>
@@ -6462,7 +6706,7 @@
     <we:reference id="wa104379485" version="1.0.0.2" store="wa104379485" storeType="OMEX"/>
   </we:alternateReferences>
   <we:properties>
-    <we:property name="savedState" value="{&quot;plotlyChartUrl&quot;:&quot;https://plot.ly/~gwenkf/34&quot;,&quot;plotlyChartJSON&quot;:null,&quot;appVersion&quot;:&quot;1.0&quot;,&quot;savedDate&quot;:&quot;Tue, 24 Oct 2017 03:36:38 GMT&quot;}"/>
+    <we:property name="savedState" value="{&quot;plotlyChartUrl&quot;:&quot;https://plot.ly/~gwenkf/34&quot;,&quot;plotlyChartJSON&quot;:null,&quot;appVersion&quot;:&quot;1.0&quot;,&quot;savedDate&quot;:&quot;Tue, 24 Oct 2017 17:13:58 GMT&quot;}"/>
   </we:properties>
   <we:bindings/>
   <we:snapshot xmlns:r="http://schemas.openxmlformats.org/officeDocument/2006/relationships" r:embed="rId1"/>

</xml_diff>

<commit_message>
add pct to insur graph
</commit_message>
<xml_diff>
--- a/webscraping_proj.pptx
+++ b/webscraping_proj.pptx
@@ -5,18 +5,17 @@
     <p:sldMasterId id="2147483720" r:id="rId1"/>
   </p:sldMasterIdLst>
   <p:notesMasterIdLst>
-    <p:notesMasterId r:id="rId11"/>
+    <p:notesMasterId r:id="rId10"/>
   </p:notesMasterIdLst>
   <p:sldIdLst>
     <p:sldId id="261" r:id="rId2"/>
     <p:sldId id="262" r:id="rId3"/>
-    <p:sldId id="263" r:id="rId4"/>
-    <p:sldId id="265" r:id="rId5"/>
-    <p:sldId id="266" r:id="rId6"/>
-    <p:sldId id="269" r:id="rId7"/>
-    <p:sldId id="267" r:id="rId8"/>
-    <p:sldId id="268" r:id="rId9"/>
-    <p:sldId id="270" r:id="rId10"/>
+    <p:sldId id="265" r:id="rId4"/>
+    <p:sldId id="266" r:id="rId5"/>
+    <p:sldId id="269" r:id="rId6"/>
+    <p:sldId id="267" r:id="rId7"/>
+    <p:sldId id="268" r:id="rId8"/>
+    <p:sldId id="270" r:id="rId9"/>
   </p:sldIdLst>
   <p:sldSz cx="12192000" cy="6858000"/>
   <p:notesSz cx="6858000" cy="9144000"/>
@@ -522,8 +521,17 @@
           <a:p>
             <a:r>
               <a:rPr lang="en-US" dirty="0"/>
-              <a:t>-</a:t>
-            </a:r>
+              <a:t>-Information for 1,388 MDs scraped</a:t>
+            </a:r>
+          </a:p>
+          <a:p>
+            <a:r>
+              <a:rPr lang="en-US" dirty="0"/>
+              <a:t>36,399 ratings scraped</a:t>
+            </a:r>
+          </a:p>
+          <a:p>
+            <a:endParaRPr lang="en-US" dirty="0"/>
           </a:p>
         </p:txBody>
       </p:sp>
@@ -608,22 +616,14 @@
           <a:lstStyle/>
           <a:p>
             <a:r>
-              <a:rPr lang="en-US" dirty="0" err="1"/>
-              <a:t>Avg</a:t>
-            </a:r>
-            <a:r>
               <a:rPr lang="en-US" dirty="0"/>
-              <a:t> number of reviews per doctor about 13</a:t>
-            </a:r>
-          </a:p>
-          <a:p>
-            <a:r>
-              <a:rPr lang="en-US" dirty="0" err="1"/>
-              <a:t>Unfortch</a:t>
-            </a:r>
+              <a:t>(As of 2014) In NYC, 48.9% of the population (&gt;5 years) speaks a language other than English</a:t>
+            </a:r>
+          </a:p>
+          <a:p>
             <a:r>
               <a:rPr lang="en-US" dirty="0"/>
-              <a:t> wasn’t able to yield good information about location – got all location information for the 1,388 doctors but the majority (1,272) listed New York City as the borough</a:t>
+              <a:t>	-of those 48.9%, 49.8% speak Spanish, followed by Chinese (12.3%) and Russian (4.8%) (INFO from NYC.gov)</a:t>
             </a:r>
           </a:p>
           <a:p>
@@ -657,7 +657,7 @@
     </p:spTree>
     <p:extLst>
       <p:ext uri="{BB962C8B-B14F-4D97-AF65-F5344CB8AC3E}">
-        <p14:creationId xmlns:p14="http://schemas.microsoft.com/office/powerpoint/2010/main" val="1207051234"/>
+        <p14:creationId xmlns:p14="http://schemas.microsoft.com/office/powerpoint/2010/main" val="3762127823"/>
       </p:ext>
     </p:extLst>
   </p:cSld>
@@ -711,19 +711,196 @@
           <a:bodyPr/>
           <a:lstStyle/>
           <a:p>
+            <a:pPr marL="0" marR="0" lvl="0" indent="0" algn="l" defTabSz="914400" rtl="0" eaLnBrk="1" fontAlgn="auto" latinLnBrk="0" hangingPunct="1">
+              <a:lnSpc>
+                <a:spcPct val="100000"/>
+              </a:lnSpc>
+              <a:spcBef>
+                <a:spcPts val="0"/>
+              </a:spcBef>
+              <a:spcAft>
+                <a:spcPts val="0"/>
+              </a:spcAft>
+              <a:buClrTx/>
+              <a:buSzTx/>
+              <a:buFontTx/>
+              <a:buNone/>
+              <a:tabLst/>
+              <a:defRPr/>
+            </a:pPr>
             <a:r>
               <a:rPr lang="en-US" dirty="0"/>
-              <a:t>(As of 2014) In NYC, 48.9% of the population (&gt;5 years) speaks a language other than English</a:t>
-            </a:r>
-          </a:p>
-          <a:p>
+              <a:t>-As of April 2017,  34% of all Physicians in the USA were female and 66% were male - https://www.kff.org/other/state-indicator/physicians-by-gender/?dataView=1&amp;currentTimeframe=0&amp;selectedRows=%7B%22wrapups%22:%7B%22united-states%22:%7B%7D%7D%7D&amp;sortModel=%7B%22colId%22:%22Location%22,%22sort%22:%22asc%22%7D</a:t>
+            </a:r>
+          </a:p>
+          <a:p>
+            <a:pPr marL="0" marR="0" lvl="0" indent="0" algn="l" defTabSz="914400" rtl="0" eaLnBrk="1" fontAlgn="auto" latinLnBrk="0" hangingPunct="1">
+              <a:lnSpc>
+                <a:spcPct val="100000"/>
+              </a:lnSpc>
+              <a:spcBef>
+                <a:spcPts val="0"/>
+              </a:spcBef>
+              <a:spcAft>
+                <a:spcPts val="0"/>
+              </a:spcAft>
+              <a:buClrTx/>
+              <a:buSzTx/>
+              <a:buFontTx/>
+              <a:buNone/>
+              <a:tabLst/>
+              <a:defRPr/>
+            </a:pPr>
             <a:r>
               <a:rPr lang="en-US" dirty="0"/>
-              <a:t>	-of those 48.9%, 49.8% speak Spanish, followed by Chinese (12.3%) and Russian (4.8%) (INFO from NYC.gov)</a:t>
-            </a:r>
-          </a:p>
-          <a:p>
-            <a:endParaRPr lang="en-US" dirty="0"/>
+              <a:t>-77% male and 23% female in this dataset</a:t>
+            </a:r>
+          </a:p>
+          <a:p>
+            <a:pPr marL="0" marR="0" lvl="0" indent="0" algn="l" defTabSz="914400" rtl="0" eaLnBrk="1" fontAlgn="auto" latinLnBrk="0" hangingPunct="1">
+              <a:lnSpc>
+                <a:spcPct val="100000"/>
+              </a:lnSpc>
+              <a:spcBef>
+                <a:spcPts val="0"/>
+              </a:spcBef>
+              <a:spcAft>
+                <a:spcPts val="0"/>
+              </a:spcAft>
+              <a:buClrTx/>
+              <a:buSzTx/>
+              <a:buFontTx/>
+              <a:buNone/>
+              <a:tabLst/>
+              <a:defRPr/>
+            </a:pPr>
+            <a:r>
+              <a:rPr lang="en-US" dirty="0"/>
+              <a:t>-NY state has one of highest percentage of female doctors in the country – two highest states are Mass and RI (both with 40% female doctors)</a:t>
+            </a:r>
+          </a:p>
+          <a:p>
+            <a:pPr marL="0" marR="0" lvl="0" indent="0" algn="l" defTabSz="914400" rtl="0" eaLnBrk="1" fontAlgn="auto" latinLnBrk="0" hangingPunct="1">
+              <a:lnSpc>
+                <a:spcPct val="100000"/>
+              </a:lnSpc>
+              <a:spcBef>
+                <a:spcPts val="0"/>
+              </a:spcBef>
+              <a:spcAft>
+                <a:spcPts val="0"/>
+              </a:spcAft>
+              <a:buClrTx/>
+              <a:buSzTx/>
+              <a:buFontTx/>
+              <a:buNone/>
+              <a:tabLst/>
+              <a:defRPr/>
+            </a:pPr>
+            <a:r>
+              <a:rPr lang="en-US" dirty="0"/>
+              <a:t>-times article from </a:t>
+            </a:r>
+            <a:r>
+              <a:rPr lang="en-US" dirty="0" err="1"/>
+              <a:t>july</a:t>
+            </a:r>
+            <a:r>
+              <a:rPr lang="en-US" dirty="0"/>
+              <a:t> 2016 on the gender wage gap asserts that although half of all medical graduates are now women, male doctors earn on average 8% more</a:t>
+            </a:r>
+          </a:p>
+          <a:p>
+            <a:pPr marL="0" marR="0" lvl="0" indent="0" algn="l" defTabSz="914400" rtl="0" eaLnBrk="1" fontAlgn="auto" latinLnBrk="0" hangingPunct="1">
+              <a:lnSpc>
+                <a:spcPct val="100000"/>
+              </a:lnSpc>
+              <a:spcBef>
+                <a:spcPts val="0"/>
+              </a:spcBef>
+              <a:spcAft>
+                <a:spcPts val="0"/>
+              </a:spcAft>
+              <a:buClrTx/>
+              <a:buSzTx/>
+              <a:buFontTx/>
+              <a:buNone/>
+              <a:tabLst/>
+              <a:defRPr/>
+            </a:pPr>
+            <a:r>
+              <a:rPr lang="en-US" dirty="0"/>
+              <a:t>than female counterparts (about a $20,000 salary difference on average) </a:t>
+            </a:r>
+          </a:p>
+          <a:p>
+            <a:pPr marL="0" marR="0" lvl="0" indent="0" algn="l" defTabSz="914400" rtl="0" eaLnBrk="1" fontAlgn="auto" latinLnBrk="0" hangingPunct="1">
+              <a:lnSpc>
+                <a:spcPct val="100000"/>
+              </a:lnSpc>
+              <a:spcBef>
+                <a:spcPts val="0"/>
+              </a:spcBef>
+              <a:spcAft>
+                <a:spcPts val="0"/>
+              </a:spcAft>
+              <a:buClrTx/>
+              <a:buSzTx/>
+              <a:buFontTx/>
+              <a:buNone/>
+              <a:tabLst/>
+              <a:defRPr/>
+            </a:pPr>
+            <a:r>
+              <a:rPr lang="en-US" dirty="0"/>
+              <a:t>	-article also asserts that similar discrepancies are observed between racial groups, for example white doctors can earn up to $60,000 more than black doctors</a:t>
+            </a:r>
+          </a:p>
+          <a:p>
+            <a:pPr marL="0" marR="0" lvl="0" indent="0" algn="l" defTabSz="914400" rtl="0" eaLnBrk="1" fontAlgn="auto" latinLnBrk="0" hangingPunct="1">
+              <a:lnSpc>
+                <a:spcPct val="100000"/>
+              </a:lnSpc>
+              <a:spcBef>
+                <a:spcPts val="0"/>
+              </a:spcBef>
+              <a:spcAft>
+                <a:spcPts val="0"/>
+              </a:spcAft>
+              <a:buClrTx/>
+              <a:buSzTx/>
+              <a:buFontTx/>
+              <a:buNone/>
+              <a:tabLst/>
+              <a:defRPr/>
+            </a:pPr>
+            <a:r>
+              <a:rPr lang="en-US" dirty="0"/>
+              <a:t>	-would like to analyze this as well, but the information was not provided.</a:t>
+            </a:r>
+          </a:p>
+          <a:p>
+            <a:pPr marL="0" marR="0" lvl="0" indent="0" algn="l" defTabSz="914400" rtl="0" eaLnBrk="1" fontAlgn="auto" latinLnBrk="0" hangingPunct="1">
+              <a:lnSpc>
+                <a:spcPct val="100000"/>
+              </a:lnSpc>
+              <a:spcBef>
+                <a:spcPts val="0"/>
+              </a:spcBef>
+              <a:spcAft>
+                <a:spcPts val="0"/>
+              </a:spcAft>
+              <a:buClrTx/>
+              <a:buSzTx/>
+              <a:buFontTx/>
+              <a:buNone/>
+              <a:tabLst/>
+              <a:defRPr/>
+            </a:pPr>
+            <a:r>
+              <a:rPr lang="en-US" dirty="0"/>
+              <a:t>	-http://time.com/4398888/doctors-gender-wage-gap/</a:t>
+            </a:r>
           </a:p>
         </p:txBody>
       </p:sp>
@@ -753,7 +930,7 @@
     </p:spTree>
     <p:extLst>
       <p:ext uri="{BB962C8B-B14F-4D97-AF65-F5344CB8AC3E}">
-        <p14:creationId xmlns:p14="http://schemas.microsoft.com/office/powerpoint/2010/main" val="3762127823"/>
+        <p14:creationId xmlns:p14="http://schemas.microsoft.com/office/powerpoint/2010/main" val="491021970"/>
       </p:ext>
     </p:extLst>
   </p:cSld>
@@ -807,197 +984,38 @@
           <a:bodyPr/>
           <a:lstStyle/>
           <a:p>
-            <a:pPr marL="0" marR="0" lvl="0" indent="0" algn="l" defTabSz="914400" rtl="0" eaLnBrk="1" fontAlgn="auto" latinLnBrk="0" hangingPunct="1">
-              <a:lnSpc>
-                <a:spcPct val="100000"/>
-              </a:lnSpc>
-              <a:spcBef>
-                <a:spcPts val="0"/>
-              </a:spcBef>
-              <a:spcAft>
-                <a:spcPts val="0"/>
-              </a:spcAft>
-              <a:buClrTx/>
-              <a:buSzTx/>
-              <a:buFontTx/>
-              <a:buNone/>
-              <a:tabLst/>
-              <a:defRPr/>
-            </a:pPr>
             <a:r>
               <a:rPr lang="en-US" dirty="0"/>
-              <a:t>-As of April 2017,  34% of all Physicians in the USA were female and 66% were male - https://www.kff.org/other/state-indicator/physicians-by-gender/?dataView=1&amp;currentTimeframe=0&amp;selectedRows=%7B%22wrapups%22:%7B%22united-states%22:%7B%7D%7D%7D&amp;sortModel=%7B%22colId%22:%22Location%22,%22sort%22:%22asc%22%7D</a:t>
-            </a:r>
-          </a:p>
-          <a:p>
-            <a:pPr marL="0" marR="0" lvl="0" indent="0" algn="l" defTabSz="914400" rtl="0" eaLnBrk="1" fontAlgn="auto" latinLnBrk="0" hangingPunct="1">
-              <a:lnSpc>
-                <a:spcPct val="100000"/>
-              </a:lnSpc>
-              <a:spcBef>
-                <a:spcPts val="0"/>
-              </a:spcBef>
-              <a:spcAft>
-                <a:spcPts val="0"/>
-              </a:spcAft>
-              <a:buClrTx/>
-              <a:buSzTx/>
-              <a:buFontTx/>
-              <a:buNone/>
-              <a:tabLst/>
-              <a:defRPr/>
-            </a:pPr>
+              <a:t>According to </a:t>
+            </a:r>
+            <a:r>
+              <a:rPr lang="en-US" dirty="0" err="1"/>
+              <a:t>Merrit</a:t>
+            </a:r>
             <a:r>
               <a:rPr lang="en-US" dirty="0"/>
-              <a:t>-77% male and 23% female in this dataset</a:t>
-            </a:r>
-          </a:p>
-          <a:p>
-            <a:pPr marL="0" marR="0" lvl="0" indent="0" algn="l" defTabSz="914400" rtl="0" eaLnBrk="1" fontAlgn="auto" latinLnBrk="0" hangingPunct="1">
-              <a:lnSpc>
-                <a:spcPct val="100000"/>
-              </a:lnSpc>
-              <a:spcBef>
-                <a:spcPts val="0"/>
-              </a:spcBef>
-              <a:spcAft>
-                <a:spcPts val="0"/>
-              </a:spcAft>
-              <a:buClrTx/>
-              <a:buSzTx/>
-              <a:buFontTx/>
-              <a:buNone/>
-              <a:tabLst/>
-              <a:defRPr/>
-            </a:pPr>
+              <a:t> Hawkins’ 2017 review of physician and advanced </a:t>
+            </a:r>
+            <a:r>
+              <a:rPr lang="en-US" dirty="0" err="1"/>
+              <a:t>particitioner</a:t>
+            </a:r>
             <a:r>
               <a:rPr lang="en-US" dirty="0"/>
-              <a:t>-NY state has one of highest percentage of female doctors in the country – two highest states are Mass and RI (both with 40% female doctors)</a:t>
-            </a:r>
-          </a:p>
-          <a:p>
-            <a:pPr marL="0" marR="0" lvl="0" indent="0" algn="l" defTabSz="914400" rtl="0" eaLnBrk="1" fontAlgn="auto" latinLnBrk="0" hangingPunct="1">
-              <a:lnSpc>
-                <a:spcPct val="100000"/>
-              </a:lnSpc>
-              <a:spcBef>
-                <a:spcPts val="0"/>
-              </a:spcBef>
-              <a:spcAft>
-                <a:spcPts val="0"/>
-              </a:spcAft>
-              <a:buClrTx/>
-              <a:buSzTx/>
-              <a:buFontTx/>
-              <a:buNone/>
-              <a:tabLst/>
-              <a:defRPr/>
-            </a:pPr>
+              <a:t> recruiting incentives,</a:t>
+            </a:r>
+          </a:p>
+          <a:p>
             <a:r>
               <a:rPr lang="en-US" dirty="0"/>
-              <a:t>-times article from </a:t>
-            </a:r>
-            <a:r>
-              <a:rPr lang="en-US" dirty="0" err="1"/>
-              <a:t>july</a:t>
-            </a:r>
-            <a:r>
-              <a:rPr lang="en-US" dirty="0"/>
-              <a:t> 2016 on the gender wage gap asserts that although half of all medical graduates are now women, male doctors earn on average 8% more</a:t>
-            </a:r>
-          </a:p>
-          <a:p>
-            <a:pPr marL="0" marR="0" lvl="0" indent="0" algn="l" defTabSz="914400" rtl="0" eaLnBrk="1" fontAlgn="auto" latinLnBrk="0" hangingPunct="1">
-              <a:lnSpc>
-                <a:spcPct val="100000"/>
-              </a:lnSpc>
-              <a:spcBef>
-                <a:spcPts val="0"/>
-              </a:spcBef>
-              <a:spcAft>
-                <a:spcPts val="0"/>
-              </a:spcAft>
-              <a:buClrTx/>
-              <a:buSzTx/>
-              <a:buFontTx/>
-              <a:buNone/>
-              <a:tabLst/>
-              <a:defRPr/>
-            </a:pPr>
-            <a:r>
-              <a:rPr lang="en-US" dirty="0"/>
-              <a:t>than female counterparts (about a $20,000 salary difference on average) </a:t>
-            </a:r>
-          </a:p>
-          <a:p>
-            <a:pPr marL="0" marR="0" lvl="0" indent="0" algn="l" defTabSz="914400" rtl="0" eaLnBrk="1" fontAlgn="auto" latinLnBrk="0" hangingPunct="1">
-              <a:lnSpc>
-                <a:spcPct val="100000"/>
-              </a:lnSpc>
-              <a:spcBef>
-                <a:spcPts val="0"/>
-              </a:spcBef>
-              <a:spcAft>
-                <a:spcPts val="0"/>
-              </a:spcAft>
-              <a:buClrTx/>
-              <a:buSzTx/>
-              <a:buFontTx/>
-              <a:buNone/>
-              <a:tabLst/>
-              <a:defRPr/>
-            </a:pPr>
-            <a:r>
-              <a:rPr lang="en-US" dirty="0"/>
-              <a:t>	-article also asserts that similar discrepancies are observed between racial groups, for example white doctors can earn up to $60,000 more than black doctors</a:t>
-            </a:r>
-          </a:p>
-          <a:p>
-            <a:pPr marL="0" marR="0" lvl="0" indent="0" algn="l" defTabSz="914400" rtl="0" eaLnBrk="1" fontAlgn="auto" latinLnBrk="0" hangingPunct="1">
-              <a:lnSpc>
-                <a:spcPct val="100000"/>
-              </a:lnSpc>
-              <a:spcBef>
-                <a:spcPts val="0"/>
-              </a:spcBef>
-              <a:spcAft>
-                <a:spcPts val="0"/>
-              </a:spcAft>
-              <a:buClrTx/>
-              <a:buSzTx/>
-              <a:buFontTx/>
-              <a:buNone/>
-              <a:tabLst/>
-              <a:defRPr/>
-            </a:pPr>
-            <a:r>
-              <a:rPr lang="en-US" dirty="0"/>
-              <a:t>	-would like to analyze this as well, but the information was not provided.</a:t>
-            </a:r>
-          </a:p>
-          <a:p>
-            <a:pPr marL="0" marR="0" lvl="0" indent="0" algn="l" defTabSz="914400" rtl="0" eaLnBrk="1" fontAlgn="auto" latinLnBrk="0" hangingPunct="1">
-              <a:lnSpc>
-                <a:spcPct val="100000"/>
-              </a:lnSpc>
-              <a:spcBef>
-                <a:spcPts val="0"/>
-              </a:spcBef>
-              <a:spcAft>
-                <a:spcPts val="0"/>
-              </a:spcAft>
-              <a:buClrTx/>
-              <a:buSzTx/>
-              <a:buFontTx/>
-              <a:buNone/>
-              <a:tabLst/>
-              <a:defRPr/>
-            </a:pPr>
+              <a:t>The top 3 most requested searches by medical specialty were – Family Medicine, Psychiatry, Internal Medicine,</a:t>
+            </a:r>
+          </a:p>
+          <a:p>
             <a:r>
               <a:rPr lang="en-US"/>
-              <a:t>	-http://time.com/4398888/doctors-gender-wage-gap/</a:t>
-            </a:r>
-            <a:endParaRPr lang="en-US" dirty="0"/>
+              <a:t>Nurse Practitioner and OBGYN</a:t>
+            </a:r>
           </a:p>
         </p:txBody>
       </p:sp>
@@ -1027,7 +1045,7 @@
     </p:spTree>
     <p:extLst>
       <p:ext uri="{BB962C8B-B14F-4D97-AF65-F5344CB8AC3E}">
-        <p14:creationId xmlns:p14="http://schemas.microsoft.com/office/powerpoint/2010/main" val="491021970"/>
+        <p14:creationId xmlns:p14="http://schemas.microsoft.com/office/powerpoint/2010/main" val="4263128842"/>
       </p:ext>
     </p:extLst>
   </p:cSld>
@@ -1081,38 +1099,7 @@
           <a:bodyPr/>
           <a:lstStyle/>
           <a:p>
-            <a:r>
-              <a:rPr lang="en-US" dirty="0"/>
-              <a:t>According to </a:t>
-            </a:r>
-            <a:r>
-              <a:rPr lang="en-US" dirty="0" err="1"/>
-              <a:t>Merrit</a:t>
-            </a:r>
-            <a:r>
-              <a:rPr lang="en-US" dirty="0"/>
-              <a:t> Hawkins’ 2017 review of physician and advanced </a:t>
-            </a:r>
-            <a:r>
-              <a:rPr lang="en-US" dirty="0" err="1"/>
-              <a:t>particitioner</a:t>
-            </a:r>
-            <a:r>
-              <a:rPr lang="en-US" dirty="0"/>
-              <a:t> recruiting incentives,</a:t>
-            </a:r>
-          </a:p>
-          <a:p>
-            <a:r>
-              <a:rPr lang="en-US" dirty="0"/>
-              <a:t>The top 3 most requested searches by medical specialty were – Family Medicine, Psychiatry, Internal Medicine,</a:t>
-            </a:r>
-          </a:p>
-          <a:p>
-            <a:r>
-              <a:rPr lang="en-US"/>
-              <a:t>Nurse Practitioner and OBGYN</a:t>
-            </a:r>
+            <a:endParaRPr lang="en-US" dirty="0"/>
           </a:p>
         </p:txBody>
       </p:sp>
@@ -1142,7 +1129,7 @@
     </p:spTree>
     <p:extLst>
       <p:ext uri="{BB962C8B-B14F-4D97-AF65-F5344CB8AC3E}">
-        <p14:creationId xmlns:p14="http://schemas.microsoft.com/office/powerpoint/2010/main" val="4263128842"/>
+        <p14:creationId xmlns:p14="http://schemas.microsoft.com/office/powerpoint/2010/main" val="977333381"/>
       </p:ext>
     </p:extLst>
   </p:cSld>
@@ -1196,7 +1183,7 @@
           <a:bodyPr/>
           <a:lstStyle/>
           <a:p>
-            <a:endParaRPr lang="en-US"/>
+            <a:endParaRPr lang="en-US" dirty="0"/>
           </a:p>
         </p:txBody>
       </p:sp>
@@ -1217,7 +1204,7 @@
           <a:p>
             <a:fld id="{04EEA3A2-2FA8-44A5-BDE6-24519C8DF7EF}" type="slidenum">
               <a:rPr lang="en-US" smtClean="0"/>
-              <a:t>9</a:t>
+              <a:t>8</a:t>
             </a:fld>
             <a:endParaRPr lang="en-US"/>
           </a:p>
@@ -4602,7 +4589,7 @@
           <a:p>
             <a:r>
               <a:rPr lang="en-US" dirty="0"/>
-              <a:t>Reviewers anonymously rate doctors based on their staff, punctuality, helpfulness and knowledgeability </a:t>
+              <a:t>Reviewers anonymously rate doctors based on their staff, punctuality, helpfulness and knowledge </a:t>
             </a:r>
           </a:p>
           <a:p>
@@ -4663,10 +4650,10 @@
       </p:grpSpPr>
       <p:sp>
         <p:nvSpPr>
-          <p:cNvPr id="2" name="Title 1">
+          <p:cNvPr id="4" name="Text Placeholder 3">
             <a:extLst>
               <a:ext uri="{FF2B5EF4-FFF2-40B4-BE49-F238E27FC236}">
-                <a16:creationId xmlns:a16="http://schemas.microsoft.com/office/drawing/2014/main" id="{C0F1D690-62D9-47F8-83D5-2BAF0E6831D4}"/>
+                <a16:creationId xmlns:a16="http://schemas.microsoft.com/office/drawing/2014/main" id="{F01730A8-2C05-44D7-BCD1-ACDEC60A8E31}"/>
               </a:ext>
             </a:extLst>
           </p:cNvPr>
@@ -4674,158 +4661,170 @@
             <a:spLocks noGrp="1"/>
           </p:cNvSpPr>
           <p:nvPr>
-            <p:ph type="title"/>
+            <p:ph type="body" sz="half" idx="2"/>
           </p:nvPr>
         </p:nvSpPr>
         <p:spPr>
           <a:xfrm>
-            <a:off x="2231136" y="438219"/>
-            <a:ext cx="7729728" cy="1188720"/>
+            <a:off x="1115568" y="2182092"/>
+            <a:ext cx="3794760" cy="3561864"/>
           </a:xfrm>
         </p:spPr>
         <p:txBody>
-          <a:bodyPr/>
-          <a:lstStyle/>
-          <a:p>
-            <a:r>
-              <a:rPr lang="en-US" dirty="0"/>
-              <a:t>Scraping </a:t>
-            </a:r>
-            <a:r>
-              <a:rPr lang="en-US" dirty="0" err="1"/>
-              <a:t>Ratemds</a:t>
-            </a:r>
-            <a:r>
-              <a:rPr lang="en-US" dirty="0"/>
-              <a:t> </a:t>
-            </a:r>
-          </a:p>
-        </p:txBody>
-      </p:sp>
-      <p:sp>
-        <p:nvSpPr>
-          <p:cNvPr id="3" name="Content Placeholder 2">
-            <a:extLst>
-              <a:ext uri="{FF2B5EF4-FFF2-40B4-BE49-F238E27FC236}">
-                <a16:creationId xmlns:a16="http://schemas.microsoft.com/office/drawing/2014/main" id="{10148D00-BB5A-4B3F-B0D8-6D8EC8725B06}"/>
-              </a:ext>
-            </a:extLst>
-          </p:cNvPr>
-          <p:cNvSpPr>
-            <a:spLocks noGrp="1"/>
-          </p:cNvSpPr>
-          <p:nvPr>
-            <p:ph idx="1"/>
-          </p:nvPr>
-        </p:nvSpPr>
-        <p:spPr>
-          <a:xfrm>
-            <a:off x="2231136" y="2112818"/>
-            <a:ext cx="7729728" cy="3627209"/>
-          </a:xfrm>
-        </p:spPr>
-        <p:txBody>
-          <a:bodyPr/>
-          <a:lstStyle/>
-          <a:p>
-            <a:r>
-              <a:rPr lang="en-US" dirty="0"/>
-              <a:t>Two </a:t>
-            </a:r>
-            <a:r>
-              <a:rPr lang="en-US" dirty="0" err="1"/>
-              <a:t>scrapy</a:t>
-            </a:r>
-            <a:r>
-              <a:rPr lang="en-US" dirty="0"/>
-              <a:t> spiders to collect general information on all doctors within NYC area as well as a sample of their ratings</a:t>
-            </a:r>
-          </a:p>
-          <a:p>
-            <a:pPr lvl="1"/>
-            <a:r>
-              <a:rPr lang="en-US" dirty="0"/>
-              <a:t>Variables include: name, gender, specialty, location (by borough), number of reviews, languages spoken, insurances accepted and ratings</a:t>
-            </a:r>
-          </a:p>
-          <a:p>
-            <a:r>
-              <a:rPr lang="en-US" dirty="0"/>
-              <a:t>Information for 1,388 MDs scraped</a:t>
-            </a:r>
-          </a:p>
-          <a:p>
-            <a:r>
-              <a:rPr lang="en-US" dirty="0"/>
-              <a:t>36,399 ratings scraped</a:t>
-            </a:r>
-          </a:p>
-        </p:txBody>
-      </p:sp>
-      <p:pic>
-        <p:nvPicPr>
-          <p:cNvPr id="4" name="Picture 3">
-            <a:extLst>
-              <a:ext uri="{FF2B5EF4-FFF2-40B4-BE49-F238E27FC236}">
-                <a16:creationId xmlns:a16="http://schemas.microsoft.com/office/drawing/2014/main" id="{1E77B739-6199-441A-B1A7-BE36272ECCFA}"/>
-              </a:ext>
-            </a:extLst>
-          </p:cNvPr>
-          <p:cNvPicPr>
-            <a:picLocks noChangeAspect="1"/>
-          </p:cNvPicPr>
-          <p:nvPr/>
-        </p:nvPicPr>
-        <p:blipFill>
-          <a:blip r:embed="rId3"/>
-          <a:stretch>
-            <a:fillRect/>
-          </a:stretch>
-        </p:blipFill>
-        <p:spPr>
-          <a:xfrm>
-            <a:off x="381000" y="4657621"/>
-            <a:ext cx="5276850" cy="1775559"/>
-          </a:xfrm>
-          <a:prstGeom prst="rect">
-            <a:avLst/>
-          </a:prstGeom>
-        </p:spPr>
-      </p:pic>
-      <p:pic>
-        <p:nvPicPr>
-          <p:cNvPr id="5" name="Picture 4">
-            <a:extLst>
-              <a:ext uri="{FF2B5EF4-FFF2-40B4-BE49-F238E27FC236}">
-                <a16:creationId xmlns:a16="http://schemas.microsoft.com/office/drawing/2014/main" id="{E108CD77-DAF3-404E-87AB-9FCAC6B32431}"/>
-              </a:ext>
-            </a:extLst>
-          </p:cNvPr>
-          <p:cNvPicPr>
-            <a:picLocks noChangeAspect="1"/>
-          </p:cNvPicPr>
-          <p:nvPr/>
-        </p:nvPicPr>
-        <p:blipFill>
-          <a:blip r:embed="rId4"/>
-          <a:stretch>
-            <a:fillRect/>
-          </a:stretch>
-        </p:blipFill>
-        <p:spPr>
-          <a:xfrm>
-            <a:off x="7151354" y="4657621"/>
-            <a:ext cx="4215146" cy="1775558"/>
-          </a:xfrm>
-          <a:prstGeom prst="rect">
-            <a:avLst/>
-          </a:prstGeom>
-        </p:spPr>
-      </p:pic>
+          <a:bodyPr>
+            <a:normAutofit/>
+          </a:bodyPr>
+          <a:lstStyle/>
+          <a:p>
+            <a:r>
+              <a:rPr lang="en-US" sz="1700" dirty="0"/>
+              <a:t>In a city as diverse as NYC, how many doctors accommodate multi-lingual populations by speaking more than one language?</a:t>
+            </a:r>
+          </a:p>
+          <a:p>
+            <a:r>
+              <a:rPr lang="en-US" sz="1700" dirty="0"/>
+              <a:t>What are the most commonly spoken languages by NYC MDs?</a:t>
+            </a:r>
+          </a:p>
+        </p:txBody>
+      </p:sp>
+      <mc:AlternateContent xmlns:mc="http://schemas.openxmlformats.org/markup-compatibility/2006">
+        <mc:Choice xmlns:we="http://schemas.microsoft.com/office/webextensions/webextension/2010/11" xmlns:pca="http://schemas.microsoft.com/office/powerpoint/2013/contentapp" Requires="we pca">
+          <p:graphicFrame>
+            <p:nvGraphicFramePr>
+              <p:cNvPr id="6" name="Add-in 5" title="Plotly D3.js Charts for Powerpoint and Excel">
+                <a:extLst>
+                  <a:ext uri="{FF2B5EF4-FFF2-40B4-BE49-F238E27FC236}">
+                    <a16:creationId xmlns:a16="http://schemas.microsoft.com/office/drawing/2014/main" id="{AA8FD719-640D-400B-8D2A-6FB9C11BB152}"/>
+                  </a:ext>
+                </a:extLst>
+              </p:cNvPr>
+              <p:cNvGraphicFramePr>
+                <a:graphicFrameLocks noGrp="1"/>
+              </p:cNvGraphicFramePr>
+              <p:nvPr>
+                <p:extLst>
+                  <p:ext uri="{D42A27DB-BD31-4B8C-83A1-F6EECF244321}">
+                    <p14:modId xmlns:p14="http://schemas.microsoft.com/office/powerpoint/2010/main" val="3484881465"/>
+                  </p:ext>
+                </p:extLst>
+              </p:nvPr>
+            </p:nvGraphicFramePr>
+            <p:xfrm>
+              <a:off x="7300814" y="55418"/>
+              <a:ext cx="3655245" cy="2013527"/>
+            </p:xfrm>
+            <a:graphic>
+              <a:graphicData uri="http://schemas.microsoft.com/office/webextensions/webextension/2010/11">
+                <we:webextensionref xmlns:we="http://schemas.microsoft.com/office/webextensions/webextension/2010/11" xmlns:r="http://schemas.openxmlformats.org/officeDocument/2006/relationships" r:id="rId3"/>
+              </a:graphicData>
+            </a:graphic>
+          </p:graphicFrame>
+        </mc:Choice>
+        <mc:Fallback>
+          <p:pic>
+            <p:nvPicPr>
+              <p:cNvPr id="6" name="Add-in 5" title="Plotly D3.js Charts for Powerpoint and Excel">
+                <a:extLst>
+                  <a:ext uri="{FF2B5EF4-FFF2-40B4-BE49-F238E27FC236}">
+                    <a16:creationId xmlns:a16="http://schemas.microsoft.com/office/drawing/2014/main" id="{AA8FD719-640D-400B-8D2A-6FB9C11BB152}"/>
+                  </a:ext>
+                </a:extLst>
+              </p:cNvPr>
+              <p:cNvPicPr>
+                <a:picLocks noGrp="1" noRot="1" noChangeAspect="1" noMove="1" noResize="1" noEditPoints="1" noAdjustHandles="1" noChangeArrowheads="1" noChangeShapeType="1"/>
+              </p:cNvPicPr>
+              <p:nvPr/>
+            </p:nvPicPr>
+            <p:blipFill>
+              <a:blip r:embed="rId4"/>
+              <a:stretch>
+                <a:fillRect/>
+              </a:stretch>
+            </p:blipFill>
+            <p:spPr>
+              <a:xfrm>
+                <a:off x="7300814" y="55418"/>
+                <a:ext cx="3655245" cy="2013527"/>
+              </a:xfrm>
+              <a:prstGeom prst="rect">
+                <a:avLst/>
+              </a:prstGeom>
+            </p:spPr>
+          </p:pic>
+        </mc:Fallback>
+      </mc:AlternateContent>
+      <mc:AlternateContent xmlns:mc="http://schemas.openxmlformats.org/markup-compatibility/2006">
+        <mc:Choice xmlns:we="http://schemas.microsoft.com/office/webextensions/webextension/2010/11" xmlns:pca="http://schemas.microsoft.com/office/powerpoint/2013/contentapp" Requires="we pca">
+          <p:graphicFrame>
+            <p:nvGraphicFramePr>
+              <p:cNvPr id="7" name="Add-in 6" title="Plotly D3.js Charts for Powerpoint and Excel">
+                <a:extLst>
+                  <a:ext uri="{FF2B5EF4-FFF2-40B4-BE49-F238E27FC236}">
+                    <a16:creationId xmlns:a16="http://schemas.microsoft.com/office/drawing/2014/main" id="{11F8C67F-C5CB-4E43-89D6-669749BA3B48}"/>
+                  </a:ext>
+                </a:extLst>
+              </p:cNvPr>
+              <p:cNvGraphicFramePr>
+                <a:graphicFrameLocks noGrp="1"/>
+              </p:cNvGraphicFramePr>
+              <p:nvPr>
+                <p:extLst>
+                  <p:ext uri="{D42A27DB-BD31-4B8C-83A1-F6EECF244321}">
+                    <p14:modId xmlns:p14="http://schemas.microsoft.com/office/powerpoint/2010/main" val="3046770473"/>
+                  </p:ext>
+                </p:extLst>
+              </p:nvPr>
+            </p:nvGraphicFramePr>
+            <p:xfrm>
+              <a:off x="6241473" y="2306782"/>
+              <a:ext cx="5769839" cy="4455969"/>
+            </p:xfrm>
+            <a:graphic>
+              <a:graphicData uri="http://schemas.microsoft.com/office/webextensions/webextension/2010/11">
+                <we:webextensionref xmlns:we="http://schemas.microsoft.com/office/webextensions/webextension/2010/11" xmlns:r="http://schemas.openxmlformats.org/officeDocument/2006/relationships" r:id="rId5"/>
+              </a:graphicData>
+            </a:graphic>
+          </p:graphicFrame>
+        </mc:Choice>
+        <mc:Fallback>
+          <p:pic>
+            <p:nvPicPr>
+              <p:cNvPr id="7" name="Add-in 6" title="Plotly D3.js Charts for Powerpoint and Excel">
+                <a:extLst>
+                  <a:ext uri="{FF2B5EF4-FFF2-40B4-BE49-F238E27FC236}">
+                    <a16:creationId xmlns:a16="http://schemas.microsoft.com/office/drawing/2014/main" id="{11F8C67F-C5CB-4E43-89D6-669749BA3B48}"/>
+                  </a:ext>
+                </a:extLst>
+              </p:cNvPr>
+              <p:cNvPicPr>
+                <a:picLocks noGrp="1" noRot="1" noChangeAspect="1" noMove="1" noResize="1" noEditPoints="1" noAdjustHandles="1" noChangeArrowheads="1" noChangeShapeType="1"/>
+              </p:cNvPicPr>
+              <p:nvPr/>
+            </p:nvPicPr>
+            <p:blipFill>
+              <a:blip r:embed="rId6"/>
+              <a:stretch>
+                <a:fillRect/>
+              </a:stretch>
+            </p:blipFill>
+            <p:spPr>
+              <a:xfrm>
+                <a:off x="6241473" y="2306782"/>
+                <a:ext cx="5769839" cy="4455969"/>
+              </a:xfrm>
+              <a:prstGeom prst="rect">
+                <a:avLst/>
+              </a:prstGeom>
+            </p:spPr>
+          </p:pic>
+        </mc:Fallback>
+      </mc:AlternateContent>
     </p:spTree>
     <p:extLst>
       <p:ext uri="{BB962C8B-B14F-4D97-AF65-F5344CB8AC3E}">
-        <p14:creationId xmlns:p14="http://schemas.microsoft.com/office/powerpoint/2010/main" val="721864400"/>
+        <p14:creationId xmlns:p14="http://schemas.microsoft.com/office/powerpoint/2010/main" val="1832427334"/>
       </p:ext>
     </p:extLst>
   </p:cSld>
@@ -4857,209 +4856,6 @@
           <p:cNvPr id="4" name="Text Placeholder 3">
             <a:extLst>
               <a:ext uri="{FF2B5EF4-FFF2-40B4-BE49-F238E27FC236}">
-                <a16:creationId xmlns:a16="http://schemas.microsoft.com/office/drawing/2014/main" id="{F01730A8-2C05-44D7-BCD1-ACDEC60A8E31}"/>
-              </a:ext>
-            </a:extLst>
-          </p:cNvPr>
-          <p:cNvSpPr>
-            <a:spLocks noGrp="1"/>
-          </p:cNvSpPr>
-          <p:nvPr>
-            <p:ph type="body" sz="half" idx="2"/>
-          </p:nvPr>
-        </p:nvSpPr>
-        <p:spPr>
-          <a:xfrm>
-            <a:off x="1115568" y="2182092"/>
-            <a:ext cx="3794760" cy="3561864"/>
-          </a:xfrm>
-        </p:spPr>
-        <p:txBody>
-          <a:bodyPr>
-            <a:normAutofit/>
-          </a:bodyPr>
-          <a:lstStyle/>
-          <a:p>
-            <a:r>
-              <a:rPr lang="en-US" sz="1700" dirty="0"/>
-              <a:t>In a city as diverse as NYC, how many doctors accommodate multi-lingual populations by speaking more than one language?</a:t>
-            </a:r>
-          </a:p>
-          <a:p>
-            <a:r>
-              <a:rPr lang="en-US" sz="1700" dirty="0"/>
-              <a:t>What are the most commonly spoken languages by NYC MDs?</a:t>
-            </a:r>
-          </a:p>
-        </p:txBody>
-      </p:sp>
-      <mc:AlternateContent xmlns:mc="http://schemas.openxmlformats.org/markup-compatibility/2006" xmlns:we="http://schemas.microsoft.com/office/webextensions/webextension/2010/11" xmlns:pca="http://schemas.microsoft.com/office/powerpoint/2013/contentapp">
-        <mc:Choice Requires="we pca">
-          <p:graphicFrame>
-            <p:nvGraphicFramePr>
-              <p:cNvPr id="6" name="Add-in 5" title="Plotly D3.js Charts for Powerpoint and Excel">
-                <a:extLst>
-                  <a:ext uri="{FF2B5EF4-FFF2-40B4-BE49-F238E27FC236}">
-                    <a16:creationId xmlns:a16="http://schemas.microsoft.com/office/drawing/2014/main" id="{AA8FD719-640D-400B-8D2A-6FB9C11BB152}"/>
-                  </a:ext>
-                </a:extLst>
-              </p:cNvPr>
-              <p:cNvGraphicFramePr>
-                <a:graphicFrameLocks noGrp="1"/>
-              </p:cNvGraphicFramePr>
-              <p:nvPr>
-                <p:extLst>
-                  <p:ext uri="{D42A27DB-BD31-4B8C-83A1-F6EECF244321}">
-                    <p14:modId xmlns:p14="http://schemas.microsoft.com/office/powerpoint/2010/main" val="2602190212"/>
-                  </p:ext>
-                </p:extLst>
-              </p:nvPr>
-            </p:nvGraphicFramePr>
-            <p:xfrm>
-              <a:off x="7127632" y="126710"/>
-              <a:ext cx="3655245" cy="3043671"/>
-            </p:xfrm>
-            <a:graphic>
-              <a:graphicData uri="http://schemas.microsoft.com/office/webextensions/webextension/2010/11">
-                <we:webextensionref xmlns:we="http://schemas.microsoft.com/office/webextensions/webextension/2010/11" xmlns:r="http://schemas.openxmlformats.org/officeDocument/2006/relationships" r:id="rId3"/>
-              </a:graphicData>
-            </a:graphic>
-          </p:graphicFrame>
-        </mc:Choice>
-        <mc:Fallback xmlns="">
-          <p:pic>
-            <p:nvPicPr>
-              <p:cNvPr id="6" name="Add-in 5" title="Plotly D3.js Charts for Powerpoint and Excel">
-                <a:extLst>
-                  <a:ext uri="{FF2B5EF4-FFF2-40B4-BE49-F238E27FC236}">
-                    <a16:creationId xmlns:a16="http://schemas.microsoft.com/office/drawing/2014/main" id="{AA8FD719-640D-400B-8D2A-6FB9C11BB152}"/>
-                  </a:ext>
-                </a:extLst>
-              </p:cNvPr>
-              <p:cNvPicPr>
-                <a:picLocks noGrp="1" noRot="1" noChangeAspect="1" noMove="1" noResize="1" noEditPoints="1" noAdjustHandles="1" noChangeArrowheads="1" noChangeShapeType="1"/>
-              </p:cNvPicPr>
-              <p:nvPr/>
-            </p:nvPicPr>
-            <p:blipFill>
-              <a:blip r:embed="rId4"/>
-              <a:stretch>
-                <a:fillRect/>
-              </a:stretch>
-            </p:blipFill>
-            <p:spPr>
-              <a:xfrm>
-                <a:off x="7127632" y="126710"/>
-                <a:ext cx="3655245" cy="3043671"/>
-              </a:xfrm>
-              <a:prstGeom prst="rect">
-                <a:avLst/>
-              </a:prstGeom>
-            </p:spPr>
-          </p:pic>
-        </mc:Fallback>
-      </mc:AlternateContent>
-      <mc:AlternateContent xmlns:mc="http://schemas.openxmlformats.org/markup-compatibility/2006" xmlns:we="http://schemas.microsoft.com/office/webextensions/webextension/2010/11" xmlns:pca="http://schemas.microsoft.com/office/powerpoint/2013/contentapp">
-        <mc:Choice Requires="we pca">
-          <p:graphicFrame>
-            <p:nvGraphicFramePr>
-              <p:cNvPr id="7" name="Add-in 6" title="Plotly D3.js Charts for Powerpoint and Excel">
-                <a:extLst>
-                  <a:ext uri="{FF2B5EF4-FFF2-40B4-BE49-F238E27FC236}">
-                    <a16:creationId xmlns:a16="http://schemas.microsoft.com/office/drawing/2014/main" id="{11F8C67F-C5CB-4E43-89D6-669749BA3B48}"/>
-                  </a:ext>
-                </a:extLst>
-              </p:cNvPr>
-              <p:cNvGraphicFramePr>
-                <a:graphicFrameLocks noGrp="1"/>
-              </p:cNvGraphicFramePr>
-              <p:nvPr>
-                <p:extLst>
-                  <p:ext uri="{D42A27DB-BD31-4B8C-83A1-F6EECF244321}">
-                    <p14:modId xmlns:p14="http://schemas.microsoft.com/office/powerpoint/2010/main" val="463343873"/>
-                  </p:ext>
-                </p:extLst>
-              </p:nvPr>
-            </p:nvGraphicFramePr>
-            <p:xfrm>
-              <a:off x="6347737" y="3495674"/>
-              <a:ext cx="5663576" cy="3267076"/>
-            </p:xfrm>
-            <a:graphic>
-              <a:graphicData uri="http://schemas.microsoft.com/office/webextensions/webextension/2010/11">
-                <we:webextensionref xmlns:we="http://schemas.microsoft.com/office/webextensions/webextension/2010/11" xmlns:r="http://schemas.openxmlformats.org/officeDocument/2006/relationships" r:id="rId5"/>
-              </a:graphicData>
-            </a:graphic>
-          </p:graphicFrame>
-        </mc:Choice>
-        <mc:Fallback xmlns="">
-          <p:pic>
-            <p:nvPicPr>
-              <p:cNvPr id="7" name="Add-in 6" title="Plotly D3.js Charts for Powerpoint and Excel">
-                <a:extLst>
-                  <a:ext uri="{FF2B5EF4-FFF2-40B4-BE49-F238E27FC236}">
-                    <a16:creationId xmlns:a16="http://schemas.microsoft.com/office/drawing/2014/main" id="{11F8C67F-C5CB-4E43-89D6-669749BA3B48}"/>
-                  </a:ext>
-                </a:extLst>
-              </p:cNvPr>
-              <p:cNvPicPr>
-                <a:picLocks noGrp="1" noRot="1" noChangeAspect="1" noMove="1" noResize="1" noEditPoints="1" noAdjustHandles="1" noChangeArrowheads="1" noChangeShapeType="1"/>
-              </p:cNvPicPr>
-              <p:nvPr/>
-            </p:nvPicPr>
-            <p:blipFill>
-              <a:blip r:embed="rId6"/>
-              <a:stretch>
-                <a:fillRect/>
-              </a:stretch>
-            </p:blipFill>
-            <p:spPr>
-              <a:xfrm>
-                <a:off x="6347737" y="3495674"/>
-                <a:ext cx="5663576" cy="3267076"/>
-              </a:xfrm>
-              <a:prstGeom prst="rect">
-                <a:avLst/>
-              </a:prstGeom>
-            </p:spPr>
-          </p:pic>
-        </mc:Fallback>
-      </mc:AlternateContent>
-    </p:spTree>
-    <p:extLst>
-      <p:ext uri="{BB962C8B-B14F-4D97-AF65-F5344CB8AC3E}">
-        <p14:creationId xmlns:p14="http://schemas.microsoft.com/office/powerpoint/2010/main" val="1832427334"/>
-      </p:ext>
-    </p:extLst>
-  </p:cSld>
-  <p:clrMapOvr>
-    <a:masterClrMapping/>
-  </p:clrMapOvr>
-</p:sld>
-</file>
-
-<file path=ppt/slides/slide5.xml><?xml version="1.0" encoding="utf-8"?>
-<p:sld xmlns:a="http://schemas.openxmlformats.org/drawingml/2006/main" xmlns:r="http://schemas.openxmlformats.org/officeDocument/2006/relationships" xmlns:p="http://schemas.openxmlformats.org/presentationml/2006/main">
-  <p:cSld>
-    <p:spTree>
-      <p:nvGrpSpPr>
-        <p:cNvPr id="1" name=""/>
-        <p:cNvGrpSpPr/>
-        <p:nvPr/>
-      </p:nvGrpSpPr>
-      <p:grpSpPr>
-        <a:xfrm>
-          <a:off x="0" y="0"/>
-          <a:ext cx="0" cy="0"/>
-          <a:chOff x="0" y="0"/>
-          <a:chExt cx="0" cy="0"/>
-        </a:xfrm>
-      </p:grpSpPr>
-      <p:sp>
-        <p:nvSpPr>
-          <p:cNvPr id="4" name="Text Placeholder 3">
-            <a:extLst>
-              <a:ext uri="{FF2B5EF4-FFF2-40B4-BE49-F238E27FC236}">
                 <a16:creationId xmlns:a16="http://schemas.microsoft.com/office/drawing/2014/main" id="{4A59C53B-37E1-4C38-B7D2-EA96E88B0F65}"/>
               </a:ext>
             </a:extLst>
@@ -5096,8 +4892,8 @@
           </a:p>
         </p:txBody>
       </p:sp>
-      <mc:AlternateContent xmlns:mc="http://schemas.openxmlformats.org/markup-compatibility/2006" xmlns:we="http://schemas.microsoft.com/office/webextensions/webextension/2010/11" xmlns:pca="http://schemas.microsoft.com/office/powerpoint/2013/contentapp">
-        <mc:Choice Requires="we pca">
+      <mc:AlternateContent xmlns:mc="http://schemas.openxmlformats.org/markup-compatibility/2006">
+        <mc:Choice xmlns:we="http://schemas.microsoft.com/office/webextensions/webextension/2010/11" xmlns:pca="http://schemas.microsoft.com/office/powerpoint/2013/contentapp" Requires="we pca">
           <p:graphicFrame>
             <p:nvGraphicFramePr>
               <p:cNvPr id="5" name="Add-in 4" title="Plotly D3.js Charts for Powerpoint and Excel">
@@ -5129,7 +4925,7 @@
             </a:graphic>
           </p:graphicFrame>
         </mc:Choice>
-        <mc:Fallback xmlns="">
+        <mc:Fallback>
           <p:pic>
             <p:nvPicPr>
               <p:cNvPr id="5" name="Add-in 4" title="Plotly D3.js Charts for Powerpoint and Excel">
@@ -5162,14 +4958,14 @@
           </p:pic>
         </mc:Fallback>
       </mc:AlternateContent>
-      <mc:AlternateContent xmlns:mc="http://schemas.openxmlformats.org/markup-compatibility/2006" xmlns:we="http://schemas.microsoft.com/office/webextensions/webextension/2010/11" xmlns:pca="http://schemas.microsoft.com/office/powerpoint/2013/contentapp">
-        <mc:Choice Requires="we pca">
+      <mc:AlternateContent xmlns:mc="http://schemas.openxmlformats.org/markup-compatibility/2006">
+        <mc:Choice xmlns:we="http://schemas.microsoft.com/office/webextensions/webextension/2010/11" xmlns:pca="http://schemas.microsoft.com/office/powerpoint/2013/contentapp" Requires="we pca">
           <p:graphicFrame>
             <p:nvGraphicFramePr>
-              <p:cNvPr id="7" name="Add-in 6" title="Plotly D3.js Charts for Powerpoint and Excel">
+              <p:cNvPr id="2" name="Add-in 1" title="Plotly D3.js Charts for Powerpoint and Excel">
                 <a:extLst>
                   <a:ext uri="{FF2B5EF4-FFF2-40B4-BE49-F238E27FC236}">
-                    <a16:creationId xmlns:a16="http://schemas.microsoft.com/office/drawing/2014/main" id="{E18EC2E1-5E00-4E0B-B813-E12C588363E0}"/>
+                    <a16:creationId xmlns:a16="http://schemas.microsoft.com/office/drawing/2014/main" id="{84015FD6-67E5-459B-B4EF-06EA8F2F37F0}"/>
                   </a:ext>
                 </a:extLst>
               </p:cNvPr>
@@ -5179,14 +4975,14 @@
               <p:nvPr>
                 <p:extLst>
                   <p:ext uri="{D42A27DB-BD31-4B8C-83A1-F6EECF244321}">
-                    <p14:modId xmlns:p14="http://schemas.microsoft.com/office/powerpoint/2010/main" val="1764464890"/>
+                    <p14:modId xmlns:p14="http://schemas.microsoft.com/office/powerpoint/2010/main" val="590959401"/>
                   </p:ext>
                 </p:extLst>
               </p:nvPr>
             </p:nvGraphicFramePr>
             <p:xfrm>
-              <a:off x="6705600" y="3851564"/>
-              <a:ext cx="4904509" cy="2914650"/>
+              <a:off x="6314208" y="3865418"/>
+              <a:ext cx="5715000" cy="2881746"/>
             </p:xfrm>
             <a:graphic>
               <a:graphicData uri="http://schemas.microsoft.com/office/webextensions/webextension/2010/11">
@@ -5195,13 +4991,13 @@
             </a:graphic>
           </p:graphicFrame>
         </mc:Choice>
-        <mc:Fallback xmlns="">
+        <mc:Fallback>
           <p:pic>
             <p:nvPicPr>
-              <p:cNvPr id="7" name="Add-in 6" title="Plotly D3.js Charts for Powerpoint and Excel">
+              <p:cNvPr id="2" name="Add-in 1" title="Plotly D3.js Charts for Powerpoint and Excel">
                 <a:extLst>
                   <a:ext uri="{FF2B5EF4-FFF2-40B4-BE49-F238E27FC236}">
-                    <a16:creationId xmlns:a16="http://schemas.microsoft.com/office/drawing/2014/main" id="{E18EC2E1-5E00-4E0B-B813-E12C588363E0}"/>
+                    <a16:creationId xmlns:a16="http://schemas.microsoft.com/office/drawing/2014/main" id="{84015FD6-67E5-459B-B4EF-06EA8F2F37F0}"/>
                   </a:ext>
                 </a:extLst>
               </p:cNvPr>
@@ -5218,8 +5014,8 @@
             </p:blipFill>
             <p:spPr>
               <a:xfrm>
-                <a:off x="6705600" y="3851564"/>
-                <a:ext cx="4904509" cy="2914650"/>
+                <a:off x="6314208" y="3865418"/>
+                <a:ext cx="5715000" cy="2881746"/>
               </a:xfrm>
               <a:prstGeom prst="rect">
                 <a:avLst/>
@@ -5241,7 +5037,7 @@
 </p:sld>
 </file>
 
-<file path=ppt/slides/slide6.xml><?xml version="1.0" encoding="utf-8"?>
+<file path=ppt/slides/slide5.xml><?xml version="1.0" encoding="utf-8"?>
 <p:sld xmlns:a="http://schemas.openxmlformats.org/drawingml/2006/main" xmlns:r="http://schemas.openxmlformats.org/officeDocument/2006/relationships" xmlns:p="http://schemas.openxmlformats.org/presentationml/2006/main">
   <p:cSld>
     <p:spTree>
@@ -5258,8 +5054,8 @@
           <a:chExt cx="0" cy="0"/>
         </a:xfrm>
       </p:grpSpPr>
-      <mc:AlternateContent xmlns:mc="http://schemas.openxmlformats.org/markup-compatibility/2006" xmlns:we="http://schemas.microsoft.com/office/webextensions/webextension/2010/11" xmlns:pca="http://schemas.microsoft.com/office/powerpoint/2013/contentapp">
-        <mc:Choice Requires="we pca">
+      <mc:AlternateContent xmlns:mc="http://schemas.openxmlformats.org/markup-compatibility/2006">
+        <mc:Choice xmlns:we="http://schemas.microsoft.com/office/webextensions/webextension/2010/11" xmlns:pca="http://schemas.microsoft.com/office/powerpoint/2013/contentapp" Requires="we pca">
           <p:graphicFrame>
             <p:nvGraphicFramePr>
               <p:cNvPr id="5" name="Content Placeholder 4" title="Plotly D3.js Charts for Powerpoint and Excel">
@@ -5292,7 +5088,7 @@
             </a:graphic>
           </p:graphicFrame>
         </mc:Choice>
-        <mc:Fallback xmlns="">
+        <mc:Fallback>
           <p:pic>
             <p:nvPicPr>
               <p:cNvPr id="5" name="Content Placeholder 4" title="Plotly D3.js Charts for Powerpoint and Excel">
@@ -5358,8 +5154,8 @@
           </a:p>
         </p:txBody>
       </p:sp>
-      <mc:AlternateContent xmlns:mc="http://schemas.openxmlformats.org/markup-compatibility/2006" xmlns:we="http://schemas.microsoft.com/office/webextensions/webextension/2010/11" xmlns:pca="http://schemas.microsoft.com/office/powerpoint/2013/contentapp">
-        <mc:Choice Requires="we pca">
+      <mc:AlternateContent xmlns:mc="http://schemas.openxmlformats.org/markup-compatibility/2006">
+        <mc:Choice xmlns:we="http://schemas.microsoft.com/office/webextensions/webextension/2010/11" xmlns:pca="http://schemas.microsoft.com/office/powerpoint/2013/contentapp" Requires="we pca">
           <p:graphicFrame>
             <p:nvGraphicFramePr>
               <p:cNvPr id="7" name="Add-in 6" title="Plotly D3.js Charts for Powerpoint and Excel">
@@ -5391,7 +5187,7 @@
             </a:graphic>
           </p:graphicFrame>
         </mc:Choice>
-        <mc:Fallback xmlns="">
+        <mc:Fallback>
           <p:pic>
             <p:nvPicPr>
               <p:cNvPr id="7" name="Add-in 6" title="Plotly D3.js Charts for Powerpoint and Excel">
@@ -5437,7 +5233,7 @@
 </p:sld>
 </file>
 
-<file path=ppt/slides/slide7.xml><?xml version="1.0" encoding="utf-8"?>
+<file path=ppt/slides/slide6.xml><?xml version="1.0" encoding="utf-8"?>
 <p:sld xmlns:a="http://schemas.openxmlformats.org/drawingml/2006/main" xmlns:r="http://schemas.openxmlformats.org/officeDocument/2006/relationships" xmlns:p="http://schemas.openxmlformats.org/presentationml/2006/main">
   <p:cSld>
     <p:spTree>
@@ -5487,8 +5283,8 @@
           </a:p>
         </p:txBody>
       </p:sp>
-      <mc:AlternateContent xmlns:mc="http://schemas.openxmlformats.org/markup-compatibility/2006" xmlns:we="http://schemas.microsoft.com/office/webextensions/webextension/2010/11" xmlns:pca="http://schemas.microsoft.com/office/powerpoint/2013/contentapp">
-        <mc:Choice Requires="we pca">
+      <mc:AlternateContent xmlns:mc="http://schemas.openxmlformats.org/markup-compatibility/2006">
+        <mc:Choice xmlns:we="http://schemas.microsoft.com/office/webextensions/webextension/2010/11" xmlns:pca="http://schemas.microsoft.com/office/powerpoint/2013/contentapp" Requires="we pca">
           <p:graphicFrame>
             <p:nvGraphicFramePr>
               <p:cNvPr id="5" name="Add-in 4" title="Plotly D3.js Charts for Powerpoint and Excel">
@@ -5504,23 +5300,23 @@
               <p:nvPr>
                 <p:extLst>
                   <p:ext uri="{D42A27DB-BD31-4B8C-83A1-F6EECF244321}">
-                    <p14:modId xmlns:p14="http://schemas.microsoft.com/office/powerpoint/2010/main" val="1914031572"/>
+                    <p14:modId xmlns:p14="http://schemas.microsoft.com/office/powerpoint/2010/main" val="1527438670"/>
                   </p:ext>
                 </p:extLst>
               </p:nvPr>
             </p:nvGraphicFramePr>
             <p:xfrm>
-              <a:off x="6605154" y="1431347"/>
-              <a:ext cx="5143500" cy="3743325"/>
+              <a:off x="6532418" y="904875"/>
+              <a:ext cx="5209308" cy="5053828"/>
             </p:xfrm>
             <a:graphic>
               <a:graphicData uri="http://schemas.microsoft.com/office/webextensions/webextension/2010/11">
-                <we:webextensionref xmlns:we="http://schemas.microsoft.com/office/webextensions/webextension/2010/11" xmlns:r="http://schemas.openxmlformats.org/officeDocument/2006/relationships" r:id="rId2"/>
+                <we:webextensionref xmlns:we="http://schemas.microsoft.com/office/webextensions/webextension/2010/11" xmlns:r="http://schemas.openxmlformats.org/officeDocument/2006/relationships" r:id="rId3"/>
               </a:graphicData>
             </a:graphic>
           </p:graphicFrame>
         </mc:Choice>
-        <mc:Fallback xmlns="">
+        <mc:Fallback>
           <p:pic>
             <p:nvPicPr>
               <p:cNvPr id="5" name="Add-in 4" title="Plotly D3.js Charts for Powerpoint and Excel">
@@ -5536,15 +5332,15 @@
               <p:nvPr/>
             </p:nvPicPr>
             <p:blipFill>
-              <a:blip r:embed="rId3"/>
+              <a:blip r:embed="rId4"/>
               <a:stretch>
                 <a:fillRect/>
               </a:stretch>
             </p:blipFill>
             <p:spPr>
               <a:xfrm>
-                <a:off x="6605154" y="1431347"/>
-                <a:ext cx="5143500" cy="3743325"/>
+                <a:off x="6532418" y="904875"/>
+                <a:ext cx="5209308" cy="5053828"/>
               </a:xfrm>
               <a:prstGeom prst="rect">
                 <a:avLst/>
@@ -5566,7 +5362,7 @@
 </p:sld>
 </file>
 
-<file path=ppt/slides/slide8.xml><?xml version="1.0" encoding="utf-8"?>
+<file path=ppt/slides/slide7.xml><?xml version="1.0" encoding="utf-8"?>
 <p:sld xmlns:a="http://schemas.openxmlformats.org/drawingml/2006/main" xmlns:r="http://schemas.openxmlformats.org/officeDocument/2006/relationships" xmlns:p="http://schemas.openxmlformats.org/presentationml/2006/main">
   <p:cSld>
     <p:spTree>
@@ -5696,7 +5492,7 @@
 </p:sld>
 </file>
 
-<file path=ppt/slides/slide9.xml><?xml version="1.0" encoding="utf-8"?>
+<file path=ppt/slides/slide8.xml><?xml version="1.0" encoding="utf-8"?>
 <p:sld xmlns:a="http://schemas.openxmlformats.org/drawingml/2006/main" xmlns:r="http://schemas.openxmlformats.org/officeDocument/2006/relationships" xmlns:p="http://schemas.openxmlformats.org/presentationml/2006/main">
   <p:cSld>
     <p:spTree>
@@ -6552,7 +6348,7 @@
     <we:reference id="wa104379485" version="1.0.0.2" store="wa104379485" storeType="OMEX"/>
   </we:alternateReferences>
   <we:properties>
-    <we:property name="savedState" value="{&quot;plotlyChartUrl&quot;:&quot;https://plot.ly/~gwenkf/20&quot;,&quot;plotlyChartJSON&quot;:null,&quot;appVersion&quot;:&quot;1.0&quot;,&quot;savedDate&quot;:&quot;Tue, 24 Oct 2017 03:34:40 GMT&quot;}"/>
+    <we:property name="savedState" value="{&quot;plotlyChartUrl&quot;:&quot;https://plot.ly/~gwenkf/20&quot;,&quot;plotlyChartJSON&quot;:null,&quot;appVersion&quot;:&quot;1.0&quot;,&quot;savedDate&quot;:&quot;Wed, 25 Oct 2017 01:38:27 GMT&quot;}"/>
   </we:properties>
   <we:bindings/>
   <we:snapshot xmlns:r="http://schemas.openxmlformats.org/officeDocument/2006/relationships" r:embed="rId1"/>
@@ -6566,7 +6362,7 @@
     <we:reference id="wa104379485" version="1.0.0.2" store="wa104379485" storeType="OMEX"/>
   </we:alternateReferences>
   <we:properties>
-    <we:property name="savedState" value="{&quot;plotlyChartUrl&quot;:&quot;https://plot.ly/~gwenkf/32&quot;,&quot;plotlyChartJSON&quot;:null,&quot;appVersion&quot;:&quot;1.0&quot;,&quot;savedDate&quot;:&quot;Tue, 24 Oct 2017 17:14:01 GMT&quot;}"/>
+    <we:property name="savedState" value="{&quot;plotlyChartUrl&quot;:&quot;https://plot.ly/~gwenkf/32&quot;,&quot;plotlyChartJSON&quot;:null,&quot;appVersion&quot;:&quot;1.0&quot;,&quot;savedDate&quot;:&quot;Wed, 25 Oct 2017 01:07:42 GMT&quot;}"/>
   </we:properties>
   <we:bindings/>
   <we:snapshot xmlns:r="http://schemas.openxmlformats.org/officeDocument/2006/relationships" r:embed="rId1"/>
@@ -6580,7 +6376,7 @@
     <we:reference id="wa104379485" version="1.0.0.2" store="wa104379485" storeType="OMEX"/>
   </we:alternateReferences>
   <we:properties>
-    <we:property name="savedState" value="{&quot;plotlyChartUrl&quot;:&quot;https://plot.ly/~gwenkf/36&quot;,&quot;plotlyChartJSON&quot;:null,&quot;appVersion&quot;:&quot;1.0&quot;,&quot;savedDate&quot;:&quot;Tue, 24 Oct 2017 17:14:46 GMT&quot;}"/>
+    <we:property name="savedState" value="{&quot;plotlyChartUrl&quot;:&quot;https://plot.ly/~gwenkf/36&quot;,&quot;plotlyChartJSON&quot;:&quot;{\n    \&quot;data\&quot;: [\n        {\n            \&quot;visible\&quot;: true,\n            \&quot;type\&quot;: \&quot;histogram\&quot;,\n            \&quot;uid\&quot;: \&quot;215ae3\&quot;,\n            \&quot;name\&quot;: \&quot;trace 0\&quot;,\n            \&quot;showlegend\&quot;: true,\n            \&quot;legendgroup\&quot;: \&quot;\&quot;,\n            \&quot;hoverlabel\&quot;: {\n                \&quot;namelength\&quot;: 15,\n                \&quot;font\&quot;: {\n                    \&quot;family\&quot;: \&quot;Arial, sans-serif\&quot;,\n                    \&quot;size\&quot;: 13\n                }\n            },\n            \&quot;x\&quot;: [\n                \&quot;5\&quot;,\n                \&quot;5\&quot;,\n                \&quot;5\&quot;,\n                \&quot;5\&quot;,\n                \&quot;5\&quot;,\n                \&quot;5\&quot;,\n                \&quot;5\&quot;,\n                \&quot;4\&quot;,\n                \&quot;5\&quot;,\n                \&quot;5\&quot;,\n                \&quot;5\&quot;,\n                \&quot;5\&quot;,\n                \&quot;5\&quot;,\n                \&quot;5\&quot;,\n                \&quot;5\&quot;,\n                \&quot;5\&quot;,\n                \&quot;5\&quot;,\n                \&quot;5\&quot;,\n                \&quot;5\&quot;,\n                \&quot;5\&quot;,\n                \&quot;5\&quot;,\n                \&quot;4\&quot;,\n                \&quot;5\&quot;,\n                \&quot;5\&quot;,\n                \&quot;5\&quot;,\n                \&quot;5\&quot;,\n                \&quot;5\&quot;,\n                \&quot;3\&quot;,\n                \&quot;5\&quot;,\n                \&quot;5\&quot;,\n                \&quot;5\&quot;,\n                \&quot;5\&quot;,\n                \&quot;5\&quot;,\n                \&quot;3\&quot;,\n                \&quot;5\&quot;,\n                \&quot;5\&quot;,\n                \&quot;1\&quot;,\n                \&quot;5\&quot;,\n                \&quot;5\&quot;,\n                \&quot;5\&quot;,\n                \&quot;5\&quot;,\n                \&quot;5\&quot;,\n                \&quot;5\&quot;,\n                \&quot;5\&quot;,\n                \&quot;5\&quot;,\n                \&quot;5\&quot;,\n                \&quot;5\&quot;,\n                \&quot;5\&quot;,\n                \&quot;5\&quot;,\n                \&quot;5\&quot;,\n                \&quot;5\&quot;,\n                \&quot;5\&quot;,\n                \&quot;5\&quot;,\n                \&quot;5\&quot;,\n                \&quot;5\&quot;,\n                \&quot;5\&quot;,\n                \&quot;5\&quot;,\n                \&quot;5\&quot;,\n                \&quot;5\&quot;,\n                \&quot;5\&quot;,\n                \&quot;5\&quot;,\n                \&quot;5\&quot;,\n                \&quot;5\&quot;,\n                \&quot;5\&quot;,\n                \&quot;4\&quot;,\n                \&quot;4\&quot;,\n                \&quot;5\&quot;,\n                \&quot;5\&quot;,\n                \&quot;5\&quot;,\n                \&quot;1\&quot;,\n                \&quot;5\&quot;,\n                \&quot;5\&quot;,\n                \&quot;5\&quot;,\n                \&quot;4\&quot;,\n                \&quot;3\&quot;,\n                \&quot;1\&quot;,\n                \&quot;3\&quot;,\n                \&quot;5\&quot;,\n                \&quot;5\&quot;,\n                \&quot;5\&quot;,\n                \&quot;4\&quot;,\n                \&quot;3\&quot;,\n                \&quot;5\&quot;,\n                \&quot;4\&quot;,\n                \&quot;2\&quot;,\n                \&quot;5\&quot;,\n                \&quot;5\&quot;,\n                \&quot;5\&quot;,\n                \&quot;5\&quot;,\n                \&quot;5\&quot;,\n                \&quot;4\&quot;,\n                \&quot;5\&quot;,\n                \&quot;4\&quot;,\n                \&quot;5\&quot;,\n                \&quot;5\&quot;,\n                \&quot;4\&quot;,\n                \&quot;4\&quot;,\n                \&quot;4\&quot;,\n                \&quot;5\&quot;,\n                \&quot;5\&quot;,\n                \&quot;4\&quot;,\n                \&quot;5\&quot;,\n                \&quot;3\&quot;,\n                \&quot;5\&quot;,\n                \&quot;5\&quot;,\n                \&quot;1\&quot;,\n                \&quot;5\&quot;,\n                \&quot;5\&quot;,\n                \&quot;5\&quot;,\n                \&quot;5\&quot;,\n                \&quot;3\&quot;,\n                \&quot;5\&quot;,\n                \&quot;5\&quot;,\n                \&quot;5\&quot;,\n                \&quot;5\&quot;,\n                \&quot;5\&quot;,\n                \&quot;4\&quot;,\n                \&quot;3\&quot;,\n                \&quot;5\&quot;,\n                \&quot;5\&quot;,\n                \&quot;5\&quot;,\n                \&quot;4\&quot;,\n                \&quot;5\&quot;,\n                \&quot;5\&quot;,\n                \&quot;5\&quot;,\n                \&quot;5\&quot;,\n                \&quot;5\&quot;,\n                \&quot;5\&quot;,\n                \&quot;5\&quot;,\n                \&quot;5\&quot;,\n                \&quot;5\&quot;,\n                \&quot;5\&quot;,\n                \&quot;5\&quot;,\n                \&quot;5\&quot;,\n                \&quot;4\&quot;,\n                \&quot;5\&quot;,\n                \&quot;5\&quot;,\n                \&quot;5\&quot;,\n                \&quot;4\&quot;,\n                \&quot;5\&quot;,\n                \&quot;4\&quot;,\n                \&quot;5\&quot;,\n                \&quot;5\&quot;,\n                \&quot;5\&quot;,\n                \&quot;5\&quot;,\n                \&quot;4\&quot;,\n                \&quot;4\&quot;,\n                \&quot;4\&quot;,\n                \&quot;4\&quot;,\n                \&quot;1\&quot;,\n                \&quot;5\&quot;,\n                \&quot;4\&quot;,\n                \&quot;4\&quot;,\n                \&quot;5\&quot;,\n                \&quot;5\&quot;,\n                \&quot;5\&quot;,\n                \&quot;5\&quot;,\n                \&quot;5\&quot;,\n                \&quot;5\&quot;,\n                \&quot;4\&quot;,\n                \&quot;2\&quot;,\n                \&quot;5\&quot;,\n                \&quot;5\&quot;,\n                \&quot;5\&quot;,\n                \&quot;5\&quot;,\n                \&quot;5\&quot;,\n                \&quot;5\&quot;,\n                \&quot;5\&quot;,\n                \&quot;5\&quot;,\n                \&quot;1\&quot;,\n                \&quot;5\&quot;,\n                \&quot;5\&quot;,\n                \&quot;5\&quot;,\n                \&quot;5\&quot;,\n                \&quot;3\&quot;,\n                \&quot;5\&quot;,\n                \&quot;5\&quot;,\n                \&quot;5\&quot;,\n                \&quot;5\&quot;,\n                \&quot;5\&quot;,\n                \&quot;4\&quot;,\n                \&quot;5\&quot;,\n                \&quot;5\&quot;,\n                \&quot;4\&quot;,\n                \&quot;1\&quot;,\n                \&quot;5\&quot;,\n                \&quot;5\&quot;,\n                \&quot;5\&quot;,\n                \&quot;5\&quot;,\n                \&quot;5\&quot;,\n                \&quot;5\&quot;,\n                \&quot;5\&quot;,\n                \&quot;5\&quot;,\n                \&quot;5\&quot;,\n                \&quot;5\&quot;,\n                \&quot;5\&quot;,\n                \&quot;5\&quot;,\n                \&quot;5\&quot;,\n                \&quot;5\&quot;,\n                \&quot;5\&quot;,\n                \&quot;5\&quot;,\n                \&quot;5\&quot;,\n                \&quot;5\&quot;,\n                \&quot;5\&quot;,\n                \&quot;5\&quot;,\n                \&quot;5\&quot;,\n                \&quot;5\&quot;,\n                \&quot;5\&quot;,\n                \&quot;5\&quot;,\n                \&quot;5\&quot;,\n                \&quot;5\&quot;,\n                \&quot;5\&quot;,\n                \&quot;5\&quot;,\n                \&quot;5\&quot;,\n                \&quot;5\&quot;,\n                \&quot;5\&quot;,\n                \&quot;5\&quot;,\n                \&quot;5\&quot;,\n                \&quot;5\&quot;,\n                \&quot;5\&quot;,\n                \&quot;5\&quot;,\n                \&quot;5\&quot;,\n                \&quot;5\&quot;,\n                \&quot;5\&quot;,\n                \&quot;5\&quot;,\n                \&quot;2\&quot;,\n                \&quot;5\&quot;,\n                \&quot;5\&quot;,\n                \&quot;5\&quot;,\n                \&quot;5\&quot;,\n                \&quot;5\&quot;,\n                \&quot;5\&quot;,\n                \&quot;5\&quot;,\n                \&quot;4\&quot;,\n                \&quot;5\&quot;,\n                \&quot;5\&quot;,\n                \&quot;5\&quot;,\n                \&quot;4\&quot;,\n                \&quot;2\&quot;,\n                \&quot;5\&quot;,\n                \&quot;5\&quot;,\n                \&quot;1\&quot;,\n                \&quot;3\&quot;,\n                \&quot;5\&quot;,\n                \&quot;5\&quot;,\n                \&quot;5\&quot;,\n                \&quot;5\&quot;,\n                \&quot;5\&quot;,\n                \&quot;5\&quot;,\n                \&quot;5\&quot;,\n                \&quot;3\&quot;,\n                \&quot;5\&quot;,\n                \&quot;5\&quot;,\n                \&quot;5\&quot;,\n                \&quot;5\&quot;,\n                \&quot;5\&quot;,\n                \&quot;5\&quot;,\n                \&quot;5\&quot;,\n                \&quot;5\&quot;,\n                \&quot;5\&quot;,\n                \&quot;5\&quot;,\n                \&quot;5\&quot;,\n                \&quot;5\&quot;,\n                \&quot;5\&quot;,\n                \&quot;5\&quot;,\n                \&quot;5\&quot;,\n                \&quot;5\&quot;,\n                \&quot;5\&quot;,\n                \&quot;3\&quot;,\n                \&quot;5\&quot;,\n                \&quot;5\&quot;,\n                \&quot;5\&quot;,\n                \&quot;5\&quot;,\n                \&quot;5\&quot;,\n                \&quot;5\&quot;,\n                \&quot;5\&quot;,\n                \&quot;5\&quot;,\n                \&quot;5\&quot;,\n                \&quot;5\&quot;,\n                \&quot;5\&quot;,\n                \&quot;5\&quot;,\n                \&quot;5\&quot;,\n                \&quot;5\&quot;,\n                \&quot;5\&quot;,\n                \&quot;4\&quot;,\n                \&quot;5\&quot;,\n                \&quot;5\&quot;,\n                \&quot;5\&quot;,\n                \&quot;5\&quot;,\n                \&quot;1\&quot;,\n                \&quot;5\&quot;,\n                \&quot;5\&quot;,\n                \&quot;5\&quot;,\n                \&quot;5\&quot;,\n                \&quot;4\&quot;,\n                \&quot;2\&quot;,\n                \&quot;5\&quot;,\n                \&quot;5\&quot;,\n                \&quot;5\&quot;,\n                \&quot;5\&quot;,\n                \&quot;1\&quot;,\n                \&quot;5\&quot;,\n                \&quot;4\&quot;,\n                \&quot;5\&quot;,\n                \&quot;5\&quot;,\n                \&quot;1\&quot;,\n                \&quot;5\&quot;,\n                \&quot;5\&quot;,\n                \&quot;5\&quot;,\n                \&quot;5\&quot;,\n                \&quot;5\&quot;,\n                \&quot;1\&quot;,\n                \&quot;5\&quot;,\n                \&quot;5\&quot;,\n                \&quot;5\&quot;,\n                \&quot;5\&quot;,\n                \&quot;5\&quot;,\n                \&quot;5\&quot;,\n                \&quot;5\&quot;,\n                \&quot;5\&quot;,\n                \&quot;5\&quot;,\n                \&quot;5\&quot;,\n                \&quot;5\&quot;,\n                \&quot;5\&quot;,\n                \&quot;5\&quot;,\n                \&quot;5\&quot;,\n                \&quot;5\&quot;,\n                \&quot;5\&quot;,\n                \&quot;5\&quot;,\n                \&quot;5\&quot;,\n                \&quot;5\&quot;,\n                \&quot;5\&quot;,\n                \&quot;5\&quot;,\n                \&quot;5\&quot;,\n                \&quot;5\&quot;,\n                \&quot;5\&quot;,\n                \&quot;5\&quot;,\n                \&quot;5\&quot;,\n                \&quot;5\&quot;,\n                \&quot;5\&quot;,\n                \&quot;5\&quot;,\n                \&quot;5\&quot;,\n                \&quot;5\&quot;,\n                \&quot;5\&quot;,\n                \&quot;5\&quot;,\n                \&quot;5\&quot;,\n                \&quot;5\&quot;,\n                \&quot;1\&quot;,\n                \&quot;5\&quot;,\n                \&quot;5\&quot;,\n                \&quot;1\&quot;,\n                \&quot;5\&quot;,\n                \&quot;5\&quot;,\n                \&quot;5\&quot;,\n                \&quot;5\&quot;,\n                \&quot;5\&quot;,\n                \&quot;5\&quot;,\n                \&quot;5\&quot;,\n                \&quot;5\&quot;,\n                \&quot;5\&quot;,\n                \&quot;5\&quot;,\n                \&quot;5\&quot;,\n                \&quot;5\&quot;,\n                \&quot;5\&quot;,\n                \&quot;5\&quot;,\n                \&quot;5\&quot;,\n                \&quot;5\&quot;,\n                \&quot;5\&quot;,\n                \&quot;1\&quot;,\n                \&quot;5\&quot;,\n                \&quot;5\&quot;,\n                \&quot;5\&quot;,\n                \&quot;5\&quot;,\n                \&quot;5\&quot;,\n                \&quot;5\&quot;,\n                \&quot;5\&quot;,\n                \&quot;5\&quot;,\n                \&quot;5\&quot;,\n                \&quot;5\&quot;,\n                \&quot;5\&quot;,\n                \&quot;5\&quot;,\n                \&quot;5\&quot;,\n                \&quot;5\&quot;,\n                \&quot;5\&quot;,\n                \&quot;5\&quot;,\n                \&quot;5\&quot;,\n                \&quot;5\&quot;,\n                \&quot;5\&quot;,\n                \&quot;5\&quot;,\n                \&quot;5\&quot;,\n                \&quot;5\&quot;,\n                \&quot;5\&quot;,\n                \&quot;5\&quot;,\n                \&quot;5\&quot;,\n                \&quot;5\&quot;,\n                \&quot;1\&quot;,\n                \&quot;5\&quot;,\n                \&quot;5\&quot;,\n                \&quot;5\&quot;,\n                \&quot;5\&quot;,\n                \&quot;5\&quot;,\n                \&quot;5\&quot;,\n                \&quot;5\&quot;,\n                \&quot;4\&quot;,\n                \&quot;5\&quot;,\n                \&quot;5\&quot;,\n                \&quot;5\&quot;,\n                \&quot;5\&quot;,\n                \&quot;4\&quot;,\n                \&quot;5\&quot;,\n                \&quot;5\&quot;,\n                \&quot;5\&quot;,\n                \&quot;5\&quot;,\n                \&quot;5\&quot;,\n                \&quot;5\&quot;,\n                \&quot;5\&quot;,\n                \&quot;5\&quot;,\n                \&quot;5\&quot;,\n                \&quot;5\&quot;,\n                \&quot;5\&quot;,\n                \&quot;5\&quot;,\n                \&quot;5\&quot;,\n                \&quot;5\&quot;,\n                \&quot;5\&quot;,\n                \&quot;5\&quot;,\n                \&quot;5\&quot;,\n                \&quot;5\&quot;,\n                \&quot;5\&quot;,\n                \&quot;5\&quot;,\n                \&quot;5\&quot;,\n                \&quot;5\&quot;,\n                \&quot;5\&quot;,\n                \&quot;5\&quot;,\n                \&quot;4\&quot;,\n                \&quot;5\&quot;,\n                \&quot;5\&quot;,\n                \&quot;5\&quot;,\n                \&quot;5\&quot;,\n                \&quot;5\&quot;,\n                \&quot;5\&quot;,\n                \&quot;5\&quot;,\n                \&quot;5\&quot;,\n                \&quot;4\&quot;,\n                \&quot;5\&quot;,\n                \&quot;5\&quot;,\n                \&quot;5\&quot;,\n                \&quot;5\&quot;,\n                \&quot;1\&quot;,\n                \&quot;5\&quot;,\n                \&quot;5\&quot;,\n                \&quot;4\&quot;,\n                \&quot;5\&quot;,\n                \&quot;5\&quot;,\n                \&quot;5\&quot;,\n                \&quot;5\&quot;,\n                \&quot;5\&quot;,\n                \&quot;5\&quot;,\n                \&quot;5\&quot;,\n                \&quot;5\&quot;,\n                \&quot;5\&quot;,\n                \&quot;5\&quot;,\n                \&quot;5\&quot;,\n                \&quot;5\&quot;,\n                \&quot;5\&quot;,\n                \&quot;5\&quot;,\n                \&quot;5\&quot;,\n                \&quot;4\&quot;,\n                \&quot;4\&quot;,\n                \&quot;2\&quot;,\n                \&quot;5\&quot;,\n                \&quot;5\&quot;,\n                \&quot;5\&quot;,\n                \&quot;5\&quot;,\n                \&quot;4\&quot;,\n                \&quot;5\&quot;,\n                \&quot;5\&quot;,\n                \&quot;4\&quot;,\n                \&quot;5\&quot;,\n                \&quot;5\&quot;,\n                \&quot;4\&quot;,\n                \&quot;5\&quot;,\n                \&quot;5\&quot;,\n                \&quot;4\&quot;,\n                \&quot;5\&quot;,\n                \&quot;5\&quot;,\n                \&quot;5\&quot;,\n                \&quot;5\&quot;,\n                \&quot;5\&quot;,\n                \&quot;4\&quot;,\n                \&quot;3\&quot;,\n                \&quot;5\&quot;,\n                \&quot;5\&quot;,\n                \&quot;5\&quot;,\n                \&quot;5\&quot;,\n                \&quot;5\&quot;,\n                \&quot;5\&quot;,\n                \&quot;5\&quot;,\n                \&quot;5\&quot;,\n                \&quot;1\&quot;,\n                \&quot;5\&quot;,\n                \&quot;5\&quot;,\n                \&quot;5\&quot;,\n                \&quot;5\&quot;,\n                \&quot;5\&quot;,\n                \&quot;5\&quot;,\n                \&quot;5\&quot;,\n                \&quot;5\&quot;,\n                \&quot;5\&quot;,\n                \&quot;5\&quot;,\n                \&quot;5\&quot;,\n                \&quot;5\&quot;,\n                \&quot;5\&quot;,\n                \&quot;5\&quot;,\n                \&quot;5\&quot;,\n                \&quot;5\&quot;,\n                \&quot;5\&quot;,\n                \&quot;5\&quot;,\n                \&quot;5\&quot;,\n                \&quot;5\&quot;,\n                \&quot;5\&quot;,\n                \&quot;5\&quot;,\n                \&quot;5\&quot;,\n                \&quot;5\&quot;,\n                \&quot;5\&quot;,\n                \&quot;5\&quot;,\n                \&quot;5\&quot;,\n                \&quot;5\&quot;,\n                \&quot;5\&quot;,\n                \&quot;5\&quot;,\n                \&quot;5\&quot;,\n                \&quot;5\&quot;,\n                \&quot;5\&quot;,\n                \&quot;5\&quot;,\n                \&quot;1\&quot;,\n                \&quot;5\&quot;,\n                \&quot;5\&quot;,\n                \&quot;5\&quot;,\n                \&quot;5\&quot;,\n                \&quot;5\&quot;,\n                \&quot;5\&quot;,\n                \&quot;5\&quot;,\n                \&quot;5\&quot;,\n                \&quot;5\&quot;,\n                \&quot;5\&quot;,\n                \&quot;5\&quot;,\n                \&quot;5\&quot;,\n                \&quot;5\&quot;,\n                \&quot;5\&quot;,\n                \&quot;5\&quot;,\n                \&quot;5\&quot;,\n                \&quot;5\&quot;,\n                \&quot;5\&quot;,\n                \&quot;5\&quot;,\n                \&quot;5\&quot;,\n                \&quot;5\&quot;,\n                \&quot;5\&quot;,\n                \&quot;2\&quot;,\n                \&quot;5\&quot;,\n                \&quot;5\&quot;,\n                \&quot;5\&quot;,\n                \&quot;5\&quot;,\n                \&quot;5\&quot;,\n                \&quot;5\&quot;,\n                \&quot;5\&quot;,\n                \&quot;5\&quot;,\n                \&quot;5\&quot;,\n                \&quot;5\&quot;,\n                \&quot;5\&quot;,\n                \&quot;5\&quot;,\n                \&quot;5\&quot;,\n                \&quot;5\&quot;,\n                \&quot;5\&quot;,\n                \&quot;4\&quot;,\n                \&quot;5\&quot;,\n                \&quot;5\&quot;,\n                \&quot;5\&quot;,\n                \&quot;5\&quot;,\n                \&quot;5\&quot;,\n                \&quot;5\&quot;,\n                \&quot;5\&quot;,\n                \&quot;5\&quot;,\n                \&quot;5\&quot;,\n                \&quot;5\&quot;,\n                \&quot;5\&quot;,\n                \&quot;5\&quot;,\n                \&quot;5\&quot;,\n                \&quot;5\&quot;,\n                \&quot;5\&quot;,\n                \&quot;5\&quot;,\n                \&quot;5\&quot;,\n                \&quot;5\&quot;,\n                \&quot;5\&quot;,\n                \&quot;5\&quot;,\n                \&quot;4\&quot;,\n                \&quot;5\&quot;,\n                \&quot;5\&quot;,\n                \&quot;5\&quot;,\n                \&quot;5\&quot;,\n                \&quot;5\&quot;,\n                \&quot;5\&quot;,\n                \&quot;5\&quot;,\n                \&quot;1\&quot;,\n                \&quot;5\&quot;,\n                \&quot;5\&quot;,\n                \&quot;5\&quot;,\n                \&quot;5\&quot;,\n                \&quot;5\&quot;,\n                \&quot;5\&quot;,\n                \&quot;5\&quot;,\n                \&quot;5\&quot;,\n                \&quot;5\&quot;,\n                \&quot;5\&quot;,\n                \&quot;5\&quot;,\n                \&quot;5\&quot;,\n                \&quot;5\&quot;,\n                \&quot;5\&quot;,\n                \&quot;3\&quot;,\n                \&quot;5\&quot;,\n                \&quot;5\&quot;,\n                \&quot;5\&quot;,\n                \&quot;5\&quot;,\n                \&quot;5\&quot;,\n                \&quot;5\&quot;,\n                \&quot;4\&quot;,\n                \&quot;5\&quot;,\n                \&quot;5\&quot;,\n                \&quot;5\&quot;,\n                \&quot;5\&quot;,\n                \&quot;5\&quot;,\n                \&quot;5\&quot;,\n                \&quot;5\&quot;,\n                \&quot;5\&quot;,\n                \&quot;5\&quot;,\n                \&quot;5\&quot;,\n                \&quot;2\&quot;,\n                \&quot;5\&quot;,\n                \&quot;5\&quot;,\n                \&quot;5\&quot;,\n                \&quot;5\&quot;,\n                \&quot;5\&quot;,\n                \&quot;5\&quot;,\n                \&quot;5\&quot;,\n                \&quot;4\&quot;,\n                \&quot;5\&quot;,\n                \&quot;3\&quot;,\n                \&quot;5\&quot;,\n                \&quot;5\&quot;,\n                \&quot;5\&quot;,\n                \&quot;4\&quot;,\n                \&quot;5\&quot;,\n                \&quot;4\&quot;,\n                \&quot;5\&quot;,\n                \&quot;5\&quot;,\n                \&quot;5\&quot;,\n                \&quot;5\&quot;,\n                \&quot;5\&quot;,\n                \&quot;5\&quot;,\n                \&quot;5\&quot;,\n                \&quot;5\&quot;,\n                \&quot;3\&quot;,\n                \&quot;5\&quot;,\n                \&quot;4\&quot;,\n                \&quot;5\&quot;,\n                \&quot;5\&quot;,\n                \&quot;5\&quot;,\n                \&quot;5\&quot;,\n                \&quot;5\&quot;,\n                \&quot;5\&quot;,\n                \&quot;5\&quot;,\n                \&quot;5\&quot;,\n                \&quot;5\&quot;,\n                \&quot;5\&quot;,\n                \&quot;5\&quot;,\n                \&quot;5\&quot;,\n                \&quot;2\&quot;,\n                \&quot;5\&quot;,\n                \&quot;5\&quot;,\n                \&quot;5\&quot;,\n                \&quot;5\&quot;,\n                \&quot;5\&quot;,\n                \&quot;5\&quot;,\n                \&quot;2\&quot;,\n                \&quot;5\&quot;,\n                \&quot;1\&quot;,\n                \&quot;1\&quot;,\n                \&quot;5\&quot;,\n                \&quot;5\&quot;,\n                \&quot;5\&quot;,\n                \&quot;5\&quot;,\n                \&quot;5\&quot;,\n                \&quot;2\&quot;,\n                \&quot;5\&quot;,\n                \&quot;5\&quot;,\n                \&quot;4\&quot;,\n                \&quot;5\&quot;,\n                \&quot;4\&quot;,\n                \&quot;5\&quot;,\n                \&quot;5\&quot;,\n                \&quot;5\&quot;,\n                \&quot;1\&quot;,\n                \&quot;1\&quot;,\n                \&quot;3\&quot;,\n                \&quot;5\&quot;,\n                \&quot;5\&quot;,\n                \&quot;5\&quot;,\n                \&quot;5\&quot;,\n                \&quot;5\&quot;,\n                \&quot;5\&quot;,\n                \&quot;5\&quot;,\n                \&quot;5\&quot;,\n                \&quot;5\&quot;,\n                \&quot;5\&quot;,\n                \&quot;5\&quot;,\n                \&quot;5\&quot;,\n                \&quot;5\&quot;,\n                \&quot;4\&quot;,\n                \&quot;5\&quot;,\n                \&quot;5\&quot;,\n                \&quot;5\&quot;,\n                \&quot;5\&quot;,\n                \&quot;5\&quot;,\n                \&quot;5\&quot;,\n                \&quot;5\&quot;,\n                \&quot;5\&quot;,\n                \&quot;5\&quot;,\n                \&quot;5\&quot;,\n                \&quot;5\&quot;,\n                \&quot;3\&quot;,\n                \&quot;5\&quot;,\n                \&quot;5\&quot;,\n                \&quot;5\&quot;,\n                \&quot;5\&quot;,\n                \&quot;1\&quot;,\n                \&quot;5\&quot;,\n                \&quot;5\&quot;,\n                \&quot;3\&quot;,\n                \&quot;5\&quot;,\n                \&quot;5\&quot;,\n                \&quot;5\&quot;,\n                \&quot;5\&quot;,\n                \&quot;1\&quot;,\n                \&quot;5\&quot;,\n                \&quot;5\&quot;,\n                \&quot;5\&quot;,\n                \&quot;5\&quot;,\n                \&quot;5\&quot;,\n                \&quot;5\&quot;,\n                \&quot;5\&quot;,\n                \&quot;5\&quot;,\n                \&quot;5\&quot;,\n                \&quot;5\&quot;,\n                \&quot;5\&quot;,\n                \&quot;5\&quot;,\n                \&quot;4\&quot;,\n                \&quot;3\&quot;,\n                \&quot;5\&quot;,\n                \&quot;5\&quot;,\n                \&quot;5\&quot;,\n                \&quot;5\&quot;,\n                \&quot;5\&quot;,\n                \&quot;5\&quot;,\n                \&quot;5\&quot;,\n                \&quot;5\&quot;,\n                \&quot;5\&quot;,\n                \&quot;5\&quot;,\n                \&quot;5\&quot;,\n                \&quot;5\&quot;,\n                \&quot;5\&quot;,\n                \&quot;5\&quot;,\n                \&quot;1\&quot;,\n                \&quot;5\&quot;,\n                \&quot;5\&quot;,\n                \&quot;5\&quot;,\n                \&quot;5\&quot;,\n                \&quot;5\&quot;,\n                \&quot;5\&quot;,\n                \&quot;5\&quot;,\n                \&quot;5\&quot;,\n                \&quot;5\&quot;,\n                \&quot;5\&quot;,\n                \&quot;5\&quot;,\n                \&quot;5\&quot;,\n                \&quot;5\&quot;,\n                \&quot;5\&quot;,\n                \&quot;5\&quot;,\n                \&quot;5\&quot;,\n                \&quot;5\&quot;,\n                \&quot;5\&quot;,\n                \&quot;5\&quot;,\n                \&quot;5\&quot;,\n                \&quot;5\&quot;,\n                \&quot;5\&quot;,\n                \&quot;5\&quot;,\n                \&quot;5\&quot;,\n                \&quot;5\&quot;,\n                \&quot;5\&quot;,\n                \&quot;5\&quot;,\n                \&quot;5\&quot;,\n                \&quot;5\&quot;,\n                \&quot;4\&quot;,\n                \&quot;5\&quot;,\n                \&quot;5\&quot;,\n                \&quot;5\&quot;,\n                \&quot;5\&quot;,\n                \&quot;5\&quot;,\n                \&quot;5\&quot;,\n                \&quot;5\&quot;,\n                \&quot;4\&quot;,\n                \&quot;5\&quot;,\n                \&quot;5\&quot;,\n                \&quot;5\&quot;,\n                \&quot;5\&quot;,\n                \&quot;5\&quot;,\n                \&quot;5\&quot;,\n                \&quot;5\&quot;,\n                \&quot;5\&quot;,\n                \&quot;4\&quot;,\n                \&quot;5\&quot;,\n                \&quot;5\&quot;,\n                \&quot;5\&quot;,\n                \&quot;5\&quot;,\n                \&quot;5\&quot;,\n                \&quot;5\&quot;,\n                \&quot;5\&quot;,\n                \&quot;1\&quot;,\n                \&quot;5\&quot;,\n                \&quot;5\&quot;,\n                \&quot;5\&quot;,\n                \&quot;5\&quot;,\n                \&quot;5\&quot;,\n                \&quot;5\&quot;,\n                \&quot;5\&quot;,\n                \&quot;5\&quot;,\n                \&quot;5\&quot;,\n                \&quot;5\&quot;,\n                \&quot;5\&quot;,\n                \&quot;5\&quot;,\n                \&quot;5\&quot;,\n                \&quot;5\&quot;,\n                \&quot;4\&quot;,\n                \&quot;5\&quot;,\n                \&quot;5\&quot;,\n                \&quot;5\&quot;,\n                \&quot;5\&quot;,\n                \&quot;5\&quot;,\n                \&quot;5\&quot;,\n                \&quot;5\&quot;,\n                \&quot;5\&quot;,\n                \&quot;5\&quot;,\n                \&quot;5\&quot;,\n                \&quot;5\&quot;,\n                \&quot;5\&quot;,\n                \&quot;5\&quot;,\n                \&quot;5\&quot;,\n                \&quot;5\&quot;,\n                \&quot;5\&quot;,\n                \&quot;5\&quot;,\n                \&quot;5\&quot;,\n                \&quot;5\&quot;,\n                \&quot;5\&quot;,\n                \&quot;5\&quot;,\n                \&quot;5\&quot;,\n                \&quot;5\&quot;,\n                \&quot;5\&quot;,\n                \&quot;5\&quot;,\n                \&quot;5\&quot;,\n                \&quot;4\&quot;,\n                \&quot;2\&quot;,\n                \&quot;5\&quot;,\n                \&quot;3\&quot;,\n                \&quot;5\&quot;,\n                \&quot;5\&quot;,\n                \&quot;1\&quot;,\n                \&quot;4\&quot;,\n                \&quot;4\&quot;,\n                \&quot;5\&quot;,\n                \&quot;5\&quot;,\n                \&quot;5\&quot;,\n                \&quot;5\&quot;,\n                \&quot;5\&quot;,\n                \&quot;5\&quot;,\n                \&quot;4\&quot;,\n                \&quot;5\&quot;,\n                \&quot;5\&quot;,\n                \&quot;5\&quot;,\n                \&quot;5\&quot;,\n                \&quot;5\&quot;,\n                \&quot;5\&quot;,\n                \&quot;5\&quot;,\n                \&quot;5\&quot;,\n                \&quot;5\&quot;,\n                \&quot;5\&quot;,\n                \&quot;5\&quot;,\n                \&quot;5\&quot;,\n                \&quot;3\&quot;,\n                \&quot;4\&quot;,\n                \&quot;5\&quot;,\n                \&quot;5\&quot;,\n                \&quot;5\&quot;,\n                \&quot;5\&quot;,\n                \&quot;5\&quot;,\n                \&quot;5\&quot;,\n                \&quot;4\&quot;,\n                \&quot;5\&quot;,\n                \&quot;5\&quot;,\n                \&quot;5\&quot;,\n                \&quot;5\&quot;,\n                \&quot;5\&quot;,\n                \&quot;4\&quot;,\n                \&quot;5\&quot;,\n                \&quot;5\&quot;,\n                \&quot;5\&quot;,\n                \&quot;5\&quot;,\n                \&quot;5\&quot;,\n                \&quot;4\&quot;,\n                \&quot;5\&quot;,\n                \&quot;5\&quot;,\n                \&quot;5\&quot;,\n                \&quot;5\&quot;,\n                \&quot;5\&quot;,\n                \&quot;5\&quot;,\n                \&quot;5\&quot;,\n                \&quot;5\&quot;,\n                \&quot;5\&quot;,\n                \&quot;5\&quot;,\n                \&quot;5\&quot;,\n                \&quot;5\&quot;,\n                \&quot;5\&quot;,\n                \&quot;5\&quot;,\n                \&quot;5\&quot;,\n                \&quot;4\&quot;,\n                \&quot;5\&quot;,\n                \&quot;5\&quot;,\n                \&quot;5\&quot;,\n                \&quot;5\&quot;,\n                \&quot;5\&quot;,\n                \&quot;5\&quot;,\n                \&quot;5\&quot;,\n                \&quot;5\&quot;,\n                \&quot;5\&quot;,\n                \&quot;5\&quot;,\n                \&quot;5\&quot;,\n                \&quot;5\&quot;,\n                \&quot;5\&quot;,\n                \&quot;5\&quot;,\n                \&quot;5\&quot;,\n                \&quot;5\&quot;,\n                \&quot;5\&quot;,\n                \&quot;5\&quot;,\n                \&quot;5\&quot;,\n                \&quot;5\&quot;,\n                \&quot;5\&quot;,\n                \&quot;4\&quot;,\n                \&quot;5\&quot;,\n                \&quot;5\&quot;,\n                \&quot;5\&quot;,\n                \&quot;1\&quot;,\n                \&quot;5\&quot;,\n                \&quot;5\&quot;,\n                \&quot;5\&quot;,\n                \&quot;5\&quot;,\n                \&quot;5\&quot;,\n                \&quot;4\&quot;,\n                \&quot;5\&quot;,\n                \&quot;5\&quot;,\n                \&quot;5\&quot;,\n                \&quot;4\&quot;,\n                \&quot;5\&quot;,\n                \&quot;5\&quot;,\n                \&quot;5\&quot;,\n                \&quot;5\&quot;,\n                \&quot;5\&quot;,\n                \&quot;1\&quot;,\n                \&quot;5\&quot;,\n                \&quot;5\&quot;,\n                \&quot;5\&quot;,\n                \&quot;5\&quot;,\n                \&quot;1\&quot;,\n                \&quot;5\&quot;,\n                \&quot;5\&quot;,\n                \&quot;5\&quot;,\n                \&quot;5\&quot;,\n                \&quot;5\&quot;,\n                \&quot;5\&quot;,\n                \&quot;5\&quot;,\n                \&quot;5\&quot;,\n                \&quot;1\&quot;,\n                \&quot;4\&quot;,\n                \&quot;5\&quot;,\n                \&quot;5\&quot;,\n                \&quot;5\&quot;,\n                \&quot;1\&quot;,\n                \&quot;5\&quot;,\n                \&quot;5\&quot;,\n                \&quot;5\&quot;,\n                \&quot;5\&quot;,\n                \&quot;5\&quot;,\n                \&quot;1\&quot;,\n                \&quot;5\&quot;,\n                \&quot;5\&quot;,\n                \&quot;5\&quot;,\n                \&quot;2\&quot;,\n                \&quot;5\&quot;,\n                \&quot;3\&quot;,\n                \&quot;3\&quot;,\n                \&quot;5\&quot;,\n                \&quot;5\&quot;,\n                \&quot;5\&quot;,\n                \&quot;5\&quot;,\n                \&quot;5\&quot;,\n                \&quot;3\&quot;,\n                \&quot;5\&quot;,\n                \&quot;5\&quot;,\n                \&quot;5\&quot;,\n                \&quot;5\&quot;,\n                \&quot;4\&quot;,\n                \&quot;4\&quot;,\n                \&quot;5\&quot;,\n                \&quot;5\&quot;,\n                \&quot;5\&quot;,\n                \&quot;5\&quot;,\n                \&quot;5\&quot;,\n                \&quot;5\&quot;,\n                \&quot;5\&quot;,\n                \&quot;5\&quot;,\n                \&quot;5\&quot;,\n                \&quot;5\&quot;,\n                \&quot;5\&quot;,\n                \&quot;5\&quot;,\n                \&quot;5\&quot;,\n                \&quot;5\&quot;,\n                \&quot;1\&quot;,\n                \&quot;5\&quot;,\n                \&quot;5\&quot;,\n                \&quot;5\&quot;,\n                \&quot;5\&quot;,\n                \&quot;5\&quot;,\n                \&quot;5\&quot;,\n                \&quot;5\&quot;,\n                \&quot;5\&quot;,\n                \&quot;5\&quot;,\n                \&quot;5\&quot;,\n                \&quot;5\&quot;,\n                \&quot;5\&quot;,\n                \&quot;5\&quot;,\n                \&quot;5\&quot;,\n                \&quot;5\&quot;,\n                \&quot;5\&quot;,\n                \&quot;5\&quot;,\n                \&quot;5\&quot;,\n                \&quot;3\&quot;,\n                \&quot;5\&quot;,\n                \&quot;5\&quot;,\n                \&quot;3\&quot;,\n                \&quot;5\&quot;,\n                \&quot;2\&quot;,\n                \&quot;1\&quot;,\n                \&quot;3\&quot;,\n                \&quot;5\&quot;,\n                \&quot;5\&quot;,\n                \&quot;5\&quot;,\n                \&quot;5\&quot;,\n                \&quot;5\&quot;,\n                \&quot;5\&quot;,\n                \&quot;5\&quot;,\n                \&quot;5\&quot;,\n                \&quot;2\&quot;,\n                \&quot;5\&quot;,\n                \&quot;5\&quot;,\n                \&quot;5\&quot;,\n                \&quot;5\&quot;,\n                \&quot;5\&quot;,\n                \&quot;5\&quot;,\n                \&quot;5\&quot;,\n                \&quot;5\&quot;,\n                \&quot;5\&quot;,\n                \&quot;1\&quot;,\n                \&quot;3\&quot;,\n                \&quot;5\&quot;,\n                \&quot;5\&quot;,\n                \&quot;5\&quot;,\n                \&quot;5\&quot;,\n                \&quot;5\&quot;,\n                \&quot;5\&quot;,\n                \&quot;5\&quot;,\n                \&quot;5\&quot;,\n                \&quot;5\&quot;,\n                \&quot;5\&quot;,\n                \&quot;5\&quot;,\n                \&quot;5\&quot;,\n                \&quot;5\&quot;,\n                \&quot;5\&quot;,\n                \&quot;5\&quot;,\n                \&quot;5\&quot;,\n                \&quot;5\&quot;,\n                \&quot;1\&quot;,\n                \&quot;5\&quot;,\n                \&quot;5\&quot;,\n                \&quot;5\&quot;,\n                \&quot;5\&quot;,\n                \&quot;5\&quot;,\n                \&quot;5\&quot;,\n                \&quot;1\&quot;,\n                \&quot;5\&quot;,\n                \&quot;5\&quot;,\n                \&quot;5\&quot;,\n                \&quot;5\&quot;,\n                \&quot;5\&quot;,\n                \&quot;5\&quot;,\n                \&quot;5\&quot;,\n                \&quot;5\&quot;,\n                \&quot;5\&quot;,\n                \&quot;5\&quot;,\n                \&quot;5\&quot;,\n                \&quot;5\&quot;,\n                \&quot;5\&quot;,\n                \&quot;2\&quot;,\n                \&quot;5\&quot;,\n                \&quot;5\&quot;,\n                \&quot;5\&quot;,\n                \&quot;5\&quot;,\n                \&quot;5\&quot;,\n                \&quot;5\&quot;,\n                \&quot;5\&quot;,\n                \&quot;5\&quot;,\n                \&quot;5\&quot;,\n                \&quot;5\&quot;,\n                \&quot;5\&quot;,\n                \&quot;5\&quot;,\n                \&quot;5\&quot;,\n                \&quot;4\&quot;,\n                \&quot;5\&quot;,\n                \&quot;5\&quot;,\n                \&quot;5\&quot;,\n                \&quot;5\&quot;,\n                \&quot;5\&quot;,\n                \&quot;5\&quot;,\n                \&quot;5\&quot;,\n                \&quot;5\&quot;,\n                \&quot;5\&quot;,\n                \&quot;5\&quot;,\n                \&quot;5\&quot;,\n                \&quot;5\&quot;,\n                \&quot;5\&quot;,\n                \&quot;5\&quot;,\n                \&quot;5\&quot;,\n                \&quot;5\&quot;,\n                \&quot;5\&quot;,\n                \&quot;5\&quot;,\n                \&quot;5\&quot;,\n                \&quot;5\&quot;,\n                \&quot;5\&quot;,\n                \&quot;5\&quot;,\n                \&quot;5\&quot;,\n                \&quot;5\&quot;,\n                \&quot;5\&quot;,\n                \&quot;5\&quot;,\n                \&quot;5\&quot;,\n                \&quot;5\&quot;,\n                \&quot;5\&quot;,\n                \&quot;5\&quot;,\n                \&quot;3\&quot;,\n                \&quot;1\&quot;,\n                \&quot;5\&quot;,\n                \&quot;5\&quot;,\n                \&quot;5\&quot;,\n                \&quot;5\&quot;,\n                \&quot;5\&quot;,\n                \&quot;5\&quot;,\n                \&quot;4\&quot;,\n                \&quot;5\&quot;,\n                \&quot;5\&quot;,\n                \&quot;5\&quot;,\n                \&quot;5\&quot;,\n                \&quot;5\&quot;,\n                \&quot;5\&quot;,\n                \&quot;5\&quot;,\n                \&quot;5\&quot;,\n                \&quot;5\&quot;,\n                \&quot;5\&quot;,\n                \&quot;5\&quot;,\n                \&quot;5\&quot;,\n                \&quot;5\&quot;,\n                \&quot;5\&quot;,\n                \&quot;5\&quot;,\n                \&quot;5\&quot;,\n                \&quot;5\&quot;,\n                \&quot;2\&quot;,\n                \&quot;5\&quot;,\n                \&quot;5\&quot;,\n                \&quot;5\&quot;,\n                \&quot;5\&quot;,\n                \&quot;5\&quot;,\n                \&quot;5\&quot;,\n                \&quot;5\&quot;,\n                \&quot;5\&quot;,\n                \&quot;5\&quot;,\n                \&quot;5\&quot;,\n                \&quot;5\&quot;,\n                \&quot;5\&quot;,\n                \&quot;5\&quot;,\n                \&quot;5\&quot;,\n                \&quot;5\&quot;,\n                \&quot;5\&quot;,\n                \&quot;5\&quot;,\n                \&quot;5\&quot;,\n                \&quot;5\&quot;,\n                \&quot;5\&quot;,\n                \&quot;5\&quot;,\n                \&quot;5\&quot;,\n                \&quot;5\&quot;,\n                \&quot;5\&quot;,\n                \&quot;5\&quot;,\n                \&quot;5\&quot;,\n                \&quot;5\&quot;,\n                \&quot;5\&quot;,\n                \&quot;5\&quot;,\n                \&quot;5\&quot;,\n                \&quot;5\&quot;,\n                \&quot;5\&quot;,\n                \&quot;1\&quot;,\n                \&quot;5\&quot;,\n                \&quot;5\&quot;,\n                \&quot;5\&quot;,\n                \&quot;5\&quot;,\n                \&quot;5\&quot;,\n                \&quot;5\&quot;,\n                \&quot;5\&quot;,\n                \&quot;5\&quot;,\n                \&quot;5\&quot;,\n                \&quot;5\&quot;,\n                \&quot;5\&quot;,\n                \&quot;5\&quot;,\n                \&quot;5\&quot;,\n                \&quot;5\&quot;,\n                \&quot;5\&quot;,\n                \&quot;5\&quot;,\n                \&quot;5\&quot;,\n                \&quot;5\&quot;,\n                \&quot;5\&quot;,\n                \&quot;5\&quot;,\n                \&quot;5\&quot;,\n                \&quot;5\&quot;,\n                \&quot;5\&quot;,\n                \&quot;5\&quot;,\n                \&quot;5\&quot;,\n                \&quot;5\&quot;,\n                \&quot;5\&quot;,\n                \&quot;5\&quot;,\n                \&quot;3\&quot;,\n                \&quot;5\&quot;,\n                \&quot;5\&quot;,\n                \&quot;5\&quot;,\n                \&quot;5\&quot;,\n                \&quot;5\&quot;,\n                \&quot;5\&quot;,\n                \&quot;2\&quot;,\n                \&quot;4\&quot;,\n                \&quot;5\&quot;,\n                \&quot;5\&quot;,\n                \&quot;5\&quot;,\n                \&quot;5\&quot;,\n                \&quot;5\&quot;,\n                \&quot;5\&quot;,\n                \&quot;5\&quot;,\n                \&quot;5\&quot;,\n                \&quot;5\&quot;,\n                \&quot;5\&quot;,\n                \&quot;5\&quot;,\n                \&quot;5\&quot;,\n                \&quot;5\&quot;,\n                \&quot;5\&quot;,\n                \&quot;5\&quot;,\n                \&quot;5\&quot;,\n                \&quot;5\&quot;,\n                \&quot;5\&quot;,\n                \&quot;5\&quot;,\n                \&quot;5\&quot;,\n                \&quot;5\&quot;,\n                \&quot;5\&quot;,\n                \&quot;5\&quot;,\n                \&quot;5\&quot;,\n                \&quot;5\&quot;,\n                \&quot;5\&quot;,\n                \&quot;5\&quot;,\n                \&quot;5\&quot;,\n                \&quot;5\&quot;,\n                \&quot;4\&quot;,\n                \&quot;5\&quot;,\n                \&quot;5\&quot;,\n                \&quot;4\&quot;,\n                \&quot;5\&quot;,\n                \&quot;5\&quot;,\n                \&quot;5\&quot;,\n                \&quot;4\&quot;,\n                \&quot;4\&quot;,\n                \&quot;5\&quot;,\n                \&quot;5\&quot;,\n                \&quot;4\&quot;,\n                \&quot;5\&quot;,\n                \&quot;4\&quot;,\n                \&quot;5\&quot;,\n                \&quot;5\&quot;,\n                \&quot;5\&quot;,\n                \&quot;5\&quot;,\n                \&quot;5\&quot;,\n                \&quot;5\&quot;,\n                \&quot;5\&quot;,\n                \&quot;5\&quot;,\n                \&quot;5\&quot;,\n                \&quot;4\&quot;,\n                \&quot;5\&quot;,\n                \&quot;4\&quot;,\n                \&quot;5\&quot;,\n                \&quot;5\&quot;,\n                \&quot;4\&quot;,\n                \&quot;5\&quot;,\n                \&quot;5\&quot;,\n                \&quot;5\&quot;,\n                \&quot;5\&quot;,\n                \&quot;5\&quot;,\n                \&quot;5\&quot;,\n                \&quot;5\&quot;,\n                \&quot;4\&quot;,\n                \&quot;5\&quot;,\n                \&quot;5\&quot;,\n                \&quot;4\&quot;,\n                \&quot;5\&quot;,\n                \&quot;3\&quot;,\n                \&quot;5\&quot;,\n                \&quot;4\&quot;,\n                \&quot;5\&quot;,\n                \&quot;5\&quot;,\n                \&quot;5\&quot;,\n                \&quot;3\&quot;,\n                \&quot;5\&quot;,\n                \&quot;5\&quot;,\n                \&quot;5\&quot;,\n                \&quot;4\&quot;,\n                \&quot;4\&quot;,\n                \&quot;4\&quot;,\n                \&quot;5\&quot;,\n                \&quot;5\&quot;,\n                \&quot;5\&quot;,\n                \&quot;5\&quot;,\n                \&quot;5\&quot;,\n                \&quot;5\&quot;,\n                \&quot;5\&quot;,\n                \&quot;5\&quot;,\n                \&quot;5\&quot;,\n                \&quot;5\&quot;,\n                \&quot;5\&quot;,\n                \&quot;5\&quot;,\n                \&quot;5\&quot;,\n                \&quot;5\&quot;,\n                \&quot;5\&quot;,\n                \&quot;5\&quot;,\n                \&quot;5\&quot;,\n                \&quot;5\&quot;,\n                \&quot;5\&quot;,\n                \&quot;4\&quot;,\n                \&quot;4\&quot;,\n                \&quot;5\&quot;,\n                \&quot;5\&quot;,\n                \&quot;5\&quot;,\n                \&quot;5\&quot;,\n                \&quot;5\&quot;,\n                \&quot;5\&quot;,\n                \&quot;5\&quot;,\n                \&quot;5\&quot;,\n                \&quot;5\&quot;,\n                \&quot;4\&quot;,\n                \&quot;5\&quot;,\n                \&quot;5\&quot;,\n                \&quot;5\&quot;,\n                \&quot;5\&quot;,\n                \&quot;5\&quot;,\n                \&quot;5\&quot;,\n                \&quot;5\&quot;,\n                \&quot;5\&quot;,\n                \&quot;5\&quot;,\n                \&quot;5\&quot;,\n                \&quot;4\&quot;,\n                \&quot;4\&quot;,\n                \&quot;5\&quot;,\n                \&quot;5\&quot;,\n                \&quot;5\&quot;,\n                \&quot;4\&quot;,\n                \&quot;4\&quot;,\n                \&quot;5\&quot;,\n                \&quot;4\&quot;,\n                \&quot;5\&quot;,\n                \&quot;5\&quot;,\n                \&quot;5\&quot;,\n                \&quot;4\&quot;,\n                \&quot;5\&quot;,\n                \&quot;5\&quot;,\n                \&quot;2\&quot;,\n                \&quot;5\&quot;,\n                \&quot;5\&quot;,\n                \&quot;5\&quot;,\n                \&quot;4\&quot;,\n                \&quot;5\&quot;,\n                \&quot;4\&quot;,\n                \&quot;5\&quot;,\n                \&quot;5\&quot;,\n                \&quot;5\&quot;,\n                \&quot;5\&quot;,\n                \&quot;5\&quot;,\n                \&quot;5\&quot;,\n                \&quot;5\&quot;,\n                \&quot;4\&quot;,\n                \&quot;5\&quot;,\n                \&quot;5\&quot;,\n                \&quot;5\&quot;,\n                \&quot;5\&quot;,\n                \&quot;4\&quot;,\n                \&quot;5\&quot;,\n                \&quot;5\&quot;,\n                \&quot;5\&quot;,\n                \&quot;5\&quot;,\n                \&quot;4\&quot;,\n                \&quot;5\&quot;,\n                \&quot;5\&quot;,\n                \&quot;5\&quot;,\n                \&quot;5\&quot;,\n                \&quot;5\&quot;,\n                \&quot;5\&quot;,\n                \&quot;5\&quot;,\n                \&quot;5\&quot;,\n                \&quot;1\&quot;,\n                \&quot;5\&quot;,\n                \&quot;5\&quot;,\n                \&quot;5\&quot;,\n                \&quot;5\&quot;,\n                \&quot;5\&quot;,\n                \&quot;1\&quot;,\n                \&quot;5\&quot;,\n                \&quot;5\&quot;,\n                \&quot;5\&quot;,\n                \&quot;5\&quot;,\n                \&quot;5\&quot;,\n                \&quot;5\&quot;,\n                \&quot;5\&quot;,\n                \&quot;5\&quot;,\n                \&quot;5\&quot;,\n                \&quot;3\&quot;,\n                \&quot;5\&quot;,\n                \&quot;5\&quot;,\n                \&quot;5\&quot;,\n                \&quot;5\&quot;,\n                \&quot;5\&quot;,\n                \&quot;5\&quot;,\n                \&quot;5\&quot;,\n                \&quot;5\&quot;,\n                \&quot;5\&quot;,\n                \&quot;5\&quot;,\n                \&quot;5\&quot;,\n                \&quot;5\&quot;,\n                \&quot;5\&quot;,\n                \&quot;5\&quot;,\n                \&quot;5\&quot;,\n                \&quot;5\&quot;,\n                \&quot;5\&quot;,\n                \&quot;5\&quot;,\n                \&quot;5\&quot;,\n                \&quot;5\&quot;,\n                \&quot;5\&quot;,\n                \&quot;5\&quot;,\n                \&quot;5\&quot;,\n                \&quot;5\&quot;,\n                \&quot;5\&quot;,\n                \&quot;5\&quot;,\n                \&quot;5\&quot;,\n                \&quot;5\&quot;,\n                \&quot;5\&quot;,\n                \&quot;5\&quot;,\n                \&quot;5\&quot;,\n                \&quot;5\&quot;,\n                \&quot;5\&quot;,\n                \&quot;5\&quot;,\n                \&quot;5\&quot;,\n                \&quot;5\&quot;,\n                \&quot;5\&quot;,\n                \&quot;5\&quot;,\n                \&quot;5\&quot;,\n                \&quot;5\&quot;,\n                \&quot;5\&quot;,\n                \&quot;5\&quot;,\n                \&quot;5\&quot;,\n                \&quot;5\&quot;,\n                \&quot;5\&quot;,\n                \&quot;5\&quot;,\n                \&quot;5\&quot;,\n                \&quot;5\&quot;,\n                \&quot;5\&quot;,\n                \&quot;5\&quot;,\n                \&quot;5\&quot;,\n                \&quot;5\&quot;,\n                \&quot;5\&quot;,\n                \&quot;5\&quot;,\n                \&quot;5\&quot;,\n                \&quot;5\&quot;,\n                \&quot;5\&quot;,\n                \&quot;5\&quot;,\n                \&quot;5\&quot;,\n                \&quot;5\&quot;,\n                \&quot;5\&quot;,\n                \&quot;5\&quot;,\n                \&quot;5\&quot;,\n                \&quot;5\&quot;,\n                \&quot;5\&quot;,\n                \&quot;5\&quot;,\n                \&quot;5\&quot;,\n                \&quot;5\&quot;,\n                \&quot;3\&quot;,\n                \&quot;5\&quot;,\n                \&quot;5\&quot;,\n                \&quot;5\&quot;,\n                \&quot;5\&quot;,\n                \&quot;5\&quot;,\n                \&quot;5\&quot;,\n                \&quot;4\&quot;,\n                \&quot;5\&quot;,\n                \&quot;5\&quot;,\n                \&quot;5\&quot;,\n                \&quot;5\&quot;,\n                \&quot;5\&quot;,\n                \&quot;5\&quot;,\n                \&quot;5\&quot;,\n                \&quot;5\&quot;,\n                \&quot;5\&quot;,\n                \&quot;5\&quot;,\n                \&quot;5\&quot;,\n                \&quot;5\&quot;,\n                \&quot;4\&quot;,\n                \&quot;5\&quot;,\n                \&quot;4\&quot;,\n                \&quot;5\&quot;,\n                \&quot;4\&quot;,\n                \&quot;5\&quot;,\n                \&quot;5\&quot;,\n                \&quot;5\&quot;,\n                \&quot;5\&quot;,\n                \&quot;5\&quot;,\n                \&quot;5\&quot;,\n                \&quot;4\&quot;,\n                \&quot;5\&quot;,\n                \&quot;5\&quot;,\n                \&quot;5\&quot;,\n                \&quot;5\&quot;,\n                \&quot;5\&quot;,\n                \&quot;3\&quot;,\n                \&quot;5\&quot;,\n                \&quot;5\&quot;,\n                \&quot;5\&quot;,\n                \&quot;2\&quot;,\n                \&quot;5\&quot;,\n                \&quot;5\&quot;,\n                \&quot;5\&quot;,\n                \&quot;5\&quot;,\n                \&quot;5\&quot;,\n                \&quot;5\&quot;,\n                \&quot;5\&quot;,\n                \&quot;5\&quot;,\n                \&quot;5\&quot;,\n                \&quot;5\&quot;,\n                \&quot;5\&quot;,\n                \&quot;4\&quot;,\n                \&quot;5\&quot;,\n                \&quot;5\&quot;,\n                \&quot;5\&quot;,\n                \&quot;5\&quot;,\n                \&quot;3\&quot;,\n                \&quot;5\&quot;,\n                \&quot;5\&quot;,\n                \&quot;5\&quot;,\n                \&quot;5\&quot;,\n                \&quot;5\&quot;,\n                \&quot;5\&quot;,\n                \&quot;5\&quot;,\n                \&quot;5\&quot;,\n                \&quot;5\&quot;,\n                \&quot;5\&quot;,\n                \&quot;5\&quot;,\n                \&quot;5\&quot;,\n                \&quot;5\&quot;,\n                \&quot;5\&quot;,\n                \&quot;5\&quot;,\n                \&quot;5\&quot;,\n                \&quot;4\&quot;,\n                \&quot;5\&quot;,\n                \&quot;5\&quot;,\n                \&quot;5\&quot;,\n                \&quot;5\&quot;,\n                \&quot;5\&quot;,\n                \&quot;5\&quot;,\n                \&quot;5\&quot;,\n                \&quot;4\&quot;,\n                \&quot;4\&quot;,\n                \&quot;3\&quot;,\n                \&quot;5\&quot;,\n                \&quot;5\&quot;,\n                \&quot;5\&quot;,\n                \&quot;5\&quot;,\n                \&quot;4\&quot;,\n                \&quot;5\&quot;,\n                \&quot;5\&quot;,\n                \&quot;5\&quot;,\n                \&quot;5\&quot;,\n                \&quot;5\&quot;,\n                \&quot;5\&quot;,\n                \&quot;4\&quot;,\n                \&quot;5\&quot;,\n                \&quot;5\&quot;,\n                \&quot;4\&quot;,\n                \&quot;3\&quot;,\n                \&quot;4\&quot;,\n                \&quot;5\&quot;,\n                \&quot;5\&quot;,\n                \&quot;5\&quot;,\n                \&quot;5\&quot;,\n                \&quot;5\&quot;,\n                \&quot;5\&quot;,\n                \&quot;5\&quot;,\n                \&quot;3\&quot;,\n                \&quot;5\&quot;,\n                \&quot;5\&quot;,\n                \&quot;5\&quot;,\n                \&quot;5\&quot;,\n                \&quot;5\&quot;,\n                \&quot;5\&quot;,\n                \&quot;3\&quot;,\n                \&quot;5\&quot;,\n                \&quot;5\&quot;,\n                \&quot;5\&quot;,\n                \&quot;5\&quot;,\n                \&quot;5\&quot;,\n                \&quot;5\&quot;,\n                \&quot;5\&quot;,\n                \&quot;5\&quot;,\n                \&quot;5\&quot;,\n                \&quot;5\&quot;,\n                \&quot;5\&quot;,\n                \&quot;4\&quot;,\n                \&quot;5\&quot;,\n                \&quot;5\&quot;,\n                \&quot;5\&quot;,\n                \&quot;1\&quot;,\n                \&quot;5\&quot;,\n                \&quot;5\&quot;,\n                \&quot;1\&quot;,\n                \&quot;5\&quot;,\n                \&quot;5\&quot;,\n                \&quot;5\&quot;,\n                \&quot;5\&quot;,\n                \&quot;5\&quot;,\n                \&quot;5\&quot;,\n                \&quot;5\&quot;,\n                \&quot;5\&quot;,\n                \&quot;5\&quot;,\n                \&quot;5\&quot;,\n                \&quot;5\&quot;,\n                \&quot;5\&quot;,\n                \&quot;5\&quot;,\n                \&quot;5\&quot;,\n                \&quot;5\&quot;,\n                \&quot;5\&quot;,\n                \&quot;5\&quot;,\n                \&quot;5\&quot;,\n                \&quot;5\&quot;,\n                \&quot;5\&quot;,\n                \&quot;5\&quot;,\n                \&quot;5\&quot;,\n                \&quot;5\&quot;,\n                \&quot;1\&quot;,\n                \&quot;5\&quot;,\n                \&quot;5\&quot;,\n                \&quot;5\&quot;,\n                \&quot;5\&quot;,\n                \&quot;5\&quot;,\n                \&quot;5\&quot;,\n                \&quot;5\&quot;,\n                \&quot;5\&quot;,\n                \&quot;5\&quot;,\n                \&quot;5\&quot;,\n                \&quot;5\&quot;,\n                \&quot;5\&quot;,\n                \&quot;5\&quot;,\n                \&quot;5\&quot;,\n                \&quot;5\&quot;,\n                \&quot;4\&quot;,\n                \&quot;3\&quot;,\n                \&quot;5\&quot;,\n                \&quot;4\&quot;,\n                \&quot;5\&quot;,\n                \&quot;5\&quot;,\n                \&quot;5\&quot;,\n                \&quot;5\&quot;,\n                \&quot;5\&quot;,\n                \&quot;5\&quot;,\n                \&quot;5\&quot;,\n                \&quot;3\&quot;,\n                \&quot;5\&quot;,\n                \&quot;5\&quot;,\n                \&quot;5\&quot;,\n                \&quot;5\&quot;,\n                \&quot;5\&quot;,\n                \&quot;4\&quot;,\n                \&quot;5\&quot;,\n                \&quot;5\&quot;,\n                \&quot;5\&quot;,\n                \&quot;5\&quot;,\n                \&quot;5\&quot;,\n                \&quot;5\&quot;,\n                \&quot;5\&quot;,\n                \&quot;5\&quot;,\n                \&quot;5\&quot;,\n                \&quot;5\&quot;,\n                \&quot;5\&quot;,\n                \&quot;5\&quot;,\n                \&quot;5\&quot;,\n                \&quot;5\&quot;,\n                \&quot;5\&quot;,\n                \&quot;5\&quot;,\n                \&quot;5\&quot;,\n                \&quot;5\&quot;,\n                \&quot;5\&quot;,\n                \&quot;5\&quot;,\n                \&quot;5\&quot;,\n                \&quot;5\&quot;,\n                \&quot;5\&quot;,\n                \&quot;5\&quot;,\n                \&quot;5\&quot;,\n                \&quot;5\&quot;,\n                \&quot;5\&quot;,\n                \&quot;5\&quot;,\n                \&quot;5\&quot;,\n                \&quot;5\&quot;,\n                \&quot;5\&quot;,\n                \&quot;5\&quot;,\n                \&quot;5\&quot;,\n                \&quot;5\&quot;,\n                \&quot;5\&quot;,\n                \&quot;5\&quot;,\n                \&quot;5\&quot;,\n                \&quot;5\&quot;,\n                \&quot;5\&quot;,\n                \&quot;5\&quot;,\n                \&quot;3\&quot;,\n                \&quot;5\&quot;,\n                \&quot;5\&quot;,\n                \&quot;4\&quot;,\n                \&quot;5\&quot;,\n                \&quot;5\&quot;,\n                \&quot;5\&quot;,\n                \&quot;5\&quot;,\n                \&quot;5\&quot;,\n                \&quot;4\&quot;,\n                \&quot;5\&quot;,\n                \&quot;5\&quot;,\n                \&quot;5\&quot;,\n                \&quot;5\&quot;,\n                \&quot;5\&quot;,\n                \&quot;5\&quot;,\n                \&quot;5\&quot;,\n                \&quot;5\&quot;,\n                \&quot;5\&quot;,\n                \&quot;5\&quot;,\n                \&quot;5\&quot;,\n                \&quot;5\&quot;,\n                \&quot;5\&quot;,\n                \&quot;5\&quot;,\n                \&quot;5\&quot;,\n                \&quot;5\&quot;,\n                \&quot;5\&quot;,\n                \&quot;5\&quot;,\n                \&quot;5\&quot;,\n                \&quot;5\&quot;,\n                \&quot;5\&quot;,\n                \&quot;5\&quot;,\n                \&quot;5\&quot;,\n                \&quot;5\&quot;,\n                \&quot;5\&quot;,\n                \&quot;5\&quot;,\n                \&quot;5\&quot;,\n                \&quot;5\&quot;,\n                \&quot;5\&quot;,\n                \&quot;4\&quot;,\n                \&quot;5\&quot;,\n                \&quot;5\&quot;,\n                \&quot;5\&quot;,\n                \&quot;5\&quot;,\n                \&quot;3\&quot;,\n                \&quot;5\&quot;,\n                \&quot;5\&quot;,\n                \&quot;5\&quot;,\n                \&quot;5\&quot;,\n                \&quot;5\&quot;,\n                \&quot;5\&quot;,\n                \&quot;5\&quot;,\n                \&quot;5\&quot;,\n                \&quot;5\&quot;,\n                \&quot;5\&quot;,\n                \&quot;5\&quot;,\n                \&quot;5\&quot;,\n                \&quot;5\&quot;,\n                \&quot;5\&quot;,\n                \&quot;4\&quot;,\n                \&quot;5\&quot;,\n                \&quot;5\&quot;,\n                \&quot;5\&quot;,\n                \&quot;5\&quot;,\n                \&quot;5\&quot;,\n                \&quot;5\&quot;,\n                \&quot;5\&quot;,\n                \&quot;5\&quot;,\n                \&quot;5\&quot;,\n                \&quot;5\&quot;,\n                \&quot;5\&quot;,\n                \&quot;5\&quot;,\n                \&quot;5\&quot;,\n                \&quot;5\&quot;,\n                \&quot;5\&quot;,\n                \&quot;5\&quot;,\n                \&quot;5\&quot;,\n                \&quot;5\&quot;,\n                \&quot;5\&quot;,\n                \&quot;5\&quot;,\n                \&quot;5\&quot;,\n                \&quot;5\&quot;,\n                \&quot;5\&quot;,\n                \&quot;5\&quot;,\n                \&quot;5\&quot;,\n                \&quot;5\&quot;,\n                \&quot;5\&quot;,\n                \&quot;5\&quot;,\n                \&quot;5\&quot;,\n                \&quot;5\&quot;,\n                \&quot;5\&quot;,\n                \&quot;5\&quot;,\n                \&quot;5\&quot;,\n                \&quot;5\&quot;,\n                \&quot;5\&quot;,\n                \&quot;4\&quot;,\n                \&quot;5\&quot;,\n                \&quot;5\&quot;,\n                \&quot;5\&quot;,\n                \&quot;4\&quot;,\n                \&quot;5\&quot;,\n                \&quot;5\&quot;,\n                \&quot;5\&quot;,\n                \&quot;5\&quot;,\n                \&quot;5\&quot;,\n                \&quot;5\&quot;,\n                \&quot;5\&quot;,\n                \&quot;5\&quot;,\n                \&quot;5\&quot;,\n                \&quot;5\&quot;,\n                \&quot;5\&quot;,\n                \&quot;2\&quot;,\n                \&quot;5\&quot;,\n                \&quot;5\&quot;,\n                \&quot;5\&quot;,\n                \&quot;5\&quot;,\n                \&quot;5\&quot;,\n                \&quot;5\&quot;,\n                \&quot;5\&quot;,\n                \&quot;5\&quot;,\n                \&quot;5\&quot;,\n                \&quot;5\&quot;,\n                \&quot;5\&quot;,\n                \&quot;4\&quot;,\n                \&quot;3\&quot;,\n                \&quot;5\&quot;,\n                \&quot;5\&quot;,\n                \&quot;5\&quot;,\n                \&quot;5\&quot;,\n                \&quot;5\&quot;,\n                \&quot;5\&quot;,\n                \&quot;5\&quot;,\n                \&quot;5\&quot;,\n                \&quot;5\&quot;,\n                \&quot;5\&quot;,\n                \&quot;5\&quot;,\n                \&quot;1\&quot;,\n                \&quot;5\&quot;,\n                \&quot;5\&quot;,\n                \&quot;5\&quot;,\n                \&quot;1\&quot;,\n                \&quot;5\&quot;,\n                \&quot;5\&quot;,\n                \&quot;5\&quot;,\n                \&quot;4\&quot;,\n                \&quot;5\&quot;,\n                \&quot;4\&quot;,\n                \&quot;5\&quot;,\n                \&quot;5\&quot;,\n                \&quot;5\&quot;,\n                \&quot;5\&quot;,\n                \&quot;5\&quot;,\n                \&quot;5\&quot;,\n                \&quot;5\&quot;,\n                \&quot;5\&quot;,\n                \&quot;5\&quot;,\n                \&quot;5\&quot;,\n                \&quot;5\&quot;,\n                \&quot;4\&quot;,\n                \&quot;5\&quot;,\n                \&quot;5\&quot;,\n                \&quot;5\&quot;,\n                \&quot;5\&quot;,\n                \&quot;5\&quot;,\n                \&quot;5\&quot;,\n                \&quot;5\&quot;,\n                \&quot;5\&quot;,\n                \&quot;5\&quot;,\n                \&quot;5\&quot;,\n                \&quot;5\&quot;,\n                \&quot;5\&quot;,\n                \&quot;3\&quot;,\n                \&quot;1\&quot;,\n                \&quot;5\&quot;,\n                \&quot;5\&quot;,\n                \&quot;4\&quot;,\n                \&quot;4\&quot;,\n                \&quot;1\&quot;,\n                \&quot;5\&quot;,\n                \&quot;5\&quot;,\n                \&quot;4\&quot;,\n                \&quot;5\&quot;,\n                \&quot;5\&quot;,\n                \&quot;2\&quot;,\n                \&quot;5\&quot;,\n                \&quot;4\&quot;,\n                \&quot;3\&quot;,\n                \&quot;3\&quot;,\n                \&quot;1\&quot;,\n                \&quot;5\&quot;,\n                \&quot;2\&quot;,\n                \&quot;4\&quot;,\n                \&quot;5\&quot;,\n                \&quot;5\&quot;,\n                \&quot;5\&quot;,\n                \&quot;1\&quot;,\n                \&quot;5\&quot;,\n                \&quot;1\&quot;,\n                \&quot;5\&quot;,\n                \&quot;5\&quot;,\n                \&quot;5\&quot;,\n                \&quot;5\&quot;,\n                \&quot;5\&quot;,\n                \&quot;5\&quot;,\n                \&quot;5\&quot;,\n                \&quot;5\&quot;,\n                \&quot;5\&quot;,\n                \&quot;5\&quot;,\n                \&quot;5\&quot;,\n                \&quot;5\&quot;,\n                \&quot;5\&quot;,\n                \&quot;5\&quot;,\n                \&quot;4\&quot;,\n                \&quot;5\&quot;,\n                \&quot;5\&quot;,\n                \&quot;5\&quot;,\n                \&quot;4\&quot;,\n                \&quot;4\&quot;,\n                \&quot;5\&quot;,\n                \&quot;5\&quot;,\n                \&quot;5\&quot;,\n                \&quot;5\&quot;,\n                \&quot;5\&quot;,\n                \&quot;5\&quot;,\n                \&quot;5\&quot;,\n                \&quot;5\&quot;,\n                \&quot;3\&quot;,\n                \&quot;5\&quot;,\n                \&quot;5\&quot;,\n                \&quot;5\&quot;,\n                \&quot;1\&quot;,\n                \&quot;5\&quot;,\n                \&quot;3\&quot;,\n                \&quot;1\&quot;,\n                \&quot;4\&quot;,\n                \&quot;4\&quot;,\n                \&quot;4\&quot;,\n                \&quot;5\&quot;,\n                \&quot;5\&quot;,\n                \&quot;1\&quot;,\n                \&quot;5\&quot;,\n                \&quot;5\&quot;,\n                \&quot;1\&quot;,\n                \&quot;5\&quot;,\n                \&quot;5\&quot;,\n                \&quot;5\&quot;,\n                \&quot;5\&quot;,\n                \&quot;5\&quot;,\n                \&quot;5\&quot;,\n                \&quot;5\&quot;,\n                \&quot;5\&quot;,\n                \&quot;5\&quot;,\n                \&quot;5\&quot;,\n                \&quot;5\&quot;,\n                \&quot;5\&quot;,\n                \&quot;5\&quot;,\n                \&quot;5\&quot;,\n                \&quot;5\&quot;,\n                \&quot;5\&quot;,\n                \&quot;5\&quot;,\n                \&quot;5\&quot;,\n                \&quot;5\&quot;,\n                \&quot;5\&quot;,\n                \&quot;5\&quot;,\n                \&quot;5\&quot;,\n                \&quot;5\&quot;,\n                \&quot;1\&quot;,\n                \&quot;5\&quot;,\n                \&quot;5\&quot;,\n                \&quot;5\&quot;,\n                \&quot;5\&quot;,\n                \&quot;5\&quot;,\n                \&quot;1\&quot;,\n                \&quot;1\&quot;,\n                \&quot;5\&quot;,\n                \&quot;1\&quot;,\n                \&quot;5\&quot;,\n                \&quot;5\&quot;,\n                \&quot;5\&quot;,\n                \&quot;5\&quot;,\n                \&quot;5\&quot;,\n                \&quot;5\&quot;,\n                \&quot;5\&quot;,\n                \&quot;5\&quot;,\n                \&quot;5\&quot;,\n                \&quot;5\&quot;,\n                \&quot;1\&quot;,\n                \&quot;5\&quot;,\n                \&quot;5\&quot;,\n                \&quot;5\&quot;,\n                \&quot;5\&quot;,\n                \&quot;5\&quot;,\n                \&quot;5\&quot;,\n                \&quot;5\&quot;,\n                \&quot;5\&quot;,\n                \&quot;5\&quot;,\n                \&quot;2\&quot;,\n                \&quot;1\&quot;,\n                \&quot;5\&quot;,\n                \&quot;5\&quot;,\n                \&quot;5\&quot;,\n                \&quot;5\&quot;,\n                \&quot;5\&quot;,\n                \&quot;5\&quot;,\n                \&quot;5\&quot;,\n                \&quot;5\&quot;,\n                \&quot;5\&quot;,\n                \&quot;5\&quot;,\n                \&quot;1\&quot;,\n                \&quot;5\&quot;,\n                \&quot;5\&quot;,\n                \&quot;5\&quot;,\n                \&quot;5\&quot;,\n                \&quot;5\&quot;,\n                \&quot;5\&quot;,\n                \&quot;5\&quot;,\n                \&quot;5\&quot;,\n                \&quot;5\&quot;,\n                \&quot;5\&quot;,\n                \&quot;5\&quot;,\n                \&quot;5\&quot;,\n                \&quot;5\&quot;,\n                \&quot;5\&quot;,\n                \&quot;5\&quot;,\n                \&quot;5\&quot;,\n                \&quot;5\&quot;,\n                \&quot;5\&quot;,\n                \&quot;1\&quot;,\n                \&quot;5\&quot;,\n                \&quot;5\&quot;,\n                \&quot;5\&quot;,\n                \&quot;5\&quot;,\n                \&quot;5\&quot;,\n                \&quot;5\&quot;,\n                \&quot;5\&quot;,\n                \&quot;5\&quot;,\n                \&quot;5\&quot;,\n                \&quot;5\&quot;,\n                \&quot;5\&quot;,\n                \&quot;5\&quot;,\n                \&quot;1\&quot;,\n                \&quot;5\&quot;,\n                \&quot;1\&quot;,\n                \&quot;5\&quot;,\n                \&quot;5\&quot;,\n                \&quot;5\&quot;,\n                \&quot;2\&quot;,\n                \&quot;4\&quot;,\n                \&quot;5\&quot;,\n                \&quot;5\&quot;,\n                \&quot;5\&quot;,\n                \&quot;5\&quot;,\n                \&quot;5\&quot;,\n                \&quot;5\&quot;,\n                \&quot;5\&quot;,\n                \&quot;5\&quot;,\n                \&quot;5\&quot;,\n                \&quot;5\&quot;,\n                \&quot;5\&quot;,\n                \&quot;5\&quot;,\n                \&quot;5\&quot;,\n                \&quot;5\&quot;,\n                \&quot;1\&quot;,\n                \&quot;5\&quot;,\n                \&quot;5\&quot;,\n                \&quot;4\&quot;,\n                \&quot;5\&quot;,\n                \&quot;5\&quot;,\n                \&quot;5\&quot;,\n                \&quot;5\&quot;,\n                \&quot;4\&quot;,\n                \&quot;5\&quot;,\n                \&quot;5\&quot;,\n                \&quot;5\&quot;,\n                \&quot;5\&quot;,\n                \&quot;5\&quot;,\n                \&quot;5\&quot;,\n                \&quot;5\&quot;,\n                \&quot;1\&quot;,\n                \&quot;5\&quot;,\n                \&quot;5\&quot;,\n                \&quot;1\&quot;,\n                \&quot;5\&quot;,\n                \&quot;5\&quot;,\n                \&quot;5\&quot;,\n                \&quot;5\&quot;,\n                \&quot;5\&quot;,\n                \&quot;5\&quot;,\n                \&quot;5\&quot;,\n                \&quot;5\&quot;,\n                \&quot;5\&quot;,\n                \&quot;5\&quot;,\n                \&quot;5\&quot;,\n                \&quot;5\&quot;,\n                \&quot;1\&quot;,\n                \&quot;5\&quot;,\n                \&quot;5\&quot;,\n                \&quot;1\&quot;,\n                \&quot;5\&quot;,\n                \&quot;5\&quot;,\n                \&quot;1\&quot;,\n                \&quot;1\&quot;,\n                \&quot;5\&quot;,\n                \&quot;5\&quot;,\n                \&quot;5\&quot;,\n                \&quot;5\&quot;,\n                \&quot;5\&quot;,\n                \&quot;5\&quot;,\n                \&quot;5\&quot;,\n                \&quot;5\&quot;,\n                \&quot;5\&quot;,\n                \&quot;5\&quot;,\n                \&quot;5\&quot;,\n                \&quot;5\&quot;,\n                \&quot;5\&quot;,\n                \&quot;5\&quot;,\n                \&quot;5\&quot;,\n                \&quot;5\&quot;,\n                \&quot;5\&quot;,\n                \&quot;5\&quot;,\n                \&quot;5\&quot;,\n                \&quot;5\&quot;,\n                \&quot;5\&quot;,\n                \&quot;5\&quot;,\n                \&quot;5\&quot;,\n                \&quot;5\&quot;,\n                \&quot;5\&quot;,\n                \&quot;5\&quot;,\n                \&quot;5\&quot;,\n                \&quot;1\&quot;,\n                \&quot;5\&quot;,\n                \&quot;5\&quot;,\n                \&quot;5\&quot;,\n                \&quot;5\&quot;,\n                \&quot;5\&quot;,\n                \&quot;5\&quot;,\n                \&quot;5\&quot;,\n                \&quot;3\&quot;,\n                \&quot;5\&quot;,\n                \&quot;5\&quot;,\n                \&quot;5\&quot;,\n                \&quot;5\&quot;,\n                \&quot;5\&quot;,\n                \&quot;5\&quot;,\n                \&quot;5\&quot;,\n                \&quot;5\&quot;,\n                \&quot;5\&quot;,\n                \&quot;5\&quot;,\n                \&quot;5\&quot;,\n                \&quot;5\&quot;,\n                \&quot;5\&quot;,\n                \&quot;5\&quot;,\n                \&quot;5\&quot;,\n                \&quot;5\&quot;,\n                \&quot;5\&quot;,\n                \&quot;5\&quot;,\n                \&quot;4\&quot;,\n                \&quot;5\&quot;,\n                \&quot;5\&quot;,\n                \&quot;5\&quot;,\n                \&quot;5\&quot;,\n                \&quot;5\&quot;,\n                \&quot;5\&quot;,\n                \&quot;5\&quot;,\n                \&quot;5\&quot;,\n                \&quot;5\&quot;,\n                \&quot;5\&quot;,\n                \&quot;5\&quot;,\n                \&quot;5\&quot;,\n                \&quot;5\&quot;,\n                \&quot;5\&quot;,\n                \&quot;5\&quot;,\n                \&quot;5\&quot;,\n                \&quot;5\&quot;,\n                \&quot;5\&quot;,\n                \&quot;5\&quot;,\n                \&quot;5\&quot;,\n                \&quot;5\&quot;,\n                \&quot;5\&quot;,\n                \&quot;5\&quot;,\n                \&quot;5\&quot;,\n                \&quot;5\&quot;,\n                \&quot;5\&quot;,\n                \&quot;5\&quot;,\n                \&quot;5\&quot;,\n                \&quot;5\&quot;,\n                \&quot;5\&quot;,\n                \&quot;5\&quot;,\n                \&quot;5\&quot;,\n                \&quot;5\&quot;,\n                \&quot;5\&quot;,\n                \&quot;5\&quot;,\n                \&quot;5\&quot;,\n                \&quot;1\&quot;,\n                \&quot;5\&quot;,\n                \&quot;5\&quot;,\n                \&quot;3\&quot;,\n                \&quot;5\&quot;,\n                \&quot;5\&quot;,\n                \&quot;5\&quot;,\n                \&quot;5\&quot;,\n                \&quot;5\&quot;,\n                \&quot;5\&quot;,\n                \&quot;5\&quot;,\n                \&quot;5\&quot;,\n                \&quot;5\&quot;,\n                \&quot;5\&quot;,\n                \&quot;5\&quot;,\n                \&quot;1\&quot;,\n                \&quot;1\&quot;,\n                \&quot;5\&quot;,\n                \&quot;5\&quot;,\n                \&quot;1\&quot;,\n                \&quot;5\&quot;,\n                \&quot;5\&quot;,\n                \&quot;5\&quot;,\n                \&quot;1\&quot;,\n                \&quot;5\&quot;,\n                \&quot;5\&quot;,\n                \&quot;5\&quot;,\n                \&quot;1\&quot;,\n                \&quot;5\&quot;,\n                \&quot;5\&quot;,\n                \&quot;5\&quot;,\n                \&quot;5\&quot;,\n                \&quot;5\&quot;,\n                \&quot;5\&quot;,\n                \&quot;5\&quot;,\n                \&quot;5\&quot;,\n                \&quot;5\&quot;,\n                \&quot;5\&quot;,\n                \&quot;5\&quot;,\n                \&quot;5\&quot;,\n                \&quot;5\&quot;,\n                \&quot;2\&quot;,\n                \&quot;5\&quot;,\n                \&quot;3\&quot;,\n                \&quot;5\&quot;,\n                \&quot;5\&quot;,\n                \&quot;3\&quot;,\n                \&quot;5\&quot;,\n                \&quot;3\&quot;,\n                \&quot;5\&quot;,\n                \&quot;4\&quot;,\n                \&quot;5\&quot;,\n                \&quot;5\&quot;,\n                \&quot;5\&quot;,\n                \&quot;5\&quot;,\n                \&quot;5\&quot;,\n                \&quot;1\&quot;,\n                \&quot;5\&quot;,\n                \&quot;5\&quot;,\n                \&quot;3\&quot;,\n                \&quot;2\&quot;,\n                \&quot;2\&quot;,\n                \&quot;5\&quot;,\n                \&quot;5\&quot;,\n                \&quot;5\&quot;,\n                \&quot;5\&quot;,\n                \&quot;5\&quot;,\n                \&quot;5\&quot;,\n                \&quot;1\&quot;,\n                \&quot;5\&quot;,\n                \&quot;5\&quot;,\n                \&quot;5\&quot;,\n                \&quot;5\&quot;,\n                \&quot;5\&quot;,\n                \&quot;5\&quot;,\n                \&quot;5\&quot;,\n                \&quot;5\&quot;,\n                \&quot;5\&quot;,\n                \&quot;5\&quot;,\n                \&quot;5\&quot;,\n                \&quot;3\&quot;,\n                \&quot;5\&quot;,\n                \&quot;5\&quot;,\n                \&quot;5\&quot;,\n                \&quot;5\&quot;,\n                \&quot;5\&quot;,\n                \&quot;5\&quot;,\n                \&quot;5\&quot;,\n                \&quot;5\&quot;,\n                \&quot;5\&quot;,\n                \&quot;5\&quot;,\n                \&quot;5\&quot;,\n                \&quot;1\&quot;,\n                \&quot;5\&quot;,\n                \&quot;5\&quot;,\n                \&quot;5\&quot;,\n                \&quot;5\&quot;,\n                \&quot;5\&quot;,\n                \&quot;5\&quot;,\n                \&quot;5\&quot;,\n                \&quot;5\&quot;,\n                \&quot;4\&quot;,\n                \&quot;5\&quot;,\n                \&quot;5\&quot;,\n                \&quot;5\&quot;,\n                \&quot;5\&quot;,\n                \&quot;5\&quot;,\n                \&quot;5\&quot;,\n                \&quot;5\&quot;,\n                \&quot;5\&quot;,\n                \&quot;5\&quot;,\n                \&quot;5\&quot;,\n                \&quot;5\&quot;,\n                \&quot;1\&quot;,\n                \&quot;5\&quot;,\n                \&quot;1\&quot;,\n                \&quot;5\&quot;,\n                \&quot;5\&quot;,\n                \&quot;5\&quot;,\n                \&quot;5\&quot;,\n                \&quot;5\&quot;,\n                \&quot;5\&quot;,\n                \&quot;5\&quot;,\n                \&quot;2\&quot;,\n                \&quot;5\&quot;,\n                \&quot;5\&quot;,\n                \&quot;4\&quot;,\n                \&quot;2\&quot;,\n                \&quot;5\&quot;,\n                \&quot;5\&quot;,\n                \&quot;4\&quot;,\n                \&quot;3\&quot;,\n                \&quot;5\&quot;,\n                \&quot;5\&quot;,\n                \&quot;5\&quot;,\n                \&quot;5\&quot;,\n                \&quot;5\&quot;,\n                \&quot;2\&quot;,\n                \&quot;3\&quot;,\n                \&quot;4\&quot;,\n                \&quot;5\&quot;,\n                \&quot;5\&quot;,\n                \&quot;5\&quot;,\n                \&quot;5\&quot;,\n                \&quot;5\&quot;,\n                \&quot;5\&quot;,\n                \&quot;5\&quot;,\n                \&quot;5\&quot;,\n                \&quot;2\&quot;,\n                \&quot;1\&quot;,\n                \&quot;5\&quot;,\n                \&quot;3\&quot;,\n                \&quot;5\&quot;,\n                \&quot;5\&quot;,\n                \&quot;3\&quot;,\n                \&quot;5\&quot;,\n                \&quot;5\&quot;,\n                \&quot;5\&quot;,\n                \&quot;5\&quot;,\n                \&quot;5\&quot;,\n                \&quot;5\&quot;,\n                \&quot;2\&quot;,\n                \&quot;5\&quot;,\n                \&quot;5\&quot;,\n                \&quot;5\&quot;,\n                \&quot;1\&quot;,\n                \&quot;5\&quot;,\n                \&quot;5\&quot;,\n                \&quot;5\&quot;,\n                \&quot;3\&quot;,\n                \&quot;5\&quot;,\n                \&quot;4\&quot;,\n                \&quot;5\&quot;,\n                \&quot;5\&quot;,\n                \&quot;5\&quot;,\n                \&quot;2\&quot;,\n                \&quot;5\&quot;,\n                \&quot;5\&quot;,\n                \&quot;5\&quot;,\n                \&quot;5\&quot;,\n                \&quot;5\&quot;,\n                \&quot;4\&quot;,\n                \&quot;5\&quot;,\n                \&quot;5\&quot;,\n                \&quot;5\&quot;,\n                \&quot;5\&quot;,\n                \&quot;5\&quot;,\n                \&quot;5\&quot;,\n                \&quot;5\&quot;,\n                \&quot;4\&quot;,\n                \&quot;5\&quot;,\n                \&quot;5\&quot;,\n                \&quot;5\&quot;,\n                \&quot;5\&quot;,\n                \&quot;5\&quot;,\n                \&quot;5\&quot;,\n                \&quot;4\&quot;,\n                \&quot;5\&quot;,\n                \&quot;5\&quot;,\n                \&quot;3\&quot;,\n                \&quot;5\&quot;,\n                \&quot;5\&quot;,\n                \&quot;1\&quot;,\n                \&quot;5\&quot;,\n                \&quot;5\&quot;,\n                \&quot;5\&quot;,\n                \&quot;5\&quot;,\n                \&quot;5\&quot;,\n                \&quot;5\&quot;,\n                \&quot;1\&quot;,\n                \&quot;5\&quot;,\n                \&quot;1\&quot;,\n                \&quot;5\&quot;,\n                \&quot;5\&quot;,\n                \&quot;5\&quot;,\n                \&quot;2\&quot;,\n                \&quot;5\&quot;,\n                \&quot;5\&quot;,\n                \&quot;1\&quot;,\n                \&quot;5\&quot;,\n                \&quot;1\&quot;,\n                \&quot;5\&quot;,\n                \&quot;3\&quot;,\n                \&quot;4\&quot;,\n                \&quot;5\&quot;,\n                \&quot;5\&quot;,\n                \&quot;4\&quot;,\n                \&quot;5\&quot;,\n                \&quot;5\&quot;,\n                \&quot;5\&quot;,\n                \&quot;1\&quot;,\n                \&quot;5\&quot;,\n                \&quot;5\&quot;,\n                \&quot;4\&quot;,\n                \&quot;5\&quot;,\n                \&quot;5\&quot;,\n                \&quot;5\&quot;,\n                \&quot;5\&quot;,\n                \&quot;4\&quot;,\n                \&quot;5\&quot;,\n                \&quot;5\&quot;,\n                \&quot;3\&quot;,\n                \&quot;4\&quot;,\n                \&quot;5\&quot;,\n                \&quot;5\&quot;,\n                \&quot;5\&quot;,\n                \&quot;5\&quot;,\n                \&quot;1\&quot;,\n                \&quot;2\&quot;,\n                \&quot;5\&quot;,\n                \&quot;5\&quot;,\n                \&quot;5\&quot;,\n                \&quot;5\&quot;,\n                \&quot;5\&quot;,\n                \&quot;5\&quot;,\n                \&quot;5\&quot;,\n                \&quot;5\&quot;,\n                \&quot;3\&quot;,\n                \&quot;4\&quot;,\n                \&quot;5\&quot;,\n                \&quot;5\&quot;,\n                \&quot;5\&quot;,\n                \&quot;5\&quot;,\n                \&quot;5\&quot;,\n                \&quot;5\&quot;,\n                \&quot;5\&quot;,\n                \&quot;5\&quot;,\n                \&quot;3\&quot;,\n                \&quot;5\&quot;,\n                \&quot;5\&quot;,\n                \&quot;5\&quot;,\n                \&quot;3\&quot;,\n                \&quot;5\&quot;,\n                \&quot;5\&quot;,\n                \&quot;5\&quot;,\n                \&quot;5\&quot;,\n                \&quot;5\&quot;,\n                \&quot;1\&quot;,\n                \&quot;5\&quot;,\n                \&quot;5\&quot;,\n                \&quot;5\&quot;,\n                \&quot;5\&quot;,\n                \&quot;5\&quot;,\n                \&quot;5\&quot;,\n                \&quot;5\&quot;,\n                \&quot;5\&quot;,\n                \&quot;5\&quot;,\n                \&quot;2\&quot;,\n                \&quot;4\&quot;,\n                \&quot;5\&quot;,\n                \&quot;5\&quot;,\n                \&quot;5\&quot;,\n                \&quot;5\&quot;,\n                \&quot;5\&quot;,\n                \&quot;5\&quot;,\n                \&quot;5\&quot;,\n                \&quot;5\&quot;,\n                \&quot;5\&quot;,\n                \&quot;5\&quot;,\n                \&quot;5\&quot;,\n                \&quot;5\&quot;,\n                \&quot;5\&quot;,\n                \&quot;5\&quot;,\n                \&quot;5\&quot;,\n                \&quot;5\&quot;,\n                \&quot;5\&quot;,\n                \&quot;5\&quot;,\n                \&quot;5\&quot;,\n                \&quot;5\&quot;,\n                \&quot;4\&quot;,\n                \&quot;5\&quot;,\n                \&quot;5\&quot;,\n                \&quot;5\&quot;,\n                \&quot;5\&quot;,\n                \&quot;5\&quot;,\n                \&quot;3\&quot;,\n                \&quot;5\&quot;,\n                \&quot;5\&quot;,\n                \&quot;5\&quot;,\n                \&quot;5\&quot;,\n                \&quot;5\&quot;,\n                \&quot;5\&quot;,\n                \&quot;5\&quot;,\n                \&quot;4\&quot;,\n                \&quot;4\&quot;,\n                \&quot;5\&quot;,\n                \&quot;5\&quot;,\n                \&quot;4\&quot;,\n                \&quot;5\&quot;,\n                \&quot;5\&quot;,\n                \&quot;5\&quot;,\n                \&quot;5\&quot;,\n                \&quot;5\&quot;,\n                \&quot;5\&quot;,\n                \&quot;5\&quot;,\n                \&quot;5\&quot;,\n                \&quot;5\&quot;,\n                \&quot;5\&quot;,\n                \&quot;5\&quot;,\n                \&quot;5\&quot;,\n                \&quot;5\&quot;,\n                \&quot;5\&quot;,\n                \&quot;5\&quot;,\n                \&quot;5\&quot;,\n                \&quot;5\&quot;,\n                \&quot;5\&quot;,\n                \&quot;5\&quot;,\n                \&quot;4\&quot;,\n                \&quot;3\&quot;,\n                \&quot;3\&quot;,\n                \&quot;2\&quot;,\n                \&quot;5\&quot;,\n                \&quot;5\&quot;,\n                \&quot;4\&quot;,\n                \&quot;4\&quot;,\n                \&quot;5\&quot;,\n                \&quot;5\&quot;,\n                \&quot;5\&quot;,\n                \&quot;1\&quot;,\n                \&quot;5\&quot;,\n                \&quot;5\&quot;,\n                \&quot;5\&quot;,\n                \&quot;4\&quot;,\n                \&quot;4\&quot;,\n                \&quot;5\&quot;,\n                \&quot;5\&quot;,\n                \&quot;5\&quot;,\n                \&quot;1\&quot;,\n                \&quot;3\&quot;,\n                \&quot;5\&quot;,\n                \&quot;4\&quot;,\n                \&quot;5\&quot;,\n                \&quot;3\&quot;,\n                \&quot;4\&quot;,\n                \&quot;5\&quot;,\n                \&quot;5\&quot;,\n                \&quot;5\&quot;,\n                \&quot;5\&quot;,\n                \&quot;5\&quot;,\n                \&quot;5\&quot;,\n                \&quot;5\&quot;,\n                \&quot;5\&quot;,\n                \&quot;4\&quot;,\n                \&quot;5\&quot;,\n                \&quot;5\&quot;,\n                \&quot;5\&quot;,\n                \&quot;4\&quot;,\n                \&quot;4\&quot;,\n                \&quot;4\&quot;,\n                \&quot;5\&quot;,\n                \&quot;5\&quot;,\n                \&quot;4\&quot;,\n                \&quot;4\&quot;,\n                \&quot;3\&quot;,\n                \&quot;4\&quot;,\n                \&quot;4\&quot;,\n                \&quot;5\&quot;,\n                \&quot;4\&quot;,\n                \&quot;5\&quot;,\n                \&quot;4\&quot;,\n                \&quot;4\&quot;,\n                \&quot;5\&quot;,\n                \&quot;5\&quot;,\n                \&quot;5\&quot;,\n                \&quot;4\&quot;,\n                \&quot;5\&quot;,\n                \&quot;5\&quot;,\n                \&quot;5\&quot;,\n                \&quot;5\&quot;,\n                \&quot;5\&quot;,\n                \&quot;5\&quot;,\n                \&quot;4\&quot;,\n                \&quot;5\&quot;,\n                \&quot;5\&quot;,\n                \&quot;3\&quot;,\n                \&quot;5\&quot;,\n                \&quot;5\&quot;,\n                \&quot;3\&quot;,\n                \&quot;2\&quot;,\n                \&quot;5\&quot;,\n                \&quot;5\&quot;,\n                \&quot;5\&quot;,\n                \&quot;5\&quot;,\n                \&quot;5\&quot;,\n                \&quot;5\&quot;,\n                \&quot;5\&quot;,\n                \&quot;5\&quot;,\n                \&quot;5\&quot;,\n                \&quot;5\&quot;,\n                \&quot;5\&quot;,\n                \&quot;5\&quot;,\n                \&quot;1\&quot;,\n                \&quot;1\&quot;,\n                \&quot;5\&quot;,\n                \&quot;5\&quot;,\n                \&quot;2\&quot;,\n                \&quot;5\&quot;,\n                \&quot;5\&quot;,\n                \&quot;5\&quot;,\n                \&quot;5\&quot;,\n                \&quot;5\&quot;,\n                \&quot;5\&quot;,\n                \&quot;5\&quot;,\n                \&quot;5\&quot;,\n                \&quot;1\&quot;,\n                \&quot;5\&quot;,\n                \&quot;5\&quot;,\n                \&quot;5\&quot;,\n                \&quot;3\&quot;,\n                \&quot;1\&quot;,\n                \&quot;1\&quot;,\n                \&quot;5\&quot;,\n                \&quot;5\&quot;,\n                \&quot;5\&quot;,\n                \&quot;4\&quot;,\n                \&quot;5\&quot;,\n                \&quot;2\&quot;,\n                \&quot;5\&quot;,\n                \&quot;5\&quot;,\n                \&quot;1\&quot;,\n                \&quot;5\&quot;,\n                \&quot;5\&quot;,\n                \&quot;5\&quot;,\n                \&quot;1\&quot;,\n                \&quot;5\&quot;,\n                \&quot;5\&quot;,\n                \&quot;5\&quot;,\n                \&quot;5\&quot;,\n                \&quot;5\&quot;,\n                \&quot;5\&quot;,\n                \&quot;5\&quot;,\n                \&quot;5\&quot;,\n                \&quot;5\&quot;,\n                \&quot;5\&quot;,\n                \&quot;5\&quot;,\n                \&quot;1\&quot;,\n                \&quot;1\&quot;,\n                \&quot;5\&quot;,\n                \&quot;1\&quot;,\n                \&quot;2\&quot;,\n                \&quot;5\&quot;,\n                \&quot;5\&quot;,\n                \&quot;5\&quot;,\n                \&quot;5\&quot;,\n                \&quot;5\&quot;,\n                \&quot;5\&quot;,\n                \&quot;5\&quot;,\n                \&quot;5\&quot;,\n                \&quot;5\&quot;,\n                \&quot;5\&quot;,\n                \&quot;5\&quot;,\n                \&quot;5\&quot;,\n                \&quot;5\&quot;,\n                \&quot;5\&quot;,\n                \&quot;5\&quot;,\n                \&quot;5\&quot;,\n                \&quot;5\&quot;,\n                \&quot;1\&quot;,\n                \&quot;5\&quot;,\n                \&quot;5\&quot;,\n                \&quot;5\&quot;,\n                \&quot;5\&quot;,\n                \&quot;5\&quot;,\n                \&quot;5\&quot;,\n                \&quot;5\&quot;,\n                \&quot;5\&quot;,\n                \&quot;5\&quot;,\n                \&quot;5\&quot;,\n                \&quot;3\&quot;,\n                \&quot;5\&quot;,\n                \&quot;5\&quot;,\n                \&quot;5\&quot;,\n                \&quot;5\&quot;,\n                \&quot;5\&quot;,\n                \&quot;5\&quot;,\n                \&quot;5\&quot;,\n                \&quot;5\&quot;,\n                \&quot;2\&quot;,\n                \&quot;5\&quot;,\n                \&quot;5\&quot;,\n                \&quot;5\&quot;,\n                \&quot;1\&quot;,\n                \&quot;1\&quot;,\n                \&quot;5\&quot;,\n                \&quot;5\&quot;,\n                \&quot;2\&quot;,\n                \&quot;5\&quot;,\n                \&quot;5\&quot;,\n                \&quot;5\&quot;,\n                \&quot;5\&quot;,\n                \&quot;5\&quot;,\n                \&quot;5\&quot;,\n                \&quot;5\&quot;,\n                \&quot;5\&quot;,\n                \&quot;1\&quot;,\n                \&quot;4\&quot;,\n                \&quot;5\&quot;,\n                \&quot;1\&quot;,\n                \&quot;4\&quot;,\n                \&quot;1\&quot;,\n                \&quot;1\&quot;,\n                \&quot;5\&quot;,\n                \&quot;5\&quot;,\n                \&quot;5\&quot;,\n                \&quot;5\&quot;,\n                \&quot;5\&quot;,\n                \&quot;5\&quot;,\n                \&quot;1\&quot;,\n                \&quot;2\&quot;,\n                \&quot;5\&quot;,\n                \&quot;5\&quot;,\n                \&quot;5\&quot;,\n                \&quot;5\&quot;,\n                \&quot;5\&quot;,\n                \&quot;5\&quot;,\n                \&quot;5\&quot;,\n                \&quot;5\&quot;,\n                \&quot;5\&quot;,\n                \&quot;5\&quot;,\n                \&quot;5\&quot;,\n                \&quot;5\&quot;,\n                \&quot;5\&quot;,\n                \&quot;5\&quot;,\n                \&quot;5\&quot;,\n                \&quot;5\&quot;,\n                \&quot;5\&quot;,\n                \&quot;5\&quot;,\n                \&quot;5\&quot;,\n                \&quot;5\&quot;,\n                \&quot;4\&quot;,\n                \&quot;5\&quot;,\n                \&quot;5\&quot;,\n                \&quot;5\&quot;,\n                \&quot;5\&quot;,\n                \&quot;5\&quot;,\n                \&quot;5\&quot;,\n                \&quot;5\&quot;,\n                \&quot;5\&quot;,\n                \&quot;5\&quot;,\n                \&quot;1\&quot;,\n                \&quot;5\&quot;,\n                \&quot;5\&quot;,\n                \&quot;5\&quot;,\n                \&quot;5\&quot;,\n                \&quot;5\&quot;,\n                \&quot;5\&quot;,\n                \&quot;4\&quot;,\n                \&quot;5\&quot;,\n                \&quot;5\&quot;,\n                \&quot;5\&quot;,\n                \&quot;5\&quot;,\n                \&quot;5\&quot;,\n                \&quot;5\&quot;,\n                \&quot;5\&quot;,\n                \&quot;5\&quot;,\n                \&quot;5\&quot;,\n                \&quot;5\&quot;,\n                \&quot;5\&quot;,\n                \&quot;5\&quot;,\n                \&quot;5\&quot;,\n                \&quot;5\&quot;,\n                \&quot;5\&quot;,\n                \&quot;1\&quot;,\n                \&quot;4\&quot;,\n                \&quot;1\&quot;,\n                \&quot;5\&quot;,\n                \&quot;5\&quot;,\n                \&quot;4\&quot;,\n                \&quot;5\&quot;,\n                \&quot;3\&quot;,\n                \&quot;3\&quot;,\n                \&quot;4\&quot;,\n                \&quot;5\&quot;,\n                \&quot;5\&quot;,\n                \&quot;5\&quot;,\n                \&quot;5\&quot;,\n                \&quot;4\&quot;,\n                \&quot;5\&quot;,\n                \&quot;5\&quot;,\n                \&quot;5\&quot;,\n                \&quot;4\&quot;,\n                \&quot;3\&quot;,\n                \&quot;5\&quot;,\n                \&quot;5\&quot;,\n                \&quot;5\&quot;,\n                \&quot;1\&quot;,\n                \&quot;5\&quot;,\n                \&quot;5\&quot;,\n                \&quot;1\&quot;,\n                \&quot;5\&quot;,\n                \&quot;5\&quot;,\n                \&quot;4\&quot;,\n                \&quot;5\&quot;,\n                \&quot;1\&quot;,\n                \&quot;5\&quot;,\n                \&quot;3\&quot;,\n                \&quot;1\&quot;,\n                \&quot;5\&quot;,\n                \&quot;2\&quot;,\n                \&quot;4\&quot;,\n                \&quot;5\&quot;,\n                \&quot;5\&quot;,\n                \&quot;3\&quot;,\n                \&quot;5\&quot;,\n                \&quot;5\&quot;,\n                \&quot;4\&quot;,\n                \&quot;5\&quot;,\n                \&quot;5\&quot;,\n                \&quot;5\&quot;,\n                \&quot;4\&quot;,\n                \&quot;2\&quot;,\n                \&quot;5\&quot;,\n                \&quot;5\&quot;,\n                \&quot;5\&quot;,\n                \&quot;5\&quot;,\n                \&quot;1\&quot;,\n                \&quot;5\&quot;,\n                \&quot;5\&quot;,\n                \&quot;5\&quot;,\n                \&quot;5\&quot;,\n                \&quot;5\&quot;,\n                \&quot;5\&quot;,\n                \&quot;4\&quot;,\n                \&quot;5\&quot;,\n                \&quot;5\&quot;,\n                \&quot;1\&quot;,\n                \&quot;2\&quot;,\n                \&quot;5\&quot;,\n                \&quot;5\&quot;,\n                \&quot;5\&quot;,\n                \&quot;4\&quot;,\n                \&quot;4\&quot;,\n                \&quot;5\&quot;,\n                \&quot;3\&quot;,\n                \&quot;5\&quot;,\n                \&quot;5\&quot;,\n                \&quot;4\&quot;,\n                \&quot;4\&quot;,\n                \&quot;2\&quot;,\n                \&quot;5\&quot;,\n                \&quot;5\&quot;,\n                \&quot;5\&quot;,\n                \&quot;1\&quot;,\n                \&quot;5\&quot;,\n                \&quot;5\&quot;,\n                \&quot;5\&quot;,\n                \&quot;5\&quot;,\n                \&quot;5\&quot;,\n                \&quot;5\&quot;,\n                \&quot;5\&quot;,\n                \&quot;5\&quot;,\n                \&quot;5\&quot;,\n                \&quot;4\&quot;,\n                \&quot;5\&quot;,\n                \&quot;4\&quot;,\n                \&quot;1\&quot;,\n                \&quot;1\&quot;,\n                \&quot;5\&quot;,\n                \&quot;5\&quot;,\n                \&quot;5\&quot;,\n                \&quot;5\&quot;,\n                \&quot;5\&quot;,\n                \&quot;5\&quot;,\n                \&quot;5\&quot;,\n                \&quot;3\&quot;,\n                \&quot;5\&quot;,\n                \&quot;1\&quot;,\n                \&quot;1\&quot;,\n                \&quot;5\&quot;,\n                \&quot;2\&quot;,\n                \&quot;5\&quot;,\n                \&quot;4\&quot;,\n                \&quot;3\&quot;,\n                \&quot;5\&quot;,\n                \&quot;5\&quot;,\n                \&quot;5\&quot;,\n                \&quot;5\&quot;,\n                \&quot;1\&quot;,\n                \&quot;5\&quot;,\n                \&quot;5\&quot;,\n                \&quot;5\&quot;,\n                \&quot;5\&quot;,\n                \&quot;5\&quot;,\n                \&quot;5\&quot;,\n                \&quot;5\&quot;,\n                \&quot;4\&quot;,\n                \&quot;1\&quot;,\n                \&quot;5\&quot;,\n                \&quot;5\&quot;,\n                \&quot;1\&quot;,\n                \&quot;5\&quot;,\n                \&quot;4\&quot;,\n                \&quot;5\&quot;,\n                \&quot;5\&quot;,\n                \&quot;5\&quot;,\n                \&quot;5\&quot;,\n                \&quot;4\&quot;,\n                \&quot;5\&quot;,\n                \&quot;5\&quot;,\n                \&quot;5\&quot;,\n                \&quot;5\&quot;,\n                \&quot;5\&quot;,\n                \&quot;1\&quot;,\n                \&quot;3\&quot;,\n                \&quot;2\&quot;,\n                \&quot;5\&quot;,\n                \&quot;5\&quot;,\n                \&quot;4\&quot;,\n                \&quot;3\&quot;,\n                \&quot;4\&quot;,\n                \&quot;4\&quot;,\n                \&quot;5\&quot;,\n                \&quot;2\&quot;,\n                \&quot;1\&quot;,\n                \&quot;5\&quot;,\n                \&quot;5\&quot;,\n                \&quot;5\&quot;,\n                \&quot;5\&quot;,\n                \&quot;5\&quot;,\n                \&quot;5\&quot;,\n                \&quot;5\&quot;,\n                \&quot;5\&quot;,\n                \&quot;5\&quot;,\n                \&quot;1\&quot;,\n                \&quot;5\&quot;,\n                \&quot;3\&quot;,\n                \&quot;5\&quot;,\n                \&quot;5\&quot;,\n                \&quot;4\&quot;,\n                \&quot;3\&quot;,\n                \&quot;3\&quot;,\n                \&quot;5\&quot;,\n                \&quot;5\&quot;,\n                \&quot;5\&quot;,\n                \&quot;3\&quot;,\n                \&quot;1\&quot;,\n                \&quot;4\&quot;,\n                \&quot;5\&quot;,\n                \&quot;4\&quot;,\n                \&quot;5\&quot;,\n                \&quot;4\&quot;,\n                \&quot;5\&quot;,\n                \&quot;5\&quot;,\n                \&quot;5\&quot;,\n                \&quot;5\&quot;,\n                \&quot;5\&quot;,\n                \&quot;5\&quot;,\n                \&quot;1\&quot;,\n                \&quot;2\&quot;,\n                \&quot;5\&quot;,\n                \&quot;5\&quot;,\n                \&quot;5\&quot;,\n                \&quot;5\&quot;,\n                \&quot;5\&quot;,\n                \&quot;5\&quot;,\n                \&quot;5\&quot;,\n                \&quot;5\&quot;,\n                \&quot;5\&quot;,\n                \&quot;5\&quot;,\n                \&quot;5\&quot;,\n                \&quot;5\&quot;,\n                \&quot;5\&quot;,\n                \&quot;4\&quot;,\n                \&quot;5\&quot;,\n                \&quot;5\&quot;,\n                \&quot;5\&quot;,\n                \&quot;1\&quot;,\n                \&quot;5\&quot;,\n                \&quot;5\&quot;,\n                \&quot;5\&quot;,\n                \&quot;5\&quot;,\n                \&quot;5\&quot;,\n                \&quot;5\&quot;,\n                \&quot;5\&quot;,\n                \&quot;5\&quot;,\n                \&quot;1\&quot;,\n                \&quot;1\&quot;,\n                \&quot;5\&quot;,\n                \&quot;5\&quot;,\n                \&quot;1\&quot;,\n                \&quot;5\&quot;,\n                \&quot;5\&quot;,\n                \&quot;5\&quot;,\n                \&quot;5\&quot;,\n                \&quot;5\&quot;,\n                \&quot;5\&quot;,\n                \&quot;5\&quot;,\n                \&quot;3\&quot;,\n                \&quot;1\&quot;,\n                \&quot;5\&quot;,\n                \&quot;5\&quot;,\n                \&quot;5\&quot;,\n                \&quot;5\&quot;,\n                \&quot;5\&quot;,\n                \&quot;5\&quot;,\n                \&quot;5\&quot;,\n                \&quot;2\&quot;,\n                \&quot;5\&quot;,\n                \&quot;4\&quot;,\n                \&quot;1\&quot;,\n                \&quot;5\&quot;,\n                \&quot;5\&quot;,\n                \&quot;2\&quot;,\n                \&quot;5\&quot;,\n                \&quot;5\&quot;,\n                \&quot;5\&quot;,\n                \&quot;5\&quot;,\n                \&quot;1\&quot;,\n                \&quot;5\&quot;,\n                \&quot;5\&quot;,\n                \&quot;5\&quot;,\n                \&quot;5\&quot;,\n                \&quot;4\&quot;,\n                \&quot;5\&quot;,\n                \&quot;5\&quot;,\n                \&quot;5\&quot;,\n                \&quot;5\&quot;,\n                \&quot;3\&quot;,\n                \&quot;5\&quot;,\n                \&quot;5\&quot;,\n                \&quot;5\&quot;,\n                \&quot;2\&quot;,\n                \&quot;4\&quot;,\n                \&quot;1\&quot;,\n                \&quot;5\&quot;,\n                \&quot;5\&quot;,\n                \&quot;5\&quot;,\n                \&quot;3\&quot;,\n                \&quot;5\&quot;,\n                \&quot;1\&quot;,\n                \&quot;5\&quot;,\n                \&quot;5\&quot;,\n                \&quot;5\&quot;,\n                \&quot;1\&quot;,\n                \&quot;5\&quot;,\n                \&quot;3\&quot;,\n                \&quot;5\&quot;,\n                \&quot;1\&quot;,\n                \&quot;5\&quot;,\n                \&quot;2\&quot;,\n                \&quot;5\&quot;,\n                \&quot;5\&quot;,\n                \&quot;1\&quot;,\n                \&quot;5\&quot;,\n                \&quot;5\&quot;,\n                \&quot;5\&quot;,\n                \&quot;5\&quot;,\n                \&quot;5\&quot;,\n                \&quot;5\&quot;,\n                \&quot;1\&quot;,\n                \&quot;5\&quot;,\n                \&quot;5\&quot;,\n                \&quot;5\&quot;,\n                \&quot;5\&quot;,\n                \&quot;5\&quot;,\n                \&quot;5\&quot;,\n                \&quot;5\&quot;,\n                \&quot;5\&quot;,\n                \&quot;5\&quot;,\n                \&quot;5\&quot;,\n                \&quot;5\&quot;,\n                \&quot;5\&quot;,\n                \&quot;5\&quot;,\n                \&quot;5\&quot;,\n                \&quot;4\&quot;,\n                \&quot;3\&quot;,\n                \&quot;5\&quot;,\n                \&quot;3\&quot;,\n                \&quot;1\&quot;,\n                \&quot;5\&quot;,\n                \&quot;1\&quot;,\n                \&quot;5\&quot;,\n                \&quot;5\&quot;,\n                \&quot;5\&quot;,\n                \&quot;5\&quot;,\n                \&quot;5\&quot;,\n                \&quot;5\&quot;,\n                \&quot;5\&quot;,\n                \&quot;2\&quot;,\n                \&quot;4\&quot;,\n                \&quot;5\&quot;,\n                \&quot;5\&quot;,\n                \&quot;5\&quot;,\n                \&quot;5\&quot;,\n                \&quot;5\&quot;,\n                \&quot;5\&quot;,\n                \&quot;5\&quot;,\n                \&quot;5\&quot;,\n                \&quot;5\&quot;,\n                \&quot;5\&quot;,\n                \&quot;5\&quot;,\n                \&quot;5\&quot;,\n                \&quot;5\&quot;,\n                \&quot;5\&quot;,\n                \&quot;5\&quot;,\n                \&quot;5\&quot;,\n                \&quot;5\&quot;,\n                \&quot;2\&quot;,\n                \&quot;5\&quot;,\n                \&quot;3\&quot;,\n                \&quot;4\&quot;,\n                \&quot;4\&quot;,\n                \&quot;4\&quot;,\n                \&quot;4\&quot;,\n                \&quot;5\&quot;,\n                \&quot;5\&quot;,\n                \&quot;4\&quot;,\n                \&quot;4\&quot;,\n                \&quot;5\&quot;,\n                \&quot;5\&quot;,\n                \&quot;5\&quot;,\n                \&quot;5\&quot;,\n                \&quot;5\&quot;,\n                \&quot;5\&quot;,\n                \&quot;5\&quot;,\n                \&quot;5\&quot;,\n                \&quot;4\&quot;,\n                \&quot;1\&quot;,\n                \&quot;5\&quot;,\n                \&quot;5\&quot;,\n                \&quot;5\&quot;,\n                \&quot;5\&quot;,\n                \&quot;5\&quot;,\n                \&quot;5\&quot;,\n                \&quot;5\&quot;,\n                \&quot;5\&quot;,\n                \&quot;5\&quot;,\n                \&quot;5\&quot;,\n                \&quot;5\&quot;,\n                \&quot;1\&quot;,\n                \&quot;5\&quot;,\n                \&quot;5\&quot;,\n                \&quot;5\&quot;,\n                \&quot;5\&quot;,\n                \&quot;5\&quot;,\n                \&quot;5\&quot;,\n                \&quot;5\&quot;,\n                \&quot;5\&quot;,\n                \&quot;5\&quot;,\n                \&quot;5\&quot;,\n                \&quot;5\&quot;,\n                \&quot;5\&quot;,\n                \&quot;5\&quot;,\n                \&quot;5\&quot;,\n                \&quot;5\&quot;,\n                \&quot;5\&quot;,\n                \&quot;5\&quot;,\n                \&quot;5\&quot;,\n                \&quot;5\&quot;,\n                \&quot;5\&quot;,\n                \&quot;5\&quot;,\n                \&quot;5\&quot;,\n                \&quot;1\&quot;,\n                \&quot;1\&quot;,\n                \&quot;5\&quot;,\n                \&quot;5\&quot;,\n                \&quot;5\&quot;,\n                \&quot;5\&quot;,\n                \&quot;5\&quot;,\n                \&quot;5\&quot;,\n                \&quot;5\&quot;,\n                \&quot;5\&quot;,\n                \&quot;5\&quot;,\n                \&quot;1\&quot;,\n                \&quot;5\&quot;,\n                \&quot;5\&quot;,\n                \&quot;5\&quot;,\n                \&quot;5\&quot;,\n                \&quot;5\&quot;,\n                \&quot;5\&quot;,\n                \&quot;5\&quot;,\n                \&quot;5\&quot;,\n                \&quot;5\&quot;,\n                \&quot;5\&quot;,\n                \&quot;5\&quot;,\n                \&quot;5\&quot;,\n                \&quot;4\&quot;,\n                \&quot;4\&quot;,\n                \&quot;5\&quot;,\n                \&quot;4\&quot;,\n                \&quot;4\&quot;,\n                \&quot;5\&quot;,\n                \&quot;3\&quot;,\n                \&quot;5\&quot;,\n                \&quot;4\&quot;,\n                \&quot;3\&quot;,\n                \&quot;3\&quot;,\n                \&quot;5\&quot;,\n                \&quot;5\&quot;,\n                \&quot;5\&quot;,\n                \&quot;5\&quot;,\n                \&quot;5\&quot;,\n                \&quot;1\&quot;,\n                \&quot;5\&quot;,\n                \&quot;1\&quot;,\n                \&quot;3\&quot;,\n                \&quot;5\&quot;,\n                \&quot;2\&quot;,\n                \&quot;1\&quot;,\n                \&quot;5\&quot;,\n                \&quot;5\&quot;,\n                \&quot;5\&quot;,\n                \&quot;5\&quot;,\n                \&quot;5\&quot;,\n                \&quot;5\&quot;,\n                \&quot;1\&quot;,\n                \&quot;5\&quot;,\n                \&quot;5\&quot;,\n                \&quot;5\&quot;,\n                \&quot;5\&quot;,\n                \&quot;5\&quot;,\n                \&quot;5\&quot;,\n                \&quot;5\&quot;,\n                \&quot;5\&quot;,\n                \&quot;5\&quot;,\n                \&quot;5\&quot;,\n                \&quot;5\&quot;,\n                \&quot;5\&quot;,\n                \&quot;5\&quot;,\n                \&quot;5\&quot;,\n                \&quot;1\&quot;,\n                \&quot;5\&quot;,\n                \&quot;2\&quot;,\n                \&quot;1\&quot;,\n                \&quot;5\&quot;,\n                \&quot;3\&quot;,\n                \&quot;5\&quot;,\n                \&quot;5\&quot;,\n                \&quot;5\&quot;,\n                \&quot;5\&quot;,\n                \&quot;5\&quot;,\n                \&quot;3\&quot;,\n                \&quot;5\&quot;,\n                \&quot;5\&quot;,\n                \&quot;2\&quot;,\n                \&quot;5\&quot;,\n                \&quot;4\&quot;,\n                \&quot;1\&quot;,\n                \&quot;1\&quot;,\n                \&quot;5\&quot;,\n                \&quot;5\&quot;,\n                \&quot;5\&quot;,\n                \&quot;4\&quot;,\n                \&quot;1\&quot;,\n                \&quot;5\&quot;,\n                \&quot;5\&quot;,\n                \&quot;5\&quot;,\n                \&quot;5\&quot;,\n                \&quot;5\&quot;,\n                \&quot;4\&quot;,\n                \&quot;3\&quot;,\n                \&quot;2\&quot;,\n                \&quot;4\&quot;,\n                \&quot;3\&quot;,\n                \&quot;4\&quot;,\n                \&quot;1\&quot;,\n                \&quot;5\&quot;,\n                \&quot;2\&quot;,\n                \&quot;5\&quot;,\n                \&quot;5\&quot;,\n                \&quot;5\&quot;,\n                \&quot;5\&quot;,\n                \&quot;5\&quot;,\n                \&quot;5\&quot;,\n                \&quot;2\&quot;,\n                \&quot;5\&quot;,\n                \&quot;5\&quot;,\n                \&quot;5\&quot;,\n                \&quot;5\&quot;,\n                \&quot;5\&quot;,\n                \&quot;5\&quot;,\n                \&quot;5\&quot;,\n                \&quot;5\&quot;,\n                \&quot;5\&quot;,\n                \&quot;5\&quot;,\n                \&quot;2\&quot;,\n                \&quot;5\&quot;,\n                \&quot;1\&quot;,\n                \&quot;4\&quot;,\n                \&quot;5\&quot;,\n                \&quot;5\&quot;,\n                \&quot;5\&quot;,\n                \&quot;5\&quot;,\n                \&quot;5\&quot;,\n                \&quot;5\&quot;,\n                \&quot;5\&quot;,\n                \&quot;5\&quot;,\n                \&quot;1\&quot;,\n                \&quot;1\&quot;,\n                \&quot;5\&quot;,\n                \&quot;5\&quot;,\n                \&quot;4\&quot;,\n                \&quot;1\&quot;,\n                \&quot;3\&quot;,\n                \&quot;5\&quot;,\n                \&quot;1\&quot;,\n                \&quot;5\&quot;,\n                \&quot;5\&quot;,\n                \&quot;5\&quot;,\n                \&quot;5\&quot;,\n                \&quot;3\&quot;,\n                \&quot;1\&quot;,\n                \&quot;1\&quot;,\n                \&quot;1\&quot;,\n                \&quot;5\&quot;,\n                \&quot;5\&quot;,\n                \&quot;5\&quot;,\n                \&quot;5\&quot;,\n                \&quot;5\&quot;,\n                \&quot;5\&quot;,\n                \&quot;1\&quot;,\n                \&quot;1\&quot;,\n                \&quot;5\&quot;,\n                \&quot;5\&quot;,\n                \&quot;5\&quot;,\n                \&quot;4\&quot;,\n                \&quot;1\&quot;,\n                \&quot;5\&quot;,\n                \&quot;5\&quot;,\n                \&quot;1\&quot;,\n                \&quot;1\&quot;,\n                \&quot;5\&quot;,\n                \&quot;5\&quot;,\n                \&quot;5\&quot;,\n                \&quot;1\&quot;,\n                \&quot;5\&quot;,\n                \&quot;5\&quot;,\n                \&quot;5\&quot;,\n                \&quot;3\&quot;,\n                \&quot;5\&quot;,\n                \&quot;5\&quot;,\n                \&quot;1\&quot;,\n                \&quot;5\&quot;,\n                \&quot;5\&quot;,\n                \&quot;5\&quot;,\n                \&quot;5\&quot;,\n                \&quot;1\&quot;,\n                \&quot;5\&quot;,\n                \&quot;5\&quot;,\n                \&quot;5\&quot;,\n                \&quot;5\&quot;,\n                \&quot;5\&quot;,\n                \&quot;5\&quot;,\n                \&quot;5\&quot;,\n                \&quot;5\&quot;,\n                \&quot;5\&quot;,\n                \&quot;5\&quot;,\n                \&quot;1\&quot;,\n                \&quot;1\&quot;,\n                \&quot;1\&quot;,\n                \&quot;5\&quot;,\n                \&quot;1\&quot;,\n                \&quot;1\&quot;,\n                \&quot;5\&quot;,\n                \&quot;5\&quot;,\n                \&quot;5\&quot;,\n                \&quot;5\&quot;,\n                \&quot;5\&quot;,\n                \&quot;1\&quot;,\n                \&quot;5\&quot;,\n                \&quot;1\&quot;,\n                \&quot;5\&quot;,\n                \&quot;1\&quot;,\n                \&quot;5\&quot;,\n                \&quot;5\&quot;,\n                \&quot;5\&quot;,\n                \&quot;5\&quot;,\n                \&quot;5\&quot;,\n                \&quot;5\&quot;,\n                \&quot;4\&quot;,\n                \&quot;1\&quot;,\n                \&quot;1\&quot;,\n                \&quot;5\&quot;,\n                \&quot;1\&quot;,\n                \&quot;5\&quot;,\n                \&quot;5\&quot;,\n                \&quot;5\&quot;,\n                \&quot;5\&quot;,\n                \&quot;5\&quot;,\n                \&quot;5\&quot;,\n                \&quot;5\&quot;,\n                \&quot;5\&quot;,\n                \&quot;5\&quot;,\n                \&quot;5\&quot;,\n                \&quot;5\&quot;,\n                \&quot;2\&quot;,\n                \&quot;5\&quot;,\n                \&quot;5\&quot;,\n                \&quot;5\&quot;,\n                \&quot;5\&quot;,\n                \&quot;5\&quot;,\n                \&quot;5\&quot;,\n                \&quot;1\&quot;,\n                \&quot;5\&quot;,\n                \&quot;5\&quot;,\n                \&quot;5\&quot;,\n                \&quot;5\&quot;,\n                \&quot;5\&quot;,\n                \&quot;4\&quot;,\n                \&quot;5\&quot;,\n                \&quot;5\&quot;,\n                \&quot;2\&quot;,\n                \&quot;5\&quot;,\n                \&quot;5\&quot;,\n                \&quot;5\&quot;,\n                \&quot;5\&quot;,\n                \&quot;5\&quot;,\n                \&quot;3\&quot;,\n                \&quot;5\&quot;,\n                \&quot;5\&quot;,\n                \&quot;5\&quot;,\n                \&quot;5\&quot;,\n                \&quot;5\&quot;,\n                \&quot;5\&quot;,\n                \&quot;5\&quot;,\n                \&quot;5\&quot;,\n                \&quot;1\&quot;,\n                \&quot;5\&quot;,\n                \&quot;3\&quot;,\n                \&quot;5\&quot;,\n                \&quot;5\&quot;,\n                \&quot;5\&quot;,\n                \&quot;3\&quot;,\n                \&quot;5\&quot;,\n                \&quot;5\&quot;,\n                \&quot;5\&quot;,\n                \&quot;5\&quot;,\n                \&quot;5\&quot;,\n                \&quot;5\&quot;,\n                \&quot;5\&quot;,\n                \&quot;5\&quot;,\n                \&quot;5\&quot;,\n                \&quot;5\&quot;,\n                \&quot;5\&quot;,\n                \&quot;5\&quot;,\n                \&quot;5\&quot;,\n                \&quot;5\&quot;,\n                \&quot;5\&quot;,\n                \&quot;5\&quot;,\n                \&quot;2\&quot;,\n                \&quot;5\&quot;,\n                \&quot;1\&quot;,\n                \&quot;5\&quot;,\n                \&quot;1\&quot;,\n                \&quot;5\&quot;,\n                \&quot;5\&quot;,\n                \&quot;5\&quot;,\n                \&quot;4\&quot;,\n                \&quot;4\&quot;,\n                \&quot;5\&quot;,\n                \&quot;5\&quot;,\n                \&quot;1\&quot;,\n                \&quot;5\&quot;,\n                \&quot;5\&quot;,\n                \&quot;1\&quot;,\n                \&quot;1\&quot;,\n                \&quot;5\&quot;,\n                \&quot;5\&quot;,\n                \&quot;5\&quot;,\n                \&quot;5\&quot;,\n                \&quot;5\&quot;,\n                \&quot;5\&quot;,\n                \&quot;5\&quot;,\n                \&quot;5\&quot;,\n                \&quot;5\&quot;,\n                \&quot;1\&quot;,\n                \&quot;5\&quot;,\n                \&quot;5\&quot;,\n                \&quot;5\&quot;,\n                \&quot;1\&quot;,\n                \&quot;5\&quot;,\n                \&quot;5\&quot;,\n                \&quot;1\&quot;,\n                \&quot;5\&quot;,\n                \&quot;5\&quot;,\n                \&quot;5\&quot;,\n                \&quot;4\&quot;,\n                \&quot;5\&quot;,\n                \&quot;4\&quot;,\n                \&quot;5\&quot;,\n                \&quot;5\&quot;,\n                \&quot;5\&quot;,\n                \&quot;4\&quot;,\n                \&quot;5\&quot;,\n                \&quot;2\&quot;,\n                \&quot;5\&quot;,\n                \&quot;4\&quot;,\n                \&quot;5\&quot;,\n                \&quot;5\&quot;,\n                \&quot;5\&quot;,\n                \&quot;5\&quot;,\n                \&quot;1\&quot;,\n                \&quot;5\&quot;,\n                \&quot;5\&quot;,\n                \&quot;5\&quot;,\n                \&quot;4\&quot;,\n                \&quot;5\&quot;,\n                \&quot;5\&quot;,\n                \&quot;5\&quot;,\n                \&quot;5\&quot;,\n                \&quot;5\&quot;,\n                \&quot;4\&quot;,\n                \&quot;4\&quot;,\n                \&quot;5\&quot;,\n                \&quot;5\&quot;,\n                \&quot;4\&quot;,\n                \&quot;1\&quot;,\n                \&quot;3\&quot;,\n                \&quot;5\&quot;,\n                \&quot;5\&quot;,\n                \&quot;5\&quot;,\n                \&quot;2\&quot;,\n                \&quot;5\&quot;,\n                \&quot;1\&quot;,\n                \&quot;5\&quot;,\n                \&quot;5\&quot;,\n                \&quot;1\&quot;,\n                \&quot;1\&quot;,\n                \&quot;4\&quot;,\n                \&quot;3\&quot;,\n                \&quot;5\&quot;,\n                \&quot;5\&quot;,\n                \&quot;5\&quot;,\n                \&quot;3\&quot;,\n                \&quot;4\&quot;,\n                \&quot;5\&quot;,\n                \&quot;5\&quot;,\n                \&quot;5\&quot;,\n                \&quot;5\&quot;,\n                \&quot;5\&quot;,\n                \&quot;5\&quot;,\n                \&quot;5\&quot;,\n                \&quot;5\&quot;,\n                \&quot;5\&quot;,\n                \&quot;1\&quot;,\n                \&quot;5\&quot;,\n                \&quot;5\&quot;,\n                \&quot;5\&quot;,\n                \&quot;5\&quot;,\n                \&quot;5\&quot;,\n                \&quot;2\&quot;,\n                \&quot;5\&quot;,\n                \&quot;5\&quot;,\n                \&quot;5\&quot;,\n                \&quot;5\&quot;,\n                \&quot;1\&quot;,\n                \&quot;5\&quot;,\n                \&quot;5\&quot;,\n                \&quot;5\&quot;,\n                \&quot;5\&quot;,\n                \&quot;2\&quot;,\n                \&quot;5\&quot;,\n                \&quot;5\&quot;,\n                \&quot;2\&quot;,\n                \&quot;5\&quot;,\n                \&quot;5\&quot;,\n                \&quot;1\&quot;,\n                \&quot;5\&quot;,\n                \&quot;1\&quot;,\n                \&quot;1\&quot;,\n                \&quot;5\&quot;,\n                \&quot;5\&quot;,\n                \&quot;5\&quot;,\n                \&quot;5\&quot;,\n                \&quot;5\&quot;,\n                \&quot;1\&quot;,\n                \&quot;1\&quot;,\n                \&quot;5\&quot;,\n                \&quot;2\&quot;,\n                \&quot;5\&quot;,\n                \&quot;5\&quot;,\n                \&quot;5\&quot;,\n                \&quot;1\&quot;,\n                \&quot;5\&quot;,\n                \&quot;5\&quot;,\n                \&quot;5\&quot;,\n                \&quot;5\&quot;,\n                \&quot;5\&quot;,\n                \&quot;5\&quot;,\n                \&quot;5\&quot;,\n                \&quot;5\&quot;,\n                \&quot;5\&quot;,\n                \&quot;5\&quot;,\n                \&quot;4\&quot;,\n                \&quot;5\&quot;,\n                \&quot;5\&quot;,\n                \&quot;4\&quot;,\n                \&quot;5\&quot;,\n                \&quot;5\&quot;,\n                \&quot;5\&quot;,\n                \&quot;5\&quot;,\n                \&quot;5\&quot;,\n                \&quot;2\&quot;,\n                \&quot;2\&quot;,\n                \&quot;5\&quot;,\n                \&quot;5\&quot;,\n                \&quot;4\&quot;,\n                \&quot;3\&quot;,\n                \&quot;5\&quot;,\n                \&quot;1\&quot;,\n                \&quot;5\&quot;,\n                \&quot;5\&quot;,\n                \&quot;5\&quot;,\n                \&quot;5\&quot;,\n                \&quot;4\&quot;,\n                \&quot;5\&quot;,\n                \&quot;5\&quot;,\n                \&quot;5\&quot;,\n                \&quot;5\&quot;,\n                \&quot;5\&quot;,\n                \&quot;1\&quot;,\n                \&quot;5\&quot;,\n                \&quot;5\&quot;,\n                \&quot;5\&quot;,\n                \&quot;5\&quot;,\n                \&quot;5\&quot;,\n                \&quot;5\&quot;,\n                \&quot;4\&quot;,\n                \&quot;4\&quot;,\n                \&quot;5\&quot;,\n                \&quot;1\&quot;,\n                \&quot;4\&quot;,\n                \&quot;1\&quot;,\n                \&quot;2\&quot;,\n                \&quot;4\&quot;,\n                \&quot;3\&quot;,\n                \&quot;5\&quot;,\n                \&quot;1\&quot;,\n                \&quot;5\&quot;,\n                \&quot;1\&quot;,\n                \&quot;5\&quot;,\n                \&quot;1\&quot;,\n                \&quot;5\&quot;,\n                \&quot;5\&quot;,\n                \&quot;4\&quot;,\n                \&quot;1\&quot;,\n                \&quot;5\&quot;,\n                \&quot;3\&quot;,\n                \&quot;5\&quot;,\n                \&quot;5\&quot;,\n                \&quot;5\&quot;,\n                \&quot;1\&quot;,\n                \&quot;5\&quot;,\n                \&quot;5\&quot;,\n                \&quot;5\&quot;,\n                \&quot;5\&quot;,\n                \&quot;5\&quot;,\n                \&quot;2\&quot;,\n                \&quot;5\&quot;,\n                \&quot;5\&quot;,\n                \&quot;5\&quot;,\n                \&quot;5\&quot;,\n                \&quot;5\&quot;,\n                \&quot;1\&quot;,\n                \&quot;5\&quot;,\n                \&quot;5\&quot;,\n                \&quot;5\&quot;,\n                \&quot;5\&quot;,\n                \&quot;1\&quot;,\n                \&quot;5\&quot;,\n                \&quot;5\&quot;,\n                \&quot;5\&quot;,\n                \&quot;5\&quot;,\n                \&quot;5\&quot;,\n                \&quot;5\&quot;,\n                \&quot;5\&quot;,\n                \&quot;5\&quot;,\n                \&quot;5\&quot;,\n                \&quot;5\&quot;,\n                \&quot;5\&quot;,\n                \&quot;5\&quot;,\n                \&quot;5\&quot;,\n                \&quot;5\&quot;,\n                \&quot;5\&quot;,\n                \&quot;5\&quot;,\n                \&quot;5\&quot;,\n                \&quot;1\&quot;,\n                \&quot;4\&quot;,\n                \&quot;3\&quot;,\n                \&quot;5\&quot;,\n                \&quot;4\&quot;,\n                \&quot;4\&quot;,\n                \&quot;1\&quot;,\n                \&quot;5\&quot;,\n                \&quot;5\&quot;,\n                \&quot;5\&quot;,\n                \&quot;5\&quot;,\n                \&quot;3\&quot;,\n                \&quot;5\&quot;,\n                \&quot;5\&quot;,\n                \&quot;5\&quot;,\n                \&quot;5\&quot;,\n                \&quot;5\&quot;,\n                \&quot;4\&quot;,\n                \&quot;4\&quot;,\n                \&quot;3\&quot;,\n                \&quot;2\&quot;,\n                \&quot;1\&quot;,\n                \&quot;4\&quot;,\n                \&quot;4\&quot;,\n                \&quot;5\&quot;,\n                \&quot;4\&quot;,\n                \&quot;1\&quot;,\n                \&quot;5\&quot;,\n                \&quot;5\&quot;,\n                \&quot;4\&quot;,\n                \&quot;5\&quot;,\n                \&quot;5\&quot;,\n                \&quot;5\&quot;,\n                \&quot;5\&quot;,\n                \&quot;4\&quot;,\n                \&quot;5\&quot;,\n                \&quot;5\&quot;,\n                \&quot;1\&quot;,\n                \&quot;5\&quot;,\n                \&quot;5\&quot;,\n                \&quot;5\&quot;,\n                \&quot;5\&quot;,\n                \&quot;5\&quot;,\n                \&quot;1\&quot;,\n                \&quot;5\&quot;,\n                \&quot;3\&quot;,\n                \&quot;5\&quot;,\n                \&quot;1\&quot;,\n                \&quot;5\&quot;,\n                \&quot;4\&quot;,\n                \&quot;4\&quot;,\n                \&quot;3\&quot;,\n                \&quot;3\&quot;,\n                \&quot;2\&quot;,\n                \&quot;4\&quot;,\n                \&quot;5\&quot;,\n                \&quot;2\&quot;,\n                \&quot;3\&quot;,\n                \&quot;5\&quot;,\n                \&quot;5\&quot;,\n                \&quot;5\&quot;,\n                \&quot;5\&quot;,\n                \&quot;5\&quot;,\n                \&quot;5\&quot;,\n                \&quot;4\&quot;,\n                \&quot;5\&quot;,\n                \&quot;5\&quot;,\n                \&quot;5\&quot;,\n                \&quot;5\&quot;,\n                \&quot;5\&quot;,\n                \&quot;4\&quot;,\n                \&quot;5\&quot;,\n                \&quot;4\&quot;,\n                \&quot;5\&quot;,\n                \&quot;4\&quot;,\n                \&quot;5\&quot;,\n                \&quot;5\&quot;,\n                \&quot;5\&quot;,\n                \&quot;5\&quot;,\n                \&quot;5\&quot;,\n                \&quot;1\&quot;,\n                \&quot;1\&quot;,\n                \&quot;5\&quot;,\n                \&quot;5\&quot;,\n                \&quot;5\&quot;,\n                \&quot;5\&quot;,\n                \&quot;5\&quot;,\n                \&quot;5\&quot;,\n                \&quot;5\&quot;,\n                \&quot;5\&quot;,\n                \&quot;5\&quot;,\n                \&quot;5\&quot;,\n                \&quot;5\&quot;,\n                \&quot;5\&quot;,\n                \&quot;1\&quot;,\n                \&quot;5\&quot;,\n                \&quot;4\&quot;,\n                \&quot;1\&quot;,\n                \&quot;5\&quot;,\n                \&quot;5\&quot;,\n                \&quot;5\&quot;,\n                \&quot;5\&quot;,\n                \&quot;5\&quot;,\n                \&quot;1\&quot;,\n                \&quot;1\&quot;,\n                \&quot;5\&quot;,\n                \&quot;5\&quot;,\n                \&quot;5\&quot;,\n                \&quot;5\&quot;,\n                \&quot;5\&quot;,\n                \&quot;5\&quot;,\n                \&quot;5\&quot;,\n                \&quot;5\&quot;,\n                \&quot;5\&quot;,\n                \&quot;1\&quot;,\n                \&quot;5\&quot;,\n                \&quot;5\&quot;,\n                \&quot;5\&quot;,\n                \&quot;5\&quot;,\n                \&quot;5\&quot;,\n                \&quot;5\&quot;,\n                \&quot;5\&quot;,\n                \&quot;5\&quot;,\n                \&quot;5\&quot;,\n                \&quot;5\&quot;,\n                \&quot;1\&quot;,\n                \&quot;2\&quot;,\n                \&quot;5\&quot;,\n                \&quot;5\&quot;,\n                \&quot;5\&quot;,\n                \&quot;3\&quot;,\n                \&quot;5\&quot;,\n                \&quot;5\&quot;,\n                \&quot;5\&quot;,\n                \&quot;1\&quot;,\n                \&quot;1\&quot;,\n                \&quot;5\&quot;,\n                \&quot;5\&quot;,\n                \&quot;5\&quot;,\n                \&quot;1\&quot;,\n                \&quot;4\&quot;,\n                \&quot;5\&quot;,\n                \&quot;2\&quot;,\n                \&quot;1\&quot;,\n                \&quot;2\&quot;,\n                \&quot;5\&quot;,\n                \&quot;5\&quot;,\n                \&quot;5\&quot;,\n                \&quot;4\&quot;,\n                \&quot;1\&quot;,\n                \&quot;4\&quot;,\n                \&quot;3\&quot;,\n                \&quot;1\&quot;,\n                \&quot;4\&quot;,\n                \&quot;1\&quot;,\n                \&quot;1\&quot;,\n                \&quot;1\&quot;,\n                \&quot;5\&quot;,\n                \&quot;5\&quot;,\n                \&quot;5\&quot;,\n                \&quot;5\&quot;,\n                \&quot;5\&quot;,\n                \&quot;5\&quot;,\n                \&quot;5\&quot;,\n                \&quot;5\&quot;,\n                \&quot;5\&quot;,\n                \&quot;1\&quot;,\n                \&quot;1\&quot;,\n                \&quot;5\&quot;,\n                \&quot;5\&quot;,\n                \&quot;3\&quot;,\n                \&quot;1\&quot;,\n                \&quot;2\&quot;,\n                \&quot;5\&quot;,\n                \&quot;1\&quot;,\n                \&quot;3\&quot;,\n                \&quot;5\&quot;,\n                \&quot;5\&quot;,\n                \&quot;3\&quot;,\n                \&quot;5\&quot;,\n                \&quot;4\&quot;,\n                \&quot;5\&quot;,\n                \&quot;4\&quot;,\n                \&quot;3\&quot;,\n                \&quot;5\&quot;,\n                \&quot;3\&quot;,\n                \&quot;4\&quot;,\n                \&quot;4\&quot;,\n                \&quot;5\&quot;,\n                \&quot;4\&quot;,\n                \&quot;3\&quot;,\n                \&quot;1\&quot;,\n                \&quot;2\&quot;,\n                \&quot;3\&quot;,\n                \&quot;5\&quot;,\n                \&quot;4\&quot;,\n                \&quot;1\&quot;,\n                \&quot;2\&quot;,\n                \&quot;4\&quot;,\n                \&quot;5\&quot;,\n                \&quot;1\&quot;,\n                \&quot;5\&quot;,\n                \&quot;3\&quot;,\n                \&quot;4\&quot;,\n                \&quot;4\&quot;,\n                \&quot;1\&quot;,\n                \&quot;2\&quot;,\n                \&quot;4\&quot;,\n                \&quot;5\&quot;,\n                \&quot;5\&quot;,\n                \&quot;5\&quot;,\n                \&quot;5\&quot;,\n                \&quot;1\&quot;,\n                \&quot;1\&quot;,\n                \&quot;3\&quot;,\n                \&quot;5\&quot;,\n                \&quot;5\&quot;,\n                \&quot;3\&quot;,\n                \&quot;5\&quot;,\n                \&quot;3\&quot;,\n                \&quot;5\&quot;,\n                \&quot;4\&quot;,\n                \&quot;5\&quot;,\n                \&quot;3\&quot;,\n                \&quot;5\&quot;,\n                \&quot;5\&quot;,\n                \&quot;5\&quot;,\n                \&quot;5\&quot;,\n                \&quot;3\&quot;,\n                \&quot;5\&quot;,\n                \&quot;4\&quot;,\n                \&quot;5\&quot;,\n                \&quot;5\&quot;,\n                \&quot;5\&quot;,\n                \&quot;1\&quot;,\n                \&quot;5\&quot;,\n                \&quot;5\&quot;,\n                \&quot;5\&quot;,\n                \&quot;5\&quot;,\n                \&quot;5\&quot;,\n                \&quot;1\&quot;,\n                \&quot;3\&quot;,\n                \&quot;5\&quot;,\n                \&quot;4\&quot;,\n                \&quot;4\&quot;,\n                \&quot;3\&quot;,\n                \&quot;4\&quot;,\n                \&quot;4\&quot;,\n                \&quot;5\&quot;,\n                \&quot;5\&quot;,\n                \&quot;5\&quot;,\n                \&quot;5\&quot;,\n                \&quot;1\&quot;,\n                \&quot;5\&quot;,\n                \&quot;5\&quot;,\n                \&quot;3\&quot;,\n                \&quot;5\&quot;,\n                \&quot;5\&quot;,\n                \&quot;4\&quot;,\n                \&quot;4\&quot;,\n                \&quot;5\&quot;,\n                \&quot;4\&quot;,\n                \&quot;5\&quot;,\n                \&quot;3\&quot;,\n                \&quot;5\&quot;,\n                \&quot;5\&quot;,\n                \&quot;5\&quot;,\n                \&quot;5\&quot;,\n                \&quot;5\&quot;,\n                \&quot;5\&quot;,\n                \&quot;5\&quot;,\n                \&quot;4\&quot;,\n                \&quot;5\&quot;,\n                \&quot;5\&quot;,\n                \&quot;5\&quot;,\n                \&quot;3\&quot;,\n                \&quot;1\&quot;,\n                \&quot;1\&quot;,\n                \&quot;1\&quot;,\n                \&quot;5\&quot;,\n                \&quot;4\&quot;,\n                \&quot;5\&quot;,\n                \&quot;5\&quot;,\n                \&quot;1\&quot;,\n                \&quot;1\&quot;,\n                \&quot;1\&quot;,\n                \&quot;4\&quot;,\n                \&quot;5\&quot;,\n                \&quot;5\&quot;,\n                \&quot;3\&quot;,\n                \&quot;5\&quot;,\n                \&quot;5\&quot;,\n                \&quot;4\&quot;,\n                \&quot;5\&quot;,\n                \&quot;1\&quot;,\n                \&quot;5\&quot;,\n                \&quot;5\&quot;,\n                \&quot;5\&quot;,\n                \&quot;5\&quot;,\n                \&quot;5\&quot;,\n                \&quot;5\&quot;,\n                \&quot;5\&quot;,\n                \&quot;5\&quot;,\n                \&quot;5\&quot;,\n                \&quot;5\&quot;,\n                \&quot;5\&quot;,\n                \&quot;1\&quot;,\n                \&quot;5\&quot;,\n                \&quot;4\&quot;,\n                \&quot;5\&quot;,\n                \&quot;5\&quot;,\n                \&quot;5\&quot;,\n                \&quot;5\&quot;,\n                \&quot;5\&quot;,\n                \&quot;1\&quot;,\n                \&quot;5\&quot;,\n                \&quot;5\&quot;,\n                \&quot;5\&quot;,\n                \&quot;5\&quot;,\n                \&quot;5\&quot;,\n                \&quot;5\&quot;,\n                \&quot;5\&quot;,\n                \&quot;5\&quot;,\n                \&quot;5\&quot;,\n                \&quot;5\&quot;,\n                \&quot;5\&quot;,\n                \&quot;5\&quot;,\n                \&quot;5\&quot;,\n                \&quot;5\&quot;,\n                \&quot;4\&quot;,\n                \&quot;4\&quot;,\n                \&quot;1\&quot;,\n                \&quot;4\&quot;,\n                \&quot;5\&quot;,\n                \&quot;5\&quot;,\n                \&quot;5\&quot;,\n                \&quot;5\&quot;,\n                \&quot;5\&quot;,\n                \&quot;5\&quot;,\n                \&quot;5\&quot;,\n                \&quot;5\&quot;,\n                \&quot;5\&quot;,\n                \&quot;5\&quot;,\n                \&quot;3\&quot;,\n                \&quot;4\&quot;,\n                \&quot;5\&quot;,\n                \&quot;5\&quot;,\n                \&quot;5\&quot;,\n                \&quot;3\&quot;,\n                \&quot;5\&quot;,\n                \&quot;5\&quot;,\n                \&quot;5\&quot;,\n                \&quot;5\&quot;,\n                \&quot;1\&quot;,\n                \&quot;5\&quot;,\n                \&quot;5\&quot;,\n                \&quot;1\&quot;,\n                \&quot;5\&quot;,\n                \&quot;5\&quot;,\n                \&quot;5\&quot;,\n                \&quot;5\&quot;,\n                \&quot;5\&quot;,\n                \&quot;5\&quot;,\n                \&quot;5\&quot;,\n                \&quot;5\&quot;,\n                \&quot;5\&quot;,\n                \&quot;5\&quot;,\n                \&quot;1\&quot;,\n                \&quot;5\&quot;,\n                \&quot;5\&quot;,\n                \&quot;5\&quot;,\n                \&quot;1\&quot;,\n                \&quot;5\&quot;,\n                \&quot;3\&quot;,\n                \&quot;5\&quot;,\n                \&quot;3\&quot;,\n                \&quot;1\&quot;,\n                \&quot;5\&quot;,\n                \&quot;5\&quot;,\n                \&quot;5\&quot;,\n                \&quot;3\&quot;,\n                \&quot;5\&quot;,\n                \&quot;5\&quot;,\n                \&quot;5\&quot;,\n                \&quot;1\&quot;,\n                \&quot;5\&quot;,\n                \&quot;5\&quot;,\n                \&quot;3\&quot;,\n                \&quot;2\&quot;,\n                \&quot;5\&quot;,\n                \&quot;5\&quot;,\n                \&quot;5\&quot;,\n                \&quot;5\&quot;,\n                \&quot;5\&quot;,\n                \&quot;1\&quot;,\n                \&quot;1\&quot;,\n                \&quot;2\&quot;,\n                \&quot;5\&quot;,\n                \&quot;5\&quot;,\n                \&quot;5\&quot;,\n                \&quot;5\&quot;,\n                \&quot;5\&quot;,\n                \&quot;5\&quot;,\n                \&quot;1\&quot;,\n                \&quot;5\&quot;,\n                \&quot;5\&quot;,\n                \&quot;5\&quot;,\n                \&quot;5\&quot;,\n                \&quot;5\&quot;,\n                \&quot;5\&quot;,\n                \&quot;5\&quot;,\n                \&quot;5\&quot;,\n                \&quot;1\&quot;,\n                \&quot;5\&quot;,\n                \&quot;5\&quot;,\n                \&quot;5\&quot;,\n                \&quot;5\&quot;,\n                \&quot;5\&quot;,\n                \&quot;5\&quot;,\n                \&quot;5\&quot;,\n                \&quot;1\&quot;,\n                \&quot;2\&quot;,\n                \&quot;1\&quot;,\n                \&quot;5\&quot;,\n                \&quot;4\&quot;,\n                \&quot;5\&quot;,\n                \&quot;4\&quot;,\n                \&quot;3\&quot;,\n                \&quot;3\&quot;,\n                \&quot;5\&quot;,\n                \&quot;5\&quot;,\n                \&quot;2\&quot;,\n                \&quot;5\&quot;,\n                \&quot;5\&quot;,\n                \&quot;5\&quot;,\n                \&quot;5\&quot;,\n                \&quot;3\&quot;,\n                \&quot;5\&quot;,\n                \&quot;5\&quot;,\n                \&quot;5\&quot;,\n                \&quot;5\&quot;,\n                \&quot;5\&quot;,\n                \&quot;1\&quot;,\n                \&quot;2\&quot;,\n                \&quot;1\&quot;,\n                \&quot;5\&quot;,\n                \&quot;5\&quot;,\n                \&quot;5\&quot;,\n                \&quot;3\&quot;,\n                \&quot;5\&quot;,\n                \&quot;2\&quot;,\n                \&quot;5\&quot;,\n                \&quot;5\&quot;,\n                \&quot;4\&quot;,\n                \&quot;5\&quot;,\n                \&quot;5\&quot;,\n                \&quot;5\&quot;,\n                \&quot;5\&quot;,\n                \&quot;5\&quot;,\n                \&quot;5\&quot;,\n                \&quot;5\&quot;,\n                \&quot;5\&quot;,\n                \&quot;1\&quot;,\n                \&quot;5\&quot;,\n                \&quot;5\&quot;,\n                \&quot;5\&quot;,\n                \&quot;1\&quot;,\n                \&quot;5\&quot;,\n                \&quot;5\&quot;,\n                \&quot;5\&quot;,\n                \&quot;1\&quot;,\n                \&quot;5\&quot;,\n                \&quot;5\&quot;,\n                \&quot;1\&quot;,\n                \&quot;5\&quot;,\n                \&quot;5\&quot;,\n                \&quot;1\&quot;,\n                \&quot;1\&quot;,\n                \&quot;5\&quot;,\n                \&quot;5\&quot;,\n                \&quot;5\&quot;,\n                \&quot;1\&quot;,\n                \&quot;5\&quot;,\n                \&quot;5\&quot;,\n                \&quot;5\&quot;,\n                \&quot;5\&quot;,\n                \&quot;5\&quot;,\n                \&quot;5\&quot;,\n                \&quot;5\&quot;,\n                \&quot;1\&quot;,\n                \&quot;1\&quot;,\n                \&quot;1\&quot;,\n                \&quot;5\&quot;,\n                \&quot;5\&quot;,\n                \&quot;5\&quot;,\n                \&quot;5\&quot;,\n                \&quot;5\&quot;,\n                \&quot;5\&quot;,\n                \&quot;5\&quot;,\n                \&quot;5\&quot;,\n                \&quot;5\&quot;,\n                \&quot;3\&quot;,\n                \&quot;2\&quot;,\n                \&quot;5\&quot;,\n                \&quot;5\&quot;,\n                \&quot;5\&quot;,\n                \&quot;4\&quot;,\n                \&quot;5\&quot;,\n                \&quot;5\&quot;,\n                \&quot;5\&quot;,\n                \&quot;5\&quot;,\n                \&quot;5\&quot;,\n                \&quot;5\&quot;,\n                \&quot;5\&quot;,\n                \&quot;5\&quot;,\n                \&quot;5\&quot;,\n                \&quot;2\&quot;,\n                \&quot;4\&quot;,\n                \&quot;5\&quot;,\n                \&quot;5\&quot;,\n                \&quot;5\&quot;,\n                \&quot;5\&quot;,\n                \&quot;5\&quot;,\n                \&quot;5\&quot;,\n                \&quot;5\&quot;,\n                \&quot;5\&quot;,\n                \&quot;2\&quot;,\n                \&quot;5\&quot;,\n                \&quot;5\&quot;,\n                \&quot;3\&quot;,\n                \&quot;3\&quot;,\n                \&quot;4\&quot;,\n                \&quot;4\&quot;,\n                \&quot;5\&quot;,\n                \&quot;1\&quot;,\n                \&quot;5\&quot;,\n                \&quot;5\&quot;,\n                \&quot;5\&quot;,\n                \&quot;5\&quot;,\n                \&quot;5\&quot;,\n                \&quot;5\&quot;,\n                \&quot;5\&quot;,\n                \&quot;1\&quot;,\n                \&quot;5\&quot;,\n                \&quot;5\&quot;,\n                \&quot;2\&quot;,\n                \&quot;1\&quot;,\n                \&quot;5\&quot;,\n                \&quot;5\&quot;,\n                \&quot;5\&quot;,\n                \&quot;1\&quot;,\n                \&quot;5\&quot;,\n                \&quot;1\&quot;,\n                \&quot;5\&quot;,\n                \&quot;5\&quot;,\n                \&quot;5\&quot;,\n                \&quot;5\&quot;,\n                \&quot;5\&quot;,\n                \&quot;5\&quot;,\n                \&quot;3\&quot;,\n                \&quot;5\&quot;,\n                \&quot;5\&quot;,\n                \&quot;5\&quot;,\n                \&quot;5\&quot;,\n                \&quot;1\&quot;,\n                \&quot;5\&quot;,\n                \&quot;5\&quot;,\n                \&quot;5\&quot;,\n                \&quot;5\&quot;,\n                \&quot;5\&quot;,\n                \&quot;5\&quot;,\n                \&quot;5\&quot;,\n                \&quot;5\&quot;,\n                \&quot;5\&quot;,\n                \&quot;5\&quot;,\n                \&quot;5\&quot;,\n                \&quot;5\&quot;,\n                \&quot;5\&quot;,\n                \&quot;5\&quot;,\n                \&quot;5\&quot;,\n                \&quot;5\&quot;,\n                \&quot;1\&quot;,\n                \&quot;1\&quot;,\n                \&quot;5\&quot;,\n                \&quot;5\&quot;,\n                \&quot;5\&quot;,\n                \&quot;5\&quot;,\n                \&quot;5\&quot;,\n                \&quot;5\&quot;,\n                \&quot;5\&quot;,\n                \&quot;1\&quot;,\n                \&quot;5\&quot;,\n                \&quot;5\&quot;,\n                \&quot;4\&quot;,\n                \&quot;5\&quot;,\n                \&quot;5\&quot;,\n                \&quot;4\&quot;,\n                \&quot;5\&quot;,\n                \&quot;5\&quot;,\n                \&quot;3\&quot;,\n                \&quot;3\&quot;,\n                \&quot;2\&quot;,\n                \&quot;3\&quot;,\n                \&quot;2\&quot;,\n                \&quot;5\&quot;,\n                \&quot;2\&quot;,\n                \&quot;5\&quot;,\n                \&quot;5\&quot;,\n                \&quot;5\&quot;,\n                \&quot;4\&quot;,\n                \&quot;5\&quot;,\n                \&quot;5\&quot;,\n                \&quot;2\&quot;,\n                \&quot;5\&quot;,\n                \&quot;1\&quot;,\n                \&quot;3\&quot;,\n                \&quot;5\&quot;,\n                \&quot;5\&quot;,\n                \&quot;5\&quot;,\n                \&quot;5\&quot;,\n                \&quot;5\&quot;,\n                \&quot;3\&quot;,\n                \&quot;5\&quot;,\n                \&quot;5\&quot;,\n                \&quot;5\&quot;,\n                \&quot;5\&quot;,\n                \&quot;5\&quot;,\n                \&quot;5\&quot;,\n                \&quot;2\&quot;,\n                \&quot;2\&quot;,\n                \&quot;5\&quot;,\n                \&quot;5\&quot;,\n                \&quot;2\&quot;,\n                \&quot;3\&quot;,\n                \&quot;5\&quot;,\n                \&quot;5\&quot;,\n                \&quot;1\&quot;,\n                \&quot;1\&quot;,\n                \&quot;5\&quot;,\n                \&quot;4\&quot;,\n                \&quot;5\&quot;,\n                \&quot;5\&quot;,\n                \&quot;5\&quot;,\n                \&quot;5\&quot;,\n                \&quot;4\&quot;,\n                \&quot;4\&quot;,\n                \&quot;5\&quot;,\n                \&quot;5\&quot;,\n                \&quot;5\&quot;,\n                \&quot;5\&quot;,\n                \&quot;1\&quot;,\n                \&quot;4\&quot;,\n                \&quot;4\&quot;,\n                \&quot;3\&quot;,\n                \&quot;5\&quot;,\n                \&quot;1\&quot;,\n                \&quot;5\&quot;,\n                \&quot;5\&quot;,\n                \&quot;3\&quot;,\n                \&quot;1\&quot;,\n                \&quot;3\&quot;,\n                \&quot;5\&quot;,\n                \&quot;1\&quot;,\n                \&quot;5\&quot;,\n                \&quot;3\&quot;,\n                \&quot;5\&quot;,\n                \&quot;5\&quot;,\n                \&quot;5\&quot;,\n                \&quot;4\&quot;,\n                \&quot;5\&quot;,\n                \&quot;5\&quot;,\n                \&quot;5\&quot;,\n                \&quot;4\&quot;,\n                \&quot;5\&quot;,\n                \&quot;5\&quot;,\n                \&quot;5\&quot;,\n                \&quot;5\&quot;,\n                \&quot;5\&quot;,\n                \&quot;4\&quot;,\n                \&quot;5\&quot;,\n                \&quot;5\&quot;,\n                \&quot;5\&quot;,\n                \&quot;5\&quot;,\n                \&quot;3\&quot;,\n                \&quot;4\&quot;,\n                \&quot;5\&quot;,\n                \&quot;5\&quot;,\n                \&quot;5\&quot;,\n                \&quot;5\&quot;,\n                \&quot;5\&quot;,\n                \&quot;4\&quot;,\n                \&quot;5\&quot;,\n                \&quot;5\&quot;,\n                \&quot;5\&quot;,\n                \&quot;5\&quot;,\n                \&quot;4\&quot;,\n                \&quot;1\&quot;,\n                \&quot;5\&quot;,\n                \&quot;5\&quot;,\n                \&quot;5\&quot;,\n                \&quot;4\&quot;,\n                \&quot;4\&quot;,\n                \&quot;4\&quot;,\n                \&quot;4\&quot;,\n                \&quot;3\&quot;,\n                \&quot;1\&quot;,\n                \&quot;1\&quot;,\n                \&quot;1\&quot;,\n                \&quot;5\&quot;,\n                \&quot;4\&quot;,\n                \&quot;2\&quot;,\n                \&quot;1\&quot;,\n                \&quot;5\&quot;,\n                \&quot;5\&quot;,\n                \&quot;5\&quot;,\n                \&quot;1\&quot;,\n                \&quot;5\&quot;,\n                \&quot;3\&quot;,\n                \&quot;1\&quot;,\n                \&quot;5\&quot;,\n                \&quot;2\&quot;,\n                \&quot;5\&quot;,\n                \&quot;5\&quot;,\n                \&quot;4\&quot;,\n                \&quot;1\&quot;,\n                \&quot;4\&quot;,\n                \&quot;5\&quot;,\n                \&quot;5\&quot;,\n                \&quot;2\&quot;,\n                \&quot;1\&quot;,\n                \&quot;5\&quot;,\n                \&quot;5\&quot;,\n                \&quot;4\&quot;,\n                \&quot;3\&quot;,\n                \&quot;1\&quot;,\n                \&quot;1\&quot;,\n                \&quot;4\&quot;,\n                \&quot;1\&quot;,\n                \&quot;5\&quot;,\n                \&quot;3\&quot;,\n                \&quot;3\&quot;,\n                \&quot;3\&quot;,\n                \&quot;1\&quot;,\n                \&quot;1\&quot;,\n                \&quot;1\&quot;,\n                \&quot;4\&quot;,\n                \&quot;4\&quot;,\n                \&quot;3\&quot;,\n                \&quot;4\&quot;,\n                \&quot;4\&quot;,\n                \&quot;5\&quot;,\n                \&quot;4\&quot;,\n                \&quot;5\&quot;,\n                \&quot;5\&quot;,\n                \&quot;5\&quot;,\n                \&quot;4\&quot;,\n                \&quot;1\&quot;,\n                \&quot;5\&quot;,\n                \&quot;5\&quot;,\n                \&quot;2\&quot;,\n                \&quot;5\&quot;,\n                \&quot;5\&quot;,\n                \&quot;5\&quot;,\n                \&quot;1\&quot;,\n                \&quot;1\&quot;,\n                \&quot;4\&quot;,\n                \&quot;2\&quot;,\n                \&quot;2\&quot;,\n                \&quot;3\&quot;,\n                \&quot;1\&quot;,\n                \&quot;5\&quot;,\n                \&quot;3\&quot;,\n                \&quot;1\&quot;,\n                \&quot;5\&quot;,\n                \&quot;5\&quot;,\n                \&quot;5\&quot;,\n                \&quot;3\&quot;,\n                \&quot;5\&quot;,\n                \&quot;1\&quot;,\n                \&quot;5\&quot;,\n                \&quot;1\&quot;,\n                \&quot;1\&quot;,\n                \&quot;5\&quot;,\n                \&quot;5\&quot;,\n                \&quot;1\&quot;,\n                \&quot;1\&quot;,\n                \&quot;5\&quot;,\n                \&quot;5\&quot;,\n                \&quot;1\&quot;,\n                \&quot;1\&quot;,\n                \&quot;1\&quot;,\n                \&quot;1\&quot;,\n                \&quot;5\&quot;,\n                \&quot;5\&quot;,\n                \&quot;5\&quot;,\n                \&quot;5\&quot;,\n                \&quot;5\&quot;,\n                \&quot;5\&quot;,\n                \&quot;5\&quot;,\n                \&quot;1\&quot;,\n                \&quot;2\&quot;,\n                \&quot;5\&quot;,\n                \&quot;1\&quot;,\n                \&quot;1\&quot;,\n                \&quot;5\&quot;,\n                \&quot;1\&quot;,\n                \&quot;5\&quot;,\n                \&quot;5\&quot;,\n                \&quot;5\&quot;,\n                \&quot;5\&quot;,\n                \&quot;5\&quot;,\n                \&quot;5\&quot;,\n                \&quot;5\&quot;,\n                \&quot;4\&quot;,\n                \&quot;5\&quot;,\n                \&quot;2\&quot;,\n                \&quot;5\&quot;,\n                \&quot;2\&quot;,\n                \&quot;5\&quot;,\n                \&quot;5\&quot;,\n                \&quot;1\&quot;,\n                \&quot;5\&quot;,\n                \&quot;4\&quot;,\n                \&quot;5\&quot;,\n                \&quot;5\&quot;,\n                \&quot;1\&quot;,\n                \&quot;5\&quot;,\n                \&quot;3\&quot;,\n                \&quot;5\&quot;,\n                \&quot;1\&quot;,\n                \&quot;5\&quot;,\n                \&quot;1\&quot;,\n                \&quot;3\&quot;,\n                \&quot;1\&quot;,\n                \&quot;4\&quot;,\n                \&quot;5\&quot;,\n                \&quot;4\&quot;,\n                \&quot;5\&quot;,\n                \&quot;3\&quot;,\n                \&quot;5\&quot;,\n                \&quot;5\&quot;,\n                \&quot;5\&quot;,\n                \&quot;5\&quot;,\n                \&quot;5\&quot;,\n                \&quot;5\&quot;,\n                \&quot;5\&quot;,\n                \&quot;1\&quot;,\n                \&quot;3\&quot;,\n                \&quot;1\&quot;,\n                \&quot;5\&quot;,\n                \&quot;5\&quot;,\n                \&quot;3\&quot;,\n                \&quot;5\&quot;,\n                \&quot;2\&quot;,\n                \&quot;5\&quot;,\n                \&quot;5\&quot;,\n                \&quot;1\&quot;,\n                \&quot;5\&quot;,\n                \&quot;5\&quot;,\n                \&quot;5\&quot;,\n                \&quot;1\&quot;,\n                \&quot;5\&quot;,\n                \&quot;1\&quot;,\n                \&quot;5\&quot;,\n                \&quot;5\&quot;,\n                \&quot;5\&quot;,\n                \&quot;5\&quot;,\n                \&quot;5\&quot;,\n                \&quot;1\&quot;,\n                \&quot;5\&quot;,\n                \&quot;5\&quot;,\n                \&quot;5\&quot;,\n                \&quot;5\&quot;,\n                \&quot;5\&quot;,\n                \&quot;5\&quot;,\n                \&quot;5\&quot;,\n                \&quot;5\&quot;,\n                \&quot;1\&quot;,\n                \&quot;1\&quot;,\n                \&quot;5\&quot;,\n                \&quot;5\&quot;,\n                \&quot;5\&quot;,\n                \&quot;5\&quot;,\n                \&quot;5\&quot;,\n                \&quot;5\&quot;,\n                \&quot;5\&quot;,\n                \&quot;5\&quot;,\n                \&quot;5\&quot;,\n                \&quot;2\&quot;,\n                \&quot;5\&quot;,\n                \&quot;5\&quot;,\n                \&quot;5\&quot;,\n                \&quot;1\&quot;,\n                \&quot;4\&quot;,\n                \&quot;5\&quot;,\n                \&quot;5\&quot;,\n                \&quot;5\&quot;,\n                \&quot;5\&quot;,\n                \&quot;5\&quot;,\n                \&quot;5\&quot;,\n                \&quot;5\&quot;,\n                \&quot;5\&quot;,\n                \&quot;5\&quot;,\n                \&quot;5\&quot;,\n                \&quot;5\&quot;,\n                \&quot;5\&quot;,\n                \&quot;5\&quot;,\n                \&quot;5\&quot;,\n                \&quot;5\&quot;,\n                \&quot;5\&quot;,\n                \&quot;5\&quot;,\n                \&quot;5\&quot;,\n                \&quot;5\&quot;,\n                \&quot;5\&quot;,\n                \&quot;5\&quot;,\n                \&quot;5\&quot;,\n                \&quot;5\&quot;,\n                \&quot;5\&quot;,\n                \&quot;5\&quot;,\n                \&quot;5\&quot;,\n                \&quot;5\&quot;,\n                \&quot;5\&quot;,\n                \&quot;5\&quot;,\n                \&quot;5\&quot;,\n                \&quot;5\&quot;,\n                \&quot;5\&quot;,\n                \&quot;5\&quot;,\n                \&quot;5\&quot;,\n                \&quot;5\&quot;,\n                \&quot;5\&quot;,\n                \&quot;5\&quot;,\n                \&quot;5\&quot;,\n                \&quot;5\&quot;,\n                \&quot;5\&quot;,\n                \&quot;5\&quot;,\n                \&quot;5\&quot;,\n                \&quot;1\&quot;,\n                \&quot;1\&quot;,\n                \&quot;5\&quot;,\n                \&quot;4\&quot;,\n                \&quot;5\&quot;,\n                \&quot;5\&quot;,\n                \&quot;5\&quot;,\n                \&quot;5\&quot;,\n                \&quot;5\&quot;,\n                \&quot;5\&quot;,\n                \&quot;5\&quot;,\n                \&quot;2\&quot;,\n                \&quot;5\&quot;,\n                \&quot;5\&quot;,\n                \&quot;5\&quot;,\n                \&quot;4\&quot;,\n                \&quot;2\&quot;,\n                \&quot;4\&quot;,\n                \&quot;4\&quot;,\n                \&quot;4\&quot;,\n                \&quot;4\&quot;,\n                \&quot;4\&quot;,\n                \&quot;4\&quot;,\n                \&quot;5\&quot;,\n                \&quot;5\&quot;,\n                \&quot;5\&quot;,\n                \&quot;5\&quot;,\n                \&quot;4\&quot;,\n                \&quot;5\&quot;,\n                \&quot;4\&quot;,\n                \&quot;2\&quot;,\n                \&quot;5\&quot;,\n                \&quot;5\&quot;,\n                \&quot;5\&quot;,\n                \&quot;5\&quot;,\n                \&quot;5\&quot;,\n                \&quot;1\&quot;,\n                \&quot;5\&quot;,\n                \&quot;3\&quot;,\n                \&quot;4\&quot;,\n                \&quot;5\&quot;,\n                \&quot;1\&quot;,\n                \&quot;5\&quot;,\n                \&quot;3\&quot;,\n                \&quot;5\&quot;,\n                \&quot;5\&quot;,\n                \&quot;5\&quot;,\n                \&quot;4\&quot;,\n                \&quot;3\&quot;,\n                \&quot;3\&quot;,\n                \&quot;5\&quot;,\n                \&quot;1\&quot;,\n                \&quot;5\&quot;,\n                \&quot;5\&quot;,\n                \&quot;5\&quot;,\n                \&quot;5\&quot;,\n                \&quot;4\&quot;,\n                \&quot;1\&quot;,\n                \&quot;5\&quot;,\n                \&quot;1\&quot;,\n                \&quot;5\&quot;,\n                \&quot;5\&quot;,\n                \&quot;4\&quot;,\n                \&quot;5\&quot;,\n                \&quot;1\&quot;,\n                \&quot;1\&quot;,\n                \&quot;1\&quot;,\n                \&quot;1\&quot;,\n                \&quot;1\&quot;,\n                \&quot;5\&quot;,\n                \&quot;5\&quot;,\n                \&quot;5\&quot;,\n                \&quot;1\&quot;,\n                \&quot;1\&quot;,\n                \&quot;1\&quot;,\n                \&quot;5\&quot;,\n                \&quot;1\&quot;,\n                \&quot;1\&quot;,\n                \&quot;5\&quot;,\n                \&quot;2\&quot;,\n                \&quot;5\&quot;,\n                \&quot;5\&quot;,\n                \&quot;1\&quot;,\n                \&quot;1\&quot;,\n                \&quot;5\&quot;,\n                \&quot;5\&quot;,\n                \&quot;5\&quot;,\n                \&quot;5\&quot;,\n                \&quot;5\&quot;,\n                \&quot;5\&quot;,\n                \&quot;5\&quot;,\n                \&quot;4\&quot;,\n                \&quot;5\&quot;,\n                \&quot;1\&quot;,\n                \&quot;5\&quot;,\n                \&quot;5\&quot;,\n                \&quot;5\&quot;,\n                \&quot;5\&quot;,\n                \&quot;5\&quot;,\n                \&quot;5\&quot;,\n                \&quot;5\&quot;,\n                \&quot;1\&quot;,\n                \&quot;5\&quot;,\n                \&quot;5\&quot;,\n                \&quot;4\&quot;,\n                \&quot;4\&quot;,\n                \&quot;3\&quot;,\n                \&quot;1\&quot;,\n                \&quot;5\&quot;,\n                \&quot;5\&quot;,\n                \&quot;3\&quot;,\n                \&quot;5\&quot;,\n                \&quot;5\&quot;,\n                \&quot;5\&quot;,\n                \&quot;1\&quot;,\n                \&quot;4\&quot;,\n                \&quot;5\&quot;,\n                \&quot;1\&quot;,\n                \&quot;1\&quot;,\n                \&quot;5\&quot;,\n                \&quot;5\&quot;,\n                \&quot;2\&quot;,\n                \&quot;2\&quot;,\n                \&quot;1\&quot;,\n                \&quot;2\&quot;,\n                \&quot;2\&quot;,\n                \&quot;5\&quot;,\n                \&quot;5\&quot;,\n                \&quot;5\&quot;,\n                \&quot;5\&quot;,\n                \&quot;5\&quot;,\n                \&quot;3\&quot;,\n                \&quot;1\&quot;,\n                \&quot;5\&quot;,\n                \&quot;1\&quot;,\n                \&quot;5\&quot;,\n                \&quot;2\&quot;,\n                \&quot;2\&quot;,\n                \&quot;5\&quot;,\n                \&quot;5\&quot;,\n                \&quot;5\&quot;,\n                \&quot;5\&quot;,\n                \&quot;5\&quot;,\n                \&quot;5\&quot;,\n                \&quot;1\&quot;,\n                \&quot;1\&quot;,\n                \&quot;5\&quot;,\n                \&quot;5\&quot;,\n                \&quot;1\&quot;,\n                \&quot;5\&quot;,\n                \&quot;5\&quot;,\n                \&quot;1\&quot;,\n                \&quot;5\&quot;,\n                \&quot;1\&quot;,\n                \&quot;5\&quot;,\n                \&quot;5\&quot;,\n                \&quot;2\&quot;,\n                \&quot;5\&quot;,\n                \&quot;5\&quot;,\n                \&quot;1\&quot;,\n                \&quot;5\&quot;,\n                \&quot;3\&quot;,\n                \&quot;3\&quot;,\n                \&quot;5\&quot;,\n                \&quot;5\&quot;,\n                \&quot;5\&quot;,\n                \&quot;5\&quot;,\n                \&quot;3\&quot;,\n                \&quot;5\&quot;,\n                \&quot;5\&quot;,\n                \&quot;5\&quot;,\n                \&quot;5\&quot;,\n                \&quot;5\&quot;,\n                \&quot;5\&quot;,\n                \&quot;5\&quot;,\n                \&quot;5\&quot;,\n                \&quot;5\&quot;,\n                \&quot;1\&quot;,\n                \&quot;5\&quot;,\n                \&quot;5\&quot;,\n                \&quot;2\&quot;,\n                \&quot;5\&quot;,\n                \&quot;5\&quot;,\n                \&quot;3\&quot;,\n                \&quot;5\&quot;,\n                \&quot;5\&quot;,\n                \&quot;5\&quot;,\n                \&quot;5\&quot;,\n                \&quot;5\&quot;,\n                \&quot;5\&quot;,\n                \&quot;5\&quot;,\n                \&quot;5\&quot;,\n                \&quot;5\&quot;,\n                \&quot;5\&quot;,\n                \&quot;5\&quot;,\n                \&quot;1\&quot;,\n                \&quot;1\&quot;,\n                \&quot;1\&quot;,\n                \&quot;5\&quot;,\n                \&quot;2\&quot;,\n                \&quot;5\&quot;,\n                \&quot;4\&quot;,\n                \&quot;5\&quot;,\n                \&quot;5\&quot;,\n                \&quot;4\&quot;,\n                \&quot;1\&quot;,\n                \&quot;5\&quot;,\n                \&quot;5\&quot;,\n                \&quot;3\&quot;,\n                \&quot;1\&quot;,\n                \&quot;5\&quot;,\n                \&quot;5\&quot;,\n                \&quot;5\&quot;,\n                \&quot;5\&quot;,\n                \&quot;5\&quot;,\n                \&quot;5\&quot;,\n                \&quot;5\&quot;,\n                \&quot;5\&quot;,\n                \&quot;5\&quot;,\n                \&quot;2\&quot;,\n                \&quot;5\&quot;,\n                \&quot;4\&quot;,\n                \&quot;3\&quot;,\n                \&quot;2\&quot;,\n                \&quot;4\&quot;,\n                \&quot;1\&quot;,\n                \&quot;5\&quot;,\n                \&quot;5\&quot;,\n                \&quot;5\&quot;,\n                \&quot;3\&quot;,\n                \&quot;5\&quot;,\n                \&quot;5\&quot;,\n                \&quot;5\&quot;,\n                \&quot;2\&quot;,\n                \&quot;3\&quot;,\n                \&quot;4\&quot;,\n                \&quot;5\&quot;,\n                \&quot;4\&quot;,\n                \&quot;4\&quot;,\n                \&quot;4\&quot;,\n                \&quot;5\&quot;,\n                \&quot;4\&quot;,\n                \&quot;4\&quot;,\n                \&quot;5\&quot;,\n                \&quot;5\&quot;,\n                \&quot;5\&quot;,\n                \&quot;2\&quot;,\n                \&quot;1\&quot;,\n                \&quot;5\&quot;,\n                \&quot;5\&quot;,\n                \&quot;5\&quot;,\n                \&quot;5\&quot;,\n                \&quot;4\&quot;,\n                \&quot;3\&quot;,\n                \&quot;4\&quot;,\n                \&quot;3\&quot;,\n                \&quot;5\&quot;,\n                \&quot;5\&quot;,\n                \&quot;1\&quot;,\n                \&quot;1\&quot;,\n                \&quot;5\&quot;,\n                \&quot;5\&quot;,\n                \&quot;5\&quot;,\n                \&quot;4\&quot;,\n                \&quot;5\&quot;,\n                \&quot;2\&quot;,\n                \&quot;5\&quot;,\n                \&quot;3\&quot;,\n                \&quot;5\&quot;,\n                \&quot;5\&quot;,\n                \&quot;5\&quot;,\n                \&quot;5\&quot;,\n                \&quot;5\&quot;,\n                \&quot;5\&quot;,\n                \&quot;5\&quot;,\n                \&quot;4\&quot;,\n                \&quot;1\&quot;,\n                \&quot;5\&quot;,\n                \&quot;1\&quot;,\n                \&quot;3\&quot;,\n                \&quot;5\&quot;,\n                \&quot;5\&quot;,\n                \&quot;5\&quot;,\n                \&quot;4\&quot;,\n                \&quot;1\&quot;,\n                \&quot;5\&quot;,\n                \&quot;1\&quot;,\n                \&quot;2\&quot;,\n                \&quot;5\&quot;,\n                \&quot;4\&quot;,\n                \&quot;5\&quot;,\n                \&quot;5\&quot;,\n                \&quot;3\&quot;,\n                \&quot;1\&quot;,\n                \&quot;5\&quot;,\n                \&quot;4\&quot;,\n                \&quot;5\&quot;,\n                \&quot;5\&quot;,\n                \&quot;3\&quot;,\n                \&quot;3\&quot;,\n                \&quot;2\&quot;,\n                \&quot;5\&quot;,\n                \&quot;5\&quot;,\n                \&quot;5\&quot;,\n                \&quot;5\&quot;,\n                \&quot;1\&quot;,\n                \&quot;4\&quot;,\n                \&quot;5\&quot;,\n                \&quot;5\&quot;,\n                \&quot;5\&quot;,\n                \&quot;5\&quot;,\n                \&quot;5\&quot;,\n                \&quot;5\&quot;,\n                \&quot;1\&quot;,\n                \&quot;5\&quot;,\n                \&quot;5\&quot;,\n                \&quot;1\&quot;,\n                \&quot;3\&quot;,\n                \&quot;4\&quot;,\n                \&quot;4\&quot;,\n                \&quot;5\&quot;,\n                \&quot;5\&quot;,\n                \&quot;5\&quot;,\n                \&quot;5\&quot;,\n                \&quot;5\&quot;,\n                \&quot;5\&quot;,\n                \&quot;5\&quot;,\n                \&quot;4\&quot;,\n                \&quot;5\&quot;,\n                \&quot;5\&quot;,\n                \&quot;1\&quot;,\n                \&quot;1\&quot;,\n                \&quot;3\&quot;,\n                \&quot;5\&quot;,\n                \&quot;4\&quot;,\n                \&quot;5\&quot;,\n                \&quot;5\&quot;,\n                \&quot;4\&quot;,\n                \&quot;5\&quot;,\n                \&quot;5\&quot;,\n                \&quot;5\&quot;,\n                \&quot;3\&quot;,\n                \&quot;2\&quot;,\n                \&quot;4\&quot;,\n                \&quot;1\&quot;,\n                \&quot;2\&quot;,\n                \&quot;1\&quot;,\n                \&quot;4\&quot;,\n                \&quot;1\&quot;,\n                \&quot;4\&quot;,\n                \&quot;5\&quot;,\n                \&quot;1\&quot;,\n                \&quot;2\&quot;,\n                \&quot;2\&quot;,\n                \&quot;5\&quot;,\n                \&quot;1\&quot;,\n                \&quot;1\&quot;,\n                \&quot;1\&quot;,\n                \&quot;2\&quot;,\n                \&quot;3\&quot;,\n                \&quot;4\&quot;,\n                \&quot;5\&quot;,\n                \&quot;5\&quot;,\n                \&quot;4\&quot;,\n                \&quot;3\&quot;,\n                \&quot;5\&quot;,\n                \&quot;5\&quot;,\n                \&quot;5\&quot;,\n                \&quot;5\&quot;,\n                \&quot;5\&quot;,\n                \&quot;5\&quot;,\n                \&quot;5\&quot;,\n                \&quot;5\&quot;,\n                \&quot;5\&quot;,\n                \&quot;1\&quot;,\n                \&quot;5\&quot;,\n                \&quot;5\&quot;,\n                \&quot;5\&quot;,\n                \&quot;5\&quot;,\n                \&quot;5\&quot;,\n                \&quot;5\&quot;,\n                \&quot;5\&quot;,\n                \&quot;5\&quot;,\n                \&quot;1\&quot;,\n                \&quot;5\&quot;,\n                \&quot;5\&quot;,\n                \&quot;5\&quot;,\n                \&quot;5\&quot;,\n                \&quot;3\&quot;,\n                \&quot;5\&quot;,\n                \&quot;5\&quot;,\n                \&quot;5\&quot;,\n                \&quot;5\&quot;,\n                \&quot;5\&quot;,\n                \&quot;5\&quot;,\n                \&quot;5\&quot;,\n                \&quot;5\&quot;,\n                \&quot;5\&quot;,\n                \&quot;5\&quot;,\n                \&quot;5\&quot;,\n                \&quot;5\&quot;,\n                \&quot;5\&quot;,\n                \&quot;5\&quot;,\n                \&quot;5\&quot;,\n                \&quot;5\&quot;,\n                \&quot;5\&quot;,\n                \&quot;5\&quot;,\n                \&quot;5\&quot;,\n                \&quot;5\&quot;,\n                \&quot;5\&quot;,\n                \&quot;5\&quot;,\n                \&quot;5\&quot;,\n                \&quot;5\&quot;,\n                \&quot;5\&quot;,\n                \&quot;5\&quot;,\n                \&quot;5\&quot;,\n                \&quot;5\&quot;,\n                \&quot;5\&quot;,\n                \&quot;5\&quot;,\n                \&quot;5\&quot;,\n                \&quot;5\&quot;,\n                \&quot;5\&quot;,\n                \&quot;5\&quot;,\n                \&quot;5\&quot;,\n                \&quot;5\&quot;,\n                \&quot;5\&quot;,\n                \&quot;5\&quot;,\n                \&quot;5\&quot;,\n                \&quot;5\&quot;,\n                \&quot;5\&quot;,\n                \&quot;3\&quot;,\n                \&quot;1\&quot;,\n                \&quot;3\&quot;,\n                \&quot;5\&quot;,\n                \&quot;5\&quot;,\n                \&quot;5\&quot;,\n                \&quot;3\&quot;,\n                \&quot;4\&quot;,\n                \&quot;2\&quot;,\n                \&quot;4\&quot;,\n                \&quot;3\&quot;,\n                \&quot;5\&quot;,\n                \&quot;5\&quot;,\n                \&quot;5\&quot;,\n                \&quot;5\&quot;,\n                \&quot;4\&quot;,\n                \&quot;5\&quot;,\n                \&quot;5\&quot;,\n                \&quot;3\&quot;,\n                \&quot;5\&quot;,\n                \&quot;5\&quot;,\n                \&quot;4\&quot;,\n                \&quot;2\&quot;,\n                \&quot;5\&quot;,\n                \&quot;2\&quot;,\n                \&quot;5\&quot;,\n                \&quot;5\&quot;,\n                \&quot;5\&quot;,\n                \&quot;4\&quot;,\n                \&quot;2\&quot;,\n                \&quot;1\&quot;,\n                \&quot;5\&quot;,\n                \&quot;1\&quot;,\n                \&quot;1\&quot;,\n                \&quot;4\&quot;,\n                \&quot;4\&quot;,\n                \&quot;5\&quot;,\n                \&quot;4\&quot;,\n                \&quot;1\&quot;,\n                \&quot;1\&quot;,\n                \&quot;5\&quot;,\n                \&quot;5\&quot;,\n                \&quot;4\&quot;,\n                \&quot;4\&quot;,\n                \&quot;5\&quot;,\n                \&quot;2\&quot;,\n                \&quot;1\&quot;,\n                \&quot;3\&quot;,\n                \&quot;4\&quot;,\n                \&quot;3\&quot;,\n                \&quot;5\&quot;,\n                \&quot;5\&quot;,\n                \&quot;5\&quot;,\n                \&quot;5\&quot;,\n                \&quot;1\&quot;,\n                \&quot;1\&quot;,\n                \&quot;5\&quot;,\n                \&quot;5\&quot;,\n                \&quot;5\&quot;,\n                \&quot;2\&quot;,\n                \&quot;1\&quot;,\n                \&quot;1\&quot;,\n                \&quot;5\&quot;,\n                \&quot;5\&quot;,\n                \&quot;5\&quot;,\n                \&quot;5\&quot;,\n                \&quot;5\&quot;,\n                \&quot;3\&quot;,\n                \&quot;5\&quot;,\n                \&quot;5\&quot;,\n                \&quot;5\&quot;,\n                \&quot;1\&quot;,\n                \&quot;5\&quot;,\n                \&quot;5\&quot;,\n                \&quot;5\&quot;,\n                \&quot;5\&quot;,\n                \&quot;5\&quot;,\n                \&quot;5\&quot;,\n                \&quot;4\&quot;,\n                \&quot;1\&quot;,\n                \&quot;5\&quot;,\n                \&quot;5\&quot;,\n                \&quot;5\&quot;,\n                \&quot;4\&quot;,\n                \&quot;5\&quot;,\n                \&quot;5\&quot;,\n                \&quot;5\&quot;,\n                \&quot;5\&quot;,\n                \&quot;5\&quot;,\n                \&quot;5\&quot;,\n                \&quot;1\&quot;,\n                \&quot;3\&quot;,\n                \&quot;3\&quot;,\n                \&quot;5\&quot;,\n                \&quot;5\&quot;,\n                \&quot;5\&quot;,\n                \&quot;4\&quot;,\n                \&quot;3\&quot;,\n                \&quot;1\&quot;,\n                \&quot;5\&quot;,\n                \&quot;5\&quot;,\n                \&quot;4\&quot;,\n                \&quot;4\&quot;,\n                \&quot;3\&quot;,\n                \&quot;3\&quot;,\n                \&quot;5\&quot;,\n                \&quot;3\&quot;,\n                \&quot;2\&quot;,\n                \&quot;2\&quot;,\n                \&quot;3\&quot;,\n                \&quot;3\&quot;,\n                \&quot;5\&quot;,\n                \&quot;5\&quot;,\n                \&quot;5\&quot;,\n                \&quot;2\&quot;,\n                \&quot;3\&quot;,\n                \&quot;5\&quot;,\n                \&quot;5\&quot;,\n                \&quot;5\&quot;,\n                \&quot;3\&quot;,\n                \&quot;5\&quot;,\n                \&quot;5\&quot;,\n                \&quot;5\&quot;,\n                \&quot;5\&quot;,\n                \&quot;5\&quot;,\n                \&quot;1\&quot;,\n                \&quot;5\&quot;,\n                \&quot;5\&quot;,\n                \&quot;1\&quot;,\n                \&quot;5\&quot;,\n                \&quot;3\&quot;,\n                \&quot;5\&quot;,\n                \&quot;5\&quot;,\n                \&quot;5\&quot;,\n                \&quot;3\&quot;,\n                \&quot;1\&quot;,\n                \&quot;1\&quot;,\n                \&quot;5\&quot;,\n                \&quot;5\&quot;,\n                \&quot;5\&quot;,\n                \&quot;3\&quot;,\n                \&quot;5\&quot;,\n                \&quot;3\&quot;,\n                \&quot;5\&quot;,\n                \&quot;5\&quot;,\n                \&quot;5\&quot;,\n                \&quot;5\&quot;,\n                \&quot;5\&quot;,\n                \&quot;1\&quot;,\n                \&quot;5\&quot;,\n                \&quot;5\&quot;,\n                \&quot;5\&quot;,\n                \&quot;1\&quot;,\n                \&quot;5\&quot;,\n                \&quot;5\&quot;,\n                \&quot;5\&quot;,\n                \&quot;5\&quot;,\n                \&quot;5\&quot;,\n                \&quot;4\&quot;,\n                \&quot;5\&quot;,\n                \&quot;5\&quot;,\n                \&quot;5\&quot;,\n                \&quot;1\&quot;,\n                \&quot;1\&quot;,\n                \&quot;5\&quot;,\n                \&quot;4\&quot;,\n                \&quot;4\&quot;,\n                \&quot;5\&quot;,\n                \&quot;3\&quot;,\n                \&quot;2\&quot;,\n                \&quot;5\&quot;,\n                \&quot;5\&quot;,\n                \&quot;5\&quot;,\n                \&quot;5\&quot;,\n                \&quot;5\&quot;,\n                \&quot;4\&quot;,\n                \&quot;5\&quot;,\n                \&quot;5\&quot;,\n                \&quot;5\&quot;,\n                \&quot;5\&quot;,\n                \&quot;5\&quot;,\n                \&quot;5\&quot;,\n                \&quot;5\&quot;,\n                \&quot;5\&quot;,\n                \&quot;4\&quot;,\n                \&quot;5\&quot;,\n                \&quot;5\&quot;,\n                \&quot;5\&quot;,\n                \&quot;2\&quot;,\n                \&quot;2\&quot;,\n                \&quot;5\&quot;,\n                \&quot;5\&quot;,\n                \&quot;5\&quot;,\n                \&quot;4\&quot;,\n                \&quot;3\&quot;,\n                \&quot;4\&quot;,\n                \&quot;5\&quot;,\n                \&quot;5\&quot;,\n                \&quot;5\&quot;,\n                \&quot;5\&quot;,\n                \&quot;3\&quot;,\n                \&quot;5\&quot;,\n                \&quot;5\&quot;,\n                \&quot;5\&quot;,\n                \&quot;5\&quot;,\n                \&quot;5\&quot;,\n                \&quot;5\&quot;,\n                \&quot;5\&quot;,\n                \&quot;5\&quot;,\n                \&quot;1\&quot;,\n                \&quot;5\&quot;,\n                \&quot;2\&quot;,\n                \&quot;5\&quot;,\n                \&quot;4\&quot;,\n                \&quot;1\&quot;,\n                \&quot;3\&quot;,\n                \&quot;5\&quot;,\n                \&quot;5\&quot;,\n                \&quot;5\&quot;,\n                \&quot;1\&quot;,\n                \&quot;5\&quot;,\n                \&quot;2\&quot;,\n                \&quot;1\&quot;,\n                \&quot;1\&quot;,\n                \&quot;5\&quot;,\n                \&quot;5\&quot;,\n                \&quot;2\&quot;,\n                \&quot;1\&quot;,\n                \&quot;1\&quot;,\n                \&quot;1\&quot;,\n                \&quot;5\&quot;,\n                \&quot;1\&quot;,\n                \&quot;5\&quot;,\n                \&quot;5\&quot;,\n                \&quot;1\&quot;,\n                \&quot;5\&quot;,\n                \&quot;1\&quot;,\n                \&quot;3\&quot;,\n                \&quot;3\&quot;,\n                \&quot;1\&quot;,\n                \&quot;3\&quot;,\n                \&quot;4\&quot;,\n                \&quot;1\&quot;,\n                \&quot;2\&quot;,\n                \&quot;1\&quot;,\n                \&quot;4\&quot;,\n                \&quot;5\&quot;,\n                \&quot;5\&quot;,\n                \&quot;5\&quot;,\n                \&quot;1\&quot;,\n                \&quot;2\&quot;,\n                \&quot;1\&quot;,\n                \&quot;5\&quot;,\n                \&quot;1\&quot;,\n                \&quot;5\&quot;,\n                \&quot;1\&quot;,\n                \&quot;1\&quot;,\n                \&quot;5\&quot;,\n                \&quot;5\&quot;,\n                \&quot;2\&quot;,\n                \&quot;5\&quot;,\n                \&quot;5\&quot;,\n                \&quot;5\&quot;,\n                \&quot;5\&quot;,\n                \&quot;4\&quot;,\n                \&quot;2\&quot;,\n                \&quot;2\&quot;,\n                \&quot;1\&quot;,\n                \&quot;5\&quot;,\n                \&quot;5\&quot;,\n                \&quot;5\&quot;,\n                \&quot;1\&quot;,\n                \&quot;5\&quot;,\n                \&quot;5\&quot;,\n                \&quot;5\&quot;,\n                \&quot;5\&quot;,\n                \&quot;5\&quot;,\n                \&quot;5\&quot;,\n                \&quot;1\&quot;,\n                \&quot;5\&quot;,\n                \&quot;5\&quot;,\n                \&quot;5\&quot;,\n                \&quot;4\&quot;,\n                \&quot;4\&quot;,\n                \&quot;3\&quot;,\n                \&quot;4\&quot;,\n                \&quot;5\&quot;,\n                \&quot;2\&quot;,\n                \&quot;4\&quot;,\n                \&quot;1\&quot;,\n                \&quot;5\&quot;,\n                \&quot;2\&quot;,\n                \&quot;5\&quot;,\n                \&quot;1\&quot;,\n                \&quot;3\&quot;,\n                \&quot;1\&quot;,\n                \&quot;5\&quot;,\n                \&quot;4\&quot;,\n                \&quot;1\&quot;,\n                \&quot;5\&quot;,\n                \&quot;5\&quot;,\n                \&quot;5\&quot;,\n                \&quot;5\&quot;,\n                \&quot;5\&quot;,\n                \&quot;5\&quot;,\n                \&quot;3\&quot;,\n                \&quot;1\&quot;,\n                \&quot;1\&quot;,\n                \&quot;4\&quot;,\n                \&quot;5\&quot;,\n                \&quot;4\&quot;,\n                \&quot;5\&quot;,\n                \&quot;4\&quot;,\n                \&quot;5\&quot;,\n                \&quot;5\&quot;,\n                \&quot;1\&quot;,\n                \&quot;5\&quot;,\n                \&quot;5\&quot;,\n                \&quot;1\&quot;,\n                \&quot;5\&quot;,\n                \&quot;2\&quot;,\n                \&quot;5\&quot;,\n                \&quot;3\&quot;,\n                \&quot;5\&quot;,\n                \&quot;5\&quot;,\n                \&quot;5\&quot;,\n                \&quot;5\&quot;,\n                \&quot;5\&quot;,\n                \&quot;5\&quot;,\n                \&quot;1\&quot;,\n                \&quot;1\&quot;,\n                \&quot;5\&quot;,\n                \&quot;5\&quot;,\n                \&quot;5\&quot;,\n                \&quot;5\&quot;,\n                \&quot;4\&quot;,\n                \&quot;2\&quot;,\n                \&quot;5\&quot;,\n                \&quot;5\&quot;,\n                \&quot;5\&quot;,\n                \&quot;5\&quot;,\n                \&quot;2\&quot;,\n                \&quot;5\&quot;,\n                \&quot;5\&quot;,\n                \&quot;5\&quot;,\n                \&quot;1\&quot;,\n                \&quot;5\&quot;,\n                \&quot;5\&quot;,\n                \&quot;5\&quot;,\n                \&quot;5\&quot;,\n                \&quot;4\&quot;,\n                \&quot;5\&quot;,\n                \&quot;5\&quot;,\n                \&quot;2\&quot;,\n                \&quot;5\&quot;,\n                \&quot;5\&quot;,\n                \&quot;3\&quot;,\n                \&quot;5\&quot;,\n                \&quot;3\&quot;,\n                \&quot;3\&quot;,\n                \&quot;5\&quot;,\n                \&quot;2\&quot;,\n                \&quot;3\&quot;,\n                \&quot;5\&quot;,\n                \&quot;5\&quot;,\n                \&quot;5\&quot;,\n                \&quot;5\&quot;,\n                \&quot;5\&quot;,\n                \&quot;5\&quot;,\n                \&quot;3\&quot;,\n                \&quot;3\&quot;,\n                \&quot;5\&quot;,\n                \&quot;5\&quot;,\n                \&quot;1\&quot;,\n                \&quot;1\&quot;,\n                \&quot;1\&quot;,\n                \&quot;5\&quot;,\n                \&quot;5\&quot;,\n                \&quot;5\&quot;,\n                \&quot;5\&quot;,\n                \&quot;5\&quot;,\n                \&quot;5\&quot;,\n                \&quot;5\&quot;,\n                \&quot;5\&quot;,\n                \&quot;4\&quot;,\n                \&quot;5\&quot;,\n                \&quot;5\&quot;,\n                \&quot;3\&quot;,\n                \&quot;3\&quot;,\n                \&quot;4\&quot;,\n                \&quot;3\&quot;,\n                \&quot;1\&quot;,\n                \&quot;1\&quot;,\n                \&quot;5\&quot;,\n                \&quot;3\&quot;,\n                \&quot;3\&quot;,\n                \&quot;4\&quot;,\n                \&quot;4\&quot;,\n                \&quot;4\&quot;,\n                \&quot;5\&quot;,\n                \&quot;5\&quot;,\n                \&quot;5\&quot;,\n                \&quot;4\&quot;,\n                \&quot;4\&quot;,\n                \&quot;1\&quot;,\n                \&quot;5\&quot;,\n                \&quot;1\&quot;,\n                \&quot;5\&quot;,\n                \&quot;5\&quot;,\n                \&quot;5\&quot;,\n                \&quot;5\&quot;,\n                \&quot;5\&quot;,\n                \&quot;5\&quot;,\n                \&quot;5\&quot;,\n                \&quot;1\&quot;,\n                \&quot;5\&quot;,\n                \&quot;5\&quot;,\n                \&quot;4\&quot;,\n                \&quot;5\&quot;,\n                \&quot;5\&quot;,\n                \&quot;5\&quot;,\n                \&quot;1\&quot;,\n                \&quot;4\&quot;,\n                \&quot;5\&quot;,\n                \&quot;1\&quot;,\n                \&quot;5\&quot;,\n                \&quot;5\&quot;,\n                \&quot;1\&quot;,\n                \&quot;3\&quot;,\n                \&quot;5\&quot;,\n                \&quot;5\&quot;,\n                \&quot;1\&quot;,\n                \&quot;1\&quot;,\n                \&quot;4\&quot;,\n                \&quot;1\&quot;,\n                \&quot;3\&quot;,\n                \&quot;5\&quot;,\n                \&quot;5\&quot;,\n                \&quot;5\&quot;,\n                \&quot;5\&quot;,\n                \&quot;5\&quot;,\n                \&quot;5\&quot;,\n                \&quot;5\&quot;,\n                \&quot;5\&quot;,\n                \&quot;5\&quot;,\n                \&quot;5\&quot;,\n                \&quot;5\&quot;,\n                \&quot;5\&quot;,\n                \&quot;5\&quot;,\n                \&quot;5\&quot;,\n                \&quot;5\&quot;,\n                \&quot;5\&quot;,\n                \&quot;5\&quot;,\n                \&quot;5\&quot;,\n                \&quot;5\&quot;,\n                \&quot;4\&quot;,\n                \&quot;5\&quot;,\n                \&quot;3\&quot;,\n                \&quot;5\&quot;,\n                \&quot;2\&quot;,\n                \&quot;5\&quot;,\n                \&quot;5\&quot;,\n                \&quot;5\&quot;,\n                \&quot;5\&quot;,\n                \&quot;5\&quot;,\n                \&quot;1\&quot;,\n                \&quot;4\&quot;,\n                \&quot;5\&quot;,\n                \&quot;5\&quot;,\n                \&quot;1\&quot;,\n                \&quot;4\&quot;,\n                \&quot;4\&quot;,\n                \&quot;3\&quot;,\n                \&quot;5\&quot;,\n                \&quot;4\&quot;,\n                \&quot;2\&quot;,\n                \&quot;1\&quot;,\n                \&quot;1\&quot;,\n                \&quot;4\&quot;,\n                \&quot;5\&quot;,\n                \&quot;3\&quot;,\n                \&quot;4\&quot;,\n                \&quot;4\&quot;,\n                \&quot;5\&quot;,\n                \&quot;4\&quot;,\n                \&quot;4\&quot;,\n                \&quot;4\&quot;,\n                \&quot;5\&quot;,\n                \&quot;1\&quot;,\n                \&quot;4\&quot;,\n                \&quot;5\&quot;,\n                \&quot;5\&quot;,\n                \&quot;5\&quot;,\n                \&quot;5\&quot;,\n                \&quot;5\&quot;,\n                \&quot;5\&quot;,\n                \&quot;5\&quot;,\n                \&quot;1\&quot;,\n                \&quot;5\&quot;,\n                \&quot;5\&quot;,\n                \&quot;2\&quot;,\n                \&quot;1\&quot;,\n                \&quot;5\&quot;,\n                \&quot;5\&quot;,\n                \&quot;3\&quot;,\n                \&quot;5\&quot;,\n                \&quot;2\&quot;,\n                \&quot;4\&quot;,\n                \&quot;5\&quot;,\n                \&quot;3\&quot;,\n                \&quot;4\&quot;,\n                \&quot;2\&quot;,\n                \&quot;1\&quot;,\n                \&quot;1\&quot;,\n                \&quot;3\&quot;,\n                \&quot;4\&quot;,\n                \&quot;4\&quot;,\n                \&quot;3\&quot;,\n                \&quot;3\&quot;,\n                \&quot;2\&quot;,\n                \&quot;4\&quot;,\n                \&quot;1\&quot;,\n                \&quot;4\&quot;,\n                \&quot;2\&quot;,\n                \&quot;5\&quot;,\n                \&quot;3\&quot;,\n                \&quot;5\&quot;,\n                \&quot;5\&quot;,\n                \&quot;3\&quot;,\n                \&quot;5\&quot;,\n                \&quot;3\&quot;,\n                \&quot;2\&quot;,\n                \&quot;1\&quot;,\n                \&quot;2\&quot;,\n                \&quot;5\&quot;,\n                \&quot;5\&quot;,\n                \&quot;1\&quot;,\n                \&quot;5\&quot;,\n                \&quot;1\&quot;,\n                \&quot;5\&quot;,\n                \&quot;4\&quot;,\n                \&quot;5\&quot;,\n                \&quot;5\&quot;,\n                \&quot;1\&quot;,\n                \&quot;2\&quot;,\n                \&quot;5\&quot;,\n                \&quot;2\&quot;,\n                \&quot;5\&quot;,\n                \&quot;5\&quot;,\n                \&quot;1\&quot;,\n                \&quot;5\&quot;,\n                \&quot;5\&quot;,\n                \&quot;5\&quot;,\n                \&quot;5\&quot;,\n                \&quot;5\&quot;,\n                \&quot;5\&quot;,\n                \&quot;5\&quot;,\n                \&quot;5\&quot;,\n                \&quot;5\&quot;,\n                \&quot;5\&quot;,\n                \&quot;4\&quot;,\n                \&quot;5\&quot;,\n                \&quot;5\&quot;,\n                \&quot;5\&quot;,\n                \&quot;5\&quot;,\n                \&quot;5\&quot;,\n                \&quot;5\&quot;,\n                \&quot;5\&quot;,\n                \&quot;5\&quot;,\n                \&quot;4\&quot;,\n                \&quot;5\&quot;,\n                \&quot;3\&quot;,\n                \&quot;5\&quot;,\n                \&quot;5\&quot;,\n                \&quot;5\&quot;,\n                \&quot;5\&quot;,\n                \&quot;5\&quot;,\n                \&quot;5\&quot;,\n                \&quot;3\&quot;,\n                \&quot;5\&quot;,\n                \&quot;5\&quot;,\n                \&quot;5\&quot;,\n                \&quot;4\&quot;,\n                \&quot;1\&quot;,\n                \&quot;5\&quot;,\n                \&quot;4\&quot;,\n                \&quot;3\&quot;,\n                \&quot;3\&quot;,\n                \&quot;3\&quot;,\n                \&quot;5\&quot;,\n                \&quot;5\&quot;,\n                \&quot;5\&quot;,\n                \&quot;3\&quot;,\n                \&quot;3\&quot;,\n                \&quot;4\&quot;,\n                \&quot;5\&quot;,\n                \&quot;5\&quot;,\n                \&quot;5\&quot;,\n                \&quot;5\&quot;,\n                \&quot;1\&quot;,\n                \&quot;1\&quot;,\n                \&quot;1\&quot;,\n                \&quot;1\&quot;,\n                \&quot;1\&quot;,\n                \&quot;5\&quot;,\n                \&quot;1\&quot;,\n                \&quot;5\&quot;,\n                \&quot;5\&quot;,\n                \&quot;5\&quot;,\n                \&quot;5\&quot;,\n                \&quot;5\&quot;,\n                \&quot;5\&quot;,\n                \&quot;5\&quot;,\n                \&quot;5\&quot;,\n                \&quot;1\&quot;,\n                \&quot;5\&quot;,\n                \&quot;5\&quot;,\n                \&quot;3\&quot;,\n                \&quot;5\&quot;,\n                \&quot;5\&quot;,\n                \&quot;1\&quot;,\n                \&quot;5\&quot;,\n                \&quot;5\&quot;,\n                \&quot;5\&quot;,\n                \&quot;4\&quot;,\n                \&quot;5\&quot;,\n                \&quot;2\&quot;,\n                \&quot;5\&quot;,\n                \&quot;5\&quot;,\n                \&quot;5\&quot;,\n                \&quot;5\&quot;,\n                \&quot;1\&quot;,\n                \&quot;5\&quot;,\n                \&quot;5\&quot;,\n                \&quot;5\&quot;,\n                \&quot;1\&quot;,\n                \&quot;4\&quot;,\n                \&quot;1\&quot;,\n                \&quot;5\&quot;,\n                \&quot;5\&quot;,\n                \&quot;5\&quot;,\n                \&quot;2\&quot;,\n                \&quot;4\&quot;,\n                \&quot;2\&quot;,\n                \&quot;5\&quot;,\n                \&quot;1\&quot;,\n                \&quot;5\&quot;,\n                \&quot;5\&quot;,\n                \&quot;5\&quot;,\n                \&quot;5\&quot;,\n                \&quot;5\&quot;,\n                \&quot;1\&quot;,\n                \&quot;4\&quot;,\n                \&quot;4\&quot;,\n                \&quot;4\&quot;,\n                \&quot;3\&quot;,\n                \&quot;4\&quot;,\n                \&quot;3\&quot;,\n                \&quot;5\&quot;,\n                \&quot;3\&quot;,\n                \&quot;5\&quot;,\n                \&quot;5\&quot;,\n                \&quot;5\&quot;,\n                \&quot;5\&quot;,\n                \&quot;3\&quot;,\n                \&quot;5\&quot;,\n                \&quot;5\&quot;,\n                \&quot;5\&quot;,\n                \&quot;5\&quot;,\n                \&quot;1\&quot;,\n                \&quot;5\&quot;,\n                \&quot;5\&quot;,\n                \&quot;3\&quot;,\n                \&quot;3\&quot;,\n                \&quot;2\&quot;,\n                \&quot;4\&quot;,\n                \&quot;5\&quot;,\n                \&quot;5\&quot;,\n                \&quot;5\&quot;,\n                \&quot;1\&quot;,\n                \&quot;5\&quot;,\n                \&quot;1\&quot;,\n                \&quot;1\&quot;,\n                \&quot;1\&quot;,\n                \&quot;5\&quot;,\n                \&quot;3\&quot;,\n                \&quot;5\&quot;,\n                \&quot;5\&quot;,\n                \&quot;3\&quot;,\n                \&quot;5\&quot;,\n                \&quot;5\&quot;,\n                \&quot;2\&quot;,\n                \&quot;5\&quot;,\n                \&quot;5\&quot;,\n                \&quot;2\&quot;,\n                \&quot;4\&quot;,\n                \&quot;5\&quot;,\n                \&quot;5\&quot;,\n                \&quot;5\&quot;,\n                \&quot;5\&quot;,\n                \&quot;5\&quot;,\n                \&quot;5\&quot;,\n                \&quot;1\&quot;,\n                \&quot;1\&quot;,\n                \&quot;5\&quot;,\n                \&quot;1\&quot;,\n                \&quot;5\&quot;,\n                \&quot;5\&quot;,\n                \&quot;5\&quot;,\n                \&quot;5\&quot;,\n                \&quot;4\&quot;,\n                \&quot;4\&quot;,\n                \&quot;5\&quot;,\n                \&quot;3\&quot;,\n                \&quot;4\&quot;,\n                \&quot;1\&quot;,\n                \&quot;3\&quot;,\n                \&quot;5\&quot;,\n                \&quot;4\&quot;,\n                \&quot;4\&quot;,\n                \&quot;5\&quot;,\n                \&quot;5\&quot;,\n                \&quot;2\&quot;,\n                \&quot;5\&quot;,\n                \&quot;4\&quot;,\n                \&quot;3\&quot;,\n                \&quot;5\&quot;,\n                \&quot;5\&quot;,\n                \&quot;2\&quot;,\n                \&quot;1\&quot;,\n                \&quot;5\&quot;,\n                \&quot;5\&quot;,\n                \&quot;5\&quot;,\n                \&quot;5\&quot;,\n                \&quot;5\&quot;,\n                \&quot;5\&quot;,\n                \&quot;5\&quot;,\n                \&quot;5\&quot;,\n                \&quot;1\&quot;,\n                \&quot;1\&quot;,\n                \&quot;5\&quot;,\n                \&quot;5\&quot;,\n                \&quot;4\&quot;,\n                \&quot;5\&quot;,\n                \&quot;5\&quot;,\n                \&quot;5\&quot;,\n                \&quot;4\&quot;,\n                \&quot;5\&quot;,\n                \&quot;5\&quot;,\n                \&quot;5\&quot;,\n                \&quot;5\&quot;,\n                \&quot;2\&quot;,\n                \&quot;4\&quot;,\n                \&quot;3\&quot;,\n                \&quot;1\&quot;,\n                \&quot;1\&quot;,\n                \&quot;3\&quot;,\n                \&quot;5\&quot;,\n                \&quot;5\&quot;,\n                \&quot;2\&quot;,\n                \&quot;2\&quot;,\n                \&quot;3\&quot;,\n                \&quot;5\&quot;,\n                \&quot;5\&quot;,\n                \&quot;5\&quot;,\n                \&quot;5\&quot;,\n                \&quot;5\&quot;,\n                \&quot;3\&quot;,\n                \&quot;3\&quot;,\n                \&quot;2\&quot;,\n                \&quot;5\&quot;,\n                \&quot;5\&quot;,\n                \&quot;3\&quot;,\n                \&quot;5\&quot;,\n                \&quot;5\&quot;,\n                \&quot;5\&quot;,\n                \&quot;2\&quot;,\n                \&quot;1\&quot;,\n                \&quot;5\&quot;,\n                \&quot;5\&quot;,\n                \&quot;5\&quot;,\n                \&quot;5\&quot;,\n                \&quot;5\&quot;,\n                \&quot;2\&quot;,\n                \&quot;3\&quot;,\n                \&quot;2\&quot;,\n                \&quot;5\&quot;,\n                \&quot;5\&quot;,\n                \&quot;5\&quot;,\n                \&quot;5\&quot;,\n                \&quot;3\&quot;,\n                \&quot;1\&quot;,\n                \&quot;5\&quot;,\n                \&quot;4\&quot;,\n                \&quot;3\&quot;,\n                \&quot;4\&quot;,\n                \&quot;5\&quot;,\n                \&quot;4\&quot;,\n                \&quot;4\&quot;,\n                \&quot;5\&quot;,\n                \&quot;2\&quot;,\n                \&quot;5\&quot;,\n                \&quot;5\&quot;,\n                \&quot;5\&quot;,\n                \&quot;5\&quot;,\n                \&quot;5\&quot;,\n                \&quot;5\&quot;,\n                \&quot;1\&quot;,\n                \&quot;1\&quot;,\n                \&quot;5\&quot;,\n                \&quot;5\&quot;,\n                \&quot;5\&quot;,\n                \&quot;5\&quot;,\n                \&quot;1\&quot;,\n                \&quot;2\&quot;,\n                \&quot;5\&quot;,\n                \&quot;2\&quot;,\n                \&quot;5\&quot;,\n                \&quot;5\&quot;,\n                \&quot;5\&quot;,\n                \&quot;5\&quot;,\n                \&quot;5\&quot;,\n                \&quot;5\&quot;,\n                \&quot;3\&quot;,\n                \&quot;1\&quot;,\n                \&quot;1\&quot;,\n                \&quot;5\&quot;,\n                \&quot;5\&quot;,\n                \&quot;5\&quot;,\n                \&quot;5\&quot;,\n                \&quot;5\&quot;,\n                \&quot;2\&quot;,\n                \&quot;1\&quot;,\n                \&quot;5\&quot;,\n                \&quot;2\&quot;,\n                \&quot;5\&quot;,\n                \&quot;5\&quot;,\n                \&quot;5\&quot;,\n                \&quot;5\&quot;,\n                \&quot;5\&quot;,\n                \&quot;3\&quot;,\n                \&quot;5\&quot;,\n                \&quot;1\&quot;,\n                \&quot;1\&quot;,\n                \&quot;5\&quot;,\n                \&quot;1\&quot;,\n                \&quot;4\&quot;,\n                \&quot;5\&quot;,\n                \&quot;2\&quot;,\n                \&quot;1\&quot;,\n                \&quot;5\&quot;,\n                \&quot;5\&quot;,\n                \&quot;5\&quot;,\n                \&quot;1\&quot;,\n                \&quot;5\&quot;,\n                \&quot;5\&quot;,\n                \&quot;5\&quot;,\n                \&quot;5\&quot;,\n                \&quot;5\&quot;,\n                \&quot;3\&quot;,\n                \&quot;3\&quot;,\n                \&quot;4\&quot;,\n                \&quot;2\&quot;,\n                \&quot;4\&quot;,\n                \&quot;5\&quot;,\n                \&quot;5\&quot;,\n                \&quot;5\&quot;,\n                \&quot;5\&quot;,\n                \&quot;5\&quot;,\n                \&quot;4\&quot;,\n                \&quot;5\&quot;,\n                \&quot;5\&quot;,\n                \&quot;5\&quot;,\n                \&quot;5\&quot;,\n                \&quot;5\&quot;,\n                \&quot;5\&quot;,\n                \&quot;5\&quot;,\n                \&quot;5\&quot;,\n                \&quot;5\&quot;,\n                \&quot;5\&quot;,\n                \&quot;5\&quot;,\n                \&quot;5\&quot;,\n                \&quot;5\&quot;,\n                \&quot;5\&quot;,\n                \&quot;5\&quot;,\n                \&quot;5\&quot;,\n                \&quot;4\&quot;,\n                \&quot;2\&quot;,\n                \&quot;5\&quot;,\n                \&quot;5\&quot;,\n                \&quot;2\&quot;,\n                \&quot;5\&quot;,\n                \&quot;5\&quot;,\n                \&quot;5\&quot;,\n                \&quot;5\&quot;,\n                \&quot;5\&quot;,\n                \&quot;5\&quot;,\n                \&quot;1\&quot;,\n                \&quot;5\&quot;,\n                \&quot;1\&quot;,\n                \&quot;5\&quot;,\n                \&quot;5\&quot;,\n                \&quot;5\&quot;,\n                \&quot;5\&quot;,\n                \&quot;1\&quot;,\n                \&quot;5\&quot;,\n                \&quot;3\&quot;,\n                \&quot;5\&quot;,\n                \&quot;5\&quot;,\n                \&quot;5\&quot;,\n                \&quot;5\&quot;,\n                \&quot;5\&quot;,\n                \&quot;5\&quot;,\n                \&quot;5\&quot;,\n                \&quot;5\&quot;,\n                \&quot;5\&quot;,\n                \&quot;4\&quot;,\n                \&quot;2\&quot;,\n                \&quot;2\&quot;,\n                \&quot;2\&quot;,\n                \&quot;1\&quot;,\n                \&quot;5\&quot;,\n                \&quot;4\&quot;,\n                \&quot;5\&quot;,\n                \&quot;5\&quot;,\n                \&quot;5\&quot;,\n                \&quot;5\&quot;,\n                \&quot;2\&quot;,\n                \&quot;5\&quot;,\n                \&quot;2\&quot;,\n                \&quot;5\&quot;,\n                \&quot;4\&quot;,\n                \&quot;4\&quot;,\n                \&quot;1\&quot;,\n                \&quot;5\&quot;,\n                \&quot;5\&quot;,\n                \&quot;5\&quot;,\n                \&quot;1\&quot;,\n                \&quot;1\&quot;,\n                \&quot;1\&quot;,\n                \&quot;3\&quot;,\n                \&quot;3\&quot;,\n                \&quot;5\&quot;,\n                \&quot;3\&quot;,\n                \&quot;5\&quot;,\n                \&quot;5\&quot;,\n                \&quot;2\&quot;,\n                \&quot;5\&quot;,\n                \&quot;5\&quot;,\n                \&quot;5\&quot;,\n                \&quot;5\&quot;,\n                \&quot;1\&quot;,\n                \&quot;4\&quot;,\n                \&quot;3\&quot;,\n                \&quot;5\&quot;,\n                \&quot;5\&quot;,\n                \&quot;1\&quot;,\n                \&quot;5\&quot;,\n                \&quot;5\&quot;,\n                \&quot;5\&quot;,\n                \&quot;5\&quot;,\n                \&quot;5\&quot;,\n                \&quot;5\&quot;,\n                \&quot;1\&quot;,\n                \&quot;4\&quot;,\n                \&quot;3\&quot;,\n                \&quot;5\&quot;,\n                \&quot;3\&quot;,\n                \&quot;5\&quot;,\n                \&quot;5\&quot;,\n                \&quot;1\&quot;,\n                \&quot;1\&quot;,\n                \&quot;5\&quot;,\n                \&quot;5\&quot;,\n                \&quot;5\&quot;,\n                \&quot;3\&quot;,\n                \&quot;1\&quot;,\n                \&quot;3\&quot;,\n                \&quot;5\&quot;,\n                \&quot;5\&quot;,\n                \&quot;1\&quot;,\n                \&quot;3\&quot;,\n                \&quot;5\&quot;,\n                \&quot;5\&quot;,\n                \&quot;5\&quot;,\n                \&quot;2\&quot;,\n                \&quot;5\&quot;,\n                \&quot;1\&quot;,\n                \&quot;1\&quot;,\n                \&quot;5\&quot;,\n                \&quot;5\&quot;,\n                \&quot;5\&quot;,\n                \&quot;5\&quot;,\n                \&quot;5\&quot;,\n                \&quot;2\&quot;,\n                \&quot;4\&quot;,\n                \&quot;3\&quot;,\n                \&quot;3\&quot;,\n                \&quot;2\&quot;,\n                \&quot;3\&quot;,\n                \&quot;5\&quot;,\n                \&quot;1\&quot;,\n                \&quot;5\&quot;,\n                \&quot;4\&quot;,\n                \&quot;4\&quot;,\n                \&quot;3\&quot;,\n                \&quot;2\&quot;,\n                \&quot;2\&quot;,\n                \&quot;2\&quot;,\n                \&quot;1\&quot;,\n                \&quot;1\&quot;,\n                \&quot;3\&quot;,\n                \&quot;5\&quot;,\n                \&quot;5\&quot;,\n                \&quot;3\&quot;,\n                \&quot;4\&quot;,\n                \&quot;2\&quot;,\n                \&quot;4\&quot;,\n                \&quot;1\&quot;,\n                \&quot;3\&quot;,\n                \&quot;5\&quot;,\n                \&quot;5\&quot;,\n                \&quot;4\&quot;,\n                \&quot;5\&quot;,\n                \&quot;3\&quot;,\n                \&quot;5\&quot;,\n                \&quot;1\&quot;,\n                \&quot;5\&quot;,\n                \&quot;1\&quot;,\n                \&quot;1\&quot;,\n                \&quot;1\&quot;,\n                \&quot;5\&quot;,\n                \&quot;1\&quot;,\n                \&quot;4\&quot;,\n                \&quot;2\&quot;,\n                \&quot;5\&quot;,\n                \&quot;5\&quot;,\n                \&quot;5\&quot;,\n                \&quot;1\&quot;,\n                \&quot;1\&quot;,\n                \&quot;1\&quot;,\n                \&quot;1\&quot;,\n                \&quot;1\&quot;,\n                \&quot;5\&quot;,\n                \&quot;5\&quot;,\n                \&quot;2\&quot;,\n                \&quot;5\&quot;,\n                \&quot;5\&quot;,\n                \&quot;5\&quot;,\n                \&quot;5\&quot;,\n                \&quot;1\&quot;,\n                \&quot;5\&quot;,\n                \&quot;1\&quot;,\n                \&quot;5\&quot;,\n                \&quot;5\&quot;,\n                \&quot;5\&quot;,\n                \&quot;5\&quot;,\n                \&quot;5\&quot;,\n                \&quot;1\&quot;,\n                \&quot;1\&quot;,\n                \&quot;2\&quot;,\n                \&quot;5\&quot;,\n                \&quot;5\&quot;,\n                \&quot;5\&quot;,\n                \&quot;5\&quot;,\n                \&quot;5\&quot;,\n                \&quot;5\&quot;,\n                \&quot;4\&quot;,\n                \&quot;1\&quot;,\n                \&quot;5\&quot;,\n                \&quot;5\&quot;,\n                \&quot;1\&quot;,\n                \&quot;1\&quot;,\n                \&quot;5\&quot;,\n                \&quot;5\&quot;,\n                \&quot;5\&quot;,\n                \&quot;2\&quot;,\n                \&quot;5\&quot;,\n                \&quot;5\&quot;,\n                \&quot;5\&quot;,\n                \&quot;1\&quot;,\n                \&quot;5\&quot;,\n                \&quot;1\&quot;,\n                \&quot;1\&quot;,\n                \&quot;5\&quot;,\n                \&quot;1\&quot;,\n                \&quot;5\&quot;,\n                \&quot;1\&quot;,\n                \&quot;1\&quot;,\n                \&quot;5\&quot;,\n                \&quot;1\&quot;,\n                \&quot;1\&quot;,\n                \&quot;1\&quot;,\n                \&quot;5\&quot;,\n                \&quot;5\&quot;,\n                \&quot;1\&quot;,\n                \&quot;4\&quot;,\n                \&quot;1\&quot;,\n                \&quot;5\&quot;,\n                \&quot;5\&quot;,\n                \&quot;4\&quot;,\n                \&quot;5\&quot;,\n                \&quot;5\&quot;,\n                \&quot;1\&quot;,\n                \&quot;3\&quot;,\n                \&quot;5\&quot;,\n                \&quot;4\&quot;,\n                \&quot;2\&quot;,\n                \&quot;1\&quot;,\n                \&quot;4\&quot;,\n                \&quot;5\&quot;,\n                \&quot;5\&quot;,\n                \&quot;5\&quot;,\n                \&quot;5\&quot;,\n                \&quot;4\&quot;,\n                \&quot;3\&quot;,\n                \&quot;5\&quot;,\n                \&quot;5\&quot;,\n                \&quot;5\&quot;,\n                \&quot;5\&quot;,\n                \&quot;4\&quot;,\n                \&quot;5\&quot;,\n                \&quot;5\&quot;,\n                \&quot;5\&quot;,\n                \&quot;1\&quot;,\n                \&quot;5\&quot;,\n                \&quot;1\&quot;,\n                \&quot;1\&quot;,\n                \&quot;1\&quot;,\n                \&quot;4\&quot;,\n                \&quot;1\&quot;,\n                \&quot;1\&quot;,\n                \&quot;1\&quot;,\n                \&quot;5\&quot;,\n                \&quot;1\&quot;,\n                \&quot;1\&quot;,\n                \&quot;1\&quot;,\n                \&quot;5\&quot;,\n                \&quot;1\&quot;,\n                \&quot;1\&quot;,\n                \&quot;1\&quot;,\n                \&quot;1\&quot;,\n                \&quot;1\&quot;,\n                \&quot;2\&quot;,\n                \&quot;2\&quot;,\n                \&quot;1\&quot;,\n                \&quot;1\&quot;,\n                \&quot;5\&quot;,\n                \&quot;1\&quot;,\n                \&quot;1\&quot;,\n                \&quot;1\&quot;,\n                \&quot;1\&quot;,\n                \&quot;1\&quot;,\n                \&quot;1\&quot;,\n                \&quot;1\&quot;,\n                \&quot;5\&quot;,\n                \&quot;1\&quot;,\n                \&quot;1\&quot;,\n                \&quot;1\&quot;,\n                \&quot;1\&quot;,\n                \&quot;5\&quot;,\n                \&quot;1\&quot;,\n                \&quot;5\&quot;,\n                \&quot;1\&quot;,\n                \&quot;1\&quot;,\n                \&quot;1\&quot;,\n                \&quot;1\&quot;,\n                \&quot;1\&quot;,\n                \&quot;5\&quot;,\n                \&quot;5\&quot;,\n                \&quot;1\&quot;,\n                \&quot;5\&quot;,\n                \&quot;1\&quot;,\n                \&quot;5\&quot;,\n                \&quot;1\&quot;,\n                \&quot;1\&quot;,\n                \&quot;1\&quot;,\n                \&quot;5\&quot;,\n                \&quot;5\&quot;,\n                \&quot;5\&quot;,\n                \&quot;5\&quot;,\n                \&quot;5\&quot;,\n                \&quot;5\&quot;,\n                \&quot;5\&quot;,\n                \&quot;5\&quot;,\n                \&quot;5\&quot;,\n                \&quot;1\&quot;,\n                \&quot;3\&quot;,\n                \&quot;1\&quot;,\n                \&quot;1\&quot;,\n                \&quot;1\&quot;,\n                \&quot;3\&quot;,\n                \&quot;5\&quot;,\n                \&quot;5\&quot;,\n                \&quot;5\&quot;,\n                \&quot;5\&quot;,\n                \&quot;1\&quot;,\n                \&quot;3\&quot;,\n                \&quot;1\&quot;,\n                \&quot;5\&quot;,\n                \&quot;5\&quot;,\n                \&quot;1\&quot;,\n                \&quot;5\&quot;,\n                \&quot;5\&quot;,\n                \&quot;3\&quot;,\n                \&quot;3\&quot;,\n                \&quot;2\&quot;,\n                \&quot;3\&quot;,\n                \&quot;4\&quot;,\n                \&quot;5\&quot;,\n                \&quot;1\&quot;,\n                \&quot;5\&quot;,\n                \&quot;5\&quot;,\n                \&quot;2\&quot;,\n                \&quot;5\&quot;,\n                \&quot;4\&quot;,\n                \&quot;1\&quot;,\n                \&quot;1\&quot;,\n                \&quot;3\&quot;,\n                \&quot;2\&quot;,\n                \&quot;4\&quot;,\n                \&quot;1\&quot;,\n                \&quot;1\&quot;,\n                \&quot;5\&quot;,\n                \&quot;1\&quot;,\n                \&quot;4\&quot;,\n                \&quot;5\&quot;,\n                \&quot;5\&quot;,\n                \&quot;5\&quot;,\n                \&quot;5\&quot;,\n                \&quot;3\&quot;,\n                \&quot;3\&quot;,\n                \&quot;1\&quot;,\n                \&quot;5\&quot;,\n                \&quot;5\&quot;,\n                \&quot;1\&quot;,\n                \&quot;1\&quot;,\n                \&quot;5\&quot;,\n                \&quot;5\&quot;,\n                \&quot;1\&quot;,\n                \&quot;5\&quot;,\n                \&quot;5\&quot;,\n                \&quot;5\&quot;,\n                \&quot;2\&quot;,\n                \&quot;5\&quot;,\n                \&quot;2\&quot;,\n                \&quot;5\&quot;,\n                \&quot;5\&quot;,\n                \&quot;1\&quot;,\n                \&quot;5\&quot;,\n                \&quot;5\&quot;,\n                \&quot;5\&quot;,\n                \&quot;5\&quot;,\n                \&quot;3\&quot;,\n                \&quot;5\&quot;,\n                \&quot;2\&quot;,\n                \&quot;1\&quot;,\n                \&quot;1\&quot;,\n                \&quot;4\&quot;,\n                \&quot;5\&quot;,\n                \&quot;5\&quot;,\n                \&quot;4\&quot;,\n                \&quot;1\&quot;,\n                \&quot;5\&quot;,\n                \&quot;4\&quot;,\n                \&quot;3\&quot;,\n                \&quot;5\&quot;,\n                \&quot;5\&quot;,\n                \&quot;3\&quot;,\n                \&quot;1\&quot;,\n                \&quot;5\&quot;,\n                \&quot;5\&quot;,\n                \&quot;1\&quot;,\n                \&quot;4\&quot;,\n                \&quot;5\&quot;,\n                \&quot;5\&quot;,\n                \&quot;3\&quot;,\n                \&quot;1\&quot;,\n                \&quot;1\&quot;,\n                \&quot;5\&quot;,\n                \&quot;3\&quot;,\n                \&quot;5\&quot;,\n                \&quot;5\&quot;,\n                \&quot;4\&quot;,\n                \&quot;1\&quot;,\n                \&quot;5\&quot;,\n                \&quot;5\&quot;,\n                \&quot;4\&quot;,\n                \&quot;3\&quot;,\n                \&quot;3\&quot;,\n                \&quot;3\&quot;,\n                \&quot;5\&quot;,\n                \&quot;4\&quot;,\n                \&quot;5\&quot;,\n                \&quot;5\&quot;,\n                \&quot;5\&quot;,\n                \&quot;2\&quot;,\n                \&quot;3\&quot;,\n                \&quot;1\&quot;,\n                \&quot;5\&quot;,\n                \&quot;5\&quot;,\n                \&quot;5\&quot;,\n                \&quot;2\&quot;,\n                \&quot;5\&quot;,\n                \&quot;3\&quot;,\n                \&quot;5\&quot;,\n                \&quot;3\&quot;,\n                \&quot;4\&quot;,\n                \&quot;3\&quot;,\n                \&quot;5\&quot;,\n                \&quot;5\&quot;,\n                \&quot;5\&quot;,\n                \&quot;5\&quot;,\n                \&quot;5\&quot;,\n                \&quot;5\&quot;,\n                \&quot;5\&quot;,\n                \&quot;5\&quot;,\n                \&quot;5\&quot;,\n                \&quot;1\&quot;,\n                \&quot;5\&quot;,\n                \&quot;5\&quot;,\n                \&quot;5\&quot;,\n                \&quot;5\&quot;,\n                \&quot;5\&quot;,\n                \&quot;5\&quot;,\n                \&quot;5\&quot;,\n                \&quot;5\&quot;,\n                \&quot;2\&quot;,\n                \&quot;1\&quot;,\n                \&quot;5\&quot;,\n                \&quot;5\&quot;,\n                \&quot;5\&quot;,\n                \&quot;5\&quot;,\n                \&quot;1\&quot;,\n                \&quot;3\&quot;,\n                \&quot;5\&quot;,\n                \&quot;1\&quot;,\n                \&quot;1\&quot;,\n                \&quot;5\&quot;,\n                \&quot;5\&quot;,\n                \&quot;5\&quot;,\n                \&quot;5\&quot;,\n                \&quot;5\&quot;,\n                \&quot;4\&quot;,\n                \&quot;5\&quot;,\n                \&quot;1\&quot;,\n                \&quot;2\&quot;,\n                \&quot;2\&quot;,\n                \&quot;5\&quot;,\n                \&quot;5\&quot;,\n                \&quot;5\&quot;,\n                \&quot;3\&quot;,\n                \&quot;5\&quot;,\n                \&quot;5\&quot;,\n                \&quot;4\&quot;,\n                \&quot;4\&quot;,\n                \&quot;4\&quot;,\n                \&quot;1\&quot;,\n                \&quot;4\&quot;,\n                \&quot;2\&quot;,\n                \&quot;3\&quot;,\n                \&quot;5\&quot;,\n                \&quot;5\&quot;,\n                \&quot;2\&quot;,\n                \&quot;4\&quot;,\n                \&quot;5\&quot;,\n                \&quot;5\&quot;,\n                \&quot;4\&quot;,\n                \&quot;1\&quot;,\n                \&quot;2\&quot;,\n                \&quot;4\&quot;,\n                \&quot;5\&quot;,\n                \&quot;5\&quot;,\n                \&quot;5\&quot;,\n                \&quot;4\&quot;,\n                \&quot;3\&quot;,\n                \&quot;2\&quot;,\n                \&quot;5\&quot;,\n                \&quot;5\&quot;,\n                \&quot;5\&quot;,\n                \&quot;1\&quot;,\n                \&quot;5\&quot;,\n                \&quot;1\&quot;,\n                \&quot;4\&quot;,\n                \&quot;5\&quot;,\n                \&quot;1\&quot;,\n                \&quot;1\&quot;,\n                \&quot;5\&quot;,\n                \&quot;5\&quot;,\n                \&quot;5\&quot;,\n                \&quot;5\&quot;,\n                \&quot;5\&quot;,\n                \&quot;1\&quot;,\n                \&quot;3\&quot;,\n                \&quot;4\&quot;,\n                \&quot;3\&quot;,\n                \&quot;2\&quot;,\n                \&quot;4\&quot;,\n                \&quot;5\&quot;,\n                \&quot;5\&quot;,\n                \&quot;5\&quot;,\n                \&quot;5\&quot;,\n                \&quot;2\&quot;,\n                \&quot;5\&quot;,\n                \&quot;5\&quot;,\n                \&quot;5\&quot;,\n                \&quot;2\&quot;,\n                \&quot;3\&quot;,\n                \&quot;4\&quot;,\n                \&quot;1\&quot;,\n                \&quot;3\&quot;,\n                \&quot;5\&quot;,\n                \&quot;5\&quot;,\n                \&quot;5\&quot;,\n                \&quot;1\&quot;,\n                \&quot;1\&quot;,\n                \&quot;5\&quot;,\n                \&quot;4\&quot;,\n                \&quot;2\&quot;,\n                \&quot;5\&quot;,\n                \&quot;3\&quot;,\n                \&quot;1\&quot;,\n                \&quot;5\&quot;,\n                \&quot;3\&quot;,\n                \&quot;5\&quot;,\n                \&quot;1\&quot;,\n                \&quot;5\&quot;,\n                \&quot;3\&quot;,\n                \&quot;4\&quot;,\n                \&quot;4\&quot;,\n                \&quot;1\&quot;,\n                \&quot;1\&quot;,\n                \&quot;1\&quot;,\n                \&quot;4\&quot;,\n                \&quot;5\&quot;,\n                \&quot;1\&quot;,\n                \&quot;5\&quot;,\n                \&quot;1\&quot;,\n                \&quot;2\&quot;,\n                \&quot;2\&quot;,\n                \&quot;1\&quot;,\n                \&quot;1\&quot;,\n                \&quot;5\&quot;,\n                \&quot;5\&quot;,\n                \&quot;1\&quot;,\n                \&quot;1\&quot;,\n                \&quot;5\&quot;,\n                \&quot;4\&quot;,\n                \&quot;5\&quot;,\n                \&quot;1\&quot;,\n                \&quot;1\&quot;,\n                \&quot;5\&quot;,\n                \&quot;4\&quot;,\n                \&quot;5\&quot;,\n                \&quot;5\&quot;,\n                \&quot;1\&quot;,\n                \&quot;1\&quot;,\n                \&quot;5\&quot;,\n                \&quot;5\&quot;,\n                \&quot;5\&quot;,\n                \&quot;5\&quot;,\n                \&quot;5\&quot;,\n                \&quot;3\&quot;,\n                \&quot;5\&quot;,\n                \&quot;1\&quot;,\n                \&quot;5\&quot;,\n                \&quot;5\&quot;,\n                \&quot;1\&quot;,\n                \&quot;1\&quot;,\n                \&quot;5\&quot;,\n                \&quot;5\&quot;,\n                \&quot;2\&quot;,\n                \&quot;1\&quot;,\n                \&quot;3\&quot;,\n                \&quot;2\&quot;,\n                \&quot;2\&quot;,\n                \&quot;1\&quot;,\n                \&quot;1\&quot;,\n                \&quot;1\&quot;,\n                \&quot;2\&quot;,\n                \&quot;2\&quot;,\n                \&quot;1\&quot;,\n                \&quot;3\&quot;,\n                \&quot;3\&quot;,\n                \&quot;1\&quot;,\n                \&quot;5\&quot;,\n                \&quot;1\&quot;,\n                \&quot;1\&quot;,\n                \&quot;2\&quot;,\n                \&quot;2\&quot;,\n                \&quot;4\&quot;,\n                \&quot;1\&quot;,\n                \&quot;1\&quot;,\n                \&quot;2\&quot;,\n                \&quot;1\&quot;,\n                \&quot;4\&quot;,\n                \&quot;1\&quot;,\n                \&quot;3\&quot;,\n                \&quot;1\&quot;,\n                \&quot;1\&quot;,\n                \&quot;1\&quot;,\n                \&quot;2\&quot;,\n                \&quot;1\&quot;,\n                \&quot;2\&quot;,\n                \&quot;5\&quot;,\n                \&quot;4\&quot;,\n                \&quot;5\&quot;,\n                \&quot;1\&quot;,\n                \&quot;4\&quot;,\n                \&quot;4\&quot;,\n                \&quot;2\&quot;,\n                \&quot;2\&quot;,\n                \&quot;4\&quot;,\n                \&quot;4\&quot;,\n                \&quot;4\&quot;,\n                \&quot;4\&quot;,\n                \&quot;3\&quot;,\n                \&quot;3\&quot;,\n                \&quot;3\&quot;,\n                \&quot;5\&quot;,\n                \&quot;3\&quot;,\n                \&quot;1\&quot;,\n                \&quot;4\&quot;,\n                \&quot;3\&quot;,\n                \&quot;5\&quot;,\n                \&quot;1\&quot;,\n                \&quot;4\&quot;,\n                \&quot;5\&quot;,\n                \&quot;5\&quot;,\n                \&quot;1\&quot;,\n                \&quot;1\&quot;,\n                \&quot;5\&quot;,\n                \&quot;5\&quot;,\n                \&quot;5\&quot;,\n                \&quot;4\&quot;,\n                \&quot;5\&quot;,\n                \&quot;5\&quot;,\n                \&quot;2\&quot;,\n                \&quot;3\&quot;,\n                \&quot;5\&quot;,\n                \&quot;5\&quot;,\n                \&quot;5\&quot;,\n                \&quot;5\&quot;,\n                \&quot;5\&quot;,\n                \&quot;5\&quot;,\n                \&quot;5\&quot;,\n                \&quot;5\&quot;,\n                \&quot;5\&quot;,\n                \&quot;5\&quot;,\n                \&quot;5\&quot;,\n                \&quot;5\&quot;,\n                \&quot;5\&quot;,\n                \&quot;2\&quot;,\n                \&quot;5\&quot;,\n                \&quot;5\&quot;,\n                \&quot;5\&quot;,\n                \&quot;5\&quot;,\n                \&quot;5\&quot;,\n                \&quot;5\&quot;,\n                \&quot;5\&quot;,\n                \&quot;5\&quot;,\n                \&quot;5\&quot;,\n                \&quot;5\&quot;,\n                \&quot;5\&quot;,\n                \&quot;5\&quot;,\n                \&quot;5\&quot;,\n                \&quot;5\&quot;,\n                \&quot;5\&quot;,\n                \&quot;5\&quot;,\n                \&quot;5\&quot;,\n                \&quot;5\&quot;,\n                \&quot;5\&quot;,\n                \&quot;5\&quot;,\n                \&quot;5\&quot;,\n                \&quot;5\&quot;,\n                \&quot;5\&quot;,\n                \&quot;5\&quot;,\n                \&quot;5\&quot;,\n                \&quot;5\&quot;,\n                \&quot;3\&quot;,\n                \&quot;5\&quot;,\n                \&quot;5\&quot;,\n                \&quot;5\&quot;,\n                \&quot;5\&quot;,\n                \&quot;5\&quot;,\n                \&quot;5\&quot;,\n                \&quot;5\&quot;,\n                \&quot;5\&quot;,\n                \&quot;5\&quot;,\n                \&quot;5\&quot;,\n                \&quot;5\&quot;,\n                \&quot;5\&quot;,\n                \&quot;5\&quot;,\n                \&quot;5\&quot;,\n                \&quot;5\&quot;,\n                \&quot;5\&quot;,\n                \&quot;5\&quot;,\n                \&quot;5\&quot;,\n                \&quot;5\&quot;,\n                \&quot;5\&quot;,\n                \&quot;5\&quot;,\n                \&quot;4\&quot;,\n                \&quot;1\&quot;,\n                \&quot;5\&quot;,\n                \&quot;5\&quot;,\n                \&quot;1\&quot;,\n                \&quot;5\&quot;,\n                \&quot;5\&quot;,\n                \&quot;1\&quot;,\n                \&quot;5\&quot;,\n                \&quot;5\&quot;,\n                \&quot;5\&quot;,\n                \&quot;5\&quot;,\n                \&quot;5\&quot;,\n                \&quot;2\&quot;,\n                \&quot;5\&quot;,\n                \&quot;1\&quot;,\n                \&quot;5\&quot;,\n                \&quot;5\&quot;,\n                \&quot;5\&quot;,\n                \&quot;1\&quot;,\n                \&quot;5\&quot;,\n                \&quot;1\&quot;,\n                \&quot;5\&quot;,\n                \&quot;5\&quot;,\n                \&quot;5\&quot;,\n                \&quot;5\&quot;,\n                \&quot;5\&quot;,\n                \&quot;5\&quot;,\n                \&quot;4\&quot;,\n                \&quot;3\&quot;,\n                \&quot;3\&quot;,\n                \&quot;2\&quot;,\n                \&quot;5\&quot;,\n                \&quot;2\&quot;,\n                \&quot;5\&quot;,\n                \&quot;1\&quot;,\n                \&quot;3\&quot;,\n                \&quot;5\&quot;,\n                \&quot;1\&quot;,\n                \&quot;1\&quot;,\n                \&quot;5\&quot;,\n                \&quot;1\&quot;,\n                \&quot;3\&quot;,\n                \&quot;4\&quot;,\n                \&quot;4\&quot;,\n                \&quot;5\&quot;,\n                \&quot;1\&quot;,\n                \&quot;3\&quot;,\n                \&quot;1\&quot;,\n                \&quot;5\&quot;,\n                \&quot;5\&quot;,\n                \&quot;5\&quot;,\n                \&quot;2\&quot;,\n                \&quot;5\&quot;,\n                \&quot;5\&quot;,\n                \&quot;3\&quot;,\n                \&quot;1\&quot;,\n                \&quot;4\&quot;,\n                \&quot;2\&quot;,\n                \&quot;5\&quot;,\n                \&quot;3\&quot;,\n                \&quot;3\&quot;,\n                \&quot;3\&quot;,\n                \&quot;2\&quot;,\n                \&quot;4\&quot;,\n                \&quot;1\&quot;,\n                \&quot;5\&quot;,\n                \&quot;3\&quot;,\n                \&quot;5\&quot;,\n                \&quot;3\&quot;,\n                \&quot;5\&quot;,\n                \&quot;5\&quot;,\n                \&quot;5\&quot;,\n                \&quot;4\&quot;,\n                \&quot;5\&quot;,\n                \&quot;3\&quot;,\n                \&quot;5\&quot;,\n                \&quot;2\&quot;,\n                \&quot;5\&quot;,\n                \&quot;5\&quot;,\n                \&quot;5\&quot;,\n                \&quot;5\&quot;,\n                \&quot;5\&quot;,\n                \&quot;1\&quot;,\n                \&quot;5\&quot;,\n                \&quot;1\&quot;,\n                \&quot;1\&quot;,\n                \&quot;1\&quot;,\n                \&quot;1\&quot;,\n                \&quot;1\&quot;,\n                \&quot;4\&quot;,\n                \&quot;2\&quot;,\n                \&quot;3\&quot;,\n                \&quot;5\&quot;,\n                \&quot;5\&quot;,\n                \&quot;5\&quot;,\n                \&quot;5\&quot;,\n                \&quot;5\&quot;,\n                \&quot;1\&quot;,\n                \&quot;5\&quot;,\n                \&quot;1\&quot;,\n                \&quot;4\&quot;,\n                \&quot;4\&quot;,\n                \&quot;4\&quot;,\n                \&quot;5\&quot;,\n                \&quot;1\&quot;,\n                \&quot;1\&quot;,\n                \&quot;1\&quot;,\n                \&quot;5\&quot;,\n                \&quot;1\&quot;,\n                \&quot;1\&quot;,\n                \&quot;1\&quot;,\n                \&quot;1\&quot;,\n                \&quot;1\&quot;,\n                \&quot;1\&quot;,\n                \&quot;2\&quot;,\n                \&quot;1\&quot;,\n                \&quot;1\&quot;,\n                \&quot;5\&quot;,\n                \&quot;5\&quot;,\n                \&quot;5\&quot;,\n                \&quot;3\&quot;,\n                \&quot;1\&quot;,\n                \&quot;1\&quot;,\n                \&quot;1\&quot;,\n                \&quot;1\&quot;,\n                \&quot;1\&quot;,\n                \&quot;4\&quot;,\n                \&quot;4\&quot;,\n                \&quot;1\&quot;,\n                \&quot;5\&quot;,\n                \&quot;1\&quot;,\n                \&quot;1\&quot;,\n                \&quot;1\&quot;,\n                \&quot;5\&quot;,\n                \&quot;5\&quot;,\n                \&quot;5\&quot;,\n                \&quot;5\&quot;,\n                \&quot;1\&quot;,\n                \&quot;1\&quot;,\n                \&quot;5\&quot;,\n                \&quot;5\&quot;,\n                \&quot;1\&quot;,\n                \&quot;1\&quot;,\n                \&quot;5\&quot;,\n                \&quot;1\&quot;,\n                \&quot;3\&quot;,\n                \&quot;1\&quot;,\n                \&quot;5\&quot;,\n                \&quot;5\&quot;,\n                \&quot;5\&quot;,\n                \&quot;2\&quot;,\n                \&quot;5\&quot;,\n                \&quot;1\&quot;,\n                \&quot;5\&quot;,\n                \&quot;5\&quot;,\n                \&quot;5\&quot;,\n                \&quot;5\&quot;,\n                \&quot;5\&quot;,\n                \&quot;5\&quot;,\n                \&quot;4\&quot;,\n                \&quot;4\&quot;,\n                \&quot;4\&quot;,\n                \&quot;2\&quot;,\n                \&quot;2\&quot;,\n                \&quot;4\&quot;,\n                \&quot;1\&quot;,\n                \&quot;2\&quot;,\n                \&quot;4\&quot;,\n                \&quot;3\&quot;,\n                \&quot;5\&quot;,\n                \&quot;4\&quot;,\n                \&quot;5\&quot;,\n                \&quot;1\&quot;,\n                \&quot;5\&quot;,\n                \&quot;4\&quot;,\n                \&quot;5\&quot;,\n                \&quot;5\&quot;,\n                \&quot;2\&quot;,\n                \&quot;5\&quot;,\n                \&quot;5\&quot;,\n                \&quot;5\&quot;,\n                \&quot;5\&quot;,\n                \&quot;1\&quot;,\n                \&quot;4\&quot;,\n                \&quot;3\&quot;,\n                \&quot;4\&quot;,\n                \&quot;5\&quot;,\n                \&quot;2\&quot;,\n                \&quot;2\&quot;,\n                \&quot;2\&quot;,\n                \&quot;1\&quot;,\n                \&quot;1\&quot;,\n                \&quot;2\&quot;,\n                \&quot;1\&quot;,\n                \&quot;1\&quot;,\n                \&quot;1\&quot;,\n                \&quot;1\&quot;,\n                \&quot;5\&quot;,\n                \&quot;1\&quot;,\n                \&quot;1\&quot;,\n                \&quot;5\&quot;,\n                \&quot;4\&quot;,\n                \&quot;5\&quot;,\n                \&quot;4\&quot;,\n                \&quot;5\&quot;,\n                \&quot;4\&quot;,\n                \&quot;5\&quot;,\n                \&quot;4\&quot;,\n                \&quot;3\&quot;,\n                \&quot;1\&quot;,\n                \&quot;5\&quot;,\n                \&quot;5\&quot;,\n                \&quot;5\&quot;,\n                \&quot;1\&quot;,\n                \&quot;1\&quot;,\n                \&quot;5\&quot;,\n                \&quot;1\&quot;,\n                \&quot;4\&quot;,\n                \&quot;1\&quot;,\n                \&quot;1\&quot;,\n                \&quot;5\&quot;,\n                \&quot;5\&quot;,\n                \&quot;4\&quot;,\n                \&quot;4\&quot;,\n                \&quot;1\&quot;,\n                \&quot;1\&quot;,\n                \&quot;5\&quot;,\n                \&quot;5\&quot;,\n                \&quot;5\&quot;,\n                \&quot;4\&quot;,\n                \&quot;1\&quot;,\n                \&quot;5\&quot;,\n                \&quot;3\&quot;,\n                \&quot;1\&quot;,\n                \&quot;1\&quot;,\n                \&quot;5\&quot;,\n                \&quot;1\&quot;,\n                \&quot;2\&quot;,\n                \&quot;5\&quot;,\n                \&quot;1\&quot;,\n                \&quot;5\&quot;,\n                \&quot;5\&quot;,\n                \&quot;2\&quot;,\n                \&quot;1\&quot;,\n                \&quot;5\&quot;,\n                \&quot;1\&quot;,\n                \&quot;5\&quot;,\n                \&quot;5\&quot;,\n                \&quot;2\&quot;,\n                \&quot;2\&quot;,\n                \&quot;2\&quot;,\n                \&quot;5\&quot;,\n                \&quot;1\&quot;,\n                \&quot;1\&quot;,\n                \&quot;5\&quot;,\n                \&quot;5\&quot;,\n                \&quot;5\&quot;,\n                \&quot;2\&quot;,\n                \&quot;1\&quot;,\n                \&quot;2\&quot;,\n                \&quot;2\&quot;,\n                \&quot;1\&quot;,\n                \&quot;5\&quot;,\n                \&quot;5\&quot;,\n                \&quot;5\&quot;,\n                \&quot;5\&quot;,\n                \&quot;1\&quot;,\n                \&quot;3\&quot;,\n                \&quot;4\&quot;,\n                \&quot;5\&quot;,\n                \&quot;4\&quot;,\n                \&quot;1\&quot;,\n                \&quot;4\&quot;,\n                \&quot;3\&quot;,\n                \&quot;5\&quot;,\n                \&quot;4\&quot;,\n                \&quot;4\&quot;,\n                \&quot;5\&quot;,\n                \&quot;5\&quot;,\n                \&quot;5\&quot;,\n                \&quot;5\&quot;,\n                \&quot;5\&quot;,\n                \&quot;5\&quot;,\n                \&quot;4\&quot;,\n                \&quot;5\&quot;,\n                \&quot;5\&quot;,\n                \&quot;5\&quot;,\n                \&quot;4\&quot;,\n                \&quot;5\&quot;,\n                \&quot;5\&quot;,\n                \&quot;5\&quot;,\n                \&quot;5\&quot;,\n                \&quot;5\&quot;,\n                \&quot;5\&quot;,\n                \&quot;5\&quot;,\n                \&quot;4\&quot;,\n                \&quot;5\&quot;,\n                \&quot;5\&quot;,\n                \&quot;5\&quot;,\n                \&quot;5\&quot;,\n                \&quot;5\&quot;,\n                \&quot;3\&quot;,\n                \&quot;5\&quot;,\n                \&quot;5\&quot;,\n                \&quot;4\&quot;,\n                \&quot;5\&quot;,\n                \&quot;1\&quot;,\n                \&quot;5\&quot;,\n                \&quot;5\&quot;,\n                \&quot;5\&quot;,\n                \&quot;1\&quot;,\n                \&quot;5\&quot;,\n                \&quot;5\&quot;,\n                \&quot;5\&quot;,\n                \&quot;4\&quot;,\n                \&quot;5\&quot;,\n                \&quot;5\&quot;,\n                \&quot;1\&quot;,\n                \&quot;4\&quot;,\n                \&quot;1\&quot;,\n                \&quot;1\&quot;,\n                \&quot;5\&quot;,\n                \&quot;5\&quot;,\n                \&quot;5\&quot;,\n                \&quot;1\&quot;,\n                \&quot;1\&quot;,\n                \&quot;3\&quot;,\n                \&quot;1\&quot;,\n                \&quot;2\&quot;,\n                \&quot;1\&quot;,\n                \&quot;2\&quot;,\n                \&quot;4\&quot;,\n                \&quot;5\&quot;,\n                \&quot;5\&quot;,\n                \&quot;2\&quot;,\n                \&quot;5\&quot;,\n                \&quot;5\&quot;,\n                \&quot;1\&quot;,\n                \&quot;5\&quot;,\n                \&quot;5\&quot;,\n                \&quot;3\&quot;,\n                \&quot;5\&quot;,\n                \&quot;1\&quot;,\n                \&quot;5\&quot;,\n                \&quot;4\&quot;,\n                \&quot;2\&quot;,\n                \&quot;5\&quot;,\n                \&quot;5\&quot;,\n                \&quot;4\&quot;,\n                \&quot;5\&quot;,\n                \&quot;2\&quot;,\n                \&quot;5\&quot;,\n                \&quot;4\&quot;,\n                \&quot;5\&quot;,\n                \&quot;5\&quot;,\n                \&quot;5\&quot;,\n                \&quot;5\&quot;,\n                \&quot;5\&quot;,\n                \&quot;5\&quot;,\n                \&quot;5\&quot;,\n                \&quot;5\&quot;,\n                \&quot;5\&quot;,\n                \&quot;5\&quot;,\n                \&quot;2\&quot;,\n                \&quot;2\&quot;,\n                \&quot;4\&quot;,\n                \&quot;2\&quot;,\n                \&quot;3\&quot;,\n                \&quot;2\&quot;,\n                \&quot;1\&quot;,\n                \&quot;5\&quot;,\n                \&quot;5\&quot;,\n                \&quot;5\&quot;,\n                \&quot;5\&quot;,\n                \&quot;5\&quot;,\n                \&quot;3\&quot;,\n                \&quot;1\&quot;,\n                \&quot;5\&quot;,\n                \&quot;4\&quot;,\n                \&quot;5\&quot;,\n                \&quot;5\&quot;,\n                \&quot;1\&quot;,\n                \&quot;1\&quot;,\n                \&quot;4\&quot;,\n                \&quot;4\&quot;,\n                \&quot;5\&quot;,\n                \&quot;4\&quot;,\n                \&quot;2\&quot;,\n                \&quot;1\&quot;,\n                \&quot;5\&quot;,\n                \&quot;1\&quot;,\n                \&quot;5\&quot;,\n                \&quot;5\&quot;,\n                \&quot;1\&quot;,\n                \&quot;2\&quot;,\n                \&quot;1\&quot;,\n                \&quot;1\&quot;,\n                \&quot;1\&quot;,\n                \&quot;5\&quot;,\n                \&quot;1\&quot;,\n                \&quot;5\&quot;,\n                \&quot;5\&quot;,\n                \&quot;5\&quot;,\n                \&quot;2\&quot;,\n                \&quot;1\&quot;,\n                \&quot;5\&quot;,\n                \&quot;1\&quot;,\n                \&quot;5\&quot;,\n                \&quot;2\&quot;,\n                \&quot;5\&quot;,\n                \&quot;4\&quot;,\n                \&quot;2\&quot;,\n                \&quot;2\&quot;,\n                \&quot;4\&quot;,\n                \&quot;5\&quot;,\n                \&quot;5\&quot;,\n                \&quot;5\&quot;,\n                \&quot;5\&quot;,\n                \&quot;5\&quot;,\n                \&quot;5\&quot;,\n                \&quot;3\&quot;,\n                \&quot;1\&quot;,\n                \&quot;4\&quot;,\n                \&quot;1\&quot;,\n                \&quot;5\&quot;,\n                \&quot;1\&quot;,\n                \&quot;1\&quot;,\n                \&quot;1\&quot;,\n                \&quot;3\&quot;,\n                \&quot;1\&quot;,\n                \&quot;1\&quot;,\n                \&quot;4\&quot;,\n                \&quot;1\&quot;,\n                \&quot;3\&quot;,\n                \&quot;3\&quot;,\n                \&quot;2\&quot;,\n                \&quot;5\&quot;,\n                \&quot;5\&quot;,\n                \&quot;1\&quot;,\n                \&quot;2\&quot;,\n                \&quot;5\&quot;,\n                \&quot;5\&quot;,\n                \&quot;5\&quot;,\n                \&quot;5\&quot;,\n                \&quot;2\&quot;,\n                \&quot;5\&quot;,\n                \&quot;1\&quot;,\n                \&quot;1\&quot;,\n                \&quot;5\&quot;,\n                \&quot;5\&quot;,\n                \&quot;5\&quot;,\n                \&quot;5\&quot;,\n                \&quot;2\&quot;,\n                \&quot;5\&quot;,\n                \&quot;1\&quot;,\n                \&quot;4\&quot;,\n                \&quot;5\&quot;,\n                \&quot;2\&quot;,\n                \&quot;1\&quot;,\n                \&quot;1\&quot;,\n                \&quot;5\&quot;,\n                \&quot;2\&quot;,\n                \&quot;1\&quot;,\n                \&quot;3\&quot;,\n                \&quot;5\&quot;,\n                \&quot;1\&quot;,\n                \&quot;2\&quot;,\n                \&quot;4\&quot;,\n                \&quot;1\&quot;,\n                \&quot;4\&quot;,\n                \&quot;2\&quot;,\n                \&quot;1\&quot;,\n                \&quot;2\&quot;,\n                \&quot;2\&quot;,\n                \&quot;5\&quot;,\n                \&quot;5\&quot;,\n                \&quot;5\&quot;,\n                \&quot;5\&quot;,\n                \&quot;5\&quot;,\n                \&quot;1\&quot;,\n                \&quot;4\&quot;,\n                \&quot;1\&quot;,\n                \&quot;5\&quot;,\n                \&quot;5\&quot;,\n                \&quot;4\&quot;,\n                \&quot;1\&quot;,\n                \&quot;4\&quot;,\n                \&quot;1\&quot;,\n                \&quot;1\&quot;,\n                \&quot;4\&quot;,\n                \&quot;1\&quot;,\n                \&quot;3\&quot;,\n                \&quot;4\&quot;,\n                \&quot;5\&quot;,\n                \&quot;5\&quot;,\n                \&quot;5\&quot;,\n                \&quot;2\&quot;,\n                \&quot;1\&quot;,\n                \&quot;1\&quot;,\n                \&quot;4\&quot;,\n                \&quot;4\&quot;,\n                \&quot;1\&quot;,\n                \&quot;1\&quot;,\n                \&quot;1\&quot;,\n                \&quot;2\&quot;,\n                \&quot;1\&quot;,\n                \&quot;1\&quot;,\n                \&quot;4\&quot;,\n                \&quot;1\&quot;,\n                \&quot;1\&quot;,\n                \&quot;3\&quot;,\n                \&quot;2\&quot;,\n                \&quot;3\&quot;,\n                \&quot;5\&quot;,\n                \&quot;1\&quot;,\n                \&quot;5\&quot;,\n                \&quot;5\&quot;,\n                \&quot;1\&quot;,\n                \&quot;1\&quot;,\n                \&quot;2\&quot;,\n                \&quot;5\&quot;,\n                \&quot;1\&quot;,\n                \&quot;2\&quot;,\n                \&quot;3\&quot;,\n                \&quot;5\&quot;,\n                \&quot;3\&quot;,\n                \&quot;3\&quot;,\n                \&quot;4\&quot;,\n                \&quot;1\&quot;,\n                \&quot;5\&quot;,\n                \&quot;5\&quot;,\n                \&quot;4\&quot;,\n                \&quot;4\&quot;,\n                \&quot;3\&quot;,\n                \&quot;2\&quot;,\n                \&quot;2\&quot;,\n                \&quot;4\&quot;,\n                \&quot;3\&quot;,\n                \&quot;5\&quot;,\n                \&quot;1\&quot;,\n                \&quot;2\&quot;,\n                \&quot;4\&quot;,\n                \&quot;3\&quot;,\n                \&quot;3\&quot;,\n                \&quot;4\&quot;,\n                \&quot;3\&quot;,\n                \&quot;5\&quot;,\n                \&quot;4\&quot;,\n                \&quot;3\&quot;,\n                \&quot;3\&quot;,\n                \&quot;4\&quot;,\n                \&quot;2\&quot;,\n                \&quot;3\&quot;,\n                \&quot;2\&quot;,\n                \&quot;1\&quot;,\n                \&quot;4\&quot;,\n                \&quot;1\&quot;,\n                \&quot;4\&quot;,\n                \&quot;5\&quot;,\n                \&quot;4\&quot;,\n                \&quot;1\&quot;,\n                \&quot;3\&quot;,\n                \&quot;5\&quot;,\n                \&quot;5\&quot;,\n                \&quot;5\&quot;,\n                \&quot;4\&quot;,\n                \&quot;5\&quot;,\n                \&quot;1\&quot;,\n                \&quot;5\&quot;,\n                \&quot;5\&quot;,\n                \&quot;1\&quot;,\n                \&quot;4\&quot;,\n                \&quot;1\&quot;,\n                \&quot;5\&quot;,\n                \&quot;5\&quot;,\n                \&quot;5\&quot;,\n                \&quot;1\&quot;,\n                \&quot;1\&quot;,\n                \&quot;1\&quot;,\n                \&quot;1\&quot;,\n                \&quot;1\&quot;,\n                \&quot;5\&quot;,\n                \&quot;5\&quot;,\n                \&quot;3\&quot;,\n                \&quot;5\&quot;,\n                \&quot;5\&quot;,\n                \&quot;3\&quot;,\n                \&quot;1\&quot;,\n                \&quot;4\&quot;,\n                \&quot;2\&quot;,\n                \&quot;3\&quot;,\n                \&quot;5\&quot;,\n                \&quot;3\&quot;,\n                \&quot;1\&quot;,\n                \&quot;5\&quot;,\n                \&quot;5\&quot;,\n                \&quot;2\&quot;,\n                \&quot;2\&quot;,\n                \&quot;4\&quot;,\n                \&quot;5\&quot;,\n                \&quot;1\&quot;,\n                \&quot;3\&quot;,\n                \&quot;1\&quot;,\n                \&quot;5\&quot;,\n                \&quot;5\&quot;,\n                \&quot;5\&quot;,\n                \&quot;5\&quot;,\n                \&quot;2\&quot;,\n                \&quot;5\&quot;,\n                \&quot;5\&quot;,\n                \&quot;5\&quot;,\n                \&quot;5\&quot;,\n                \&quot;5\&quot;,\n                \&quot;5\&quot;,\n                \&quot;1\&quot;,\n                \&quot;5\&quot;,\n                \&quot;5\&quot;,\n                \&quot;1\&quot;,\n                \&quot;5\&quot;,\n                \&quot;2\&quot;,\n                \&quot;5\&quot;,\n                \&quot;5\&quot;,\n                \&quot;5\&quot;,\n                \&quot;5\&quot;,\n                \&quot;1\&quot;,\n                \&quot;4\&quot;,\n                \&quot;4\&quot;,\n                \&quot;1\&quot;,\n                \&quot;3\&quot;,\n                \&quot;4\&quot;,\n                \&quot;1\&quot;,\n                \&quot;1\&quot;,\n                \&quot;1\&quot;,\n                \&quot;3\&quot;,\n                \&quot;2\&quot;,\n                \&quot;5\&quot;,\n                \&quot;2\&quot;,\n                \&quot;2\&quot;,\n                \&quot;1\&quot;,\n                \&quot;1\&quot;,\n                \&quot;5\&quot;,\n                \&quot;4\&quot;,\n                \&quot;4\&quot;,\n                \&quot;3\&quot;,\n                \&quot;4\&quot;,\n                \&quot;4\&quot;,\n                \&quot;5\&quot;,\n                \&quot;3\&quot;,\n                \&quot;3\&quot;,\n                \&quot;5\&quot;,\n                \&quot;5\&quot;,\n                \&quot;2\&quot;,\n                \&quot;1\&quot;,\n                \&quot;5\&quot;,\n                \&quot;3\&quot;,\n                \&quot;5\&quot;,\n                \&quot;5\&quot;,\n                \&quot;1\&quot;,\n                \&quot;3\&quot;,\n                \&quot;1\&quot;,\n                \&quot;1\&quot;,\n                \&quot;4\&quot;,\n                \&quot;1\&quot;,\n                \&quot;5\&quot;,\n                \&quot;1\&quot;,\n                \&quot;5\&quot;,\n                \&quot;5\&quot;,\n                \&quot;4\&quot;,\n                \&quot;3\&quot;,\n                \&quot;4\&quot;,\n                \&quot;3\&quot;,\n                \&quot;3\&quot;,\n                \&quot;3\&quot;,\n                \&quot;4\&quot;,\n                \&quot;5\&quot;,\n                \&quot;5\&quot;,\n                \&quot;4\&quot;,\n                \&quot;3\&quot;,\n                \&quot;5\&quot;,\n                \&quot;5\&quot;,\n                \&quot;3\&quot;,\n                \&quot;1\&quot;,\n                \&quot;4\&quot;,\n                \&quot;3\&quot;,\n                \&quot;5\&quot;,\n                \&quot;4\&quot;,\n                \&quot;1\&quot;,\n                \&quot;1\&quot;,\n                \&quot;5\&quot;,\n                \&quot;2\&quot;,\n                \&quot;2\&quot;,\n                \&quot;2\&quot;,\n                \&quot;5\&quot;,\n                \&quot;5\&quot;,\n                \&quot;5\&quot;,\n                \&quot;5\&quot;,\n                \&quot;1\&quot;,\n                \&quot;1\&quot;,\n                \&quot;5\&quot;,\n                \&quot;3\&quot;,\n                \&quot;4\&quot;,\n                \&quot;1\&quot;,\n                \&quot;4\&quot;,\n                \&quot;1\&quot;,\n                \&quot;2\&quot;,\n                \&quot;3\&quot;,\n                \&quot;2\&quot;,\n                \&quot;5\&quot;,\n                \&quot;5\&quot;,\n                \&quot;1\&quot;,\n                \&quot;1\&quot;,\n                \&quot;5\&quot;,\n                \&quot;4\&quot;,\n                \&quot;5\&quot;,\n                \&quot;4\&quot;,\n                \&quot;1\&quot;,\n                \&quot;1\&quot;,\n                \&quot;1\&quot;,\n                \&quot;2\&quot;,\n                \&quot;5\&quot;,\n                \&quot;1\&quot;,\n                \&quot;4\&quot;,\n                \&quot;4\&quot;,\n                \&quot;5\&quot;,\n                \&quot;1\&quot;,\n                \&quot;5\&quot;,\n                \&quot;5\&quot;,\n                \&quot;1\&quot;,\n                \&quot;3\&quot;,\n                \&quot;5\&quot;,\n                \&quot;2\&quot;,\n                \&quot;2\&quot;,\n                \&quot;5\&quot;,\n                \&quot;3\&quot;,\n                \&quot;5\&quot;,\n                \&quot;5\&quot;,\n                \&quot;5\&quot;,\n                \&quot;4\&quot;,\n                \&quot;5\&quot;,\n                \&quot;1\&quot;,\n                \&quot;2\&quot;,\n                \&quot;2\&quot;,\n                \&quot;1\&quot;,\n                \&quot;5\&quot;,\n                \&quot;5\&quot;,\n                \&quot;5\&quot;,\n                \&quot;5\&quot;,\n                \&quot;2\&quot;,\n                \&quot;2\&quot;,\n                \&quot;1\&quot;,\n                \&quot;2\&quot;,\n                \&quot;1\&quot;,\n                \&quot;4\&quot;,\n                \&quot;5\&quot;,\n                \&quot;5\&quot;,\n                \&quot;5\&quot;,\n                \&quot;3\&quot;,\n                \&quot;1\&quot;,\n                \&quot;5\&quot;,\n                \&quot;5\&quot;,\n                \&quot;4\&quot;,\n                \&quot;5\&quot;,\n                \&quot;4\&quot;,\n                \&quot;3\&quot;,\n                \&quot;5\&quot;,\n                \&quot;4\&quot;,\n                \&quot;4\&quot;,\n                \&quot;3\&quot;,\n                \&quot;5\&quot;,\n                \&quot;1\&quot;,\n                \&quot;1\&quot;,\n                \&quot;5\&quot;,\n                \&quot;5\&quot;,\n                \&quot;5\&quot;,\n                \&quot;4\&quot;,\n                \&quot;5\&quot;,\n                \&quot;5\&quot;,\n                \&quot;5\&quot;,\n                \&quot;5\&quot;,\n                \&quot;5\&quot;,\n                \&quot;5\&quot;,\n                \&quot;1\&quot;,\n                \&quot;5\&quot;,\n                \&quot;3\&quot;,\n                \&quot;5\&quot;,\n                \&quot;2\&quot;,\n                \&quot;5\&quot;,\n                \&quot;1\&quot;,\n                \&quot;1\&quot;,\n                \&quot;1\&quot;,\n                \&quot;3\&quot;,\n                \&quot;1\&quot;,\n                \&quot;2\&quot;,\n                \&quot;3\&quot;,\n                \&quot;5\&quot;,\n                \&quot;2\&quot;,\n                \&quot;5\&quot;,\n                \&quot;5\&quot;,\n                \&quot;1\&quot;,\n                \&quot;5\&quot;,\n                \&quot;5\&quot;,\n                \&quot;3\&quot;,\n                \&quot;2\&quot;,\n                \&quot;1\&quot;,\n                \&quot;2\&quot;,\n                \&quot;4\&quot;,\n                \&quot;5\&quot;,\n                \&quot;3\&quot;,\n                \&quot;1\&quot;,\n                \&quot;1\&quot;,\n                \&quot;4\&quot;,\n                \&quot;2\&quot;,\n                \&quot;2\&quot;,\n                \&quot;5\&quot;,\n                \&quot;5\&quot;,\n                \&quot;1\&quot;,\n                \&quot;1\&quot;,\n                \&quot;3\&quot;,\n                \&quot;3\&quot;,\n                \&quot;4\&quot;,\n                \&quot;3\&quot;,\n                \&quot;3\&quot;,\n                \&quot;4\&quot;,\n                \&quot;3\&quot;,\n                \&quot;5\&quot;,\n                \&quot;5\&quot;,\n                \&quot;3\&quot;,\n                \&quot;5\&quot;,\n                \&quot;5\&quot;,\n                \&quot;1\&quot;,\n                \&quot;5\&quot;,\n                \&quot;1\&quot;,\n                \&quot;1\&quot;,\n                \&quot;1\&quot;,\n                \&quot;1\&quot;,\n                \&quot;1\&quot;,\n                \&quot;2\&quot;,\n                \&quot;3\&quot;,\n                \&quot;1\&quot;,\n                \&quot;5\&quot;,\n                \&quot;2\&quot;,\n                \&quot;1\&quot;,\n                \&quot;4\&quot;,\n                \&quot;3\&quot;,\n                \&quot;1\&quot;,\n                \&quot;4\&quot;,\n                \&quot;5\&quot;,\n                \&quot;3\&quot;,\n                \&quot;5\&quot;,\n                \&quot;2\&quot;,\n                \&quot;5\&quot;,\n                \&quot;1\&quot;,\n                \&quot;5\&quot;,\n                \&quot;1\&quot;,\n                \&quot;1\&quot;,\n                \&quot;1\&quot;,\n                \&quot;1\&quot;,\n                \&quot;5\&quot;,\n                \&quot;1\&quot;,\n                \&quot;3\&quot;,\n                \&quot;1\&quot;,\n                \&quot;1\&quot;,\n                \&quot;4\&quot;,\n                \&quot;2\&quot;,\n                \&quot;1\&quot;,\n                \&quot;1\&quot;,\n                \&quot;2\&quot;,\n                \&quot;5\&quot;,\n                \&quot;5\&quot;,\n                \&quot;5\&quot;,\n                \&quot;5\&quot;,\n                \&quot;5\&quot;,\n                \&quot;1\&quot;,\n                \&quot;1\&quot;,\n                \&quot;2\&quot;,\n                \&quot;2\&quot;,\n                \&quot;5\&quot;,\n                \&quot;1\&quot;,\n                \&quot;3\&quot;,\n                \&quot;5\&quot;,\n                \&quot;1\&quot;,\n                \&quot;5\&quot;,\n                \&quot;5\&quot;,\n                \&quot;5\&quot;,\n                \&quot;1\&quot;,\n                \&quot;1\&quot;,\n                \&quot;1\&quot;,\n                \&quot;1\&quot;,\n                \&quot;5\&quot;,\n                \&quot;5\&quot;,\n                \&quot;1\&quot;,\n                \&quot;2\&quot;,\n                \&quot;5\&quot;,\n                \&quot;5\&quot;,\n                \&quot;3\&quot;,\n                \&quot;2\&quot;,\n                \&quot;5\&quot;,\n                \&quot;5\&quot;,\n                \&quot;3\&quot;,\n                \&quot;1\&quot;,\n                \&quot;5\&quot;,\n                \&quot;5\&quot;,\n                \&quot;1\&quot;,\n                \&quot;1\&quot;,\n                \&quot;5\&quot;,\n                \&quot;5\&quot;,\n                \&quot;5\&quot;,\n                \&quot;5\&quot;,\n                \&quot;5\&quot;,\n                \&quot;4\&quot;,\n                \&quot;5\&quot;,\n                \&quot;5\&quot;,\n                \&quot;4\&quot;,\n                \&quot;5\&quot;,\n                \&quot;2\&quot;,\n                \&quot;5\&quot;,\n                \&quot;4\&quot;,\n                \&quot;5\&quot;,\n                \&quot;2\&quot;,\n                \&quot;5\&quot;,\n                \&quot;1\&quot;,\n                \&quot;1\&quot;,\n                \&quot;4\&quot;,\n                \&quot;4\&quot;,\n                \&quot;3\&quot;,\n                \&quot;3\&quot;,\n                \&quot;1\&quot;,\n                \&quot;4\&quot;,\n                \&quot;3\&quot;,\n                \&quot;5\&quot;,\n                \&quot;5\&quot;,\n                \&quot;1\&quot;,\n                \&quot;5\&quot;,\n                \&quot;1\&quot;,\n                \&quot;2\&quot;,\n                \&quot;1\&quot;,\n                \&quot;5\&quot;,\n                \&quot;5\&quot;,\n                \&quot;5\&quot;,\n                \&quot;1\&quot;,\n                \&quot;1\&quot;,\n                \&quot;4\&quot;,\n                \&quot;4\&quot;,\n                \&quot;1\&quot;,\n                \&quot;1\&quot;,\n                \&quot;4\&quot;,\n                \&quot;4\&quot;,\n                \&quot;5\&quot;,\n                \&quot;5\&quot;,\n                \&quot;2\&quot;,\n                \&quot;3\&quot;,\n                \&quot;2\&quot;,\n                \&quot;5\&quot;,\n                \&quot;2\&quot;,\n                \&quot;3\&quot;,\n                \&quot;5\&quot;,\n                \&quot;5\&quot;,\n                \&quot;3\&quot;,\n                \&quot;1\&quot;,\n                \&quot;2\&quot;,\n                \&quot;5\&quot;,\n                \&quot;5\&quot;,\n                \&quot;2\&quot;,\n                \&quot;1\&quot;,\n                \&quot;1\&quot;,\n                \&quot;5\&quot;,\n                \&quot;5\&quot;,\n                \&quot;5\&quot;,\n                \&quot;5\&quot;,\n                \&quot;1\&quot;,\n                \&quot;1\&quot;,\n                \&quot;1\&quot;,\n                \&quot;1\&quot;,\n                \&quot;1\&quot;,\n                \&quot;1\&quot;,\n                \&quot;3\&quot;,\n                \&quot;1\&quot;,\n                \&quot;1\&quot;,\n                \&quot;5\&quot;,\n                \&quot;1\&quot;,\n                \&quot;1\&quot;,\n                \&quot;5\&quot;,\n                \&quot;2\&quot;,\n                \&quot;2\&quot;,\n                \&quot;1\&quot;,\n                \&quot;1\&quot;,\n                \&quot;5\&quot;,\n                \&quot;2\&quot;,\n                \&quot;1\&quot;,\n                \&quot;1\&quot;,\n                \&quot;2\&quot;,\n                \&quot;5\&quot;,\n                \&quot;4\&quot;,\n                \&quot;3\&quot;,\n                \&quot;5\&quot;,\n                \&quot;1\&quot;,\n                \&quot;1\&quot;,\n                \&quot;5\&quot;,\n                \&quot;5\&quot;,\n                \&quot;3\&quot;,\n                \&quot;3\&quot;,\n                \&quot;5\&quot;,\n                \&quot;1\&quot;,\n                \&quot;3\&quot;,\n                \&quot;5\&quot;,\n                \&quot;3\&quot;,\n                \&quot;5\&quot;,\n                \&quot;5\&quot;,\n                \&quot;5\&quot;,\n                \&quot;3\&quot;,\n                \&quot;5\&quot;,\n                \&quot;5\&quot;,\n                \&quot;1\&quot;,\n                \&quot;1\&quot;,\n                \&quot;3\&quot;,\n                \&quot;5\&quot;,\n                \&quot;5\&quot;,\n                \&quot;5\&quot;,\n                \&quot;5\&quot;,\n                \&quot;1\&quot;,\n                \&quot;5\&quot;,\n                \&quot;5\&quot;,\n                \&quot;1\&quot;,\n                \&quot;1\&quot;,\n                \&quot;5\&quot;,\n                \&quot;5\&quot;,\n                \&quot;5\&quot;,\n                \&quot;1\&quot;,\n                \&quot;1\&quot;,\n                \&quot;5\&quot;,\n                \&quot;1\&quot;,\n                \&quot;1\&quot;,\n                \&quot;2\&quot;,\n                \&quot;5\&quot;,\n                \&quot;2\&quot;,\n                \&quot;5\&quot;,\n                \&quot;5\&quot;,\n                \&quot;1\&quot;,\n                \&quot;5\&quot;,\n                \&quot;4\&quot;,\n                \&quot;5\&quot;,\n                \&quot;5\&quot;,\n                \&quot;5\&quot;,\n                \&quot;5\&quot;,\n                \&quot;1\&quot;,\n                \&quot;1\&quot;,\n                \&quot;2\&quot;,\n                \&quot;5\&quot;,\n                \&quot;5\&quot;,\n                \&quot;4\&quot;,\n                \&quot;1\&quot;,\n                \&quot;5\&quot;,\n                \&quot;1\&quot;,\n                \&quot;5\&quot;,\n                \&quot;1\&quot;,\n                \&quot;5\&quot;,\n                \&quot;5\&quot;,\n                \&quot;5\&quot;,\n                \&quot;1\&quot;,\n                \&quot;5\&quot;,\n                \&quot;1\&quot;,\n                \&quot;5\&quot;,\n                \&quot;3\&quot;,\n                \&quot;1\&quot;,\n                \&quot;5\&quot;,\n                \&quot;4\&quot;,\n                \&quot;5\&quot;,\n                \&quot;1\&quot;,\n                \&quot;1\&quot;,\n                \&quot;1\&quot;,\n                \&quot;1\&quot;,\n                \&quot;1\&quot;,\n                \&quot;2\&quot;,\n                \&quot;5\&quot;,\n                \&quot;5\&quot;,\n                \&quot;1\&quot;,\n                \&quot;5\&quot;,\n                \&quot;1\&quot;,\n                \&quot;5\&quot;,\n                \&quot;1\&quot;,\n                \&quot;5\&quot;,\n                \&quot;4\&quot;,\n                \&quot;1\&quot;,\n                \&quot;5\&quot;,\n                \&quot;1\&quot;,\n                \&quot;5\&quot;,\n                \&quot;5\&quot;,\n                \&quot;1\&quot;,\n                \&quot;5\&quot;,\n                \&quot;5\&quot;,\n                \&quot;3\&quot;,\n                \&quot;5\&quot;,\n                \&quot;5\&quot;,\n                \&quot;1\&quot;,\n                \&quot;5\&quot;,\n                \&quot;2\&quot;,\n                \&quot;5\&quot;,\n                \&quot;5\&quot;,\n                \&quot;2\&quot;,\n                \&quot;5\&quot;,\n                \&quot;1\&quot;,\n                \&quot;5\&quot;,\n                \&quot;5\&quot;,\n                \&quot;5\&quot;,\n                \&quot;5\&quot;,\n                \&quot;1\&quot;,\n                \&quot;1\&quot;,\n                \&quot;5\&quot;,\n                \&quot;5\&quot;,\n                \&quot;1\&quot;,\n                \&quot;1\&quot;,\n                \&quot;1\&quot;,\n                \&quot;1\&quot;,\n                \&quot;5\&quot;,\n                \&quot;1\&quot;,\n                \&quot;1\&quot;,\n                \&quot;4\&quot;,\n                \&quot;1\&quot;,\n                \&quot;1\&quot;,\n                \&quot;1\&quot;,\n                \&quot;2\&quot;,\n                \&quot;2\&quot;,\n                \&quot;5\&quot;,\n                \&quot;3\&quot;,\n                \&quot;2\&quot;,\n                \&quot;3\&quot;,\n                \&quot;1\&quot;,\n                \&quot;4\&quot;,\n                \&quot;1\&quot;,\n                \&quot;1\&quot;,\n                \&quot;1\&quot;,\n                \&quot;1\&quot;,\n                \&quot;1\&quot;,\n                \&quot;1\&quot;,\n                \&quot;1\&quot;,\n                \&quot;2\&quot;,\n                \&quot;1\&quot;,\n                \&quot;2\&quot;,\n                \&quot;1\&quot;,\n                \&quot;1\&quot;,\n                \&quot;1\&quot;,\n                \&quot;1\&quot;,\n                \&quot;1\&quot;,\n                \&quot;5\&quot;,\n                \&quot;1\&quot;,\n                \&quot;5\&quot;,\n                \&quot;1\&quot;,\n                \&quot;1\&quot;,\n                \&quot;1\&quot;,\n                \&quot;5\&quot;,\n                \&quot;1\&quot;,\n                \&quot;5\&quot;,\n                \&quot;4\&quot;,\n                \&quot;4\&quot;,\n                \&quot;5\&quot;,\n                \&quot;5\&quot;,\n                \&quot;5\&quot;,\n                \&quot;3\&quot;,\n                \&quot;5\&quot;,\n                \&quot;4\&quot;,\n                \&quot;1\&quot;,\n                \&quot;3\&quot;,\n                \&quot;5\&quot;,\n                \&quot;1\&quot;,\n                \&quot;1\&quot;,\n                \&quot;1\&quot;,\n                \&quot;1\&quot;,\n                \&quot;2\&quot;,\n                \&quot;5\&quot;,\n                \&quot;5\&quot;,\n                \&quot;1\&quot;,\n                \&quot;1\&quot;,\n                \&quot;5\&quot;,\n                \&quot;5\&quot;,\n                \&quot;1\&quot;,\n                \&quot;2\&quot;,\n                \&quot;1\&quot;,\n                \&quot;1\&quot;,\n                \&quot;1\&quot;,\n                \&quot;2\&quot;,\n                \&quot;1\&quot;,\n                \&quot;1\&quot;,\n                \&quot;5\&quot;,\n                \&quot;1\&quot;,\n                \&quot;3\&quot;,\n                \&quot;1\&quot;,\n                \&quot;1\&quot;,\n                \&quot;1\&quot;,\n                \&quot;5\&quot;,\n                \&quot;4\&quot;,\n                \&quot;5\&quot;,\n                \&quot;5\&quot;,\n                \&quot;1\&quot;,\n                \&quot;4\&quot;,\n                \&quot;5\&quot;,\n                \&quot;1\&quot;,\n                \&quot;5\&quot;,\n                \&quot;1\&quot;,\n                \&quot;5\&quot;,\n                \&quot;5\&quot;,\n                \&quot;1\&quot;,\n                \&quot;5\&quot;,\n                \&quot;1\&quot;,\n                \&quot;4\&quot;,\n                \&quot;1\&quot;,\n                \&quot;1\&quot;,\n                \&quot;1\&quot;,\n                \&quot;1\&quot;,\n                \&quot;5\&quot;,\n                \&quot;1\&quot;,\n                \&quot;5\&quot;,\n                \&quot;1\&quot;,\n                \&quot;2\&quot;,\n                \&quot;1\&quot;,\n                \&quot;1\&quot;,\n                \&quot;5\&quot;,\n                \&quot;1\&quot;,\n                \&quot;3\&quot;,\n                \&quot;5\&quot;,\n                \&quot;5\&quot;,\n                \&quot;5\&quot;,\n                \&quot;1\&quot;,\n                \&quot;1\&quot;,\n                \&quot;1\&quot;,\n                \&quot;1\&quot;,\n                \&quot;1\&quot;,\n                \&quot;1\&quot;,\n                \&quot;1\&quot;,\n                \&quot;1\&quot;,\n                \&quot;5\&quot;,\n                \&quot;5\&quot;,\n                \&quot;5\&quot;,\n                \&quot;5\&quot;,\n                \&quot;2\&quot;,\n                \&quot;5\&quot;,\n                \&quot;2\&quot;,\n                \&quot;5\&quot;,\n                \&quot;1\&quot;,\n                \&quot;2\&quot;,\n                \&quot;5\&quot;,\n                \&quot;1\&quot;,\n                \&quot;5\&quot;,\n                \&quot;5\&quot;,\n                \&quot;1\&quot;,\n                \&quot;5\&quot;,\n                \&quot;1\&quot;,\n                \&quot;1\&quot;,\n                \&quot;5\&quot;,\n                \&quot;5\&quot;,\n                \&quot;1\&quot;,\n                \&quot;5\&quot;,\n                \&quot;5\&quot;,\n                \&quot;5\&quot;,\n                \&quot;1\&quot;,\n                \&quot;5\&quot;,\n                \&quot;1\&quot;,\n                \&quot;1\&quot;,\n                \&quot;1\&quot;,\n                \&quot;5\&quot;,\n                \&quot;1\&quot;,\n                \&quot;5\&quot;,\n                \&quot;3\&quot;,\n                \&quot;5\&quot;,\n                \&quot;5\&quot;,\n                \&quot;4\&quot;,\n                \&quot;2\&quot;,\n                \&quot;1\&quot;,\n                \&quot;5\&quot;,\n                \&quot;5\&quot;,\n                \&quot;5\&quot;,\n                \&quot;5\&quot;,\n                \&quot;1\&quot;,\n                \&quot;3\&quot;,\n                \&quot;4\&quot;,\n                \&quot;5\&quot;,\n                \&quot;1\&quot;,\n                \&quot;5\&quot;,\n                \&quot;5\&quot;,\n                \&quot;5\&quot;,\n                \&quot;1\&quot;,\n                \&quot;3\&quot;,\n                \&quot;2\&quot;,\n                \&quot;5\&quot;,\n                \&quot;5\&quot;,\n                \&quot;5\&quot;,\n                \&quot;1\&quot;,\n                \&quot;5\&quot;,\n                \&quot;3\&quot;,\n                \&quot;5\&quot;,\n                \&quot;5\&quot;,\n                \&quot;1\&quot;,\n                \&quot;4\&quot;,\n                \&quot;2\&quot;,\n                \&quot;5\&quot;,\n                \&quot;4\&quot;,\n                \&quot;3\&quot;,\n                \&quot;5\&quot;,\n                \&quot;1\&quot;,\n                \&quot;5\&quot;,\n                \&quot;5\&quot;,\n                \&quot;3\&quot;,\n                \&quot;1\&quot;,\n                \&quot;4\&quot;,\n                \&quot;1\&quot;,\n                \&quot;4\&quot;,\n                \&quot;2\&quot;,\n                \&quot;3\&quot;,\n                \&quot;2\&quot;,\n                \&quot;3\&quot;,\n                \&quot;2\&quot;,\n                \&quot;5\&quot;,\n                \&quot;3\&quot;,\n                \&quot;2\&quot;,\n                \&quot;2\&quot;,\n                \&quot;5\&quot;,\n                \&quot;3\&quot;,\n                \&quot;1\&quot;,\n                \&quot;3\&quot;,\n                \&quot;4\&quot;,\n                \&quot;2\&quot;,\n                \&quot;3\&quot;,\n                \&quot;5\&quot;,\n                \&quot;4\&quot;,\n                \&quot;5\&quot;,\n                \&quot;4\&quot;,\n                \&quot;4\&quot;,\n                \&quot;1\&quot;,\n                \&quot;4\&quot;,\n                \&quot;5\&quot;,\n                \&quot;1\&quot;,\n                \&quot;1\&quot;,\n                \&quot;2\&quot;,\n                \&quot;3\&quot;,\n                \&quot;2\&quot;,\n                \&quot;3\&quot;,\n                \&quot;2\&quot;,\n                \&quot;2\&quot;,\n                \&quot;1\&quot;,\n                \&quot;3\&quot;,\n                \&quot;1\&quot;,\n                \&quot;1\&quot;,\n                \&quot;1\&quot;,\n                \&quot;4\&quot;,\n                \&quot;3\&quot;,\n                \&quot;5\&quot;,\n                \&quot;5\&quot;,\n                \&quot;1\&quot;,\n                \&quot;2\&quot;,\n                \&quot;5\&quot;,\n                \&quot;4\&quot;,\n                \&quot;1\&quot;,\n                \&quot;5\&quot;,\n                \&quot;2\&quot;,\n                \&quot;5\&quot;,\n                \&quot;1\&quot;,\n                \&quot;5\&quot;,\n                \&quot;1\&quot;,\n                \&quot;1\&quot;,\n                \&quot;1\&quot;,\n                \&quot;2\&quot;,\n                \&quot;5\&quot;,\n                \&quot;5\&quot;,\n                \&quot;1\&quot;,\n                \&quot;5\&quot;,\n                \&quot;1\&quot;,\n                \&quot;1\&quot;,\n                \&quot;1\&quot;,\n                \&quot;2\&quot;,\n                \&quot;1\&quot;,\n                \&quot;1\&quot;,\n                \&quot;1\&quot;,\n                \&quot;2\&quot;,\n                \&quot;1\&quot;,\n                \&quot;5\&quot;,\n                \&quot;1\&quot;,\n                \&quot;1\&quot;,\n                \&quot;4\&quot;,\n                \&quot;3\&quot;,\n                \&quot;3\&quot;,\n                \&quot;5\&quot;,\n                \&quot;1\&quot;,\n                \&quot;5\&quot;,\n                \&quot;1\&quot;,\n                \&quot;1\&quot;,\n                \&quot;4\&quot;,\n                \&quot;5\&quot;,\n                \&quot;2\&quot;,\n                \&quot;2\&quot;,\n                \&quot;1\&quot;,\n                \&quot;3\&quot;,\n                \&quot;4\&quot;,\n                \&quot;5\&quot;,\n                \&quot;5\&quot;,\n                \&quot;5\&quot;,\n                \&quot;5\&quot;,\n                \&quot;1\&quot;,\n                \&quot;2\&quot;,\n                \&quot;1\&quot;,\n                \&quot;4\&quot;,\n                \&quot;1\&quot;,\n                \&quot;3\&quot;,\n                \&quot;5\&quot;,\n                \&quot;5\&quot;,\n                \&quot;5\&quot;,\n                \&quot;5\&quot;,\n                \&quot;5\&quot;,\n                \&quot;5\&quot;,\n                \&quot;5\&quot;,\n                \&quot;1\&quot;,\n                \&quot;2\&quot;,\n                \&quot;5\&quot;,\n                \&quot;1\&quot;,\n                \&quot;1\&quot;,\n                \&quot;5\&quot;,\n                \&quot;1\&quot;,\n                \&quot;5\&quot;,\n                \&quot;1\&quot;,\n                \&quot;5\&quot;,\n                \&quot;4\&quot;,\n                \&quot;1\&quot;,\n                \&quot;5\&quot;,\n                \&quot;1\&quot;,\n                \&quot;5\&quot;,\n                \&quot;3\&quot;,\n                \&quot;1\&quot;,\n                \&quot;1\&quot;,\n                \&quot;4\&quot;,\n                \&quot;5\&quot;,\n                \&quot;1\&quot;,\n                \&quot;5\&quot;,\n                \&quot;2\&quot;,\n                \&quot;1\&quot;,\n                \&quot;1\&quot;,\n                \&quot;5\&quot;,\n                \&quot;1\&quot;,\n                \&quot;1\&quot;,\n                \&quot;1\&quot;,\n                \&quot;1\&quot;,\n                \&quot;1\&quot;,\n                \&quot;1\&quot;,\n                \&quot;5\&quot;,\n                \&quot;5\&quot;,\n                \&quot;2\&quot;,\n                \&quot;5\&quot;,\n                \&quot;1\&quot;,\n                \&quot;5\&quot;,\n                \&quot;1\&quot;,\n                \&quot;1\&quot;,\n                \&quot;5\&quot;,\n                \&quot;5\&quot;,\n                \&quot;1\&quot;,\n                \&quot;1\&quot;,\n                \&quot;5\&quot;,\n                \&quot;1\&quot;,\n                \&quot;5\&quot;,\n                \&quot;1\&quot;,\n                \&quot;1\&quot;,\n                \&quot;5\&quot;,\n                \&quot;1\&quot;,\n                \&quot;1\&quot;,\n                \&quot;4\&quot;,\n                \&quot;5\&quot;,\n                \&quot;5\&quot;,\n                \&quot;3\&quot;,\n                \&quot;3\&quot;,\n                \&quot;2\&quot;,\n                \&quot;3\&quot;,\n                \&quot;1\&quot;,\n                \&quot;5\&quot;,\n                \&quot;2\&quot;,\n                \&quot;2\&quot;,\n                \&quot;3\&quot;,\n                \&quot;2\&quot;,\n                \&quot;3\&quot;,\n                \&quot;5\&quot;,\n                \&quot;4\&quot;,\n                \&quot;5\&quot;,\n                \&quot;1\&quot;,\n                \&quot;1\&quot;,\n                \&quot;5\&quot;,\n                \&quot;1\&quot;,\n                \&quot;5\&quot;,\n                \&quot;1\&quot;,\n                \&quot;5\&quot;,\n                \&quot;1\&quot;,\n                \&quot;5\&quot;,\n                \&quot;1\&quot;,\n                \&quot;3\&quot;,\n                \&quot;1\&quot;,\n                \&quot;5\&quot;,\n                \&quot;5\&quot;,\n                \&quot;3\&quot;,\n                \&quot;1\&quot;,\n                \&quot;3\&quot;,\n                \&quot;5\&quot;,\n                \&quot;5\&quot;,\n                \&quot;5\&quot;,\n                \&quot;5\&quot;,\n                \&quot;1\&quot;,\n                \&quot;5\&quot;,\n                \&quot;1\&quot;,\n                \&quot;1\&quot;,\n                \&quot;1\&quot;,\n                \&quot;5\&quot;,\n                \&quot;1\&quot;,\n                \&quot;1\&quot;,\n                \&quot;5\&quot;,\n                \&quot;1\&quot;,\n                \&quot;5\&quot;,\n                \&quot;5\&quot;,\n                \&quot;1\&quot;,\n                \&quot;1\&quot;,\n                \&quot;1\&quot;,\n                \&quot;1\&quot;,\n                \&quot;1\&quot;,\n                \&quot;3\&quot;,\n                \&quot;1\&quot;,\n                \&quot;4\&quot;,\n                \&quot;4\&quot;,\n                \&quot;1\&quot;,\n                \&quot;1\&quot;,\n                \&quot;1\&quot;,\n                \&quot;5\&quot;,\n                \&quot;5\&quot;,\n                \&quot;5\&quot;,\n                \&quot;5\&quot;,\n                \&quot;5\&quot;,\n                \&quot;5\&quot;,\n                \&quot;5\&quot;,\n                \&quot;5\&quot;,\n                \&quot;5\&quot;,\n                \&quot;5\&quot;,\n                \&quot;5\&quot;,\n                \&quot;5\&quot;,\n                \&quot;5\&quot;,\n                \&quot;5\&quot;,\n                \&quot;5\&quot;,\n                \&quot;5\&quot;,\n                \&quot;5\&quot;,\n                \&quot;5\&quot;,\n                \&quot;5\&quot;,\n                \&quot;5\&quot;,\n                \&quot;5\&quot;,\n                \&quot;5\&quot;,\n                \&quot;5\&quot;,\n                \&quot;5\&quot;,\n                \&quot;5\&quot;,\n                \&quot;5\&quot;,\n                \&quot;5\&quot;,\n                \&quot;5\&quot;,\n                \&quot;5\&quot;,\n                \&quot;4\&quot;,\n                \&quot;5\&quot;,\n                \&quot;1\&quot;,\n                \&quot;5\&quot;,\n                \&quot;5\&quot;,\n                \&quot;5\&quot;,\n                \&quot;5\&quot;,\n                \&quot;5\&quot;,\n                \&quot;5\&quot;,\n                \&quot;5\&quot;,\n                \&quot;5\&quot;,\n                \&quot;5\&quot;,\n                \&quot;2\&quot;,\n                \&quot;5\&quot;,\n                \&quot;5\&quot;,\n                \&quot;5\&quot;,\n                \&quot;5\&quot;,\n                \&quot;5\&quot;,\n                \&quot;5\&quot;,\n                \&quot;5\&quot;,\n                \&quot;5\&quot;,\n                \&quot;5\&quot;,\n                \&quot;5\&quot;,\n                \&quot;5\&quot;,\n                \&quot;5\&quot;,\n                \&quot;5\&quot;,\n                \&quot;5\&quot;,\n                \&quot;5\&quot;,\n                \&quot;5\&quot;,\n                \&quot;5\&quot;,\n                \&quot;5\&quot;,\n                \&quot;5\&quot;,\n                \&quot;5\&quot;,\n                \&quot;5\&quot;,\n                \&quot;5\&quot;,\n                \&quot;5\&quot;,\n                \&quot;5\&quot;,\n                \&quot;5\&quot;,\n                \&quot;5\&quot;,\n                \&quot;5\&quot;,\n                \&quot;5\&quot;,\n                \&quot;5\&quot;,\n                \&quot;5\&quot;,\n                \&quot;5\&quot;,\n                \&quot;5\&quot;,\n                \&quot;5\&quot;,\n                \&quot;5\&quot;,\n                \&quot;5\&quot;,\n                \&quot;5\&quot;,\n                \&quot;5\&quot;,\n                \&quot;5\&quot;,\n                \&quot;5\&quot;,\n                \&quot;5\&quot;,\n                \&quot;5\&quot;,\n                \&quot;5\&quot;,\n                \&quot;5\&quot;,\n                \&quot;3\&quot;,\n                \&quot;5\&quot;,\n                \&quot;5\&quot;,\n                \&quot;5\&quot;,\n                \&quot;1\&quot;,\n                \&quot;5\&quot;,\n                \&quot;5\&quot;,\n                \&quot;5\&quot;,\n                \&quot;5\&quot;,\n                \&quot;2\&quot;,\n                \&quot;2\&quot;,\n                \&quot;5\&quot;,\n                \&quot;2\&quot;,\n                \&quot;2\&quot;,\n                \&quot;5\&quot;,\n                \&quot;3\&quot;,\n                \&quot;1\&quot;,\n                \&quot;5\&quot;,\n                \&quot;1\&quot;,\n                \&quot;2\&quot;,\n                \&quot;4\&quot;,\n                \&quot;1\&quot;,\n                \&quot;5\&quot;,\n                \&quot;5\&quot;,\n                \&quot;5\&quot;,\n                \&quot;5\&quot;,\n                \&quot;5\&quot;,\n                \&quot;5\&quot;,\n                \&quot;5\&quot;,\n                \&quot;5\&quot;,\n                \&quot;5\&quot;,\n                \&quot;5\&quot;,\n                \&quot;5\&quot;,\n                \&quot;1\&quot;,\n                \&quot;1\&quot;,\n                \&quot;5\&quot;,\n                \&quot;2\&quot;,\n                \&quot;5\&quot;,\n                \&quot;1\&quot;,\n                \&quot;5\&quot;,\n                \&quot;1\&quot;,\n                \&quot;3\&quot;,\n                \&quot;5\&quot;,\n                \&quot;5\&quot;,\n                \&quot;2\&quot;,\n                \&quot;5\&quot;,\n                \&quot;5\&quot;,\n                \&quot;1\&quot;,\n                \&quot;1\&quot;,\n                \&quot;3\&quot;,\n                \&quot;1\&quot;,\n                \&quot;1\&quot;,\n                \&quot;5\&quot;,\n                \&quot;1\&quot;,\n                \&quot;4\&quot;,\n                \&quot;2\&quot;,\n                \&quot;1\&quot;,\n                \&quot;5\&quot;,\n                \&quot;5\&quot;,\n                \&quot;5\&quot;,\n                \&quot;4\&quot;,\n                \&quot;4\&quot;,\n                \&quot;1\&quot;,\n                \&quot;4\&quot;,\n                \&quot;1\&quot;,\n                \&quot;3\&quot;,\n                \&quot;1\&quot;,\n                \&quot;2\&quot;,\n                \&quot;3\&quot;,\n                \&quot;1\&quot;,\n                \&quot;2\&quot;,\n                \&quot;1\&quot;,\n                \&quot;5\&quot;,\n                \&quot;1\&quot;,\n                \&quot;3\&quot;,\n                \&quot;4\&quot;,\n                \&quot;5\&quot;,\n                \&quot;2\&quot;,\n                \&quot;5\&quot;,\n                \&quot;3\&quot;,\n                \&quot;5\&quot;,\n                \&quot;5\&quot;,\n                \&quot;4\&quot;,\n                \&quot;5\&quot;,\n                \&quot;5\&quot;,\n                \&quot;3\&quot;,\n                \&quot;4\&quot;,\n                \&quot;5\&quot;,\n                \&quot;3\&quot;,\n                \&quot;5\&quot;,\n                \&quot;5\&quot;,\n                \&quot;5\&quot;,\n                \&quot;1\&quot;,\n                \&quot;2\&quot;,\n                \&quot;1\&quot;,\n                \&quot;1\&quot;,\n                \&quot;1\&quot;,\n                \&quot;1\&quot;,\n                \&quot;5\&quot;,\n                \&quot;1\&quot;,\n                \&quot;5\&quot;,\n                \&quot;1\&quot;,\n                \&quot;1\&quot;,\n                \&quot;1\&quot;,\n                \&quot;1\&quot;,\n                \&quot;4\&quot;,\n                \&quot;1\&quot;,\n                \&quot;1\&quot;,\n                \&quot;1\&quot;,\n                \&quot;5\&quot;,\n                \&quot;5\&quot;,\n                \&quot;5\&quot;,\n                \&quot;5\&quot;,\n                \&quot;5\&quot;,\n                \&quot;4\&quot;,\n                \&quot;3\&quot;,\n                \&quot;5\&quot;,\n                \&quot;4\&quot;,\n                \&quot;4\&quot;,\n                \&quot;4\&quot;,\n                \&quot;2\&quot;,\n                \&quot;5\&quot;,\n                \&quot;5\&quot;,\n                \&quot;1\&quot;,\n                \&quot;5\&quot;,\n                \&quot;4\&quot;,\n                \&quot;5\&quot;,\n                \&quot;4\&quot;,\n                \&quot;5\&quot;,\n                \&quot;5\&quot;,\n                \&quot;4\&quot;,\n                \&quot;4\&quot;,\n                \&quot;5\&quot;,\n                \&quot;5\&quot;,\n                \&quot;4\&quot;,\n                \&quot;1\&quot;,\n                \&quot;1\&quot;,\n                \&quot;1\&quot;,\n                \&quot;1\&quot;,\n                \&quot;4\&quot;,\n                \&quot;3\&quot;,\n                \&quot;1\&quot;,\n                \&quot;2\&quot;,\n                \&quot;4\&quot;,\n                \&quot;5\&quot;,\n                \&quot;1\&quot;,\n                \&quot;3\&quot;,\n                \&quot;2\&quot;,\n                \&quot;5\&quot;,\n                \&quot;5\&quot;,\n                \&quot;1\&quot;,\n                \&quot;5\&quot;,\n                \&quot;5\&quot;,\n                \&quot;5\&quot;,\n                \&quot;5\&quot;,\n                \&quot;5\&quot;,\n                \&quot;1\&quot;,\n                \&quot;3\&quot;,\n                \&quot;5\&quot;,\n                \&quot;1\&quot;,\n                \&quot;1\&quot;,\n                \&quot;5\&quot;,\n                \&quot;3\&quot;,\n                \&quot;5\&quot;,\n                \&quot;1\&quot;,\n                \&quot;5\&quot;,\n                \&quot;1\&quot;,\n                \&quot;5\&quot;,\n                \&quot;3\&quot;,\n                \&quot;2\&quot;,\n                \&quot;5\&quot;,\n                \&quot;2\&quot;,\n                \&quot;5\&quot;,\n                \&quot;4\&quot;,\n                \&quot;1\&quot;,\n                \&quot;5\&quot;,\n                \&quot;1\&quot;,\n                \&quot;1\&quot;,\n                \&quot;1\&quot;,\n                \&quot;3\&quot;,\n                \&quot;1\&quot;,\n                \&quot;5\&quot;,\n                \&quot;5\&quot;,\n                \&quot;1\&quot;,\n                \&quot;3\&quot;,\n                \&quot;5\&quot;,\n                \&quot;1\&quot;,\n                \&quot;1\&quot;,\n                \&quot;2\&quot;,\n                \&quot;1\&quot;,\n                \&quot;4\&quot;,\n                \&quot;1\&quot;,\n                \&quot;3\&quot;,\n                \&quot;4\&quot;,\n                \&quot;5\&quot;,\n                \&quot;1\&quot;,\n                \&quot;2\&quot;,\n                \&quot;1\&quot;,\n                \&quot;2\&quot;,\n                \&quot;1\&quot;,\n                \&quot;1\&quot;,\n                \&quot;1\&quot;,\n                \&quot;1\&quot;,\n                \&quot;1\&quot;,\n                \&quot;1\&quot;,\n                \&quot;5\&quot;,\n                \&quot;1\&quot;,\n                \&quot;1\&quot;,\n                \&quot;1\&quot;,\n                \&quot;1\&quot;,\n                \&quot;2\&quot;,\n                \&quot;1\&quot;,\n                \&quot;1\&quot;,\n                \&quot;3\&quot;,\n                \&quot;5\&quot;,\n                \&quot;1\&quot;,\n                \&quot;2\&quot;,\n                \&quot;2\&quot;,\n                \&quot;1\&quot;,\n                \&quot;3\&quot;,\n                \&quot;4\&quot;,\n                \&quot;5\&quot;,\n                \&quot;3\&quot;,\n                \&quot;4\&quot;,\n                \&quot;4\&quot;,\n                \&quot;2\&quot;,\n                \&quot;4\&quot;,\n                \&quot;4\&quot;,\n                \&quot;1\&quot;,\n                \&quot;1\&quot;,\n                \&quot;2\&quot;,\n                \&quot;3\&quot;,\n                \&quot;1\&quot;,\n                \&quot;1\&quot;,\n                \&quot;1\&quot;,\n                \&quot;4\&quot;,\n                \&quot;1\&quot;,\n                \&quot;3\&quot;,\n                \&quot;1\&quot;,\n                \&quot;5\&quot;,\n                \&quot;5\&quot;,\n                \&quot;5\&quot;,\n                \&quot;5\&quot;,\n                \&quot;5\&quot;,\n                \&quot;5\&quot;,\n                \&quot;5\&quot;,\n                \&quot;4\&quot;,\n                \&quot;4\&quot;,\n                \&quot;3\&quot;,\n                \&quot;3\&quot;,\n                \&quot;3\&quot;,\n                \&quot;3\&quot;,\n                \&quot;5\&quot;,\n                \&quot;5\&quot;,\n                \&quot;5\&quot;,\n                \&quot;5\&quot;,\n                \&quot;5\&quot;,\n                \&quot;4\&quot;,\n                \&quot;5\&quot;,\n                \&quot;5\&quot;,\n                \&quot;1\&quot;,\n                \&quot;5\&quot;,\n                \&quot;1\&quot;,\n                \&quot;2\&quot;,\n                \&quot;3\&quot;,\n                \&quot;3\&quot;,\n                \&quot;4\&quot;,\n                \&quot;5\&quot;,\n                \&quot;5\&quot;,\n                \&quot;5\&quot;,\n                \&quot;1\&quot;,\n                \&quot;5\&quot;,\n                \&quot;4\&quot;,\n                \&quot;1\&quot;,\n                \&quot;1\&quot;,\n                \&quot;2\&quot;,\n                \&quot;1\&quot;,\n                \&quot;4\&quot;,\n                \&quot;4\&quot;,\n                \&quot;1\&quot;,\n                \&quot;1\&quot;,\n                \&quot;2\&quot;,\n                \&quot;1\&quot;,\n                \&quot;1\&quot;,\n                \&quot;5\&quot;,\n                \&quot;4\&quot;,\n                \&quot;1\&quot;,\n                \&quot;1\&quot;,\n                \&quot;1\&quot;,\n                \&quot;1\&quot;,\n                \&quot;1\&quot;,\n                \&quot;5\&quot;,\n                \&quot;5\&quot;,\n                \&quot;4\&quot;,\n                \&quot;2\&quot;,\n                \&quot;4\&quot;,\n                \&quot;1\&quot;,\n                \&quot;2\&quot;,\n                \&quot;1\&quot;,\n                \&quot;5\&quot;,\n                \&quot;5\&quot;,\n                \&quot;5\&quot;,\n                \&quot;1\&quot;,\n                \&quot;3\&quot;,\n                \&quot;1\&quot;,\n                \&quot;1\&quot;,\n                \&quot;3\&quot;,\n                \&quot;1\&quot;,\n                \&quot;3\&quot;,\n                \&quot;5\&quot;,\n                \&quot;2\&quot;,\n                \&quot;4\&quot;,\n                \&quot;5\&quot;,\n                \&quot;1\&quot;,\n                \&quot;2\&quot;,\n                \&quot;5\&quot;,\n                \&quot;3\&quot;,\n                \&quot;1\&quot;,\n                \&quot;2\&quot;,\n                \&quot;5\&quot;,\n                \&quot;1\&quot;,\n                \&quot;5\&quot;,\n                \&quot;1\&quot;,\n                \&quot;1\&quot;,\n                \&quot;1\&quot;,\n                \&quot;5\&quot;,\n                \&quot;1\&quot;,\n                \&quot;5\&quot;,\n                \&quot;3\&quot;,\n                \&quot;1\&quot;,\n                \&quot;4\&quot;,\n                \&quot;1\&quot;,\n                \&quot;5\&quot;,\n                \&quot;1\&quot;,\n                \&quot;5\&quot;,\n                \&quot;2\&quot;,\n                \&quot;2\&quot;,\n                \&quot;5\&quot;,\n                \&quot;1\&quot;,\n                \&quot;5\&quot;,\n                \&quot;1\&quot;,\n                \&quot;1\&quot;,\n                \&quot;5\&quot;,\n                \&quot;5\&quot;,\n                \&quot;1\&quot;,\n                \&quot;3\&quot;,\n                \&quot;1\&quot;,\n                \&quot;2\&quot;,\n                \&quot;1\&quot;,\n                \&quot;2\&quot;,\n                \&quot;1\&quot;,\n                \&quot;2\&quot;,\n                \&quot;2\&quot;,\n                \&quot;3\&quot;,\n                \&quot;1\&quot;,\n                \&quot;4\&quot;,\n                \&quot;1\&quot;,\n                \&quot;5\&quot;,\n                \&quot;5\&quot;,\n                \&quot;5\&quot;,\n                \&quot;5\&quot;,\n                \&quot;1\&quot;,\n                \&quot;5\&quot;,\n                \&quot;3\&quot;,\n                \&quot;5\&quot;,\n                \&quot;4\&quot;,\n                \&quot;5\&quot;,\n                \&quot;1\&quot;,\n                \&quot;1\&quot;,\n                \&quot;1\&quot;,\n                \&quot;1\&quot;,\n                \&quot;1\&quot;,\n                \&quot;1\&quot;,\n                \&quot;5\&quot;,\n                \&quot;1\&quot;,\n                \&quot;1\&quot;,\n                \&quot;5\&quot;,\n                \&quot;3\&quot;,\n                \&quot;5\&quot;,\n                \&quot;5\&quot;,\n                \&quot;5\&quot;,\n                \&quot;2\&quot;,\n                \&quot;4\&quot;,\n                \&quot;4\&quot;,\n                \&quot;4\&quot;,\n                \&quot;5\&quot;,\n                \&quot;1\&quot;,\n                \&quot;1\&quot;,\n                \&quot;1\&quot;,\n                \&quot;1\&quot;,\n                \&quot;1\&quot;,\n                \&quot;1\&quot;,\n                \&quot;1\&quot;,\n                \&quot;1\&quot;,\n                \&quot;1\&quot;,\n                \&quot;1\&quot;,\n                \&quot;1\&quot;,\n                \&quot;4\&quot;,\n                \&quot;1\&quot;,\n                \&quot;1\&quot;,\n                \&quot;1\&quot;,\n                \&quot;1\&quot;,\n                \&quot;1\&quot;,\n                \&quot;1\&quot;,\n                \&quot;1\&quot;,\n                \&quot;4\&quot;,\n                \&quot;3\&quot;,\n                \&quot;1\&quot;,\n                \&quot;3\&quot;,\n                \&quot;4\&quot;,\n                \&quot;3\&quot;,\n                \&quot;2\&quot;,\n                \&quot;5\&quot;,\n                \&quot;2\&quot;,\n                \&quot;1\&quot;,\n                \&quot;5\&quot;,\n                \&quot;4\&quot;,\n                \&quot;2\&quot;,\n                \&quot;1\&quot;,\n                \&quot;5\&quot;,\n                \&quot;5\&quot;,\n                \&quot;5\&quot;,\n                \&quot;3\&quot;,\n                \&quot;3\&quot;,\n                \&quot;3\&quot;,\n                \&quot;4\&quot;,\n                \&quot;4\&quot;,\n                \&quot;3\&quot;,\n                \&quot;5\&quot;,\n                \&quot;1\&quot;,\n                \&quot;4\&quot;,\n                \&quot;1\&quot;,\n                \&quot;2\&quot;,\n                \&quot;3\&quot;,\n                \&quot;1\&quot;,\n                \&quot;3\&quot;,\n                \&quot;2\&quot;,\n                \&quot;4\&quot;,\n                \&quot;2\&quot;,\n                \&quot;3\&quot;,\n                \&quot;5\&quot;,\n                \&quot;1\&quot;,\n                \&quot;2\&quot;,\n                \&quot;1\&quot;,\n                \&quot;1\&quot;,\n                \&quot;1\&quot;,\n                \&quot;1\&quot;,\n                \&quot;1\&quot;,\n                \&quot;1\&quot;,\n                \&quot;1\&quot;,\n                \&quot;1\&quot;,\n                \&quot;5\&quot;,\n                \&quot;5\&quot;,\n                \&quot;5\&quot;,\n                \&quot;5\&quot;,\n                \&quot;1\&quot;,\n                \&quot;1\&quot;,\n                \&quot;5\&quot;,\n                \&quot;5\&quot;,\n                \&quot;1\&quot;,\n                \&quot;1\&quot;,\n                \&quot;5\&quot;,\n                \&quot;1\&quot;,\n                \&quot;1\&quot;,\n                \&quot;3\&quot;,\n                \&quot;1\&quot;,\n                \&quot;5\&quot;,\n                \&quot;1\&quot;,\n                \&quot;1\&quot;,\n                \&quot;1\&quot;,\n                \&quot;1\&quot;,\n                \&quot;5\&quot;,\n                \&quot;2\&quot;,\n                \&quot;2\&quot;,\n                \&quot;1\&quot;,\n                \&quot;1\&quot;,\n                \&quot;2\&quot;,\n                \&quot;1\&quot;,\n                \&quot;5\&quot;,\n                \&quot;1\&quot;,\n                \&quot;5\&quot;,\n                \&quot;4\&quot;,\n                \&quot;1\&quot;,\n                \&quot;1\&quot;,\n                \&quot;3\&quot;,\n                \&quot;1\&quot;,\n                \&quot;2\&quot;,\n                \&quot;4\&quot;,\n                \&quot;1\&quot;,\n                \&quot;5\&quot;,\n                \&quot;1\&quot;,\n                \&quot;1\&quot;,\n                \&quot;1\&quot;,\n                \&quot;3\&quot;,\n                \&quot;1\&quot;,\n                \&quot;2\&quot;,\n                \&quot;3\&quot;,\n                \&quot;1\&quot;,\n                \&quot;5\&quot;,\n                \&quot;1\&quot;,\n                \&quot;3\&quot;,\n                \&quot;1\&quot;,\n                \&quot;4\&quot;,\n                \&quot;1\&quot;,\n                \&quot;1\&quot;,\n                \&quot;5\&quot;,\n                \&quot;3\&quot;,\n                \&quot;5\&quot;,\n                \&quot;5\&quot;,\n                \&quot;4\&quot;,\n                \&quot;3\&quot;,\n                \&quot;1\&quot;,\n                \&quot;5\&quot;,\n                \&quot;1\&quot;,\n                \&quot;2\&quot;,\n                \&quot;3\&quot;,\n                \&quot;2\&quot;,\n                \&quot;1\&quot;,\n                \&quot;1\&quot;,\n                \&quot;5\&quot;,\n                \&quot;5\&quot;,\n                \&quot;1\&quot;,\n                \&quot;5\&quot;,\n                \&quot;1\&quot;,\n                \&quot;1\&quot;,\n                \&quot;3\&quot;,\n                \&quot;5\&quot;,\n                \&quot;1\&quot;,\n                \&quot;1\&quot;,\n                \&quot;5\&quot;,\n                \&quot;2\&quot;,\n                \&quot;1\&quot;,\n                \&quot;1\&quot;,\n                \&quot;4\&quot;,\n                \&quot;5\&quot;,\n                \&quot;3\&quot;,\n                \&quot;3\&quot;,\n                \&quot;4\&quot;,\n                \&quot;1\&quot;,\n                \&quot;1\&quot;,\n                \&quot;4\&quot;,\n                \&quot;1\&quot;,\n                \&quot;2\&quot;,\n                \&quot;1\&quot;,\n                \&quot;3\&quot;,\n                \&quot;3\&quot;,\n                \&quot;1\&quot;,\n                \&quot;4\&quot;,\n                \&quot;1\&quot;,\n                \&quot;2\&quot;,\n                \&quot;2\&quot;,\n                \&quot;2\&quot;,\n                \&quot;1\&quot;,\n                \&quot;3\&quot;,\n                \&quot;1\&quot;,\n                \&quot;2\&quot;,\n                \&quot;2\&quot;,\n                \&quot;1\&quot;,\n                \&quot;1\&quot;,\n                \&quot;4\&quot;,\n                \&quot;5\&quot;,\n                \&quot;2\&quot;,\n                \&quot;1\&quot;,\n                \&quot;3\&quot;,\n                \&quot;3\&quot;,\n                \&quot;2\&quot;,\n                \&quot;3\&quot;,\n                \&quot;1\&quot;,\n                \&quot;4\&quot;,\n                \&quot;2\&quot;,\n                \&quot;5\&quot;,\n                \&quot;5\&quot;,\n                \&quot;1\&quot;,\n                \&quot;1\&quot;,\n                \&quot;1\&quot;,\n                \&quot;3\&quot;,\n                \&quot;4\&quot;,\n                \&quot;2\&quot;,\n                \&quot;1\&quot;,\n                \&quot;1\&quot;,\n                \&quot;5\&quot;,\n                \&quot;1\&quot;,\n                \&quot;1\&quot;,\n                \&quot;4\&quot;,\n                \&quot;1\&quot;,\n                \&quot;4\&quot;,\n                \&quot;1\&quot;,\n                \&quot;2\&quot;,\n                \&quot;1\&quot;,\n                \&quot;2\&quot;,\n                \&quot;2\&quot;,\n                \&quot;5\&quot;,\n                \&quot;4\&quot;,\n                \&quot;1\&quot;,\n                \&quot;4\&quot;,\n                \&quot;2\&quot;,\n                \&quot;1\&quot;,\n                \&quot;4\&quot;,\n                \&quot;1\&quot;,\n                \&quot;5\&quot;,\n                \&quot;1\&quot;,\n                \&quot;2\&quot;,\n                \&quot;1\&quot;,\n                \&quot;2\&quot;,\n                \&quot;3\&quot;,\n                \&quot;3\&quot;,\n                \&quot;3\&quot;,\n                \&quot;1\&quot;,\n                \&quot;1\&quot;,\n                \&quot;1\&quot;,\n                \&quot;3\&quot;,\n                \&quot;1\&quot;,\n                \&quot;1\&quot;,\n                \&quot;4\&quot;,\n                \&quot;1\&quot;,\n                \&quot;1\&quot;,\n                \&quot;1\&quot;,\n                \&quot;1\&quot;,\n                \&quot;3\&quot;,\n                \&quot;4\&quot;,\n                \&quot;3\&quot;,\n                \&quot;5\&quot;,\n                \&quot;1\&quot;,\n                \&quot;2\&quot;,\n                \&quot;1\&quot;,\n                \&quot;1\&quot;,\n                \&quot;1\&quot;,\n                \&quot;3\&quot;,\n                \&quot;1\&quot;,\n                \&quot;3\&quot;,\n                \&quot;4\&quot;,\n                \&quot;1\&quot;,\n                \&quot;1\&quot;,\n                \&quot;1\&quot;,\n                \&quot;1\&quot;,\n                \&quot;1\&quot;,\n                \&quot;1\&quot;,\n                \&quot;4\&quot;,\n                \&quot;1\&quot;,\n                \&quot;1\&quot;,\n                \&quot;1\&quot;,\n                \&quot;1\&quot;,\n                \&quot;1\&quot;,\n                \&quot;1\&quot;,\n                \&quot;1\&quot;,\n                \&quot;2\&quot;,\n                \&quot;1\&quot;,\n                \&quot;1\&quot;,\n                \&quot;2\&quot;,\n                \&quot;1\&quot;,\n                \&quot;1\&quot;,\n                \&quot;1\&quot;,\n                \&quot;1\&quot;,\n                \&quot;1\&quot;,\n                \&quot;1\&quot;,\n                \&quot;1\&quot;,\n                \&quot;1\&quot;,\n                \&quot;2\&quot;,\n                \&quot;1\&quot;,\n                \&quot;1\&quot;,\n                \&quot;1\&quot;,\n                \&quot;2\&quot;,\n                \&quot;2\&quot;,\n                \&quot;1\&quot;,\n                \&quot;1\&quot;,\n                \&quot;5\&quot;,\n                \&quot;1\&quot;,\n                \&quot;1\&quot;,\n                \&quot;5\&quot;,\n                \&quot;2\&quot;,\n                \&quot;2\&quot;,\n                \&quot;1\&quot;,\n                \&quot;2\&quot;,\n                \&quot;1\&quot;,\n                \&quot;3\&quot;,\n                \&quot;3\&quot;,\n                \&quot;1\&quot;,\n                \&quot;1\&quot;,\n                \&quot;1\&quot;,\n                \&quot;5\&quot;,\n                \&quot;1\&quot;,\n                \&quot;3\&quot;,\n                \&quot;5\&quot;,\n                \&quot;1\&quot;,\n                \&quot;5\&quot;,\n                \&quot;5\&quot;,\n                \&quot;5\&quot;,\n                \&quot;5\&quot;,\n                \&quot;5\&quot;,\n                \&quot;5\&quot;,\n                \&quot;5\&quot;,\n                \&quot;5\&quot;,\n                \&quot;3\&quot;,\n                \&quot;5\&quot;,\n                \&quot;1\&quot;,\n                \&quot;3\&quot;,\n                \&quot;5\&quot;,\n                \&quot;3\&quot;,\n                \&quot;5\&quot;,\n                \&quot;5\&quot;,\n                \&quot;5\&quot;,\n                \&quot;5\&quot;,\n                \&quot;5\&quot;,\n                \&quot;3\&quot;,\n                \&quot;3\&quot;,\n                \&quot;2\&quot;,\n                \&quot;3\&quot;,\n                \&quot;1\&quot;,\n                \&quot;5\&quot;,\n                \&quot;2\&quot;,\n                \&quot;5\&quot;,\n                \&quot;1\&quot;,\n                \&quot;1\&quot;,\n                \&quot;5\&quot;,\n                \&quot;2\&quot;,\n                \&quot;2\&quot;,\n                \&quot;1\&quot;,\n                \&quot;1\&quot;,\n                \&quot;1\&quot;,\n                \&quot;1\&quot;,\n                \&quot;1\&quot;,\n                \&quot;1\&quot;,\n                \&quot;2\&quot;,\n                \&quot;1\&quot;,\n                \&quot;2\&quot;,\n                \&quot;5\&quot;,\n                \&quot;5\&quot;,\n                \&quot;5\&quot;,\n                \&quot;1\&quot;,\n                \&quot;5\&quot;,\n                \&quot;5\&quot;,\n                \&quot;1\&quot;,\n                \&quot;5\&quot;,\n                \&quot;5\&quot;,\n                \&quot;5\&quot;,\n                \&quot;1\&quot;,\n                \&quot;1\&quot;,\n                \&quot;1\&quot;,\n                \&quot;1\&quot;,\n                \&quot;5\&quot;,\n                \&quot;1\&quot;,\n                \&quot;1\&quot;,\n                \&quot;1\&quot;,\n                \&quot;1\&quot;,\n                \&quot;1\&quot;,\n                \&quot;1\&quot;,\n                \&quot;1\&quot;,\n                \&quot;1\&quot;,\n                \&quot;1\&quot;,\n                \&quot;1\&quot;,\n                \&quot;1\&quot;,\n                \&quot;1\&quot;,\n                \&quot;1\&quot;,\n                \&quot;1\&quot;,\n                \&quot;1\&quot;,\n                \&quot;1\&quot;,\n                \&quot;5\&quot;,\n                \&quot;1\&quot;,\n                \&quot;1\&quot;,\n                \&quot;1\&quot;,\n                \&quot;1\&quot;,\n                \&quot;1\&quot;,\n                \&quot;1\&quot;,\n                \&quot;1\&quot;,\n                \&quot;1\&quot;,\n                \&quot;1\&quot;,\n                \&quot;1\&quot;\n            ],\n            \&quot;cumulative\&quot;: {\n                \&quot;enabled\&quot;: false\n            },\n            \&quot;text\&quot;: \&quot;\&quot;,\n            \&quot;orientation\&quot;: \&quot;v\&quot;,\n            \&quot;xcalendar\&quot;: \&quot;gregorian\&quot;,\n            \&quot;ycalendar\&quot;: \&quot;gregorian\&quot;,\n            \&quot;histnorm\&quot;: \&quot;\&quot;,\n            \&quot;nbinsx\&quot;: 0,\n            \&quot;marker\&quot;: {\n                \&quot;color\&quot;: \&quot;rgba(96, 159, 148, 1)\&quot;,\n                \&quot;line\&quot;: {\n                    \&quot;color\&quot;: \&quot;#444\&quot;,\n                    \&quot;width\&quot;: 0\n                }\n            },\n            \&quot;error_y\&quot;: {\n                \&quot;visible\&quot;: false\n            },\n            \&quot;error_x\&quot;: {\n                \&quot;visible\&quot;: false\n            },\n            \&quot;hoverinfo\&quot;: \&quot;x+y+z+text\&quot;,\n            \&quot;opacity\&quot;: 1,\n            \&quot;xaxis\&quot;: \&quot;x\&quot;,\n            \&quot;yaxis\&quot;: \&quot;y\&quot;,\n            \&quot;index\&quot;: 0,\n            \&quot;xbins\&quot;: {\n                \&quot;start\&quot;: 0.5,\n                \&quot;end\&quot;: 5.5,\n                \&quot;size\&quot;: 1\n            },\n            \&quot;autobinx\&quot;: true\n        }\n    ],\n    \&quot;layout\&quot;: {\n        \&quot;font\&quot;: {\n            \&quot;family\&quot;: \&quot;\\\&quot;Open Sans\\\&quot;, verdana, arial, sans-serif\&quot;,\n            \&quot;size\&quot;: 12,\n            \&quot;color\&quot;: \&quot;#444\&quot;\n        },\n        \&quot;title\&quot;: \&quot;Click to enter Plot title\&quot;,\n        \&quot;titlefont\&quot;: {\n            \&quot;family\&quot;: \&quot;\\\&quot;Open Sans\\\&quot;, verdana, arial, sans-serif\&quot;,\n            \&quot;size\&quot;: 17,\n            \&quot;color\&quot;: \&quot;#444\&quot;\n        },\n        \&quot;autosize\&quot;: true,\n        \&quot;width\&quot;: 562,\n        \&quot;height\&quot;: 289,\n        \&quot;margin\&quot;: {\n            \&quot;l\&quot;: 80,\n            \&quot;r\&quot;: 80,\n            \&quot;t\&quot;: 100,\n            \&quot;b\&quot;: 80,\n            \&quot;pad\&quot;: 0,\n            \&quot;autoexpand\&quot;: true\n        },\n        \&quot;paper_bgcolor\&quot;: \&quot;#fff\&quot;,\n        \&quot;separators\&quot;: \&quot;.,\&quot;,\n        \&quot;hidesources\&quot;: false,\n        \&quot;smith\&quot;: false,\n        \&quot;calendar\&quot;: \&quot;gregorian\&quot;,\n        \&quot;hoverlabel\&quot;: {\n            \&quot;namelength\&quot;: 15,\n            \&quot;font\&quot;: {\n                \&quot;family\&quot;: \&quot;Arial, sans-serif\&quot;,\n                \&quot;size\&quot;: 13\n            }\n        },\n        \&quot;plot_bgcolor\&quot;: \&quot;#fff\&quot;,\n        \&quot;xaxis\&quot;: {\n            \&quot;type\&quot;: \&quot;linear\&quot;,\n            \&quot;visible\&quot;: true,\n            \&quot;autorange\&quot;: true,\n            \&quot;rangemode\&quot;: \&quot;normal\&quot;,\n            \&quot;range\&quot;: [\n                0.5,\n                5.5\n            ],\n            \&quot;color\&quot;: \&quot;#444\&quot;,\n            \&quot;title\&quot;: \&quot;Punctuality Ratings - NYC Physicians\&quot;,\n            \&quot;titlefont\&quot;: {\n                \&quot;family\&quot;: \&quot;\\\&quot;Open Sans\\\&quot;, verdana, arial, sans-serif\&quot;,\n                \&quot;size\&quot;: 14,\n                \&quot;color\&quot;: \&quot;#444\&quot;\n            },\n            \&quot;tickmode\&quot;: \&quot;auto\&quot;,\n            \&quot;nticks\&quot;: 0,\n            \&quot;tickprefix\&quot;: \&quot;\&quot;,\n            \&quot;ticksuffix\&quot;: \&quot;\&quot;,\n            \&quot;showticklabels\&quot;: true,\n            \&quot;tickfont\&quot;: {\n                \&quot;family\&quot;: \&quot;\\\&quot;Open Sans\\\&quot;, verdana, arial, sans-serif\&quot;,\n                \&quot;size\&quot;: 12,\n                \&quot;color\&quot;: \&quot;#444\&quot;\n            },\n            \&quot;tickangle\&quot;: \&quot;auto\&quot;,\n            \&quot;tickformat\&quot;: \&quot;\&quot;,\n            \&quot;showexponent\&quot;: \&quot;all\&quot;,\n            \&quot;exponentformat\&quot;: \&quot;B\&quot;,\n            \&quot;separatethousands\&quot;: false,\n            \&quot;hoverformat\&quot;: \&quot;\&quot;,\n            \&quot;ticks\&quot;: \&quot;\&quot;,\n            \&quot;showline\&quot;: false,\n            \&quot;showgrid\&quot;: false,\n            \&quot;zeroline\&quot;: false,\n            \&quot;showspikes\&quot;: false,\n            \&quot;anchor\&quot;: \&quot;y\&quot;,\n            \&quot;side\&quot;: \&quot;bottom\&quot;,\n            \&quot;domain\&quot;: [\n                0,\n                1\n            ],\n            \&quot;layer\&quot;: \&quot;above traces\&quot;,\n            \&quot;fixedrange\&quot;: false,\n            \&quot;constrain\&quot;: \&quot;range\&quot;,\n            \&quot;constraintoward\&quot;: \&quot;center\&quot;,\n            \&quot;tick0\&quot;: 0,\n            \&quot;dtick\&quot;: 1\n        },\n        \&quot;yaxis\&quot;: {\n            \&quot;type\&quot;: \&quot;linear\&quot;,\n            \&quot;visible\&quot;: true,\n            \&quot;autorange\&quot;: true,\n            \&quot;rangemode\&quot;: \&quot;normal\&quot;,\n            \&quot;range\&quot;: [\n                0,\n                5977.894736842105\n            ],\n            \&quot;color\&quot;: \&quot;#444\&quot;,\n            \&quot;title\&quot;: \&quot;Frequency\&quot;,\n            \&quot;titlefont\&quot;: {\n                \&quot;family\&quot;: \&quot;\\\&quot;Open Sans\\\&quot;, verdana, arial, sans-serif\&quot;,\n                \&quot;size\&quot;: 14,\n                \&quot;color\&quot;: \&quot;#444\&quot;\n            },\n            \&quot;tickmode\&quot;: \&quot;auto\&quot;,\n            \&quot;nticks\&quot;: 0,\n            \&quot;tickprefix\&quot;: \&quot;\&quot;,\n            \&quot;ticksuffix\&quot;: \&quot;\&quot;,\n            \&quot;showticklabels\&quot;: true,\n            \&quot;tickfont\&quot;: {\n                \&quot;family\&quot;: \&quot;\\\&quot;Open Sans\\\&quot;, verdana, arial, sans-serif\&quot;,\n                \&quot;size\&quot;: 12,\n                \&quot;color\&quot;: \&quot;#444\&quot;\n            },\n            \&quot;tickangle\&quot;: \&quot;auto\&quot;,\n            \&quot;tickformat\&quot;: \&quot;\&quot;,\n            \&quot;showexponent\&quot;: \&quot;all\&quot;,\n            \&quot;exponentformat\&quot;: \&quot;B\&quot;,\n            \&quot;separatethousands\&quot;: false,\n            \&quot;hoverformat\&quot;: \&quot;\&quot;,\n            \&quot;ticks\&quot;: \&quot;\&quot;,\n            \&quot;showline\&quot;: false,\n            \&quot;gridcolor\&quot;: \&quot;rgb(238, 238, 238)\&quot;,\n            \&quot;gridwidth\&quot;: 1,\n            \&quot;showgrid\&quot;: true,\n            \&quot;zerolinecolor\&quot;: \&quot;#444\&quot;,\n            \&quot;zerolinewidth\&quot;: 1,\n            \&quot;zeroline\&quot;: true,\n            \&quot;showspikes\&quot;: false,\n            \&quot;anchor\&quot;: \&quot;x\&quot;,\n            \&quot;side\&quot;: \&quot;left\&quot;,\n            \&quot;domain\&quot;: [\n                0,\n                1\n            ],\n            \&quot;layer\&quot;: \&quot;above traces\&quot;,\n            \&quot;fixedrange\&quot;: false,\n            \&quot;constrain\&quot;: \&quot;range\&quot;,\n            \&quot;constraintoward\&quot;: \&quot;middle\&quot;,\n            \&quot;tick0\&quot;: 0,\n            \&quot;dtick\&quot;: 2000\n        },\n        \&quot;barmode\&quot;: \&quot;group\&quot;,\n        \&quot;barnorm\&quot;: \&quot;\&quot;,\n        \&quot;bargap\&quot;: 0,\n        \&quot;bargroupgap\&quot;: 0,\n        \&quot;dragmode\&quot;: \&quot;zoom\&quot;,\n        \&quot;hovermode\&quot;: \&quot;x\&quot;,\n        \&quot;legend\&quot;: {},\n        \&quot;showlegend\&quot;: false,\n        \&quot;annotations\&quot;: [],\n        \&quot;shapes\&quot;: [],\n        \&quot;images\&quot;: [],\n        \&quot;updatemenus\&quot;: [],\n        \&quot;sliders\&quot;: [],\n        \&quot;breakpoints\&quot;: []\n    }\n}&quot;,&quot;appVersion&quot;:&quot;1.0&quot;,&quot;savedDate&quot;:&quot;Wed, 25 Oct 2017 01:07:43 GMT&quot;}"/>
   </we:properties>
   <we:bindings/>
   <we:snapshot xmlns:r="http://schemas.openxmlformats.org/officeDocument/2006/relationships" r:embed="rId1"/>
@@ -6594,7 +6390,7 @@
     <we:reference id="wa104379485" version="1.0.0.2" store="wa104379485" storeType="OMEX"/>
   </we:alternateReferences>
   <we:properties>
-    <we:property name="savedState" value="{&quot;plotlyChartUrl&quot;:&quot;https://plot.ly/~gwenkf/38&quot;,&quot;plotlyChartJSON&quot;:null,&quot;appVersion&quot;:&quot;1.0&quot;,&quot;savedDate&quot;:&quot;Tue, 24 Oct 2017 17:16:12 GMT&quot;}"/>
+    <we:property name="savedState" value="{&quot;plotlyChartUrl&quot;:&quot;https://plot.ly/~gwenkf/38&quot;,&quot;plotlyChartJSON&quot;:null,&quot;appVersion&quot;:&quot;1.0&quot;,&quot;savedDate&quot;:&quot;Wed, 25 Oct 2017 01:07:43 GMT&quot;}"/>
   </we:properties>
   <we:bindings/>
   <we:snapshot xmlns:r="http://schemas.openxmlformats.org/officeDocument/2006/relationships" r:embed="rId1"/>
@@ -6608,7 +6404,7 @@
     <we:reference id="wa104379485" version="1.0.0.2" store="wa104379485" storeType="OMEX"/>
   </we:alternateReferences>
   <we:properties>
-    <we:property name="savedState" value="{&quot;plotlyChartUrl&quot;:&quot;https://plot.ly/~gwenkf/18/number-of-doctors-vs-number-of-languages-spoken/&quot;,&quot;plotlyChartJSON&quot;:null,&quot;appVersion&quot;:&quot;1.0&quot;,&quot;savedDate&quot;:&quot;Tue, 24 Oct 2017 03:34:40 GMT&quot;}"/>
+    <we:property name="savedState" value="{&quot;plotlyChartUrl&quot;:&quot;https://plot.ly/~gwenkf/18/number-of-doctors-vs-number-of-languages-spoken/&quot;,&quot;plotlyChartJSON&quot;:null,&quot;appVersion&quot;:&quot;1.0&quot;,&quot;savedDate&quot;:&quot;Wed, 25 Oct 2017 01:38:29 GMT&quot;}"/>
   </we:properties>
   <we:bindings/>
   <we:snapshot xmlns:r="http://schemas.openxmlformats.org/officeDocument/2006/relationships" r:embed="rId1"/>
@@ -6622,7 +6418,7 @@
     <we:reference id="wa104379485" version="1.0.0.2" store="wa104379485" storeType="OMEX"/>
   </we:alternateReferences>
   <we:properties>
-    <we:property name="savedState" value="{&quot;plotlyChartUrl&quot;:&quot;https://plot.ly/~gwenkf/11&quot;,&quot;plotlyChartJSON&quot;:null,&quot;appVersion&quot;:&quot;1.0&quot;,&quot;savedDate&quot;:&quot;Tue, 24 Oct 2017 15:02:15 GMT&quot;}"/>
+    <we:property name="savedState" value="{&quot;plotlyChartUrl&quot;:&quot;https://plot.ly/~gwenkf/11&quot;,&quot;plotlyChartJSON&quot;:null,&quot;appVersion&quot;:&quot;1.0&quot;,&quot;savedDate&quot;:&quot;Wed, 25 Oct 2017 01:45:00 GMT&quot;}"/>
   </we:properties>
   <we:bindings/>
   <we:snapshot xmlns:r="http://schemas.openxmlformats.org/officeDocument/2006/relationships" r:embed="rId1"/>
@@ -6630,13 +6426,13 @@
 </file>
 
 <file path=ppt/webextensions/webextension4.xml><?xml version="1.0" encoding="utf-8"?>
-<we:webextension xmlns:we="http://schemas.microsoft.com/office/webextensions/webextension/2010/11" id="{033FCDDF-C12D-4C7B-B083-2729A26F42E4}">
+<we:webextension xmlns:we="http://schemas.microsoft.com/office/webextensions/webextension/2010/11" id="{B95C0874-CAF8-4EA7-B396-A217CAF5A8F2}">
   <we:reference id="wa104379485" version="1.0.0.2" store="en-US" storeType="OMEX"/>
   <we:alternateReferences>
     <we:reference id="wa104379485" version="1.0.0.2" store="wa104379485" storeType="OMEX"/>
   </we:alternateReferences>
   <we:properties>
-    <we:property name="savedState" value="{&quot;plotlyChartUrl&quot;:&quot;https://plot.ly/~gwenkf/0&quot;,&quot;plotlyChartJSON&quot;:null,&quot;appVersion&quot;:&quot;1.0&quot;,&quot;savedDate&quot;:&quot;Tue, 24 Oct 2017 15:02:15 GMT&quot;}"/>
+    <we:property name="savedState" value="{&quot;plotlyChartUrl&quot;:&quot;https://plot.ly/~gwenkf/0&quot;,&quot;plotlyChartJSON&quot;:null,&quot;appVersion&quot;:&quot;1.0&quot;,&quot;savedDate&quot;:&quot;Wed, 25 Oct 2017 01:45:00 GMT&quot;}"/>
   </we:properties>
   <we:bindings/>
   <we:snapshot xmlns:r="http://schemas.openxmlformats.org/officeDocument/2006/relationships" r:embed="rId1"/>
@@ -6650,7 +6446,7 @@
     <we:reference id="wa104379485" version="1.0.0.2" store="wa104379485" storeType="OMEX"/>
   </we:alternateReferences>
   <we:properties>
-    <we:property name="savedState" value="{&quot;plotlyChartUrl&quot;:&quot;https://plot.ly/~gwenkf/14&quot;,&quot;plotlyChartJSON&quot;:null,&quot;appVersion&quot;:&quot;1.0&quot;,&quot;savedDate&quot;:&quot;Tue, 24 Oct 2017 03:35:43 GMT&quot;}"/>
+    <we:property name="savedState" value="{&quot;plotlyChartUrl&quot;:&quot;https://plot.ly/~gwenkf/14&quot;,&quot;plotlyChartJSON&quot;:null,&quot;appVersion&quot;:&quot;1.0&quot;,&quot;savedDate&quot;:&quot;Wed, 25 Oct 2017 01:45:02 GMT&quot;}"/>
   </we:properties>
   <we:bindings/>
   <we:snapshot xmlns:r="http://schemas.openxmlformats.org/officeDocument/2006/relationships" r:embed="rId1"/>
@@ -6664,7 +6460,7 @@
     <we:reference id="wa104379485" version="1.0.0.2" store="wa104379485" storeType="OMEX"/>
   </we:alternateReferences>
   <we:properties>
-    <we:property name="savedState" value="{&quot;plotlyChartUrl&quot;:&quot;https://plot.ly/~gwenkf/16&quot;,&quot;plotlyChartJSON&quot;:null,&quot;appVersion&quot;:&quot;1.0&quot;,&quot;savedDate&quot;:&quot;Tue, 24 Oct 2017 03:35:42 GMT&quot;}"/>
+    <we:property name="savedState" value="{&quot;plotlyChartUrl&quot;:&quot;https://plot.ly/~gwenkf/16&quot;,&quot;plotlyChartJSON&quot;:null,&quot;appVersion&quot;:&quot;1.0&quot;,&quot;savedDate&quot;:&quot;Wed, 25 Oct 2017 01:45:04 GMT&quot;}"/>
   </we:properties>
   <we:bindings/>
   <we:snapshot xmlns:r="http://schemas.openxmlformats.org/officeDocument/2006/relationships" r:embed="rId1"/>
@@ -6678,7 +6474,7 @@
     <we:reference id="wa104379485" version="1.0.0.2" store="wa104379485" storeType="OMEX"/>
   </we:alternateReferences>
   <we:properties>
-    <we:property name="savedState" value="{&quot;plotlyChartUrl&quot;:&quot;https://plot.ly/~gwenkf/7&quot;,&quot;plotlyChartJSON&quot;:null,&quot;appVersion&quot;:&quot;1.0&quot;,&quot;savedDate&quot;:&quot;Tue, 24 Oct 2017 03:36:05 GMT&quot;}"/>
+    <we:property name="savedState" value="{&quot;plotlyChartUrl&quot;:&quot;https://plot.ly/~gwenkf/7&quot;,&quot;plotlyChartJSON&quot;:null,&quot;appVersion&quot;:&quot;1.0&quot;,&quot;savedDate&quot;:&quot;Wed, 25 Oct 2017 01:45:04 GMT&quot;}"/>
   </we:properties>
   <we:bindings/>
   <we:snapshot xmlns:r="http://schemas.openxmlformats.org/officeDocument/2006/relationships" r:embed="rId1"/>
@@ -6692,7 +6488,7 @@
     <we:reference id="wa104379485" version="1.0.0.2" store="wa104379485" storeType="OMEX"/>
   </we:alternateReferences>
   <we:properties>
-    <we:property name="savedState" value="{&quot;plotlyChartUrl&quot;:&quot;https://plot.ly/~gwenkf/42&quot;,&quot;plotlyChartJSON&quot;:null,&quot;appVersion&quot;:&quot;1.0&quot;,&quot;savedDate&quot;:&quot;Tue, 24 Oct 2017 17:14:02 GMT&quot;}"/>
+    <we:property name="savedState" value="{&quot;plotlyChartUrl&quot;:&quot;https://plot.ly/~gwenkf/42&quot;,&quot;plotlyChartJSON&quot;:null,&quot;appVersion&quot;:&quot;1.0&quot;,&quot;savedDate&quot;:&quot;Wed, 25 Oct 2017 01:40:43 GMT&quot;}"/>
   </we:properties>
   <we:bindings/>
   <we:snapshot xmlns:r="http://schemas.openxmlformats.org/officeDocument/2006/relationships" r:embed="rId1"/>
@@ -6706,7 +6502,7 @@
     <we:reference id="wa104379485" version="1.0.0.2" store="wa104379485" storeType="OMEX"/>
   </we:alternateReferences>
   <we:properties>
-    <we:property name="savedState" value="{&quot;plotlyChartUrl&quot;:&quot;https://plot.ly/~gwenkf/34&quot;,&quot;plotlyChartJSON&quot;:null,&quot;appVersion&quot;:&quot;1.0&quot;,&quot;savedDate&quot;:&quot;Tue, 24 Oct 2017 17:13:58 GMT&quot;}"/>
+    <we:property name="savedState" value="{&quot;plotlyChartUrl&quot;:&quot;https://plot.ly/~gwenkf/34&quot;,&quot;plotlyChartJSON&quot;:null,&quot;appVersion&quot;:&quot;1.0&quot;,&quot;savedDate&quot;:&quot;Wed, 25 Oct 2017 01:07:41 GMT&quot;}"/>
   </we:properties>
   <we:bindings/>
   <we:snapshot xmlns:r="http://schemas.openxmlformats.org/officeDocument/2006/relationships" r:embed="rId1"/>

</xml_diff>